<commit_message>
Add first page of PPT
</commit_message>
<xml_diff>
--- a/TA_Class_III.pptx
+++ b/TA_Class_III.pptx
@@ -108,6 +108,11 @@
       </a:defRPr>
     </a:lvl9pPr>
   </p:defaultTextStyle>
+  <p:extLst>
+    <p:ext uri="{EFAFB233-063F-42B5-8137-9DF3F51BA10A}">
+      <p15:sldGuideLst xmlns:p15="http://schemas.microsoft.com/office/powerpoint/2012/main"/>
+    </p:ext>
+  </p:extLst>
 </p:presentation>
 </file>
 
@@ -3277,6 +3282,257 @@
           </a:prstGeom>
         </p:spPr>
       </p:pic>
+      <p:cxnSp>
+        <p:nvCxnSpPr>
+          <p:cNvPr id="5" name="直線接點 4">
+            <a:extLst>
+              <a:ext uri="{FF2B5EF4-FFF2-40B4-BE49-F238E27FC236}">
+                <a16:creationId xmlns:a16="http://schemas.microsoft.com/office/drawing/2014/main" id="{6EEDF312-A1A4-4102-BABE-2071A3C085C4}"/>
+              </a:ext>
+            </a:extLst>
+          </p:cNvPr>
+          <p:cNvCxnSpPr>
+            <a:cxnSpLocks/>
+          </p:cNvCxnSpPr>
+          <p:nvPr/>
+        </p:nvCxnSpPr>
+        <p:spPr>
+          <a:xfrm>
+            <a:off x="678535" y="637564"/>
+            <a:ext cx="285226" cy="503339"/>
+          </a:xfrm>
+          <a:prstGeom prst="line">
+            <a:avLst/>
+          </a:prstGeom>
+          <a:ln w="28575">
+            <a:solidFill>
+              <a:schemeClr val="bg1">
+                <a:lumMod val="50000"/>
+              </a:schemeClr>
+            </a:solidFill>
+          </a:ln>
+        </p:spPr>
+        <p:style>
+          <a:lnRef idx="1">
+            <a:schemeClr val="accent1"/>
+          </a:lnRef>
+          <a:fillRef idx="0">
+            <a:schemeClr val="accent1"/>
+          </a:fillRef>
+          <a:effectRef idx="0">
+            <a:schemeClr val="accent1"/>
+          </a:effectRef>
+          <a:fontRef idx="minor">
+            <a:schemeClr val="tx1"/>
+          </a:fontRef>
+        </p:style>
+      </p:cxnSp>
+      <p:cxnSp>
+        <p:nvCxnSpPr>
+          <p:cNvPr id="6" name="直線接點 5">
+            <a:extLst>
+              <a:ext uri="{FF2B5EF4-FFF2-40B4-BE49-F238E27FC236}">
+                <a16:creationId xmlns:a16="http://schemas.microsoft.com/office/drawing/2014/main" id="{CDFE80F0-F85E-42A5-9B40-A9DA6E0602EF}"/>
+              </a:ext>
+            </a:extLst>
+          </p:cNvPr>
+          <p:cNvCxnSpPr>
+            <a:cxnSpLocks/>
+          </p:cNvCxnSpPr>
+          <p:nvPr/>
+        </p:nvCxnSpPr>
+        <p:spPr>
+          <a:xfrm>
+            <a:off x="963761" y="1140903"/>
+            <a:ext cx="3162650" cy="0"/>
+          </a:xfrm>
+          <a:prstGeom prst="line">
+            <a:avLst/>
+          </a:prstGeom>
+          <a:ln w="28575">
+            <a:solidFill>
+              <a:schemeClr val="bg1">
+                <a:lumMod val="50000"/>
+              </a:schemeClr>
+            </a:solidFill>
+          </a:ln>
+        </p:spPr>
+        <p:style>
+          <a:lnRef idx="1">
+            <a:schemeClr val="accent1"/>
+          </a:lnRef>
+          <a:fillRef idx="0">
+            <a:schemeClr val="accent1"/>
+          </a:fillRef>
+          <a:effectRef idx="0">
+            <a:schemeClr val="accent1"/>
+          </a:effectRef>
+          <a:fontRef idx="minor">
+            <a:schemeClr val="tx1"/>
+          </a:fontRef>
+        </p:style>
+      </p:cxnSp>
+      <p:cxnSp>
+        <p:nvCxnSpPr>
+          <p:cNvPr id="7" name="直線接點 6">
+            <a:extLst>
+              <a:ext uri="{FF2B5EF4-FFF2-40B4-BE49-F238E27FC236}">
+                <a16:creationId xmlns:a16="http://schemas.microsoft.com/office/drawing/2014/main" id="{8DACCE5A-9F1D-4F2B-B490-2E0981BD5943}"/>
+              </a:ext>
+            </a:extLst>
+          </p:cNvPr>
+          <p:cNvCxnSpPr>
+            <a:cxnSpLocks/>
+          </p:cNvCxnSpPr>
+          <p:nvPr/>
+        </p:nvCxnSpPr>
+        <p:spPr>
+          <a:xfrm>
+            <a:off x="4126411" y="1140904"/>
+            <a:ext cx="285226" cy="503339"/>
+          </a:xfrm>
+          <a:prstGeom prst="line">
+            <a:avLst/>
+          </a:prstGeom>
+          <a:ln w="28575">
+            <a:solidFill>
+              <a:schemeClr val="bg1">
+                <a:lumMod val="50000"/>
+              </a:schemeClr>
+            </a:solidFill>
+          </a:ln>
+        </p:spPr>
+        <p:style>
+          <a:lnRef idx="1">
+            <a:schemeClr val="accent1"/>
+          </a:lnRef>
+          <a:fillRef idx="0">
+            <a:schemeClr val="accent1"/>
+          </a:fillRef>
+          <a:effectRef idx="0">
+            <a:schemeClr val="accent1"/>
+          </a:effectRef>
+          <a:fontRef idx="minor">
+            <a:schemeClr val="tx1"/>
+          </a:fontRef>
+        </p:style>
+      </p:cxnSp>
+      <p:sp>
+        <p:nvSpPr>
+          <p:cNvPr id="8" name="文字方塊 7">
+            <a:extLst>
+              <a:ext uri="{FF2B5EF4-FFF2-40B4-BE49-F238E27FC236}">
+                <a16:creationId xmlns:a16="http://schemas.microsoft.com/office/drawing/2014/main" id="{D65015A0-B7B4-4BBF-9A7C-A7EA5F4C2CB8}"/>
+              </a:ext>
+            </a:extLst>
+          </p:cNvPr>
+          <p:cNvSpPr txBox="1"/>
+          <p:nvPr/>
+        </p:nvSpPr>
+        <p:spPr>
+          <a:xfrm>
+            <a:off x="963761" y="433017"/>
+            <a:ext cx="3304110" cy="707886"/>
+          </a:xfrm>
+          <a:prstGeom prst="rect">
+            <a:avLst/>
+          </a:prstGeom>
+          <a:noFill/>
+        </p:spPr>
+        <p:txBody>
+          <a:bodyPr wrap="none" rtlCol="0">
+            <a:spAutoFit/>
+          </a:bodyPr>
+          <a:lstStyle/>
+          <a:p>
+            <a:r>
+              <a:rPr lang="en-US" altLang="zh-TW" sz="4000" dirty="0">
+                <a:latin typeface="微軟正黑體" panose="020B0604030504040204" pitchFamily="34" charset="-120"/>
+                <a:ea typeface="微軟正黑體" panose="020B0604030504040204" pitchFamily="34" charset="-120"/>
+                <a:cs typeface="Times New Roman" panose="02020603050405020304" pitchFamily="18" charset="0"/>
+              </a:rPr>
+              <a:t>Git &amp; GitHub</a:t>
+            </a:r>
+            <a:endParaRPr lang="zh-TW" altLang="en-US" sz="4000" dirty="0">
+              <a:latin typeface="微軟正黑體" panose="020B0604030504040204" pitchFamily="34" charset="-120"/>
+              <a:ea typeface="微軟正黑體" panose="020B0604030504040204" pitchFamily="34" charset="-120"/>
+              <a:cs typeface="Times New Roman" panose="02020603050405020304" pitchFamily="18" charset="0"/>
+            </a:endParaRPr>
+          </a:p>
+        </p:txBody>
+      </p:sp>
+      <p:pic>
+        <p:nvPicPr>
+          <p:cNvPr id="9" name="圖片 8">
+            <a:extLst>
+              <a:ext uri="{FF2B5EF4-FFF2-40B4-BE49-F238E27FC236}">
+                <a16:creationId xmlns:a16="http://schemas.microsoft.com/office/drawing/2014/main" id="{0030A6E6-552C-4911-9A47-B910C8A045BD}"/>
+              </a:ext>
+            </a:extLst>
+          </p:cNvPr>
+          <p:cNvPicPr>
+            <a:picLocks noChangeAspect="1"/>
+          </p:cNvPicPr>
+          <p:nvPr/>
+        </p:nvPicPr>
+        <p:blipFill>
+          <a:blip r:embed="rId4">
+            <a:extLst>
+              <a:ext uri="{28A0092B-C50C-407E-A947-70E740481C1C}">
+                <a14:useLocalDpi xmlns:a14="http://schemas.microsoft.com/office/drawing/2010/main" val="0"/>
+              </a:ext>
+            </a:extLst>
+          </a:blip>
+          <a:stretch>
+            <a:fillRect/>
+          </a:stretch>
+        </p:blipFill>
+        <p:spPr>
+          <a:xfrm>
+            <a:off x="1200734" y="2313696"/>
+            <a:ext cx="3067137" cy="1280782"/>
+          </a:xfrm>
+          <a:prstGeom prst="rect">
+            <a:avLst/>
+          </a:prstGeom>
+        </p:spPr>
+      </p:pic>
+      <p:pic>
+        <p:nvPicPr>
+          <p:cNvPr id="11" name="圖片 10" descr="一張含有 文字 的圖片&#10;&#10;自動產生的描述">
+            <a:extLst>
+              <a:ext uri="{FF2B5EF4-FFF2-40B4-BE49-F238E27FC236}">
+                <a16:creationId xmlns:a16="http://schemas.microsoft.com/office/drawing/2014/main" id="{32A2A153-8C9D-44F6-8B12-1F51E589F1C1}"/>
+              </a:ext>
+            </a:extLst>
+          </p:cNvPr>
+          <p:cNvPicPr>
+            <a:picLocks noChangeAspect="1"/>
+          </p:cNvPicPr>
+          <p:nvPr/>
+        </p:nvPicPr>
+        <p:blipFill>
+          <a:blip r:embed="rId5">
+            <a:extLst>
+              <a:ext uri="{28A0092B-C50C-407E-A947-70E740481C1C}">
+                <a14:useLocalDpi xmlns:a14="http://schemas.microsoft.com/office/drawing/2010/main" val="0"/>
+              </a:ext>
+            </a:extLst>
+          </a:blip>
+          <a:stretch>
+            <a:fillRect/>
+          </a:stretch>
+        </p:blipFill>
+        <p:spPr>
+          <a:xfrm>
+            <a:off x="3442070" y="4169658"/>
+            <a:ext cx="4429387" cy="1472771"/>
+          </a:xfrm>
+          <a:prstGeom prst="rect">
+            <a:avLst/>
+          </a:prstGeom>
+        </p:spPr>
+      </p:pic>
     </p:spTree>
     <p:extLst>
       <p:ext uri="{BB962C8B-B14F-4D97-AF65-F5344CB8AC3E}">

</xml_diff>

<commit_message>
Add the .gitignor file in the folder.
</commit_message>
<xml_diff>
--- a/TA_Class_III.pptx
+++ b/TA_Class_III.pptx
@@ -16,8 +16,8 @@
     <p:sldId id="302" r:id="rId10"/>
     <p:sldId id="303" r:id="rId11"/>
     <p:sldId id="304" r:id="rId12"/>
-    <p:sldId id="305" r:id="rId13"/>
-    <p:sldId id="306" r:id="rId14"/>
+    <p:sldId id="306" r:id="rId13"/>
+    <p:sldId id="305" r:id="rId14"/>
     <p:sldId id="307" r:id="rId15"/>
     <p:sldId id="308" r:id="rId16"/>
     <p:sldId id="309" r:id="rId17"/>
@@ -26,6 +26,12 @@
     <p:sldId id="312" r:id="rId20"/>
     <p:sldId id="313" r:id="rId21"/>
     <p:sldId id="300" r:id="rId22"/>
+    <p:sldId id="314" r:id="rId23"/>
+    <p:sldId id="315" r:id="rId24"/>
+    <p:sldId id="316" r:id="rId25"/>
+    <p:sldId id="317" r:id="rId26"/>
+    <p:sldId id="318" r:id="rId27"/>
+    <p:sldId id="319" r:id="rId28"/>
   </p:sldIdLst>
   <p:sldSz cx="9144000" cy="6858000" type="screen4x3"/>
   <p:notesSz cx="6858000" cy="9144000"/>
@@ -3870,10 +3876,287 @@
           </a:prstGeom>
         </p:spPr>
       </p:pic>
+      <p:sp>
+        <p:nvSpPr>
+          <p:cNvPr id="5" name="文字方塊 4">
+            <a:extLst>
+              <a:ext uri="{FF2B5EF4-FFF2-40B4-BE49-F238E27FC236}">
+                <a16:creationId xmlns:a16="http://schemas.microsoft.com/office/drawing/2014/main" id="{17EFF3C9-08E2-48A2-AB8B-AE4517857449}"/>
+              </a:ext>
+            </a:extLst>
+          </p:cNvPr>
+          <p:cNvSpPr txBox="1"/>
+          <p:nvPr/>
+        </p:nvSpPr>
+        <p:spPr>
+          <a:xfrm>
+            <a:off x="662730" y="963329"/>
+            <a:ext cx="5330305" cy="584775"/>
+          </a:xfrm>
+          <a:prstGeom prst="rect">
+            <a:avLst/>
+          </a:prstGeom>
+          <a:noFill/>
+        </p:spPr>
+        <p:txBody>
+          <a:bodyPr wrap="none" rtlCol="0">
+            <a:spAutoFit/>
+          </a:bodyPr>
+          <a:lstStyle/>
+          <a:p>
+            <a:r>
+              <a:rPr lang="en-US" altLang="zh-TW" sz="3200" dirty="0">
+                <a:latin typeface="Arial" panose="020B0604020202020204" pitchFamily="34" charset="0"/>
+                <a:cs typeface="Arial" panose="020B0604020202020204" pitchFamily="34" charset="0"/>
+              </a:rPr>
+              <a:t>Three state of tracking files :</a:t>
+            </a:r>
+          </a:p>
+        </p:txBody>
+      </p:sp>
+      <p:sp>
+        <p:nvSpPr>
+          <p:cNvPr id="6" name="矩形 5">
+            <a:extLst>
+              <a:ext uri="{FF2B5EF4-FFF2-40B4-BE49-F238E27FC236}">
+                <a16:creationId xmlns:a16="http://schemas.microsoft.com/office/drawing/2014/main" id="{229D59C0-A0D6-4862-9F9D-9E074ED8E216}"/>
+              </a:ext>
+            </a:extLst>
+          </p:cNvPr>
+          <p:cNvSpPr/>
+          <p:nvPr/>
+        </p:nvSpPr>
+        <p:spPr>
+          <a:xfrm>
+            <a:off x="1396767" y="2114356"/>
+            <a:ext cx="6350466" cy="3506268"/>
+          </a:xfrm>
+          <a:prstGeom prst="rect">
+            <a:avLst/>
+          </a:prstGeom>
+          <a:solidFill>
+            <a:schemeClr val="accent3">
+              <a:lumMod val="20000"/>
+              <a:lumOff val="80000"/>
+            </a:schemeClr>
+          </a:solidFill>
+          <a:ln>
+            <a:solidFill>
+              <a:schemeClr val="tx1"/>
+            </a:solidFill>
+          </a:ln>
+        </p:spPr>
+        <p:style>
+          <a:lnRef idx="2">
+            <a:schemeClr val="accent1">
+              <a:shade val="50000"/>
+            </a:schemeClr>
+          </a:lnRef>
+          <a:fillRef idx="1">
+            <a:schemeClr val="accent1"/>
+          </a:fillRef>
+          <a:effectRef idx="0">
+            <a:schemeClr val="accent1"/>
+          </a:effectRef>
+          <a:fontRef idx="minor">
+            <a:schemeClr val="lt1"/>
+          </a:fontRef>
+        </p:style>
+        <p:txBody>
+          <a:bodyPr rtlCol="0" anchor="ctr"/>
+          <a:lstStyle/>
+          <a:p>
+            <a:pPr algn="ctr"/>
+            <a:endParaRPr lang="zh-TW" altLang="en-US"/>
+          </a:p>
+        </p:txBody>
+      </p:sp>
+      <p:sp>
+        <p:nvSpPr>
+          <p:cNvPr id="7" name="文字方塊 6">
+            <a:extLst>
+              <a:ext uri="{FF2B5EF4-FFF2-40B4-BE49-F238E27FC236}">
+                <a16:creationId xmlns:a16="http://schemas.microsoft.com/office/drawing/2014/main" id="{8A2AC333-FC56-492D-A1DC-8060D251DF73}"/>
+              </a:ext>
+            </a:extLst>
+          </p:cNvPr>
+          <p:cNvSpPr txBox="1"/>
+          <p:nvPr/>
+        </p:nvSpPr>
+        <p:spPr>
+          <a:xfrm>
+            <a:off x="2177699" y="2388842"/>
+            <a:ext cx="2202847" cy="2547236"/>
+          </a:xfrm>
+          <a:prstGeom prst="rect">
+            <a:avLst/>
+          </a:prstGeom>
+          <a:noFill/>
+        </p:spPr>
+        <p:txBody>
+          <a:bodyPr wrap="none" rtlCol="0">
+            <a:spAutoFit/>
+          </a:bodyPr>
+          <a:lstStyle/>
+          <a:p>
+            <a:pPr>
+              <a:lnSpc>
+                <a:spcPct val="200000"/>
+              </a:lnSpc>
+            </a:pPr>
+            <a:r>
+              <a:rPr lang="zh-TW" altLang="en-US" sz="2800" dirty="0">
+                <a:latin typeface="Arial" panose="020B0604020202020204" pitchFamily="34" charset="0"/>
+                <a:cs typeface="Arial" panose="020B0604020202020204" pitchFamily="34" charset="0"/>
+              </a:rPr>
+              <a:t>．</a:t>
+            </a:r>
+            <a:r>
+              <a:rPr lang="en-US" altLang="zh-TW" sz="2800" dirty="0">
+                <a:latin typeface="Arial" panose="020B0604020202020204" pitchFamily="34" charset="0"/>
+                <a:cs typeface="Arial" panose="020B0604020202020204" pitchFamily="34" charset="0"/>
+              </a:rPr>
+              <a:t>modified</a:t>
+            </a:r>
+          </a:p>
+          <a:p>
+            <a:pPr>
+              <a:lnSpc>
+                <a:spcPct val="200000"/>
+              </a:lnSpc>
+            </a:pPr>
+            <a:r>
+              <a:rPr lang="zh-TW" altLang="en-US" sz="2800" dirty="0">
+                <a:latin typeface="Arial" panose="020B0604020202020204" pitchFamily="34" charset="0"/>
+                <a:cs typeface="Arial" panose="020B0604020202020204" pitchFamily="34" charset="0"/>
+              </a:rPr>
+              <a:t>．</a:t>
+            </a:r>
+            <a:r>
+              <a:rPr lang="en-US" altLang="zh-TW" sz="2800" dirty="0">
+                <a:latin typeface="Arial" panose="020B0604020202020204" pitchFamily="34" charset="0"/>
+                <a:cs typeface="Arial" panose="020B0604020202020204" pitchFamily="34" charset="0"/>
+              </a:rPr>
+              <a:t>staged</a:t>
+            </a:r>
+          </a:p>
+          <a:p>
+            <a:pPr>
+              <a:lnSpc>
+                <a:spcPct val="200000"/>
+              </a:lnSpc>
+            </a:pPr>
+            <a:r>
+              <a:rPr lang="zh-TW" altLang="en-US" sz="2800" dirty="0">
+                <a:latin typeface="Arial" panose="020B0604020202020204" pitchFamily="34" charset="0"/>
+                <a:cs typeface="Arial" panose="020B0604020202020204" pitchFamily="34" charset="0"/>
+              </a:rPr>
+              <a:t>．</a:t>
+            </a:r>
+            <a:r>
+              <a:rPr lang="en-US" altLang="zh-TW" sz="2800" dirty="0">
+                <a:latin typeface="Arial" panose="020B0604020202020204" pitchFamily="34" charset="0"/>
+                <a:cs typeface="Arial" panose="020B0604020202020204" pitchFamily="34" charset="0"/>
+              </a:rPr>
+              <a:t>committed</a:t>
+            </a:r>
+          </a:p>
+        </p:txBody>
+      </p:sp>
+      <p:sp>
+        <p:nvSpPr>
+          <p:cNvPr id="8" name="文字方塊 7">
+            <a:extLst>
+              <a:ext uri="{FF2B5EF4-FFF2-40B4-BE49-F238E27FC236}">
+                <a16:creationId xmlns:a16="http://schemas.microsoft.com/office/drawing/2014/main" id="{C3C29C19-8EA5-4DD2-85EC-8A14E7E54750}"/>
+              </a:ext>
+            </a:extLst>
+          </p:cNvPr>
+          <p:cNvSpPr txBox="1"/>
+          <p:nvPr/>
+        </p:nvSpPr>
+        <p:spPr>
+          <a:xfrm>
+            <a:off x="5765956" y="3504501"/>
+            <a:ext cx="1072730" cy="584775"/>
+          </a:xfrm>
+          <a:prstGeom prst="rect">
+            <a:avLst/>
+          </a:prstGeom>
+          <a:noFill/>
+        </p:spPr>
+        <p:txBody>
+          <a:bodyPr wrap="none" rtlCol="0">
+            <a:spAutoFit/>
+          </a:bodyPr>
+          <a:lstStyle/>
+          <a:p>
+            <a:r>
+              <a:rPr lang="en-US" altLang="zh-TW" sz="3200" dirty="0">
+                <a:latin typeface="Arial" panose="020B0604020202020204" pitchFamily="34" charset="0"/>
+                <a:cs typeface="Arial" panose="020B0604020202020204" pitchFamily="34" charset="0"/>
+              </a:rPr>
+              <a:t>state</a:t>
+            </a:r>
+          </a:p>
+        </p:txBody>
+      </p:sp>
+      <p:sp>
+        <p:nvSpPr>
+          <p:cNvPr id="2" name="右大括弧 1">
+            <a:extLst>
+              <a:ext uri="{FF2B5EF4-FFF2-40B4-BE49-F238E27FC236}">
+                <a16:creationId xmlns:a16="http://schemas.microsoft.com/office/drawing/2014/main" id="{50D6A1D9-DC93-49EB-B995-C759D95600F0}"/>
+              </a:ext>
+            </a:extLst>
+          </p:cNvPr>
+          <p:cNvSpPr/>
+          <p:nvPr/>
+        </p:nvSpPr>
+        <p:spPr>
+          <a:xfrm>
+            <a:off x="4862722" y="2593872"/>
+            <a:ext cx="672073" cy="2547236"/>
+          </a:xfrm>
+          <a:prstGeom prst="rightBrace">
+            <a:avLst>
+              <a:gd name="adj1" fmla="val 8333"/>
+              <a:gd name="adj2" fmla="val 49012"/>
+            </a:avLst>
+          </a:prstGeom>
+          <a:ln w="28575">
+            <a:solidFill>
+              <a:schemeClr val="tx1"/>
+            </a:solidFill>
+          </a:ln>
+        </p:spPr>
+        <p:style>
+          <a:lnRef idx="1">
+            <a:schemeClr val="accent1"/>
+          </a:lnRef>
+          <a:fillRef idx="0">
+            <a:schemeClr val="accent1"/>
+          </a:fillRef>
+          <a:effectRef idx="0">
+            <a:schemeClr val="accent1"/>
+          </a:effectRef>
+          <a:fontRef idx="minor">
+            <a:schemeClr val="tx1"/>
+          </a:fontRef>
+        </p:style>
+        <p:txBody>
+          <a:bodyPr rtlCol="0" anchor="ctr"/>
+          <a:lstStyle/>
+          <a:p>
+            <a:pPr algn="ctr"/>
+            <a:endParaRPr lang="zh-TW" altLang="en-US"/>
+          </a:p>
+        </p:txBody>
+      </p:sp>
     </p:spTree>
     <p:extLst>
       <p:ext uri="{BB962C8B-B14F-4D97-AF65-F5344CB8AC3E}">
-        <p14:creationId xmlns:p14="http://schemas.microsoft.com/office/powerpoint/2010/main" val="3467330036"/>
+        <p14:creationId xmlns:p14="http://schemas.microsoft.com/office/powerpoint/2010/main" val="137063245"/>
       </p:ext>
     </p:extLst>
   </p:cSld>
@@ -3972,10 +4255,147 @@
           </a:prstGeom>
         </p:spPr>
       </p:pic>
+      <p:sp>
+        <p:nvSpPr>
+          <p:cNvPr id="5" name="矩形 4">
+            <a:extLst>
+              <a:ext uri="{FF2B5EF4-FFF2-40B4-BE49-F238E27FC236}">
+                <a16:creationId xmlns:a16="http://schemas.microsoft.com/office/drawing/2014/main" id="{97EA95AC-D793-49B2-8A8C-E840C8BD65E6}"/>
+              </a:ext>
+            </a:extLst>
+          </p:cNvPr>
+          <p:cNvSpPr/>
+          <p:nvPr/>
+        </p:nvSpPr>
+        <p:spPr>
+          <a:xfrm>
+            <a:off x="646221" y="604008"/>
+            <a:ext cx="3179159" cy="1224792"/>
+          </a:xfrm>
+          <a:prstGeom prst="rect">
+            <a:avLst/>
+          </a:prstGeom>
+          <a:solidFill>
+            <a:schemeClr val="accent3">
+              <a:lumMod val="20000"/>
+              <a:lumOff val="80000"/>
+            </a:schemeClr>
+          </a:solidFill>
+          <a:ln w="38100">
+            <a:solidFill>
+              <a:schemeClr val="tx1"/>
+            </a:solidFill>
+          </a:ln>
+        </p:spPr>
+        <p:style>
+          <a:lnRef idx="2">
+            <a:schemeClr val="accent1">
+              <a:shade val="50000"/>
+            </a:schemeClr>
+          </a:lnRef>
+          <a:fillRef idx="1">
+            <a:schemeClr val="accent1"/>
+          </a:fillRef>
+          <a:effectRef idx="0">
+            <a:schemeClr val="accent1"/>
+          </a:effectRef>
+          <a:fontRef idx="minor">
+            <a:schemeClr val="lt1"/>
+          </a:fontRef>
+        </p:style>
+        <p:txBody>
+          <a:bodyPr rtlCol="0" anchor="ctr"/>
+          <a:lstStyle/>
+          <a:p>
+            <a:pPr algn="ctr"/>
+            <a:endParaRPr lang="zh-TW" altLang="en-US"/>
+          </a:p>
+        </p:txBody>
+      </p:sp>
+      <p:sp>
+        <p:nvSpPr>
+          <p:cNvPr id="6" name="文字方塊 5">
+            <a:extLst>
+              <a:ext uri="{FF2B5EF4-FFF2-40B4-BE49-F238E27FC236}">
+                <a16:creationId xmlns:a16="http://schemas.microsoft.com/office/drawing/2014/main" id="{7316823D-3FCA-434F-A900-4F5557EB3F89}"/>
+              </a:ext>
+            </a:extLst>
+          </p:cNvPr>
+          <p:cNvSpPr txBox="1"/>
+          <p:nvPr/>
+        </p:nvSpPr>
+        <p:spPr>
+          <a:xfrm>
+            <a:off x="935048" y="924016"/>
+            <a:ext cx="2348720" cy="584775"/>
+          </a:xfrm>
+          <a:prstGeom prst="rect">
+            <a:avLst/>
+          </a:prstGeom>
+          <a:noFill/>
+        </p:spPr>
+        <p:txBody>
+          <a:bodyPr wrap="none" rtlCol="0">
+            <a:spAutoFit/>
+          </a:bodyPr>
+          <a:lstStyle/>
+          <a:p>
+            <a:r>
+              <a:rPr lang="zh-TW" altLang="en-US" sz="3200" dirty="0">
+                <a:latin typeface="Arial" panose="020B0604020202020204" pitchFamily="34" charset="0"/>
+                <a:cs typeface="Arial" panose="020B0604020202020204" pitchFamily="34" charset="0"/>
+              </a:rPr>
+              <a:t>． </a:t>
+            </a:r>
+            <a:r>
+              <a:rPr lang="en-US" altLang="zh-TW" sz="3200" dirty="0">
+                <a:latin typeface="Arial" panose="020B0604020202020204" pitchFamily="34" charset="0"/>
+                <a:cs typeface="Arial" panose="020B0604020202020204" pitchFamily="34" charset="0"/>
+              </a:rPr>
+              <a:t>git status</a:t>
+            </a:r>
+          </a:p>
+        </p:txBody>
+      </p:sp>
+      <p:pic>
+        <p:nvPicPr>
+          <p:cNvPr id="7" name="圖片 6" descr="一張含有 文字 的圖片&#10;&#10;自動產生的描述">
+            <a:extLst>
+              <a:ext uri="{FF2B5EF4-FFF2-40B4-BE49-F238E27FC236}">
+                <a16:creationId xmlns:a16="http://schemas.microsoft.com/office/drawing/2014/main" id="{0C91348F-9487-4556-9934-EFC656710516}"/>
+              </a:ext>
+            </a:extLst>
+          </p:cNvPr>
+          <p:cNvPicPr>
+            <a:picLocks noChangeAspect="1"/>
+          </p:cNvPicPr>
+          <p:nvPr/>
+        </p:nvPicPr>
+        <p:blipFill rotWithShape="1">
+          <a:blip r:embed="rId4">
+            <a:extLst>
+              <a:ext uri="{28A0092B-C50C-407E-A947-70E740481C1C}">
+                <a14:useLocalDpi xmlns:a14="http://schemas.microsoft.com/office/drawing/2010/main" val="0"/>
+              </a:ext>
+            </a:extLst>
+          </a:blip>
+          <a:srcRect l="47161" t="22711" r="8813" b="27426"/>
+          <a:stretch/>
+        </p:blipFill>
+        <p:spPr>
+          <a:xfrm>
+            <a:off x="2545086" y="2423168"/>
+            <a:ext cx="5786364" cy="3660761"/>
+          </a:xfrm>
+          <a:prstGeom prst="rect">
+            <a:avLst/>
+          </a:prstGeom>
+        </p:spPr>
+      </p:pic>
     </p:spTree>
     <p:extLst>
       <p:ext uri="{BB962C8B-B14F-4D97-AF65-F5344CB8AC3E}">
-        <p14:creationId xmlns:p14="http://schemas.microsoft.com/office/powerpoint/2010/main" val="137063245"/>
+        <p14:creationId xmlns:p14="http://schemas.microsoft.com/office/powerpoint/2010/main" val="3467330036"/>
       </p:ext>
     </p:extLst>
   </p:cSld>
@@ -4068,6 +4488,143 @@
           <a:xfrm>
             <a:off x="0" y="4169659"/>
             <a:ext cx="3934976" cy="2688341"/>
+          </a:xfrm>
+          <a:prstGeom prst="rect">
+            <a:avLst/>
+          </a:prstGeom>
+        </p:spPr>
+      </p:pic>
+      <p:sp>
+        <p:nvSpPr>
+          <p:cNvPr id="5" name="矩形 4">
+            <a:extLst>
+              <a:ext uri="{FF2B5EF4-FFF2-40B4-BE49-F238E27FC236}">
+                <a16:creationId xmlns:a16="http://schemas.microsoft.com/office/drawing/2014/main" id="{5C3A603C-CF91-465C-A54F-8D59905FD57A}"/>
+              </a:ext>
+            </a:extLst>
+          </p:cNvPr>
+          <p:cNvSpPr/>
+          <p:nvPr/>
+        </p:nvSpPr>
+        <p:spPr>
+          <a:xfrm>
+            <a:off x="646221" y="604008"/>
+            <a:ext cx="2642533" cy="1224792"/>
+          </a:xfrm>
+          <a:prstGeom prst="rect">
+            <a:avLst/>
+          </a:prstGeom>
+          <a:solidFill>
+            <a:schemeClr val="accent3">
+              <a:lumMod val="20000"/>
+              <a:lumOff val="80000"/>
+            </a:schemeClr>
+          </a:solidFill>
+          <a:ln w="38100">
+            <a:solidFill>
+              <a:schemeClr val="tx1"/>
+            </a:solidFill>
+          </a:ln>
+        </p:spPr>
+        <p:style>
+          <a:lnRef idx="2">
+            <a:schemeClr val="accent1">
+              <a:shade val="50000"/>
+            </a:schemeClr>
+          </a:lnRef>
+          <a:fillRef idx="1">
+            <a:schemeClr val="accent1"/>
+          </a:fillRef>
+          <a:effectRef idx="0">
+            <a:schemeClr val="accent1"/>
+          </a:effectRef>
+          <a:fontRef idx="minor">
+            <a:schemeClr val="lt1"/>
+          </a:fontRef>
+        </p:style>
+        <p:txBody>
+          <a:bodyPr rtlCol="0" anchor="ctr"/>
+          <a:lstStyle/>
+          <a:p>
+            <a:pPr algn="ctr"/>
+            <a:endParaRPr lang="zh-TW" altLang="en-US"/>
+          </a:p>
+        </p:txBody>
+      </p:sp>
+      <p:sp>
+        <p:nvSpPr>
+          <p:cNvPr id="6" name="文字方塊 5">
+            <a:extLst>
+              <a:ext uri="{FF2B5EF4-FFF2-40B4-BE49-F238E27FC236}">
+                <a16:creationId xmlns:a16="http://schemas.microsoft.com/office/drawing/2014/main" id="{D36CBD38-AD49-4061-9B36-9AFA65B32A27}"/>
+              </a:ext>
+            </a:extLst>
+          </p:cNvPr>
+          <p:cNvSpPr txBox="1"/>
+          <p:nvPr/>
+        </p:nvSpPr>
+        <p:spPr>
+          <a:xfrm>
+            <a:off x="935048" y="924016"/>
+            <a:ext cx="1938351" cy="584775"/>
+          </a:xfrm>
+          <a:prstGeom prst="rect">
+            <a:avLst/>
+          </a:prstGeom>
+          <a:noFill/>
+        </p:spPr>
+        <p:txBody>
+          <a:bodyPr wrap="none" rtlCol="0">
+            <a:spAutoFit/>
+          </a:bodyPr>
+          <a:lstStyle/>
+          <a:p>
+            <a:r>
+              <a:rPr lang="zh-TW" altLang="en-US" sz="3200" dirty="0">
+                <a:latin typeface="Arial" panose="020B0604020202020204" pitchFamily="34" charset="0"/>
+                <a:cs typeface="Arial" panose="020B0604020202020204" pitchFamily="34" charset="0"/>
+              </a:rPr>
+              <a:t>． </a:t>
+            </a:r>
+            <a:r>
+              <a:rPr lang="en-US" altLang="zh-TW" sz="3200" dirty="0">
+                <a:latin typeface="Arial" panose="020B0604020202020204" pitchFamily="34" charset="0"/>
+                <a:cs typeface="Arial" panose="020B0604020202020204" pitchFamily="34" charset="0"/>
+              </a:rPr>
+              <a:t>git add</a:t>
+            </a:r>
+          </a:p>
+        </p:txBody>
+      </p:sp>
+      <p:pic>
+        <p:nvPicPr>
+          <p:cNvPr id="8" name="圖片 7" descr="一張含有 文字 的圖片&#10;&#10;自動產生的描述">
+            <a:extLst>
+              <a:ext uri="{FF2B5EF4-FFF2-40B4-BE49-F238E27FC236}">
+                <a16:creationId xmlns:a16="http://schemas.microsoft.com/office/drawing/2014/main" id="{35CC4861-470B-4901-B13F-448595E10533}"/>
+              </a:ext>
+            </a:extLst>
+          </p:cNvPr>
+          <p:cNvPicPr>
+            <a:picLocks noChangeAspect="1"/>
+          </p:cNvPicPr>
+          <p:nvPr/>
+        </p:nvPicPr>
+        <p:blipFill rotWithShape="1">
+          <a:blip r:embed="rId4">
+            <a:extLst>
+              <a:ext uri="{28A0092B-C50C-407E-A947-70E740481C1C}">
+                <a14:useLocalDpi xmlns:a14="http://schemas.microsoft.com/office/drawing/2010/main" val="0"/>
+              </a:ext>
+            </a:extLst>
+          </a:blip>
+          <a:srcRect l="45321" t="22835" r="10826" b="27997"/>
+          <a:stretch/>
+        </p:blipFill>
+        <p:spPr>
+          <a:xfrm>
+            <a:off x="2545085" y="2452322"/>
+            <a:ext cx="5786363" cy="3631608"/>
           </a:xfrm>
           <a:prstGeom prst="rect">
             <a:avLst/>
@@ -4176,6 +4733,143 @@
           </a:prstGeom>
         </p:spPr>
       </p:pic>
+      <p:sp>
+        <p:nvSpPr>
+          <p:cNvPr id="5" name="矩形 4">
+            <a:extLst>
+              <a:ext uri="{FF2B5EF4-FFF2-40B4-BE49-F238E27FC236}">
+                <a16:creationId xmlns:a16="http://schemas.microsoft.com/office/drawing/2014/main" id="{6766FB30-D4E1-404F-BBFB-221346B73812}"/>
+              </a:ext>
+            </a:extLst>
+          </p:cNvPr>
+          <p:cNvSpPr/>
+          <p:nvPr/>
+        </p:nvSpPr>
+        <p:spPr>
+          <a:xfrm>
+            <a:off x="646221" y="604008"/>
+            <a:ext cx="3288755" cy="1224792"/>
+          </a:xfrm>
+          <a:prstGeom prst="rect">
+            <a:avLst/>
+          </a:prstGeom>
+          <a:solidFill>
+            <a:schemeClr val="accent3">
+              <a:lumMod val="20000"/>
+              <a:lumOff val="80000"/>
+            </a:schemeClr>
+          </a:solidFill>
+          <a:ln w="38100">
+            <a:solidFill>
+              <a:schemeClr val="tx1"/>
+            </a:solidFill>
+          </a:ln>
+        </p:spPr>
+        <p:style>
+          <a:lnRef idx="2">
+            <a:schemeClr val="accent1">
+              <a:shade val="50000"/>
+            </a:schemeClr>
+          </a:lnRef>
+          <a:fillRef idx="1">
+            <a:schemeClr val="accent1"/>
+          </a:fillRef>
+          <a:effectRef idx="0">
+            <a:schemeClr val="accent1"/>
+          </a:effectRef>
+          <a:fontRef idx="minor">
+            <a:schemeClr val="lt1"/>
+          </a:fontRef>
+        </p:style>
+        <p:txBody>
+          <a:bodyPr rtlCol="0" anchor="ctr"/>
+          <a:lstStyle/>
+          <a:p>
+            <a:pPr algn="ctr"/>
+            <a:endParaRPr lang="zh-TW" altLang="en-US"/>
+          </a:p>
+        </p:txBody>
+      </p:sp>
+      <p:sp>
+        <p:nvSpPr>
+          <p:cNvPr id="6" name="文字方塊 5">
+            <a:extLst>
+              <a:ext uri="{FF2B5EF4-FFF2-40B4-BE49-F238E27FC236}">
+                <a16:creationId xmlns:a16="http://schemas.microsoft.com/office/drawing/2014/main" id="{3DE209A1-E144-4409-81B8-EDCE9CCD3FAA}"/>
+              </a:ext>
+            </a:extLst>
+          </p:cNvPr>
+          <p:cNvSpPr txBox="1"/>
+          <p:nvPr/>
+        </p:nvSpPr>
+        <p:spPr>
+          <a:xfrm>
+            <a:off x="935048" y="924016"/>
+            <a:ext cx="2576346" cy="584775"/>
+          </a:xfrm>
+          <a:prstGeom prst="rect">
+            <a:avLst/>
+          </a:prstGeom>
+          <a:noFill/>
+        </p:spPr>
+        <p:txBody>
+          <a:bodyPr wrap="none" rtlCol="0">
+            <a:spAutoFit/>
+          </a:bodyPr>
+          <a:lstStyle/>
+          <a:p>
+            <a:r>
+              <a:rPr lang="zh-TW" altLang="en-US" sz="3200" dirty="0">
+                <a:latin typeface="Arial" panose="020B0604020202020204" pitchFamily="34" charset="0"/>
+                <a:cs typeface="Arial" panose="020B0604020202020204" pitchFamily="34" charset="0"/>
+              </a:rPr>
+              <a:t>． </a:t>
+            </a:r>
+            <a:r>
+              <a:rPr lang="en-US" altLang="zh-TW" sz="3200" dirty="0">
+                <a:latin typeface="Arial" panose="020B0604020202020204" pitchFamily="34" charset="0"/>
+                <a:cs typeface="Arial" panose="020B0604020202020204" pitchFamily="34" charset="0"/>
+              </a:rPr>
+              <a:t>git commit</a:t>
+            </a:r>
+          </a:p>
+        </p:txBody>
+      </p:sp>
+      <p:pic>
+        <p:nvPicPr>
+          <p:cNvPr id="8" name="圖片 7" descr="一張含有 文字 的圖片&#10;&#10;自動產生的描述">
+            <a:extLst>
+              <a:ext uri="{FF2B5EF4-FFF2-40B4-BE49-F238E27FC236}">
+                <a16:creationId xmlns:a16="http://schemas.microsoft.com/office/drawing/2014/main" id="{434CE7F8-B94D-478E-88F8-F05D9B01286A}"/>
+              </a:ext>
+            </a:extLst>
+          </p:cNvPr>
+          <p:cNvPicPr>
+            <a:picLocks noChangeAspect="1"/>
+          </p:cNvPicPr>
+          <p:nvPr/>
+        </p:nvPicPr>
+        <p:blipFill rotWithShape="1">
+          <a:blip r:embed="rId4">
+            <a:extLst>
+              <a:ext uri="{28A0092B-C50C-407E-A947-70E740481C1C}">
+                <a14:useLocalDpi xmlns:a14="http://schemas.microsoft.com/office/drawing/2010/main" val="0"/>
+              </a:ext>
+            </a:extLst>
+          </a:blip>
+          <a:srcRect l="45413" t="22794" r="10826" b="27964"/>
+          <a:stretch/>
+        </p:blipFill>
+        <p:spPr>
+          <a:xfrm>
+            <a:off x="2545085" y="2444709"/>
+            <a:ext cx="5786363" cy="3639221"/>
+          </a:xfrm>
+          <a:prstGeom prst="rect">
+            <a:avLst/>
+          </a:prstGeom>
+        </p:spPr>
+      </p:pic>
     </p:spTree>
     <p:extLst>
       <p:ext uri="{BB962C8B-B14F-4D97-AF65-F5344CB8AC3E}">
@@ -5145,6 +5839,618 @@
     <p:extLst>
       <p:ext uri="{BB962C8B-B14F-4D97-AF65-F5344CB8AC3E}">
         <p14:creationId xmlns:p14="http://schemas.microsoft.com/office/powerpoint/2010/main" val="1537635377"/>
+      </p:ext>
+    </p:extLst>
+  </p:cSld>
+  <p:clrMapOvr>
+    <a:masterClrMapping/>
+  </p:clrMapOvr>
+</p:sld>
+</file>
+
+<file path=ppt/slides/slide22.xml><?xml version="1.0" encoding="utf-8"?>
+<p:sld xmlns:a="http://schemas.openxmlformats.org/drawingml/2006/main" xmlns:r="http://schemas.openxmlformats.org/officeDocument/2006/relationships" xmlns:p="http://schemas.openxmlformats.org/presentationml/2006/main">
+  <p:cSld>
+    <p:spTree>
+      <p:nvGrpSpPr>
+        <p:cNvPr id="1" name=""/>
+        <p:cNvGrpSpPr/>
+        <p:nvPr/>
+      </p:nvGrpSpPr>
+      <p:grpSpPr>
+        <a:xfrm>
+          <a:off x="0" y="0"/>
+          <a:ext cx="0" cy="0"/>
+          <a:chOff x="0" y="0"/>
+          <a:chExt cx="0" cy="0"/>
+        </a:xfrm>
+      </p:grpSpPr>
+      <p:pic>
+        <p:nvPicPr>
+          <p:cNvPr id="3" name="圖片 2">
+            <a:extLst>
+              <a:ext uri="{FF2B5EF4-FFF2-40B4-BE49-F238E27FC236}">
+                <a16:creationId xmlns:a16="http://schemas.microsoft.com/office/drawing/2014/main" id="{1202EBDE-7F64-43BD-86B7-6C228CCEC2D0}"/>
+              </a:ext>
+            </a:extLst>
+          </p:cNvPr>
+          <p:cNvPicPr>
+            <a:picLocks noChangeAspect="1"/>
+          </p:cNvPicPr>
+          <p:nvPr/>
+        </p:nvPicPr>
+        <p:blipFill>
+          <a:blip r:embed="rId2" cstate="print">
+            <a:extLst>
+              <a:ext uri="{28A0092B-C50C-407E-A947-70E740481C1C}">
+                <a14:useLocalDpi xmlns:a14="http://schemas.microsoft.com/office/drawing/2010/main" val="0"/>
+              </a:ext>
+            </a:extLst>
+          </a:blip>
+          <a:stretch>
+            <a:fillRect/>
+          </a:stretch>
+        </p:blipFill>
+        <p:spPr>
+          <a:xfrm>
+            <a:off x="6598915" y="0"/>
+            <a:ext cx="2545085" cy="3294895"/>
+          </a:xfrm>
+          <a:prstGeom prst="rect">
+            <a:avLst/>
+          </a:prstGeom>
+        </p:spPr>
+      </p:pic>
+      <p:pic>
+        <p:nvPicPr>
+          <p:cNvPr id="4" name="圖片 3">
+            <a:extLst>
+              <a:ext uri="{FF2B5EF4-FFF2-40B4-BE49-F238E27FC236}">
+                <a16:creationId xmlns:a16="http://schemas.microsoft.com/office/drawing/2014/main" id="{AEFF5069-0FA7-44E7-AEEE-225463C6B1AC}"/>
+              </a:ext>
+            </a:extLst>
+          </p:cNvPr>
+          <p:cNvPicPr>
+            <a:picLocks noChangeAspect="1"/>
+          </p:cNvPicPr>
+          <p:nvPr/>
+        </p:nvPicPr>
+        <p:blipFill>
+          <a:blip r:embed="rId3" cstate="print">
+            <a:extLst>
+              <a:ext uri="{28A0092B-C50C-407E-A947-70E740481C1C}">
+                <a14:useLocalDpi xmlns:a14="http://schemas.microsoft.com/office/drawing/2010/main" val="0"/>
+              </a:ext>
+            </a:extLst>
+          </a:blip>
+          <a:stretch>
+            <a:fillRect/>
+          </a:stretch>
+        </p:blipFill>
+        <p:spPr>
+          <a:xfrm>
+            <a:off x="0" y="4169659"/>
+            <a:ext cx="3934976" cy="2688341"/>
+          </a:xfrm>
+          <a:prstGeom prst="rect">
+            <a:avLst/>
+          </a:prstGeom>
+        </p:spPr>
+      </p:pic>
+    </p:spTree>
+    <p:extLst>
+      <p:ext uri="{BB962C8B-B14F-4D97-AF65-F5344CB8AC3E}">
+        <p14:creationId xmlns:p14="http://schemas.microsoft.com/office/powerpoint/2010/main" val="3646952177"/>
+      </p:ext>
+    </p:extLst>
+  </p:cSld>
+  <p:clrMapOvr>
+    <a:masterClrMapping/>
+  </p:clrMapOvr>
+</p:sld>
+</file>
+
+<file path=ppt/slides/slide23.xml><?xml version="1.0" encoding="utf-8"?>
+<p:sld xmlns:a="http://schemas.openxmlformats.org/drawingml/2006/main" xmlns:r="http://schemas.openxmlformats.org/officeDocument/2006/relationships" xmlns:p="http://schemas.openxmlformats.org/presentationml/2006/main">
+  <p:cSld>
+    <p:spTree>
+      <p:nvGrpSpPr>
+        <p:cNvPr id="1" name=""/>
+        <p:cNvGrpSpPr/>
+        <p:nvPr/>
+      </p:nvGrpSpPr>
+      <p:grpSpPr>
+        <a:xfrm>
+          <a:off x="0" y="0"/>
+          <a:ext cx="0" cy="0"/>
+          <a:chOff x="0" y="0"/>
+          <a:chExt cx="0" cy="0"/>
+        </a:xfrm>
+      </p:grpSpPr>
+      <p:pic>
+        <p:nvPicPr>
+          <p:cNvPr id="3" name="圖片 2">
+            <a:extLst>
+              <a:ext uri="{FF2B5EF4-FFF2-40B4-BE49-F238E27FC236}">
+                <a16:creationId xmlns:a16="http://schemas.microsoft.com/office/drawing/2014/main" id="{1202EBDE-7F64-43BD-86B7-6C228CCEC2D0}"/>
+              </a:ext>
+            </a:extLst>
+          </p:cNvPr>
+          <p:cNvPicPr>
+            <a:picLocks noChangeAspect="1"/>
+          </p:cNvPicPr>
+          <p:nvPr/>
+        </p:nvPicPr>
+        <p:blipFill>
+          <a:blip r:embed="rId2" cstate="print">
+            <a:extLst>
+              <a:ext uri="{28A0092B-C50C-407E-A947-70E740481C1C}">
+                <a14:useLocalDpi xmlns:a14="http://schemas.microsoft.com/office/drawing/2010/main" val="0"/>
+              </a:ext>
+            </a:extLst>
+          </a:blip>
+          <a:stretch>
+            <a:fillRect/>
+          </a:stretch>
+        </p:blipFill>
+        <p:spPr>
+          <a:xfrm>
+            <a:off x="6598915" y="0"/>
+            <a:ext cx="2545085" cy="3294895"/>
+          </a:xfrm>
+          <a:prstGeom prst="rect">
+            <a:avLst/>
+          </a:prstGeom>
+        </p:spPr>
+      </p:pic>
+      <p:pic>
+        <p:nvPicPr>
+          <p:cNvPr id="4" name="圖片 3">
+            <a:extLst>
+              <a:ext uri="{FF2B5EF4-FFF2-40B4-BE49-F238E27FC236}">
+                <a16:creationId xmlns:a16="http://schemas.microsoft.com/office/drawing/2014/main" id="{AEFF5069-0FA7-44E7-AEEE-225463C6B1AC}"/>
+              </a:ext>
+            </a:extLst>
+          </p:cNvPr>
+          <p:cNvPicPr>
+            <a:picLocks noChangeAspect="1"/>
+          </p:cNvPicPr>
+          <p:nvPr/>
+        </p:nvPicPr>
+        <p:blipFill>
+          <a:blip r:embed="rId3" cstate="print">
+            <a:extLst>
+              <a:ext uri="{28A0092B-C50C-407E-A947-70E740481C1C}">
+                <a14:useLocalDpi xmlns:a14="http://schemas.microsoft.com/office/drawing/2010/main" val="0"/>
+              </a:ext>
+            </a:extLst>
+          </a:blip>
+          <a:stretch>
+            <a:fillRect/>
+          </a:stretch>
+        </p:blipFill>
+        <p:spPr>
+          <a:xfrm>
+            <a:off x="0" y="4169659"/>
+            <a:ext cx="3934976" cy="2688341"/>
+          </a:xfrm>
+          <a:prstGeom prst="rect">
+            <a:avLst/>
+          </a:prstGeom>
+        </p:spPr>
+      </p:pic>
+    </p:spTree>
+    <p:extLst>
+      <p:ext uri="{BB962C8B-B14F-4D97-AF65-F5344CB8AC3E}">
+        <p14:creationId xmlns:p14="http://schemas.microsoft.com/office/powerpoint/2010/main" val="1418836918"/>
+      </p:ext>
+    </p:extLst>
+  </p:cSld>
+  <p:clrMapOvr>
+    <a:masterClrMapping/>
+  </p:clrMapOvr>
+</p:sld>
+</file>
+
+<file path=ppt/slides/slide24.xml><?xml version="1.0" encoding="utf-8"?>
+<p:sld xmlns:a="http://schemas.openxmlformats.org/drawingml/2006/main" xmlns:r="http://schemas.openxmlformats.org/officeDocument/2006/relationships" xmlns:p="http://schemas.openxmlformats.org/presentationml/2006/main">
+  <p:cSld>
+    <p:spTree>
+      <p:nvGrpSpPr>
+        <p:cNvPr id="1" name=""/>
+        <p:cNvGrpSpPr/>
+        <p:nvPr/>
+      </p:nvGrpSpPr>
+      <p:grpSpPr>
+        <a:xfrm>
+          <a:off x="0" y="0"/>
+          <a:ext cx="0" cy="0"/>
+          <a:chOff x="0" y="0"/>
+          <a:chExt cx="0" cy="0"/>
+        </a:xfrm>
+      </p:grpSpPr>
+      <p:pic>
+        <p:nvPicPr>
+          <p:cNvPr id="3" name="圖片 2">
+            <a:extLst>
+              <a:ext uri="{FF2B5EF4-FFF2-40B4-BE49-F238E27FC236}">
+                <a16:creationId xmlns:a16="http://schemas.microsoft.com/office/drawing/2014/main" id="{1202EBDE-7F64-43BD-86B7-6C228CCEC2D0}"/>
+              </a:ext>
+            </a:extLst>
+          </p:cNvPr>
+          <p:cNvPicPr>
+            <a:picLocks noChangeAspect="1"/>
+          </p:cNvPicPr>
+          <p:nvPr/>
+        </p:nvPicPr>
+        <p:blipFill>
+          <a:blip r:embed="rId2" cstate="print">
+            <a:extLst>
+              <a:ext uri="{28A0092B-C50C-407E-A947-70E740481C1C}">
+                <a14:useLocalDpi xmlns:a14="http://schemas.microsoft.com/office/drawing/2010/main" val="0"/>
+              </a:ext>
+            </a:extLst>
+          </a:blip>
+          <a:stretch>
+            <a:fillRect/>
+          </a:stretch>
+        </p:blipFill>
+        <p:spPr>
+          <a:xfrm>
+            <a:off x="6598915" y="0"/>
+            <a:ext cx="2545085" cy="3294895"/>
+          </a:xfrm>
+          <a:prstGeom prst="rect">
+            <a:avLst/>
+          </a:prstGeom>
+        </p:spPr>
+      </p:pic>
+      <p:pic>
+        <p:nvPicPr>
+          <p:cNvPr id="4" name="圖片 3">
+            <a:extLst>
+              <a:ext uri="{FF2B5EF4-FFF2-40B4-BE49-F238E27FC236}">
+                <a16:creationId xmlns:a16="http://schemas.microsoft.com/office/drawing/2014/main" id="{AEFF5069-0FA7-44E7-AEEE-225463C6B1AC}"/>
+              </a:ext>
+            </a:extLst>
+          </p:cNvPr>
+          <p:cNvPicPr>
+            <a:picLocks noChangeAspect="1"/>
+          </p:cNvPicPr>
+          <p:nvPr/>
+        </p:nvPicPr>
+        <p:blipFill>
+          <a:blip r:embed="rId3" cstate="print">
+            <a:extLst>
+              <a:ext uri="{28A0092B-C50C-407E-A947-70E740481C1C}">
+                <a14:useLocalDpi xmlns:a14="http://schemas.microsoft.com/office/drawing/2010/main" val="0"/>
+              </a:ext>
+            </a:extLst>
+          </a:blip>
+          <a:stretch>
+            <a:fillRect/>
+          </a:stretch>
+        </p:blipFill>
+        <p:spPr>
+          <a:xfrm>
+            <a:off x="0" y="4169659"/>
+            <a:ext cx="3934976" cy="2688341"/>
+          </a:xfrm>
+          <a:prstGeom prst="rect">
+            <a:avLst/>
+          </a:prstGeom>
+        </p:spPr>
+      </p:pic>
+    </p:spTree>
+    <p:extLst>
+      <p:ext uri="{BB962C8B-B14F-4D97-AF65-F5344CB8AC3E}">
+        <p14:creationId xmlns:p14="http://schemas.microsoft.com/office/powerpoint/2010/main" val="1557077587"/>
+      </p:ext>
+    </p:extLst>
+  </p:cSld>
+  <p:clrMapOvr>
+    <a:masterClrMapping/>
+  </p:clrMapOvr>
+</p:sld>
+</file>
+
+<file path=ppt/slides/slide25.xml><?xml version="1.0" encoding="utf-8"?>
+<p:sld xmlns:a="http://schemas.openxmlformats.org/drawingml/2006/main" xmlns:r="http://schemas.openxmlformats.org/officeDocument/2006/relationships" xmlns:p="http://schemas.openxmlformats.org/presentationml/2006/main">
+  <p:cSld>
+    <p:spTree>
+      <p:nvGrpSpPr>
+        <p:cNvPr id="1" name=""/>
+        <p:cNvGrpSpPr/>
+        <p:nvPr/>
+      </p:nvGrpSpPr>
+      <p:grpSpPr>
+        <a:xfrm>
+          <a:off x="0" y="0"/>
+          <a:ext cx="0" cy="0"/>
+          <a:chOff x="0" y="0"/>
+          <a:chExt cx="0" cy="0"/>
+        </a:xfrm>
+      </p:grpSpPr>
+      <p:pic>
+        <p:nvPicPr>
+          <p:cNvPr id="3" name="圖片 2">
+            <a:extLst>
+              <a:ext uri="{FF2B5EF4-FFF2-40B4-BE49-F238E27FC236}">
+                <a16:creationId xmlns:a16="http://schemas.microsoft.com/office/drawing/2014/main" id="{1202EBDE-7F64-43BD-86B7-6C228CCEC2D0}"/>
+              </a:ext>
+            </a:extLst>
+          </p:cNvPr>
+          <p:cNvPicPr>
+            <a:picLocks noChangeAspect="1"/>
+          </p:cNvPicPr>
+          <p:nvPr/>
+        </p:nvPicPr>
+        <p:blipFill>
+          <a:blip r:embed="rId2" cstate="print">
+            <a:extLst>
+              <a:ext uri="{28A0092B-C50C-407E-A947-70E740481C1C}">
+                <a14:useLocalDpi xmlns:a14="http://schemas.microsoft.com/office/drawing/2010/main" val="0"/>
+              </a:ext>
+            </a:extLst>
+          </a:blip>
+          <a:stretch>
+            <a:fillRect/>
+          </a:stretch>
+        </p:blipFill>
+        <p:spPr>
+          <a:xfrm>
+            <a:off x="6598915" y="0"/>
+            <a:ext cx="2545085" cy="3294895"/>
+          </a:xfrm>
+          <a:prstGeom prst="rect">
+            <a:avLst/>
+          </a:prstGeom>
+        </p:spPr>
+      </p:pic>
+      <p:pic>
+        <p:nvPicPr>
+          <p:cNvPr id="4" name="圖片 3">
+            <a:extLst>
+              <a:ext uri="{FF2B5EF4-FFF2-40B4-BE49-F238E27FC236}">
+                <a16:creationId xmlns:a16="http://schemas.microsoft.com/office/drawing/2014/main" id="{AEFF5069-0FA7-44E7-AEEE-225463C6B1AC}"/>
+              </a:ext>
+            </a:extLst>
+          </p:cNvPr>
+          <p:cNvPicPr>
+            <a:picLocks noChangeAspect="1"/>
+          </p:cNvPicPr>
+          <p:nvPr/>
+        </p:nvPicPr>
+        <p:blipFill>
+          <a:blip r:embed="rId3" cstate="print">
+            <a:extLst>
+              <a:ext uri="{28A0092B-C50C-407E-A947-70E740481C1C}">
+                <a14:useLocalDpi xmlns:a14="http://schemas.microsoft.com/office/drawing/2010/main" val="0"/>
+              </a:ext>
+            </a:extLst>
+          </a:blip>
+          <a:stretch>
+            <a:fillRect/>
+          </a:stretch>
+        </p:blipFill>
+        <p:spPr>
+          <a:xfrm>
+            <a:off x="0" y="4169659"/>
+            <a:ext cx="3934976" cy="2688341"/>
+          </a:xfrm>
+          <a:prstGeom prst="rect">
+            <a:avLst/>
+          </a:prstGeom>
+        </p:spPr>
+      </p:pic>
+    </p:spTree>
+    <p:extLst>
+      <p:ext uri="{BB962C8B-B14F-4D97-AF65-F5344CB8AC3E}">
+        <p14:creationId xmlns:p14="http://schemas.microsoft.com/office/powerpoint/2010/main" val="3514847679"/>
+      </p:ext>
+    </p:extLst>
+  </p:cSld>
+  <p:clrMapOvr>
+    <a:masterClrMapping/>
+  </p:clrMapOvr>
+</p:sld>
+</file>
+
+<file path=ppt/slides/slide26.xml><?xml version="1.0" encoding="utf-8"?>
+<p:sld xmlns:a="http://schemas.openxmlformats.org/drawingml/2006/main" xmlns:r="http://schemas.openxmlformats.org/officeDocument/2006/relationships" xmlns:p="http://schemas.openxmlformats.org/presentationml/2006/main">
+  <p:cSld>
+    <p:spTree>
+      <p:nvGrpSpPr>
+        <p:cNvPr id="1" name=""/>
+        <p:cNvGrpSpPr/>
+        <p:nvPr/>
+      </p:nvGrpSpPr>
+      <p:grpSpPr>
+        <a:xfrm>
+          <a:off x="0" y="0"/>
+          <a:ext cx="0" cy="0"/>
+          <a:chOff x="0" y="0"/>
+          <a:chExt cx="0" cy="0"/>
+        </a:xfrm>
+      </p:grpSpPr>
+      <p:pic>
+        <p:nvPicPr>
+          <p:cNvPr id="3" name="圖片 2">
+            <a:extLst>
+              <a:ext uri="{FF2B5EF4-FFF2-40B4-BE49-F238E27FC236}">
+                <a16:creationId xmlns:a16="http://schemas.microsoft.com/office/drawing/2014/main" id="{1202EBDE-7F64-43BD-86B7-6C228CCEC2D0}"/>
+              </a:ext>
+            </a:extLst>
+          </p:cNvPr>
+          <p:cNvPicPr>
+            <a:picLocks noChangeAspect="1"/>
+          </p:cNvPicPr>
+          <p:nvPr/>
+        </p:nvPicPr>
+        <p:blipFill>
+          <a:blip r:embed="rId2" cstate="print">
+            <a:extLst>
+              <a:ext uri="{28A0092B-C50C-407E-A947-70E740481C1C}">
+                <a14:useLocalDpi xmlns:a14="http://schemas.microsoft.com/office/drawing/2010/main" val="0"/>
+              </a:ext>
+            </a:extLst>
+          </a:blip>
+          <a:stretch>
+            <a:fillRect/>
+          </a:stretch>
+        </p:blipFill>
+        <p:spPr>
+          <a:xfrm>
+            <a:off x="6598915" y="0"/>
+            <a:ext cx="2545085" cy="3294895"/>
+          </a:xfrm>
+          <a:prstGeom prst="rect">
+            <a:avLst/>
+          </a:prstGeom>
+        </p:spPr>
+      </p:pic>
+      <p:pic>
+        <p:nvPicPr>
+          <p:cNvPr id="4" name="圖片 3">
+            <a:extLst>
+              <a:ext uri="{FF2B5EF4-FFF2-40B4-BE49-F238E27FC236}">
+                <a16:creationId xmlns:a16="http://schemas.microsoft.com/office/drawing/2014/main" id="{AEFF5069-0FA7-44E7-AEEE-225463C6B1AC}"/>
+              </a:ext>
+            </a:extLst>
+          </p:cNvPr>
+          <p:cNvPicPr>
+            <a:picLocks noChangeAspect="1"/>
+          </p:cNvPicPr>
+          <p:nvPr/>
+        </p:nvPicPr>
+        <p:blipFill>
+          <a:blip r:embed="rId3" cstate="print">
+            <a:extLst>
+              <a:ext uri="{28A0092B-C50C-407E-A947-70E740481C1C}">
+                <a14:useLocalDpi xmlns:a14="http://schemas.microsoft.com/office/drawing/2010/main" val="0"/>
+              </a:ext>
+            </a:extLst>
+          </a:blip>
+          <a:stretch>
+            <a:fillRect/>
+          </a:stretch>
+        </p:blipFill>
+        <p:spPr>
+          <a:xfrm>
+            <a:off x="0" y="4169659"/>
+            <a:ext cx="3934976" cy="2688341"/>
+          </a:xfrm>
+          <a:prstGeom prst="rect">
+            <a:avLst/>
+          </a:prstGeom>
+        </p:spPr>
+      </p:pic>
+    </p:spTree>
+    <p:extLst>
+      <p:ext uri="{BB962C8B-B14F-4D97-AF65-F5344CB8AC3E}">
+        <p14:creationId xmlns:p14="http://schemas.microsoft.com/office/powerpoint/2010/main" val="496548563"/>
+      </p:ext>
+    </p:extLst>
+  </p:cSld>
+  <p:clrMapOvr>
+    <a:masterClrMapping/>
+  </p:clrMapOvr>
+</p:sld>
+</file>
+
+<file path=ppt/slides/slide27.xml><?xml version="1.0" encoding="utf-8"?>
+<p:sld xmlns:a="http://schemas.openxmlformats.org/drawingml/2006/main" xmlns:r="http://schemas.openxmlformats.org/officeDocument/2006/relationships" xmlns:p="http://schemas.openxmlformats.org/presentationml/2006/main">
+  <p:cSld>
+    <p:spTree>
+      <p:nvGrpSpPr>
+        <p:cNvPr id="1" name=""/>
+        <p:cNvGrpSpPr/>
+        <p:nvPr/>
+      </p:nvGrpSpPr>
+      <p:grpSpPr>
+        <a:xfrm>
+          <a:off x="0" y="0"/>
+          <a:ext cx="0" cy="0"/>
+          <a:chOff x="0" y="0"/>
+          <a:chExt cx="0" cy="0"/>
+        </a:xfrm>
+      </p:grpSpPr>
+      <p:pic>
+        <p:nvPicPr>
+          <p:cNvPr id="3" name="圖片 2">
+            <a:extLst>
+              <a:ext uri="{FF2B5EF4-FFF2-40B4-BE49-F238E27FC236}">
+                <a16:creationId xmlns:a16="http://schemas.microsoft.com/office/drawing/2014/main" id="{1202EBDE-7F64-43BD-86B7-6C228CCEC2D0}"/>
+              </a:ext>
+            </a:extLst>
+          </p:cNvPr>
+          <p:cNvPicPr>
+            <a:picLocks noChangeAspect="1"/>
+          </p:cNvPicPr>
+          <p:nvPr/>
+        </p:nvPicPr>
+        <p:blipFill>
+          <a:blip r:embed="rId2" cstate="print">
+            <a:extLst>
+              <a:ext uri="{28A0092B-C50C-407E-A947-70E740481C1C}">
+                <a14:useLocalDpi xmlns:a14="http://schemas.microsoft.com/office/drawing/2010/main" val="0"/>
+              </a:ext>
+            </a:extLst>
+          </a:blip>
+          <a:stretch>
+            <a:fillRect/>
+          </a:stretch>
+        </p:blipFill>
+        <p:spPr>
+          <a:xfrm>
+            <a:off x="6598915" y="0"/>
+            <a:ext cx="2545085" cy="3294895"/>
+          </a:xfrm>
+          <a:prstGeom prst="rect">
+            <a:avLst/>
+          </a:prstGeom>
+        </p:spPr>
+      </p:pic>
+      <p:pic>
+        <p:nvPicPr>
+          <p:cNvPr id="4" name="圖片 3">
+            <a:extLst>
+              <a:ext uri="{FF2B5EF4-FFF2-40B4-BE49-F238E27FC236}">
+                <a16:creationId xmlns:a16="http://schemas.microsoft.com/office/drawing/2014/main" id="{AEFF5069-0FA7-44E7-AEEE-225463C6B1AC}"/>
+              </a:ext>
+            </a:extLst>
+          </p:cNvPr>
+          <p:cNvPicPr>
+            <a:picLocks noChangeAspect="1"/>
+          </p:cNvPicPr>
+          <p:nvPr/>
+        </p:nvPicPr>
+        <p:blipFill>
+          <a:blip r:embed="rId3" cstate="print">
+            <a:extLst>
+              <a:ext uri="{28A0092B-C50C-407E-A947-70E740481C1C}">
+                <a14:useLocalDpi xmlns:a14="http://schemas.microsoft.com/office/drawing/2010/main" val="0"/>
+              </a:ext>
+            </a:extLst>
+          </a:blip>
+          <a:stretch>
+            <a:fillRect/>
+          </a:stretch>
+        </p:blipFill>
+        <p:spPr>
+          <a:xfrm>
+            <a:off x="0" y="4169659"/>
+            <a:ext cx="3934976" cy="2688341"/>
+          </a:xfrm>
+          <a:prstGeom prst="rect">
+            <a:avLst/>
+          </a:prstGeom>
+        </p:spPr>
+      </p:pic>
+    </p:spTree>
+    <p:extLst>
+      <p:ext uri="{BB962C8B-B14F-4D97-AF65-F5344CB8AC3E}">
+        <p14:creationId xmlns:p14="http://schemas.microsoft.com/office/powerpoint/2010/main" val="1659399492"/>
       </p:ext>
     </p:extLst>
   </p:cSld>

</xml_diff>

<commit_message>
Finish the 'status' part of the PPT.
</commit_message>
<xml_diff>
--- a/TA_Class_III.pptx
+++ b/TA_Class_III.pptx
@@ -17,10 +17,10 @@
     <p:sldId id="303" r:id="rId11"/>
     <p:sldId id="304" r:id="rId12"/>
     <p:sldId id="306" r:id="rId13"/>
-    <p:sldId id="305" r:id="rId14"/>
-    <p:sldId id="307" r:id="rId15"/>
-    <p:sldId id="308" r:id="rId16"/>
-    <p:sldId id="309" r:id="rId17"/>
+    <p:sldId id="309" r:id="rId14"/>
+    <p:sldId id="305" r:id="rId15"/>
+    <p:sldId id="307" r:id="rId16"/>
+    <p:sldId id="308" r:id="rId17"/>
     <p:sldId id="310" r:id="rId18"/>
     <p:sldId id="311" r:id="rId19"/>
     <p:sldId id="312" r:id="rId20"/>
@@ -4255,69 +4255,48 @@
           </a:prstGeom>
         </p:spPr>
       </p:pic>
-      <p:sp>
-        <p:nvSpPr>
-          <p:cNvPr id="5" name="矩形 4">
-            <a:extLst>
-              <a:ext uri="{FF2B5EF4-FFF2-40B4-BE49-F238E27FC236}">
-                <a16:creationId xmlns:a16="http://schemas.microsoft.com/office/drawing/2014/main" id="{97EA95AC-D793-49B2-8A8C-E840C8BD65E6}"/>
-              </a:ext>
-            </a:extLst>
-          </p:cNvPr>
-          <p:cNvSpPr/>
-          <p:nvPr/>
-        </p:nvSpPr>
-        <p:spPr>
-          <a:xfrm>
-            <a:off x="646221" y="604008"/>
-            <a:ext cx="3179159" cy="1224792"/>
-          </a:xfrm>
-          <a:prstGeom prst="rect">
-            <a:avLst/>
-          </a:prstGeom>
-          <a:solidFill>
-            <a:schemeClr val="accent3">
-              <a:lumMod val="20000"/>
-              <a:lumOff val="80000"/>
-            </a:schemeClr>
-          </a:solidFill>
-          <a:ln w="38100">
-            <a:solidFill>
-              <a:schemeClr val="tx1"/>
-            </a:solidFill>
-          </a:ln>
-        </p:spPr>
-        <p:style>
-          <a:lnRef idx="2">
-            <a:schemeClr val="accent1">
-              <a:shade val="50000"/>
-            </a:schemeClr>
-          </a:lnRef>
-          <a:fillRef idx="1">
-            <a:schemeClr val="accent1"/>
-          </a:fillRef>
-          <a:effectRef idx="0">
-            <a:schemeClr val="accent1"/>
-          </a:effectRef>
-          <a:fontRef idx="minor">
-            <a:schemeClr val="lt1"/>
-          </a:fontRef>
-        </p:style>
-        <p:txBody>
-          <a:bodyPr rtlCol="0" anchor="ctr"/>
-          <a:lstStyle/>
-          <a:p>
-            <a:pPr algn="ctr"/>
-            <a:endParaRPr lang="zh-TW" altLang="en-US"/>
-          </a:p>
-        </p:txBody>
-      </p:sp>
+      <p:pic>
+        <p:nvPicPr>
+          <p:cNvPr id="5" name="圖片 4">
+            <a:extLst>
+              <a:ext uri="{FF2B5EF4-FFF2-40B4-BE49-F238E27FC236}">
+                <a16:creationId xmlns:a16="http://schemas.microsoft.com/office/drawing/2014/main" id="{8D014E5D-EEAA-4AA8-99B1-9FEDEB53F6EC}"/>
+              </a:ext>
+            </a:extLst>
+          </p:cNvPr>
+          <p:cNvPicPr>
+            <a:picLocks noChangeAspect="1"/>
+          </p:cNvPicPr>
+          <p:nvPr/>
+        </p:nvPicPr>
+        <p:blipFill>
+          <a:blip r:embed="rId4">
+            <a:extLst>
+              <a:ext uri="{28A0092B-C50C-407E-A947-70E740481C1C}">
+                <a14:useLocalDpi xmlns:a14="http://schemas.microsoft.com/office/drawing/2010/main" val="0"/>
+              </a:ext>
+            </a:extLst>
+          </a:blip>
+          <a:stretch>
+            <a:fillRect/>
+          </a:stretch>
+        </p:blipFill>
+        <p:spPr>
+          <a:xfrm>
+            <a:off x="3302159" y="1277758"/>
+            <a:ext cx="2539682" cy="2539682"/>
+          </a:xfrm>
+          <a:prstGeom prst="rect">
+            <a:avLst/>
+          </a:prstGeom>
+        </p:spPr>
+      </p:pic>
       <p:sp>
         <p:nvSpPr>
           <p:cNvPr id="6" name="文字方塊 5">
             <a:extLst>
               <a:ext uri="{FF2B5EF4-FFF2-40B4-BE49-F238E27FC236}">
-                <a16:creationId xmlns:a16="http://schemas.microsoft.com/office/drawing/2014/main" id="{7316823D-3FCA-434F-A900-4F5557EB3F89}"/>
+                <a16:creationId xmlns:a16="http://schemas.microsoft.com/office/drawing/2014/main" id="{C4EB8C33-3A1A-4B3B-A42F-FDAC57563C7A}"/>
               </a:ext>
             </a:extLst>
           </p:cNvPr>
@@ -4326,8 +4305,8 @@
         </p:nvSpPr>
         <p:spPr>
           <a:xfrm>
-            <a:off x="935048" y="924016"/>
-            <a:ext cx="2348720" cy="584775"/>
+            <a:off x="957068" y="4035554"/>
+            <a:ext cx="7229864" cy="707886"/>
           </a:xfrm>
           <a:prstGeom prst="rect">
             <a:avLst/>
@@ -4341,61 +4320,26 @@
           <a:lstStyle/>
           <a:p>
             <a:r>
-              <a:rPr lang="zh-TW" altLang="en-US" sz="3200" dirty="0">
+              <a:rPr lang="zh-TW" altLang="en-US" sz="4000" dirty="0">
                 <a:latin typeface="Arial" panose="020B0604020202020204" pitchFamily="34" charset="0"/>
                 <a:cs typeface="Arial" panose="020B0604020202020204" pitchFamily="34" charset="0"/>
               </a:rPr>
-              <a:t>． </a:t>
-            </a:r>
-            <a:r>
-              <a:rPr lang="en-US" altLang="zh-TW" sz="3200" dirty="0">
+              <a:t>．</a:t>
+            </a:r>
+            <a:r>
+              <a:rPr lang="en-US" altLang="zh-TW" sz="4000" dirty="0">
                 <a:latin typeface="Arial" panose="020B0604020202020204" pitchFamily="34" charset="0"/>
                 <a:cs typeface="Arial" panose="020B0604020202020204" pitchFamily="34" charset="0"/>
               </a:rPr>
-              <a:t>git status</a:t>
-            </a:r>
-          </a:p>
-        </p:txBody>
-      </p:sp>
-      <p:pic>
-        <p:nvPicPr>
-          <p:cNvPr id="7" name="圖片 6" descr="一張含有 文字 的圖片&#10;&#10;自動產生的描述">
-            <a:extLst>
-              <a:ext uri="{FF2B5EF4-FFF2-40B4-BE49-F238E27FC236}">
-                <a16:creationId xmlns:a16="http://schemas.microsoft.com/office/drawing/2014/main" id="{0C91348F-9487-4556-9934-EFC656710516}"/>
-              </a:ext>
-            </a:extLst>
-          </p:cNvPr>
-          <p:cNvPicPr>
-            <a:picLocks noChangeAspect="1"/>
-          </p:cNvPicPr>
-          <p:nvPr/>
-        </p:nvPicPr>
-        <p:blipFill rotWithShape="1">
-          <a:blip r:embed="rId4">
-            <a:extLst>
-              <a:ext uri="{28A0092B-C50C-407E-A947-70E740481C1C}">
-                <a14:useLocalDpi xmlns:a14="http://schemas.microsoft.com/office/drawing/2010/main" val="0"/>
-              </a:ext>
-            </a:extLst>
-          </a:blip>
-          <a:srcRect l="47161" t="22711" r="8813" b="27426"/>
-          <a:stretch/>
-        </p:blipFill>
-        <p:spPr>
-          <a:xfrm>
-            <a:off x="2545086" y="2423168"/>
-            <a:ext cx="5786364" cy="3660761"/>
-          </a:xfrm>
-          <a:prstGeom prst="rect">
-            <a:avLst/>
-          </a:prstGeom>
-        </p:spPr>
-      </p:pic>
+              <a:t>Snapshotting your repository</a:t>
+            </a:r>
+          </a:p>
+        </p:txBody>
+      </p:sp>
     </p:spTree>
     <p:extLst>
       <p:ext uri="{BB962C8B-B14F-4D97-AF65-F5344CB8AC3E}">
-        <p14:creationId xmlns:p14="http://schemas.microsoft.com/office/powerpoint/2010/main" val="3467330036"/>
+        <p14:creationId xmlns:p14="http://schemas.microsoft.com/office/powerpoint/2010/main" val="2937085979"/>
       </p:ext>
     </p:extLst>
   </p:cSld>
@@ -4499,7 +4443,7 @@
           <p:cNvPr id="5" name="矩形 4">
             <a:extLst>
               <a:ext uri="{FF2B5EF4-FFF2-40B4-BE49-F238E27FC236}">
-                <a16:creationId xmlns:a16="http://schemas.microsoft.com/office/drawing/2014/main" id="{5C3A603C-CF91-465C-A54F-8D59905FD57A}"/>
+                <a16:creationId xmlns:a16="http://schemas.microsoft.com/office/drawing/2014/main" id="{97EA95AC-D793-49B2-8A8C-E840C8BD65E6}"/>
               </a:ext>
             </a:extLst>
           </p:cNvPr>
@@ -4509,7 +4453,7 @@
         <p:spPr>
           <a:xfrm>
             <a:off x="646221" y="604008"/>
-            <a:ext cx="2642533" cy="1224792"/>
+            <a:ext cx="3179159" cy="1224792"/>
           </a:xfrm>
           <a:prstGeom prst="rect">
             <a:avLst/>
@@ -4556,7 +4500,7 @@
           <p:cNvPr id="6" name="文字方塊 5">
             <a:extLst>
               <a:ext uri="{FF2B5EF4-FFF2-40B4-BE49-F238E27FC236}">
-                <a16:creationId xmlns:a16="http://schemas.microsoft.com/office/drawing/2014/main" id="{D36CBD38-AD49-4061-9B36-9AFA65B32A27}"/>
+                <a16:creationId xmlns:a16="http://schemas.microsoft.com/office/drawing/2014/main" id="{7316823D-3FCA-434F-A900-4F5557EB3F89}"/>
               </a:ext>
             </a:extLst>
           </p:cNvPr>
@@ -4566,7 +4510,7 @@
         <p:spPr>
           <a:xfrm>
             <a:off x="935048" y="924016"/>
-            <a:ext cx="1938351" cy="584775"/>
+            <a:ext cx="2348720" cy="584775"/>
           </a:xfrm>
           <a:prstGeom prst="rect">
             <a:avLst/>
@@ -4591,17 +4535,17 @@
                 <a:latin typeface="Arial" panose="020B0604020202020204" pitchFamily="34" charset="0"/>
                 <a:cs typeface="Arial" panose="020B0604020202020204" pitchFamily="34" charset="0"/>
               </a:rPr>
-              <a:t>git add</a:t>
+              <a:t>git status</a:t>
             </a:r>
           </a:p>
         </p:txBody>
       </p:sp>
       <p:pic>
         <p:nvPicPr>
-          <p:cNvPr id="8" name="圖片 7" descr="一張含有 文字 的圖片&#10;&#10;自動產生的描述">
-            <a:extLst>
-              <a:ext uri="{FF2B5EF4-FFF2-40B4-BE49-F238E27FC236}">
-                <a16:creationId xmlns:a16="http://schemas.microsoft.com/office/drawing/2014/main" id="{35CC4861-470B-4901-B13F-448595E10533}"/>
+          <p:cNvPr id="7" name="圖片 6" descr="一張含有 文字 的圖片&#10;&#10;自動產生的描述">
+            <a:extLst>
+              <a:ext uri="{FF2B5EF4-FFF2-40B4-BE49-F238E27FC236}">
+                <a16:creationId xmlns:a16="http://schemas.microsoft.com/office/drawing/2014/main" id="{0C91348F-9487-4556-9934-EFC656710516}"/>
               </a:ext>
             </a:extLst>
           </p:cNvPr>
@@ -4618,13 +4562,13 @@
               </a:ext>
             </a:extLst>
           </a:blip>
-          <a:srcRect l="45321" t="22835" r="10826" b="27997"/>
+          <a:srcRect l="47161" t="22711" r="8813" b="27426"/>
           <a:stretch/>
         </p:blipFill>
         <p:spPr>
           <a:xfrm>
-            <a:off x="2545085" y="2452322"/>
-            <a:ext cx="5786363" cy="3631608"/>
+            <a:off x="2545086" y="2423168"/>
+            <a:ext cx="5786364" cy="3660761"/>
           </a:xfrm>
           <a:prstGeom prst="rect">
             <a:avLst/>
@@ -4634,7 +4578,7 @@
     </p:spTree>
     <p:extLst>
       <p:ext uri="{BB962C8B-B14F-4D97-AF65-F5344CB8AC3E}">
-        <p14:creationId xmlns:p14="http://schemas.microsoft.com/office/powerpoint/2010/main" val="299310135"/>
+        <p14:creationId xmlns:p14="http://schemas.microsoft.com/office/powerpoint/2010/main" val="3467330036"/>
       </p:ext>
     </p:extLst>
   </p:cSld>
@@ -4738,7 +4682,7 @@
           <p:cNvPr id="5" name="矩形 4">
             <a:extLst>
               <a:ext uri="{FF2B5EF4-FFF2-40B4-BE49-F238E27FC236}">
-                <a16:creationId xmlns:a16="http://schemas.microsoft.com/office/drawing/2014/main" id="{6766FB30-D4E1-404F-BBFB-221346B73812}"/>
+                <a16:creationId xmlns:a16="http://schemas.microsoft.com/office/drawing/2014/main" id="{5C3A603C-CF91-465C-A54F-8D59905FD57A}"/>
               </a:ext>
             </a:extLst>
           </p:cNvPr>
@@ -4748,7 +4692,7 @@
         <p:spPr>
           <a:xfrm>
             <a:off x="646221" y="604008"/>
-            <a:ext cx="3288755" cy="1224792"/>
+            <a:ext cx="2642533" cy="1224792"/>
           </a:xfrm>
           <a:prstGeom prst="rect">
             <a:avLst/>
@@ -4795,7 +4739,7 @@
           <p:cNvPr id="6" name="文字方塊 5">
             <a:extLst>
               <a:ext uri="{FF2B5EF4-FFF2-40B4-BE49-F238E27FC236}">
-                <a16:creationId xmlns:a16="http://schemas.microsoft.com/office/drawing/2014/main" id="{3DE209A1-E144-4409-81B8-EDCE9CCD3FAA}"/>
+                <a16:creationId xmlns:a16="http://schemas.microsoft.com/office/drawing/2014/main" id="{D36CBD38-AD49-4061-9B36-9AFA65B32A27}"/>
               </a:ext>
             </a:extLst>
           </p:cNvPr>
@@ -4805,7 +4749,7 @@
         <p:spPr>
           <a:xfrm>
             <a:off x="935048" y="924016"/>
-            <a:ext cx="2576346" cy="584775"/>
+            <a:ext cx="1938351" cy="584775"/>
           </a:xfrm>
           <a:prstGeom prst="rect">
             <a:avLst/>
@@ -4830,7 +4774,7 @@
                 <a:latin typeface="Arial" panose="020B0604020202020204" pitchFamily="34" charset="0"/>
                 <a:cs typeface="Arial" panose="020B0604020202020204" pitchFamily="34" charset="0"/>
               </a:rPr>
-              <a:t>git commit</a:t>
+              <a:t>git add</a:t>
             </a:r>
           </a:p>
         </p:txBody>
@@ -4840,7 +4784,7 @@
           <p:cNvPr id="8" name="圖片 7" descr="一張含有 文字 的圖片&#10;&#10;自動產生的描述">
             <a:extLst>
               <a:ext uri="{FF2B5EF4-FFF2-40B4-BE49-F238E27FC236}">
-                <a16:creationId xmlns:a16="http://schemas.microsoft.com/office/drawing/2014/main" id="{434CE7F8-B94D-478E-88F8-F05D9B01286A}"/>
+                <a16:creationId xmlns:a16="http://schemas.microsoft.com/office/drawing/2014/main" id="{35CC4861-470B-4901-B13F-448595E10533}"/>
               </a:ext>
             </a:extLst>
           </p:cNvPr>
@@ -4857,13 +4801,13 @@
               </a:ext>
             </a:extLst>
           </a:blip>
-          <a:srcRect l="45413" t="22794" r="10826" b="27964"/>
+          <a:srcRect l="45321" t="22835" r="10826" b="27997"/>
           <a:stretch/>
         </p:blipFill>
         <p:spPr>
           <a:xfrm>
-            <a:off x="2545085" y="2444709"/>
-            <a:ext cx="5786363" cy="3639221"/>
+            <a:off x="2545085" y="2452322"/>
+            <a:ext cx="5786363" cy="3631608"/>
           </a:xfrm>
           <a:prstGeom prst="rect">
             <a:avLst/>
@@ -4873,7 +4817,7 @@
     </p:spTree>
     <p:extLst>
       <p:ext uri="{BB962C8B-B14F-4D97-AF65-F5344CB8AC3E}">
-        <p14:creationId xmlns:p14="http://schemas.microsoft.com/office/powerpoint/2010/main" val="3325426144"/>
+        <p14:creationId xmlns:p14="http://schemas.microsoft.com/office/powerpoint/2010/main" val="299310135"/>
       </p:ext>
     </p:extLst>
   </p:cSld>
@@ -4972,10 +4916,147 @@
           </a:prstGeom>
         </p:spPr>
       </p:pic>
+      <p:sp>
+        <p:nvSpPr>
+          <p:cNvPr id="5" name="矩形 4">
+            <a:extLst>
+              <a:ext uri="{FF2B5EF4-FFF2-40B4-BE49-F238E27FC236}">
+                <a16:creationId xmlns:a16="http://schemas.microsoft.com/office/drawing/2014/main" id="{6766FB30-D4E1-404F-BBFB-221346B73812}"/>
+              </a:ext>
+            </a:extLst>
+          </p:cNvPr>
+          <p:cNvSpPr/>
+          <p:nvPr/>
+        </p:nvSpPr>
+        <p:spPr>
+          <a:xfrm>
+            <a:off x="646221" y="604008"/>
+            <a:ext cx="5016348" cy="1224792"/>
+          </a:xfrm>
+          <a:prstGeom prst="rect">
+            <a:avLst/>
+          </a:prstGeom>
+          <a:solidFill>
+            <a:schemeClr val="accent3">
+              <a:lumMod val="20000"/>
+              <a:lumOff val="80000"/>
+            </a:schemeClr>
+          </a:solidFill>
+          <a:ln w="38100">
+            <a:solidFill>
+              <a:schemeClr val="tx1"/>
+            </a:solidFill>
+          </a:ln>
+        </p:spPr>
+        <p:style>
+          <a:lnRef idx="2">
+            <a:schemeClr val="accent1">
+              <a:shade val="50000"/>
+            </a:schemeClr>
+          </a:lnRef>
+          <a:fillRef idx="1">
+            <a:schemeClr val="accent1"/>
+          </a:fillRef>
+          <a:effectRef idx="0">
+            <a:schemeClr val="accent1"/>
+          </a:effectRef>
+          <a:fontRef idx="minor">
+            <a:schemeClr val="lt1"/>
+          </a:fontRef>
+        </p:style>
+        <p:txBody>
+          <a:bodyPr rtlCol="0" anchor="ctr"/>
+          <a:lstStyle/>
+          <a:p>
+            <a:pPr algn="ctr"/>
+            <a:endParaRPr lang="zh-TW" altLang="en-US"/>
+          </a:p>
+        </p:txBody>
+      </p:sp>
+      <p:sp>
+        <p:nvSpPr>
+          <p:cNvPr id="6" name="文字方塊 5">
+            <a:extLst>
+              <a:ext uri="{FF2B5EF4-FFF2-40B4-BE49-F238E27FC236}">
+                <a16:creationId xmlns:a16="http://schemas.microsoft.com/office/drawing/2014/main" id="{3DE209A1-E144-4409-81B8-EDCE9CCD3FAA}"/>
+              </a:ext>
+            </a:extLst>
+          </p:cNvPr>
+          <p:cNvSpPr txBox="1"/>
+          <p:nvPr/>
+        </p:nvSpPr>
+        <p:spPr>
+          <a:xfrm>
+            <a:off x="935048" y="924016"/>
+            <a:ext cx="3953326" cy="584775"/>
+          </a:xfrm>
+          <a:prstGeom prst="rect">
+            <a:avLst/>
+          </a:prstGeom>
+          <a:noFill/>
+        </p:spPr>
+        <p:txBody>
+          <a:bodyPr wrap="none" rtlCol="0">
+            <a:spAutoFit/>
+          </a:bodyPr>
+          <a:lstStyle/>
+          <a:p>
+            <a:r>
+              <a:rPr lang="zh-TW" altLang="en-US" sz="3200" dirty="0">
+                <a:latin typeface="Arial" panose="020B0604020202020204" pitchFamily="34" charset="0"/>
+                <a:cs typeface="Arial" panose="020B0604020202020204" pitchFamily="34" charset="0"/>
+              </a:rPr>
+              <a:t>． </a:t>
+            </a:r>
+            <a:r>
+              <a:rPr lang="en-US" altLang="zh-TW" sz="3200" dirty="0">
+                <a:latin typeface="Arial" panose="020B0604020202020204" pitchFamily="34" charset="0"/>
+                <a:cs typeface="Arial" panose="020B0604020202020204" pitchFamily="34" charset="0"/>
+              </a:rPr>
+              <a:t>git commit –m ‘…’</a:t>
+            </a:r>
+          </a:p>
+        </p:txBody>
+      </p:sp>
+      <p:pic>
+        <p:nvPicPr>
+          <p:cNvPr id="8" name="圖片 7" descr="一張含有 文字 的圖片&#10;&#10;自動產生的描述">
+            <a:extLst>
+              <a:ext uri="{FF2B5EF4-FFF2-40B4-BE49-F238E27FC236}">
+                <a16:creationId xmlns:a16="http://schemas.microsoft.com/office/drawing/2014/main" id="{434CE7F8-B94D-478E-88F8-F05D9B01286A}"/>
+              </a:ext>
+            </a:extLst>
+          </p:cNvPr>
+          <p:cNvPicPr>
+            <a:picLocks noChangeAspect="1"/>
+          </p:cNvPicPr>
+          <p:nvPr/>
+        </p:nvPicPr>
+        <p:blipFill rotWithShape="1">
+          <a:blip r:embed="rId4">
+            <a:extLst>
+              <a:ext uri="{28A0092B-C50C-407E-A947-70E740481C1C}">
+                <a14:useLocalDpi xmlns:a14="http://schemas.microsoft.com/office/drawing/2010/main" val="0"/>
+              </a:ext>
+            </a:extLst>
+          </a:blip>
+          <a:srcRect l="45413" t="22794" r="10826" b="27964"/>
+          <a:stretch/>
+        </p:blipFill>
+        <p:spPr>
+          <a:xfrm>
+            <a:off x="2545085" y="2444709"/>
+            <a:ext cx="5786363" cy="3639221"/>
+          </a:xfrm>
+          <a:prstGeom prst="rect">
+            <a:avLst/>
+          </a:prstGeom>
+        </p:spPr>
+      </p:pic>
     </p:spTree>
     <p:extLst>
       <p:ext uri="{BB962C8B-B14F-4D97-AF65-F5344CB8AC3E}">
-        <p14:creationId xmlns:p14="http://schemas.microsoft.com/office/powerpoint/2010/main" val="2937085979"/>
+        <p14:creationId xmlns:p14="http://schemas.microsoft.com/office/powerpoint/2010/main" val="3325426144"/>
       </p:ext>
     </p:extLst>
   </p:cSld>
@@ -5074,6 +5155,148 @@
           </a:prstGeom>
         </p:spPr>
       </p:pic>
+      <p:pic>
+        <p:nvPicPr>
+          <p:cNvPr id="5" name="圖片 4">
+            <a:extLst>
+              <a:ext uri="{FF2B5EF4-FFF2-40B4-BE49-F238E27FC236}">
+                <a16:creationId xmlns:a16="http://schemas.microsoft.com/office/drawing/2014/main" id="{07159256-E46E-4447-994C-253BCA809BBC}"/>
+              </a:ext>
+            </a:extLst>
+          </p:cNvPr>
+          <p:cNvPicPr>
+            <a:picLocks noChangeAspect="1"/>
+          </p:cNvPicPr>
+          <p:nvPr/>
+        </p:nvPicPr>
+        <p:blipFill>
+          <a:blip r:embed="rId4">
+            <a:extLst>
+              <a:ext uri="{28A0092B-C50C-407E-A947-70E740481C1C}">
+                <a14:useLocalDpi xmlns:a14="http://schemas.microsoft.com/office/drawing/2010/main" val="0"/>
+              </a:ext>
+            </a:extLst>
+          </a:blip>
+          <a:stretch>
+            <a:fillRect/>
+          </a:stretch>
+        </p:blipFill>
+        <p:spPr>
+          <a:xfrm>
+            <a:off x="935048" y="2510625"/>
+            <a:ext cx="7331978" cy="2678050"/>
+          </a:xfrm>
+          <a:prstGeom prst="rect">
+            <a:avLst/>
+          </a:prstGeom>
+        </p:spPr>
+      </p:pic>
+      <p:sp>
+        <p:nvSpPr>
+          <p:cNvPr id="6" name="矩形 5">
+            <a:extLst>
+              <a:ext uri="{FF2B5EF4-FFF2-40B4-BE49-F238E27FC236}">
+                <a16:creationId xmlns:a16="http://schemas.microsoft.com/office/drawing/2014/main" id="{EEFAE22A-C21E-42EA-9D38-D896CA2B1B77}"/>
+              </a:ext>
+            </a:extLst>
+          </p:cNvPr>
+          <p:cNvSpPr/>
+          <p:nvPr/>
+        </p:nvSpPr>
+        <p:spPr>
+          <a:xfrm>
+            <a:off x="646222" y="604008"/>
+            <a:ext cx="2323482" cy="1224792"/>
+          </a:xfrm>
+          <a:prstGeom prst="rect">
+            <a:avLst/>
+          </a:prstGeom>
+          <a:solidFill>
+            <a:schemeClr val="accent3">
+              <a:lumMod val="20000"/>
+              <a:lumOff val="80000"/>
+            </a:schemeClr>
+          </a:solidFill>
+          <a:ln w="38100">
+            <a:solidFill>
+              <a:schemeClr val="tx1"/>
+            </a:solidFill>
+          </a:ln>
+        </p:spPr>
+        <p:style>
+          <a:lnRef idx="2">
+            <a:schemeClr val="accent1">
+              <a:shade val="50000"/>
+            </a:schemeClr>
+          </a:lnRef>
+          <a:fillRef idx="1">
+            <a:schemeClr val="accent1"/>
+          </a:fillRef>
+          <a:effectRef idx="0">
+            <a:schemeClr val="accent1"/>
+          </a:effectRef>
+          <a:fontRef idx="minor">
+            <a:schemeClr val="lt1"/>
+          </a:fontRef>
+        </p:style>
+        <p:txBody>
+          <a:bodyPr rtlCol="0" anchor="ctr"/>
+          <a:lstStyle/>
+          <a:p>
+            <a:pPr algn="ctr"/>
+            <a:endParaRPr lang="zh-TW" altLang="en-US"/>
+          </a:p>
+        </p:txBody>
+      </p:sp>
+      <p:sp>
+        <p:nvSpPr>
+          <p:cNvPr id="7" name="文字方塊 6">
+            <a:extLst>
+              <a:ext uri="{FF2B5EF4-FFF2-40B4-BE49-F238E27FC236}">
+                <a16:creationId xmlns:a16="http://schemas.microsoft.com/office/drawing/2014/main" id="{416DF437-36E8-4486-8AF3-CFC1DD2250D8}"/>
+              </a:ext>
+            </a:extLst>
+          </p:cNvPr>
+          <p:cNvSpPr txBox="1"/>
+          <p:nvPr/>
+        </p:nvSpPr>
+        <p:spPr>
+          <a:xfrm>
+            <a:off x="935048" y="924016"/>
+            <a:ext cx="1641796" cy="584775"/>
+          </a:xfrm>
+          <a:prstGeom prst="rect">
+            <a:avLst/>
+          </a:prstGeom>
+          <a:noFill/>
+        </p:spPr>
+        <p:txBody>
+          <a:bodyPr wrap="none" rtlCol="0">
+            <a:spAutoFit/>
+          </a:bodyPr>
+          <a:lstStyle/>
+          <a:p>
+            <a:r>
+              <a:rPr lang="en-US" altLang="zh-TW" sz="3200" dirty="0">
+                <a:latin typeface="Arial" panose="020B0604020202020204" pitchFamily="34" charset="0"/>
+                <a:cs typeface="Arial" panose="020B0604020202020204" pitchFamily="34" charset="0"/>
+              </a:rPr>
+              <a:t>.</a:t>
+            </a:r>
+            <a:r>
+              <a:rPr lang="en-US" altLang="zh-TW" sz="3200" dirty="0" err="1">
+                <a:latin typeface="Arial" panose="020B0604020202020204" pitchFamily="34" charset="0"/>
+                <a:cs typeface="Arial" panose="020B0604020202020204" pitchFamily="34" charset="0"/>
+              </a:rPr>
+              <a:t>gitignor</a:t>
+            </a:r>
+            <a:endParaRPr lang="en-US" altLang="zh-TW" sz="3200" dirty="0">
+              <a:latin typeface="Arial" panose="020B0604020202020204" pitchFamily="34" charset="0"/>
+              <a:cs typeface="Arial" panose="020B0604020202020204" pitchFamily="34" charset="0"/>
+            </a:endParaRPr>
+          </a:p>
+        </p:txBody>
+      </p:sp>
     </p:spTree>
     <p:extLst>
       <p:ext uri="{BB962C8B-B14F-4D97-AF65-F5344CB8AC3E}">
@@ -5176,6 +5399,127 @@
           </a:prstGeom>
         </p:spPr>
       </p:pic>
+      <p:pic>
+        <p:nvPicPr>
+          <p:cNvPr id="5" name="圖片 4">
+            <a:extLst>
+              <a:ext uri="{FF2B5EF4-FFF2-40B4-BE49-F238E27FC236}">
+                <a16:creationId xmlns:a16="http://schemas.microsoft.com/office/drawing/2014/main" id="{120AD865-2351-49AA-82E0-EF6DE8EA04F1}"/>
+              </a:ext>
+            </a:extLst>
+          </p:cNvPr>
+          <p:cNvPicPr>
+            <a:picLocks noChangeAspect="1"/>
+          </p:cNvPicPr>
+          <p:nvPr/>
+        </p:nvPicPr>
+        <p:blipFill>
+          <a:blip r:embed="rId4">
+            <a:extLst>
+              <a:ext uri="{28A0092B-C50C-407E-A947-70E740481C1C}">
+                <a14:useLocalDpi xmlns:a14="http://schemas.microsoft.com/office/drawing/2010/main" val="0"/>
+              </a:ext>
+            </a:extLst>
+          </a:blip>
+          <a:stretch>
+            <a:fillRect/>
+          </a:stretch>
+        </p:blipFill>
+        <p:spPr>
+          <a:xfrm>
+            <a:off x="1053823" y="1979802"/>
+            <a:ext cx="7036354" cy="3946204"/>
+          </a:xfrm>
+          <a:prstGeom prst="rect">
+            <a:avLst/>
+          </a:prstGeom>
+        </p:spPr>
+      </p:pic>
+      <p:sp>
+        <p:nvSpPr>
+          <p:cNvPr id="6" name="文字方塊 5">
+            <a:extLst>
+              <a:ext uri="{FF2B5EF4-FFF2-40B4-BE49-F238E27FC236}">
+                <a16:creationId xmlns:a16="http://schemas.microsoft.com/office/drawing/2014/main" id="{39346032-9365-46FB-B6CD-850B2C33FD7A}"/>
+              </a:ext>
+            </a:extLst>
+          </p:cNvPr>
+          <p:cNvSpPr txBox="1"/>
+          <p:nvPr/>
+        </p:nvSpPr>
+        <p:spPr>
+          <a:xfrm>
+            <a:off x="1053823" y="308599"/>
+            <a:ext cx="6401111" cy="1478418"/>
+          </a:xfrm>
+          <a:prstGeom prst="rect">
+            <a:avLst/>
+          </a:prstGeom>
+          <a:noFill/>
+        </p:spPr>
+        <p:txBody>
+          <a:bodyPr wrap="none" rtlCol="0">
+            <a:spAutoFit/>
+          </a:bodyPr>
+          <a:lstStyle/>
+          <a:p>
+            <a:pPr>
+              <a:lnSpc>
+                <a:spcPct val="150000"/>
+              </a:lnSpc>
+            </a:pPr>
+            <a:r>
+              <a:rPr lang="en-US" altLang="zh-TW" sz="3200" dirty="0">
+                <a:latin typeface="Arial" panose="020B0604020202020204" pitchFamily="34" charset="0"/>
+                <a:cs typeface="Arial" panose="020B0604020202020204" pitchFamily="34" charset="0"/>
+              </a:rPr>
+              <a:t>…after adding an </a:t>
+            </a:r>
+            <a:r>
+              <a:rPr lang="en-US" altLang="zh-TW" sz="3200" dirty="0" err="1">
+                <a:latin typeface="Arial" panose="020B0604020202020204" pitchFamily="34" charset="0"/>
+                <a:cs typeface="Arial" panose="020B0604020202020204" pitchFamily="34" charset="0"/>
+              </a:rPr>
+              <a:t>ipynb</a:t>
+            </a:r>
+            <a:r>
+              <a:rPr lang="en-US" altLang="zh-TW" sz="3200" dirty="0">
+                <a:latin typeface="Arial" panose="020B0604020202020204" pitchFamily="34" charset="0"/>
+                <a:cs typeface="Arial" panose="020B0604020202020204" pitchFamily="34" charset="0"/>
+              </a:rPr>
+              <a:t> file</a:t>
+            </a:r>
+          </a:p>
+          <a:p>
+            <a:pPr>
+              <a:lnSpc>
+                <a:spcPct val="150000"/>
+              </a:lnSpc>
+            </a:pPr>
+            <a:r>
+              <a:rPr lang="en-US" altLang="zh-TW" sz="3200" dirty="0">
+                <a:latin typeface="Arial" panose="020B0604020202020204" pitchFamily="34" charset="0"/>
+                <a:cs typeface="Arial" panose="020B0604020202020204" pitchFamily="34" charset="0"/>
+              </a:rPr>
+              <a:t>(the </a:t>
+            </a:r>
+            <a:r>
+              <a:rPr lang="en-US" altLang="zh-TW" sz="3200" dirty="0" err="1">
+                <a:latin typeface="Arial" panose="020B0604020202020204" pitchFamily="34" charset="0"/>
+                <a:cs typeface="Arial" panose="020B0604020202020204" pitchFamily="34" charset="0"/>
+              </a:rPr>
+              <a:t>ipynb_checkpoints</a:t>
+            </a:r>
+            <a:r>
+              <a:rPr lang="en-US" altLang="zh-TW" sz="3200" dirty="0">
+                <a:latin typeface="Arial" panose="020B0604020202020204" pitchFamily="34" charset="0"/>
+                <a:cs typeface="Arial" panose="020B0604020202020204" pitchFamily="34" charset="0"/>
+              </a:rPr>
+              <a:t> is ignored)</a:t>
+            </a:r>
+          </a:p>
+        </p:txBody>
+      </p:sp>
     </p:spTree>
     <p:extLst>
       <p:ext uri="{BB962C8B-B14F-4D97-AF65-F5344CB8AC3E}">
@@ -5272,6 +5616,144 @@
           <a:xfrm>
             <a:off x="0" y="4169659"/>
             <a:ext cx="3934976" cy="2688341"/>
+          </a:xfrm>
+          <a:prstGeom prst="rect">
+            <a:avLst/>
+          </a:prstGeom>
+        </p:spPr>
+      </p:pic>
+      <p:sp>
+        <p:nvSpPr>
+          <p:cNvPr id="6" name="矩形 5">
+            <a:extLst>
+              <a:ext uri="{FF2B5EF4-FFF2-40B4-BE49-F238E27FC236}">
+                <a16:creationId xmlns:a16="http://schemas.microsoft.com/office/drawing/2014/main" id="{3D401E60-412B-4D9B-9C87-84AD753985E4}"/>
+              </a:ext>
+            </a:extLst>
+          </p:cNvPr>
+          <p:cNvSpPr/>
+          <p:nvPr/>
+        </p:nvSpPr>
+        <p:spPr>
+          <a:xfrm>
+            <a:off x="646221" y="604008"/>
+            <a:ext cx="3288755" cy="1224792"/>
+          </a:xfrm>
+          <a:prstGeom prst="rect">
+            <a:avLst/>
+          </a:prstGeom>
+          <a:solidFill>
+            <a:schemeClr val="accent3">
+              <a:lumMod val="20000"/>
+              <a:lumOff val="80000"/>
+            </a:schemeClr>
+          </a:solidFill>
+          <a:ln w="38100">
+            <a:solidFill>
+              <a:schemeClr val="tx1"/>
+            </a:solidFill>
+          </a:ln>
+        </p:spPr>
+        <p:style>
+          <a:lnRef idx="2">
+            <a:schemeClr val="accent1">
+              <a:shade val="50000"/>
+            </a:schemeClr>
+          </a:lnRef>
+          <a:fillRef idx="1">
+            <a:schemeClr val="accent1"/>
+          </a:fillRef>
+          <a:effectRef idx="0">
+            <a:schemeClr val="accent1"/>
+          </a:effectRef>
+          <a:fontRef idx="minor">
+            <a:schemeClr val="lt1"/>
+          </a:fontRef>
+        </p:style>
+        <p:txBody>
+          <a:bodyPr rtlCol="0" anchor="ctr"/>
+          <a:lstStyle/>
+          <a:p>
+            <a:pPr algn="ctr"/>
+            <a:endParaRPr lang="zh-TW" altLang="en-US"/>
+          </a:p>
+        </p:txBody>
+      </p:sp>
+      <p:sp>
+        <p:nvSpPr>
+          <p:cNvPr id="7" name="文字方塊 6">
+            <a:extLst>
+              <a:ext uri="{FF2B5EF4-FFF2-40B4-BE49-F238E27FC236}">
+                <a16:creationId xmlns:a16="http://schemas.microsoft.com/office/drawing/2014/main" id="{CFD8DDE9-195E-401C-9036-703217E28413}"/>
+              </a:ext>
+            </a:extLst>
+          </p:cNvPr>
+          <p:cNvSpPr txBox="1"/>
+          <p:nvPr/>
+        </p:nvSpPr>
+        <p:spPr>
+          <a:xfrm>
+            <a:off x="935048" y="924016"/>
+            <a:ext cx="2462534" cy="584775"/>
+          </a:xfrm>
+          <a:prstGeom prst="rect">
+            <a:avLst/>
+          </a:prstGeom>
+          <a:noFill/>
+        </p:spPr>
+        <p:txBody>
+          <a:bodyPr wrap="none" rtlCol="0">
+            <a:spAutoFit/>
+          </a:bodyPr>
+          <a:lstStyle/>
+          <a:p>
+            <a:r>
+              <a:rPr lang="zh-TW" altLang="en-US" sz="3200" dirty="0">
+                <a:latin typeface="Arial" panose="020B0604020202020204" pitchFamily="34" charset="0"/>
+                <a:cs typeface="Arial" panose="020B0604020202020204" pitchFamily="34" charset="0"/>
+              </a:rPr>
+              <a:t>． </a:t>
+            </a:r>
+            <a:r>
+              <a:rPr lang="en-US" altLang="zh-TW" sz="3200" dirty="0">
+                <a:latin typeface="Arial" panose="020B0604020202020204" pitchFamily="34" charset="0"/>
+                <a:cs typeface="Arial" panose="020B0604020202020204" pitchFamily="34" charset="0"/>
+              </a:rPr>
+              <a:t>git add -A</a:t>
+            </a:r>
+          </a:p>
+        </p:txBody>
+      </p:sp>
+      <p:pic>
+        <p:nvPicPr>
+          <p:cNvPr id="8" name="圖片 7" descr="一張含有 文字 的圖片&#10;&#10;自動產生的描述">
+            <a:extLst>
+              <a:ext uri="{FF2B5EF4-FFF2-40B4-BE49-F238E27FC236}">
+                <a16:creationId xmlns:a16="http://schemas.microsoft.com/office/drawing/2014/main" id="{D21AB004-DF74-4B88-B5C4-54F65F07324A}"/>
+              </a:ext>
+            </a:extLst>
+          </p:cNvPr>
+          <p:cNvPicPr>
+            <a:picLocks noChangeAspect="1"/>
+          </p:cNvPicPr>
+          <p:nvPr/>
+        </p:nvPicPr>
+        <p:blipFill>
+          <a:blip r:embed="rId4">
+            <a:extLst>
+              <a:ext uri="{28A0092B-C50C-407E-A947-70E740481C1C}">
+                <a14:useLocalDpi xmlns:a14="http://schemas.microsoft.com/office/drawing/2010/main" val="0"/>
+              </a:ext>
+            </a:extLst>
+          </a:blip>
+          <a:stretch>
+            <a:fillRect/>
+          </a:stretch>
+        </p:blipFill>
+        <p:spPr>
+          <a:xfrm>
+            <a:off x="2638544" y="2444709"/>
+            <a:ext cx="5692904" cy="3613173"/>
           </a:xfrm>
           <a:prstGeom prst="rect">
             <a:avLst/>
@@ -5733,6 +6215,144 @@
           </a:prstGeom>
         </p:spPr>
       </p:pic>
+      <p:sp>
+        <p:nvSpPr>
+          <p:cNvPr id="6" name="矩形 5">
+            <a:extLst>
+              <a:ext uri="{FF2B5EF4-FFF2-40B4-BE49-F238E27FC236}">
+                <a16:creationId xmlns:a16="http://schemas.microsoft.com/office/drawing/2014/main" id="{7FFC9498-3974-44FA-BE5F-52A7232C4704}"/>
+              </a:ext>
+            </a:extLst>
+          </p:cNvPr>
+          <p:cNvSpPr/>
+          <p:nvPr/>
+        </p:nvSpPr>
+        <p:spPr>
+          <a:xfrm>
+            <a:off x="646221" y="604008"/>
+            <a:ext cx="3288755" cy="1224792"/>
+          </a:xfrm>
+          <a:prstGeom prst="rect">
+            <a:avLst/>
+          </a:prstGeom>
+          <a:solidFill>
+            <a:schemeClr val="accent3">
+              <a:lumMod val="20000"/>
+              <a:lumOff val="80000"/>
+            </a:schemeClr>
+          </a:solidFill>
+          <a:ln w="38100">
+            <a:solidFill>
+              <a:schemeClr val="tx1"/>
+            </a:solidFill>
+          </a:ln>
+        </p:spPr>
+        <p:style>
+          <a:lnRef idx="2">
+            <a:schemeClr val="accent1">
+              <a:shade val="50000"/>
+            </a:schemeClr>
+          </a:lnRef>
+          <a:fillRef idx="1">
+            <a:schemeClr val="accent1"/>
+          </a:fillRef>
+          <a:effectRef idx="0">
+            <a:schemeClr val="accent1"/>
+          </a:effectRef>
+          <a:fontRef idx="minor">
+            <a:schemeClr val="lt1"/>
+          </a:fontRef>
+        </p:style>
+        <p:txBody>
+          <a:bodyPr rtlCol="0" anchor="ctr"/>
+          <a:lstStyle/>
+          <a:p>
+            <a:pPr algn="ctr"/>
+            <a:endParaRPr lang="zh-TW" altLang="en-US"/>
+          </a:p>
+        </p:txBody>
+      </p:sp>
+      <p:sp>
+        <p:nvSpPr>
+          <p:cNvPr id="7" name="文字方塊 6">
+            <a:extLst>
+              <a:ext uri="{FF2B5EF4-FFF2-40B4-BE49-F238E27FC236}">
+                <a16:creationId xmlns:a16="http://schemas.microsoft.com/office/drawing/2014/main" id="{033E7C73-F505-4EB6-B8C5-1660593636E5}"/>
+              </a:ext>
+            </a:extLst>
+          </p:cNvPr>
+          <p:cNvSpPr txBox="1"/>
+          <p:nvPr/>
+        </p:nvSpPr>
+        <p:spPr>
+          <a:xfrm>
+            <a:off x="935048" y="924016"/>
+            <a:ext cx="2576346" cy="584775"/>
+          </a:xfrm>
+          <a:prstGeom prst="rect">
+            <a:avLst/>
+          </a:prstGeom>
+          <a:noFill/>
+        </p:spPr>
+        <p:txBody>
+          <a:bodyPr wrap="none" rtlCol="0">
+            <a:spAutoFit/>
+          </a:bodyPr>
+          <a:lstStyle/>
+          <a:p>
+            <a:r>
+              <a:rPr lang="zh-TW" altLang="en-US" sz="3200" dirty="0">
+                <a:latin typeface="Arial" panose="020B0604020202020204" pitchFamily="34" charset="0"/>
+                <a:cs typeface="Arial" panose="020B0604020202020204" pitchFamily="34" charset="0"/>
+              </a:rPr>
+              <a:t>． </a:t>
+            </a:r>
+            <a:r>
+              <a:rPr lang="en-US" altLang="zh-TW" sz="3200" dirty="0">
+                <a:latin typeface="Arial" panose="020B0604020202020204" pitchFamily="34" charset="0"/>
+                <a:cs typeface="Arial" panose="020B0604020202020204" pitchFamily="34" charset="0"/>
+              </a:rPr>
+              <a:t>git commit</a:t>
+            </a:r>
+          </a:p>
+        </p:txBody>
+      </p:sp>
+      <p:pic>
+        <p:nvPicPr>
+          <p:cNvPr id="8" name="圖片 7" descr="一張含有 文字 的圖片&#10;&#10;自動產生的描述">
+            <a:extLst>
+              <a:ext uri="{FF2B5EF4-FFF2-40B4-BE49-F238E27FC236}">
+                <a16:creationId xmlns:a16="http://schemas.microsoft.com/office/drawing/2014/main" id="{09EB6E81-44B6-423F-80D9-5568602956E9}"/>
+              </a:ext>
+            </a:extLst>
+          </p:cNvPr>
+          <p:cNvPicPr>
+            <a:picLocks noChangeAspect="1"/>
+          </p:cNvPicPr>
+          <p:nvPr/>
+        </p:nvPicPr>
+        <p:blipFill>
+          <a:blip r:embed="rId4">
+            <a:extLst>
+              <a:ext uri="{28A0092B-C50C-407E-A947-70E740481C1C}">
+                <a14:useLocalDpi xmlns:a14="http://schemas.microsoft.com/office/drawing/2010/main" val="0"/>
+              </a:ext>
+            </a:extLst>
+          </a:blip>
+          <a:stretch>
+            <a:fillRect/>
+          </a:stretch>
+        </p:blipFill>
+        <p:spPr>
+          <a:xfrm>
+            <a:off x="2638544" y="2444709"/>
+            <a:ext cx="5658640" cy="3572374"/>
+          </a:xfrm>
+          <a:prstGeom prst="rect">
+            <a:avLst/>
+          </a:prstGeom>
+        </p:spPr>
+      </p:pic>
     </p:spTree>
     <p:extLst>
       <p:ext uri="{BB962C8B-B14F-4D97-AF65-F5344CB8AC3E}">
@@ -5835,6 +6455,249 @@
           </a:prstGeom>
         </p:spPr>
       </p:pic>
+      <p:sp>
+        <p:nvSpPr>
+          <p:cNvPr id="5" name="矩形 4">
+            <a:extLst>
+              <a:ext uri="{FF2B5EF4-FFF2-40B4-BE49-F238E27FC236}">
+                <a16:creationId xmlns:a16="http://schemas.microsoft.com/office/drawing/2014/main" id="{D3DF75CA-7867-47A2-9D56-87A07693FAFD}"/>
+              </a:ext>
+            </a:extLst>
+          </p:cNvPr>
+          <p:cNvSpPr/>
+          <p:nvPr/>
+        </p:nvSpPr>
+        <p:spPr>
+          <a:xfrm>
+            <a:off x="646221" y="604008"/>
+            <a:ext cx="2096979" cy="1224792"/>
+          </a:xfrm>
+          <a:prstGeom prst="rect">
+            <a:avLst/>
+          </a:prstGeom>
+          <a:solidFill>
+            <a:schemeClr val="accent3">
+              <a:lumMod val="20000"/>
+              <a:lumOff val="80000"/>
+            </a:schemeClr>
+          </a:solidFill>
+          <a:ln w="38100">
+            <a:solidFill>
+              <a:schemeClr val="tx1"/>
+            </a:solidFill>
+          </a:ln>
+        </p:spPr>
+        <p:style>
+          <a:lnRef idx="2">
+            <a:schemeClr val="accent1">
+              <a:shade val="50000"/>
+            </a:schemeClr>
+          </a:lnRef>
+          <a:fillRef idx="1">
+            <a:schemeClr val="accent1"/>
+          </a:fillRef>
+          <a:effectRef idx="0">
+            <a:schemeClr val="accent1"/>
+          </a:effectRef>
+          <a:fontRef idx="minor">
+            <a:schemeClr val="lt1"/>
+          </a:fontRef>
+        </p:style>
+        <p:txBody>
+          <a:bodyPr rtlCol="0" anchor="ctr"/>
+          <a:lstStyle/>
+          <a:p>
+            <a:pPr algn="ctr"/>
+            <a:endParaRPr lang="zh-TW" altLang="en-US"/>
+          </a:p>
+        </p:txBody>
+      </p:sp>
+      <p:sp>
+        <p:nvSpPr>
+          <p:cNvPr id="6" name="文字方塊 5">
+            <a:extLst>
+              <a:ext uri="{FF2B5EF4-FFF2-40B4-BE49-F238E27FC236}">
+                <a16:creationId xmlns:a16="http://schemas.microsoft.com/office/drawing/2014/main" id="{B2D4E84B-E6B9-4E08-95D5-1E65B2D1CF56}"/>
+              </a:ext>
+            </a:extLst>
+          </p:cNvPr>
+          <p:cNvSpPr txBox="1"/>
+          <p:nvPr/>
+        </p:nvSpPr>
+        <p:spPr>
+          <a:xfrm>
+            <a:off x="935048" y="924016"/>
+            <a:ext cx="1346844" cy="584775"/>
+          </a:xfrm>
+          <a:prstGeom prst="rect">
+            <a:avLst/>
+          </a:prstGeom>
+          <a:noFill/>
+        </p:spPr>
+        <p:txBody>
+          <a:bodyPr wrap="none" rtlCol="0">
+            <a:spAutoFit/>
+          </a:bodyPr>
+          <a:lstStyle/>
+          <a:p>
+            <a:r>
+              <a:rPr lang="zh-TW" altLang="en-US" sz="3200" dirty="0">
+                <a:latin typeface="Arial" panose="020B0604020202020204" pitchFamily="34" charset="0"/>
+                <a:cs typeface="Arial" panose="020B0604020202020204" pitchFamily="34" charset="0"/>
+              </a:rPr>
+              <a:t>． </a:t>
+            </a:r>
+            <a:r>
+              <a:rPr lang="en-US" altLang="zh-TW" sz="3200" dirty="0">
+                <a:latin typeface="Arial" panose="020B0604020202020204" pitchFamily="34" charset="0"/>
+                <a:cs typeface="Arial" panose="020B0604020202020204" pitchFamily="34" charset="0"/>
+              </a:rPr>
+              <a:t>vim</a:t>
+            </a:r>
+          </a:p>
+        </p:txBody>
+      </p:sp>
+      <p:sp>
+        <p:nvSpPr>
+          <p:cNvPr id="8" name="文字方塊 7">
+            <a:extLst>
+              <a:ext uri="{FF2B5EF4-FFF2-40B4-BE49-F238E27FC236}">
+                <a16:creationId xmlns:a16="http://schemas.microsoft.com/office/drawing/2014/main" id="{3E7AD204-D686-49CE-A4FB-56F661EF6B2A}"/>
+              </a:ext>
+            </a:extLst>
+          </p:cNvPr>
+          <p:cNvSpPr txBox="1"/>
+          <p:nvPr/>
+        </p:nvSpPr>
+        <p:spPr>
+          <a:xfrm>
+            <a:off x="1781011" y="2218742"/>
+            <a:ext cx="5581977" cy="2959528"/>
+          </a:xfrm>
+          <a:prstGeom prst="rect">
+            <a:avLst/>
+          </a:prstGeom>
+          <a:noFill/>
+        </p:spPr>
+        <p:txBody>
+          <a:bodyPr wrap="none" rtlCol="0">
+            <a:spAutoFit/>
+          </a:bodyPr>
+          <a:lstStyle/>
+          <a:p>
+            <a:pPr>
+              <a:lnSpc>
+                <a:spcPct val="150000"/>
+              </a:lnSpc>
+            </a:pPr>
+            <a:r>
+              <a:rPr lang="zh-TW" altLang="en-US" sz="3200" dirty="0">
+                <a:latin typeface="Arial" panose="020B0604020202020204" pitchFamily="34" charset="0"/>
+                <a:cs typeface="Arial" panose="020B0604020202020204" pitchFamily="34" charset="0"/>
+              </a:rPr>
+              <a:t>．</a:t>
+            </a:r>
+            <a:r>
+              <a:rPr lang="en-US" altLang="zh-TW" sz="3200" dirty="0">
+                <a:latin typeface="Arial" panose="020B0604020202020204" pitchFamily="34" charset="0"/>
+                <a:cs typeface="Arial" panose="020B0604020202020204" pitchFamily="34" charset="0"/>
+              </a:rPr>
+              <a:t>press ‘</a:t>
+            </a:r>
+            <a:r>
+              <a:rPr lang="en-US" altLang="zh-TW" sz="3200" dirty="0" err="1">
+                <a:latin typeface="Arial" panose="020B0604020202020204" pitchFamily="34" charset="0"/>
+                <a:cs typeface="Arial" panose="020B0604020202020204" pitchFamily="34" charset="0"/>
+              </a:rPr>
+              <a:t>i</a:t>
+            </a:r>
+            <a:r>
+              <a:rPr lang="en-US" altLang="zh-TW" sz="3200" dirty="0">
+                <a:latin typeface="Arial" panose="020B0604020202020204" pitchFamily="34" charset="0"/>
+                <a:cs typeface="Arial" panose="020B0604020202020204" pitchFamily="34" charset="0"/>
+              </a:rPr>
+              <a:t>’</a:t>
+            </a:r>
+          </a:p>
+          <a:p>
+            <a:pPr>
+              <a:lnSpc>
+                <a:spcPct val="150000"/>
+              </a:lnSpc>
+            </a:pPr>
+            <a:r>
+              <a:rPr lang="zh-TW" altLang="en-US" sz="3200" dirty="0">
+                <a:latin typeface="Arial" panose="020B0604020202020204" pitchFamily="34" charset="0"/>
+                <a:cs typeface="Arial" panose="020B0604020202020204" pitchFamily="34" charset="0"/>
+              </a:rPr>
+              <a:t>．</a:t>
+            </a:r>
+            <a:r>
+              <a:rPr lang="en-US" altLang="zh-TW" sz="3200" dirty="0">
+                <a:latin typeface="Arial" panose="020B0604020202020204" pitchFamily="34" charset="0"/>
+                <a:cs typeface="Arial" panose="020B0604020202020204" pitchFamily="34" charset="0"/>
+              </a:rPr>
+              <a:t>write your commit message</a:t>
+            </a:r>
+          </a:p>
+          <a:p>
+            <a:pPr>
+              <a:lnSpc>
+                <a:spcPct val="150000"/>
+              </a:lnSpc>
+            </a:pPr>
+            <a:r>
+              <a:rPr lang="zh-TW" altLang="en-US" sz="3200" dirty="0">
+                <a:latin typeface="Arial" panose="020B0604020202020204" pitchFamily="34" charset="0"/>
+                <a:cs typeface="Arial" panose="020B0604020202020204" pitchFamily="34" charset="0"/>
+              </a:rPr>
+              <a:t>．</a:t>
+            </a:r>
+            <a:r>
+              <a:rPr lang="en-US" altLang="zh-TW" sz="3200" dirty="0">
+                <a:latin typeface="Arial" panose="020B0604020202020204" pitchFamily="34" charset="0"/>
+                <a:cs typeface="Arial" panose="020B0604020202020204" pitchFamily="34" charset="0"/>
+              </a:rPr>
+              <a:t>press ‘Esc’</a:t>
+            </a:r>
+          </a:p>
+          <a:p>
+            <a:pPr>
+              <a:lnSpc>
+                <a:spcPct val="150000"/>
+              </a:lnSpc>
+            </a:pPr>
+            <a:r>
+              <a:rPr lang="zh-TW" altLang="en-US" sz="3200" dirty="0">
+                <a:latin typeface="Arial" panose="020B0604020202020204" pitchFamily="34" charset="0"/>
+                <a:cs typeface="Arial" panose="020B0604020202020204" pitchFamily="34" charset="0"/>
+              </a:rPr>
+              <a:t>．</a:t>
+            </a:r>
+            <a:r>
+              <a:rPr lang="en-US" altLang="zh-TW" sz="3200" dirty="0">
+                <a:latin typeface="Arial" panose="020B0604020202020204" pitchFamily="34" charset="0"/>
+                <a:cs typeface="Arial" panose="020B0604020202020204" pitchFamily="34" charset="0"/>
+              </a:rPr>
+              <a:t>type ‘:</a:t>
+            </a:r>
+            <a:r>
+              <a:rPr lang="en-US" altLang="zh-TW" sz="3200" dirty="0" err="1">
+                <a:latin typeface="Arial" panose="020B0604020202020204" pitchFamily="34" charset="0"/>
+                <a:cs typeface="Arial" panose="020B0604020202020204" pitchFamily="34" charset="0"/>
+              </a:rPr>
+              <a:t>wq</a:t>
+            </a:r>
+            <a:r>
+              <a:rPr lang="en-US" altLang="zh-TW" sz="3200" dirty="0">
+                <a:latin typeface="Arial" panose="020B0604020202020204" pitchFamily="34" charset="0"/>
+                <a:cs typeface="Arial" panose="020B0604020202020204" pitchFamily="34" charset="0"/>
+              </a:rPr>
+              <a:t>’</a:t>
+            </a:r>
+          </a:p>
+        </p:txBody>
+      </p:sp>
     </p:spTree>
     <p:extLst>
       <p:ext uri="{BB962C8B-B14F-4D97-AF65-F5344CB8AC3E}">

</xml_diff>

<commit_message>
Create a py file for the example of comflict
</commit_message>
<xml_diff>
--- a/TA_Class_III.pptx
+++ b/TA_Class_III.pptx
@@ -6800,6 +6800,42 @@
           </a:prstGeom>
         </p:spPr>
       </p:pic>
+      <p:pic>
+        <p:nvPicPr>
+          <p:cNvPr id="5" name="圖片 4" descr="一張含有 文字 的圖片&#10;&#10;自動產生的描述">
+            <a:extLst>
+              <a:ext uri="{FF2B5EF4-FFF2-40B4-BE49-F238E27FC236}">
+                <a16:creationId xmlns:a16="http://schemas.microsoft.com/office/drawing/2014/main" id="{DE932EE8-0C49-4DCA-A776-CD62590A56E9}"/>
+              </a:ext>
+            </a:extLst>
+          </p:cNvPr>
+          <p:cNvPicPr>
+            <a:picLocks noChangeAspect="1"/>
+          </p:cNvPicPr>
+          <p:nvPr/>
+        </p:nvPicPr>
+        <p:blipFill>
+          <a:blip r:embed="rId4">
+            <a:extLst>
+              <a:ext uri="{28A0092B-C50C-407E-A947-70E740481C1C}">
+                <a14:useLocalDpi xmlns:a14="http://schemas.microsoft.com/office/drawing/2010/main" val="0"/>
+              </a:ext>
+            </a:extLst>
+          </a:blip>
+          <a:stretch>
+            <a:fillRect/>
+          </a:stretch>
+        </p:blipFill>
+        <p:spPr>
+          <a:xfrm>
+            <a:off x="1761733" y="1522997"/>
+            <a:ext cx="5620534" cy="3543795"/>
+          </a:xfrm>
+          <a:prstGeom prst="rect">
+            <a:avLst/>
+          </a:prstGeom>
+        </p:spPr>
+      </p:pic>
     </p:spTree>
     <p:extLst>
       <p:ext uri="{BB962C8B-B14F-4D97-AF65-F5344CB8AC3E}">
@@ -6896,6 +6932,144 @@
           <a:xfrm>
             <a:off x="0" y="4169659"/>
             <a:ext cx="3934976" cy="2688341"/>
+          </a:xfrm>
+          <a:prstGeom prst="rect">
+            <a:avLst/>
+          </a:prstGeom>
+        </p:spPr>
+      </p:pic>
+      <p:sp>
+        <p:nvSpPr>
+          <p:cNvPr id="5" name="矩形 4">
+            <a:extLst>
+              <a:ext uri="{FF2B5EF4-FFF2-40B4-BE49-F238E27FC236}">
+                <a16:creationId xmlns:a16="http://schemas.microsoft.com/office/drawing/2014/main" id="{6D2A1EC3-EC15-430D-9FEB-BA013B25BBE8}"/>
+              </a:ext>
+            </a:extLst>
+          </p:cNvPr>
+          <p:cNvSpPr/>
+          <p:nvPr/>
+        </p:nvSpPr>
+        <p:spPr>
+          <a:xfrm>
+            <a:off x="646221" y="604008"/>
+            <a:ext cx="2642533" cy="1224792"/>
+          </a:xfrm>
+          <a:prstGeom prst="rect">
+            <a:avLst/>
+          </a:prstGeom>
+          <a:solidFill>
+            <a:schemeClr val="accent3">
+              <a:lumMod val="20000"/>
+              <a:lumOff val="80000"/>
+            </a:schemeClr>
+          </a:solidFill>
+          <a:ln w="38100">
+            <a:solidFill>
+              <a:schemeClr val="tx1"/>
+            </a:solidFill>
+          </a:ln>
+        </p:spPr>
+        <p:style>
+          <a:lnRef idx="2">
+            <a:schemeClr val="accent1">
+              <a:shade val="50000"/>
+            </a:schemeClr>
+          </a:lnRef>
+          <a:fillRef idx="1">
+            <a:schemeClr val="accent1"/>
+          </a:fillRef>
+          <a:effectRef idx="0">
+            <a:schemeClr val="accent1"/>
+          </a:effectRef>
+          <a:fontRef idx="minor">
+            <a:schemeClr val="lt1"/>
+          </a:fontRef>
+        </p:style>
+        <p:txBody>
+          <a:bodyPr rtlCol="0" anchor="ctr"/>
+          <a:lstStyle/>
+          <a:p>
+            <a:pPr algn="ctr"/>
+            <a:endParaRPr lang="zh-TW" altLang="en-US"/>
+          </a:p>
+        </p:txBody>
+      </p:sp>
+      <p:sp>
+        <p:nvSpPr>
+          <p:cNvPr id="6" name="文字方塊 5">
+            <a:extLst>
+              <a:ext uri="{FF2B5EF4-FFF2-40B4-BE49-F238E27FC236}">
+                <a16:creationId xmlns:a16="http://schemas.microsoft.com/office/drawing/2014/main" id="{75E2C94C-4508-4A25-8A14-6A5F977AFC85}"/>
+              </a:ext>
+            </a:extLst>
+          </p:cNvPr>
+          <p:cNvSpPr txBox="1"/>
+          <p:nvPr/>
+        </p:nvSpPr>
+        <p:spPr>
+          <a:xfrm>
+            <a:off x="935048" y="924016"/>
+            <a:ext cx="1802096" cy="584775"/>
+          </a:xfrm>
+          <a:prstGeom prst="rect">
+            <a:avLst/>
+          </a:prstGeom>
+          <a:noFill/>
+        </p:spPr>
+        <p:txBody>
+          <a:bodyPr wrap="none" rtlCol="0">
+            <a:spAutoFit/>
+          </a:bodyPr>
+          <a:lstStyle/>
+          <a:p>
+            <a:r>
+              <a:rPr lang="zh-TW" altLang="en-US" sz="3200" dirty="0">
+                <a:latin typeface="Arial" panose="020B0604020202020204" pitchFamily="34" charset="0"/>
+                <a:cs typeface="Arial" panose="020B0604020202020204" pitchFamily="34" charset="0"/>
+              </a:rPr>
+              <a:t>． </a:t>
+            </a:r>
+            <a:r>
+              <a:rPr lang="en-US" altLang="zh-TW" sz="3200" dirty="0">
+                <a:latin typeface="Arial" panose="020B0604020202020204" pitchFamily="34" charset="0"/>
+                <a:cs typeface="Arial" panose="020B0604020202020204" pitchFamily="34" charset="0"/>
+              </a:rPr>
+              <a:t>git log</a:t>
+            </a:r>
+          </a:p>
+        </p:txBody>
+      </p:sp>
+      <p:pic>
+        <p:nvPicPr>
+          <p:cNvPr id="9" name="圖片 8" descr="一張含有 文字 的圖片&#10;&#10;自動產生的描述">
+            <a:extLst>
+              <a:ext uri="{FF2B5EF4-FFF2-40B4-BE49-F238E27FC236}">
+                <a16:creationId xmlns:a16="http://schemas.microsoft.com/office/drawing/2014/main" id="{4B83DDF2-165B-4746-A1DF-02D83E5A3239}"/>
+              </a:ext>
+            </a:extLst>
+          </p:cNvPr>
+          <p:cNvPicPr>
+            <a:picLocks noChangeAspect="1"/>
+          </p:cNvPicPr>
+          <p:nvPr/>
+        </p:nvPicPr>
+        <p:blipFill>
+          <a:blip r:embed="rId4">
+            <a:extLst>
+              <a:ext uri="{28A0092B-C50C-407E-A947-70E740481C1C}">
+                <a14:useLocalDpi xmlns:a14="http://schemas.microsoft.com/office/drawing/2010/main" val="0"/>
+              </a:ext>
+            </a:extLst>
+          </a:blip>
+          <a:stretch>
+            <a:fillRect/>
+          </a:stretch>
+        </p:blipFill>
+        <p:spPr>
+          <a:xfrm>
+            <a:off x="2638544" y="2468525"/>
+            <a:ext cx="5620534" cy="3524742"/>
           </a:xfrm>
           <a:prstGeom prst="rect">
             <a:avLst/>

</xml_diff>

<commit_message>
Finish the Git part in PPT
</commit_message>
<xml_diff>
--- a/TA_Class_III.pptx
+++ b/TA_Class_III.pptx
@@ -32,6 +32,21 @@
     <p:sldId id="317" r:id="rId26"/>
     <p:sldId id="318" r:id="rId27"/>
     <p:sldId id="319" r:id="rId28"/>
+    <p:sldId id="320" r:id="rId29"/>
+    <p:sldId id="321" r:id="rId30"/>
+    <p:sldId id="322" r:id="rId31"/>
+    <p:sldId id="323" r:id="rId32"/>
+    <p:sldId id="324" r:id="rId33"/>
+    <p:sldId id="325" r:id="rId34"/>
+    <p:sldId id="326" r:id="rId35"/>
+    <p:sldId id="327" r:id="rId36"/>
+    <p:sldId id="328" r:id="rId37"/>
+    <p:sldId id="329" r:id="rId38"/>
+    <p:sldId id="330" r:id="rId39"/>
+    <p:sldId id="331" r:id="rId40"/>
+    <p:sldId id="332" r:id="rId41"/>
+    <p:sldId id="333" r:id="rId42"/>
+    <p:sldId id="334" r:id="rId43"/>
   </p:sldIdLst>
   <p:sldSz cx="9144000" cy="6858000" type="screen4x3"/>
   <p:notesSz cx="6858000" cy="9144000"/>
@@ -3459,7 +3474,7 @@
         <p:spPr>
           <a:xfrm>
             <a:off x="662730" y="963329"/>
-            <a:ext cx="2447273" cy="584775"/>
+            <a:ext cx="2732736" cy="646331"/>
           </a:xfrm>
           <a:prstGeom prst="rect">
             <a:avLst/>
@@ -3473,7 +3488,7 @@
           <a:lstStyle/>
           <a:p>
             <a:r>
-              <a:rPr lang="en-US" altLang="zh-TW" sz="3200" dirty="0">
+              <a:rPr lang="en-US" altLang="zh-TW" sz="3600" dirty="0">
                 <a:latin typeface="Arial" panose="020B0604020202020204" pitchFamily="34" charset="0"/>
                 <a:cs typeface="Arial" panose="020B0604020202020204" pitchFamily="34" charset="0"/>
               </a:rPr>
@@ -3656,7 +3671,7 @@
         <p:spPr>
           <a:xfrm>
             <a:off x="935048" y="924016"/>
-            <a:ext cx="1779654" cy="584775"/>
+            <a:ext cx="1665841" cy="584775"/>
           </a:xfrm>
           <a:prstGeom prst="rect">
             <a:avLst/>
@@ -3674,7 +3689,7 @@
                 <a:latin typeface="Arial" panose="020B0604020202020204" pitchFamily="34" charset="0"/>
                 <a:cs typeface="Arial" panose="020B0604020202020204" pitchFamily="34" charset="0"/>
               </a:rPr>
-              <a:t>． </a:t>
+              <a:t>．</a:t>
             </a:r>
             <a:r>
               <a:rPr lang="en-US" altLang="zh-TW" sz="3200" dirty="0">
@@ -4510,7 +4525,7 @@
         <p:spPr>
           <a:xfrm>
             <a:off x="935048" y="924016"/>
-            <a:ext cx="2348720" cy="584775"/>
+            <a:ext cx="2234907" cy="584775"/>
           </a:xfrm>
           <a:prstGeom prst="rect">
             <a:avLst/>
@@ -4528,7 +4543,7 @@
                 <a:latin typeface="Arial" panose="020B0604020202020204" pitchFamily="34" charset="0"/>
                 <a:cs typeface="Arial" panose="020B0604020202020204" pitchFamily="34" charset="0"/>
               </a:rPr>
-              <a:t>． </a:t>
+              <a:t>．</a:t>
             </a:r>
             <a:r>
               <a:rPr lang="en-US" altLang="zh-TW" sz="3200" dirty="0">
@@ -4749,7 +4764,7 @@
         <p:spPr>
           <a:xfrm>
             <a:off x="935048" y="924016"/>
-            <a:ext cx="1938351" cy="584775"/>
+            <a:ext cx="1824538" cy="584775"/>
           </a:xfrm>
           <a:prstGeom prst="rect">
             <a:avLst/>
@@ -4767,7 +4782,7 @@
                 <a:latin typeface="Arial" panose="020B0604020202020204" pitchFamily="34" charset="0"/>
                 <a:cs typeface="Arial" panose="020B0604020202020204" pitchFamily="34" charset="0"/>
               </a:rPr>
-              <a:t>． </a:t>
+              <a:t>．</a:t>
             </a:r>
             <a:r>
               <a:rPr lang="en-US" altLang="zh-TW" sz="3200" dirty="0">
@@ -5006,7 +5021,7 @@
                 <a:latin typeface="Arial" panose="020B0604020202020204" pitchFamily="34" charset="0"/>
                 <a:cs typeface="Arial" panose="020B0604020202020204" pitchFamily="34" charset="0"/>
               </a:rPr>
-              <a:t>． </a:t>
+              <a:t>．</a:t>
             </a:r>
             <a:r>
               <a:rPr lang="en-US" altLang="zh-TW" sz="3200" dirty="0">
@@ -5694,7 +5709,7 @@
         <p:spPr>
           <a:xfrm>
             <a:off x="935048" y="924016"/>
-            <a:ext cx="2462534" cy="584775"/>
+            <a:ext cx="2348720" cy="584775"/>
           </a:xfrm>
           <a:prstGeom prst="rect">
             <a:avLst/>
@@ -5712,7 +5727,7 @@
                 <a:latin typeface="Arial" panose="020B0604020202020204" pitchFamily="34" charset="0"/>
                 <a:cs typeface="Arial" panose="020B0604020202020204" pitchFamily="34" charset="0"/>
               </a:rPr>
-              <a:t>． </a:t>
+              <a:t>．</a:t>
             </a:r>
             <a:r>
               <a:rPr lang="en-US" altLang="zh-TW" sz="3200" dirty="0">
@@ -6079,10 +6094,10 @@
       </p:pic>
       <p:pic>
         <p:nvPicPr>
-          <p:cNvPr id="11" name="圖片 10" descr="一張含有 文字 的圖片&#10;&#10;自動產生的描述">
-            <a:extLst>
-              <a:ext uri="{FF2B5EF4-FFF2-40B4-BE49-F238E27FC236}">
-                <a16:creationId xmlns:a16="http://schemas.microsoft.com/office/drawing/2014/main" id="{32A2A153-8C9D-44F6-8B12-1F51E589F1C1}"/>
+          <p:cNvPr id="10" name="圖片 9">
+            <a:extLst>
+              <a:ext uri="{FF2B5EF4-FFF2-40B4-BE49-F238E27FC236}">
+                <a16:creationId xmlns:a16="http://schemas.microsoft.com/office/drawing/2014/main" id="{4729305C-8EC1-4C8A-8DF7-78F88F335A8C}"/>
               </a:ext>
             </a:extLst>
           </p:cNvPr>
@@ -6091,7 +6106,7 @@
           </p:cNvPicPr>
           <p:nvPr/>
         </p:nvPicPr>
-        <p:blipFill>
+        <p:blipFill rotWithShape="1">
           <a:blip r:embed="rId5">
             <a:extLst>
               <a:ext uri="{28A0092B-C50C-407E-A947-70E740481C1C}">
@@ -6099,14 +6114,13 @@
               </a:ext>
             </a:extLst>
           </a:blip>
-          <a:stretch>
-            <a:fillRect/>
-          </a:stretch>
+          <a:srcRect l="8034" t="17384" r="12037" b="33220"/>
+          <a:stretch/>
         </p:blipFill>
         <p:spPr>
           <a:xfrm>
-            <a:off x="3442070" y="4169658"/>
-            <a:ext cx="4429387" cy="1472771"/>
+            <a:off x="3422709" y="3922727"/>
+            <a:ext cx="4857225" cy="1689085"/>
           </a:xfrm>
           <a:prstGeom prst="rect">
             <a:avLst/>
@@ -6287,7 +6301,7 @@
         <p:spPr>
           <a:xfrm>
             <a:off x="935048" y="924016"/>
-            <a:ext cx="2576346" cy="584775"/>
+            <a:ext cx="2462534" cy="584775"/>
           </a:xfrm>
           <a:prstGeom prst="rect">
             <a:avLst/>
@@ -6305,7 +6319,7 @@
                 <a:latin typeface="Arial" panose="020B0604020202020204" pitchFamily="34" charset="0"/>
                 <a:cs typeface="Arial" panose="020B0604020202020204" pitchFamily="34" charset="0"/>
               </a:rPr>
-              <a:t>． </a:t>
+              <a:t>．</a:t>
             </a:r>
             <a:r>
               <a:rPr lang="en-US" altLang="zh-TW" sz="3200" dirty="0">
@@ -6527,7 +6541,7 @@
         <p:spPr>
           <a:xfrm>
             <a:off x="935048" y="924016"/>
-            <a:ext cx="1346844" cy="584775"/>
+            <a:ext cx="1233030" cy="584775"/>
           </a:xfrm>
           <a:prstGeom prst="rect">
             <a:avLst/>
@@ -6545,7 +6559,7 @@
                 <a:latin typeface="Arial" panose="020B0604020202020204" pitchFamily="34" charset="0"/>
                 <a:cs typeface="Arial" panose="020B0604020202020204" pitchFamily="34" charset="0"/>
               </a:rPr>
-              <a:t>． </a:t>
+              <a:t>．</a:t>
             </a:r>
             <a:r>
               <a:rPr lang="en-US" altLang="zh-TW" sz="3200" dirty="0">
@@ -7010,7 +7024,7 @@
         <p:spPr>
           <a:xfrm>
             <a:off x="935048" y="924016"/>
-            <a:ext cx="1802096" cy="584775"/>
+            <a:ext cx="1688283" cy="584775"/>
           </a:xfrm>
           <a:prstGeom prst="rect">
             <a:avLst/>
@@ -7028,7 +7042,7 @@
                 <a:latin typeface="Arial" panose="020B0604020202020204" pitchFamily="34" charset="0"/>
                 <a:cs typeface="Arial" panose="020B0604020202020204" pitchFamily="34" charset="0"/>
               </a:rPr>
-              <a:t>． </a:t>
+              <a:t>．</a:t>
             </a:r>
             <a:r>
               <a:rPr lang="en-US" altLang="zh-TW" sz="3200" dirty="0">
@@ -7178,6 +7192,133 @@
           </a:prstGeom>
         </p:spPr>
       </p:pic>
+      <p:sp>
+        <p:nvSpPr>
+          <p:cNvPr id="5" name="文字方塊 4">
+            <a:extLst>
+              <a:ext uri="{FF2B5EF4-FFF2-40B4-BE49-F238E27FC236}">
+                <a16:creationId xmlns:a16="http://schemas.microsoft.com/office/drawing/2014/main" id="{81F06AE7-3921-42C6-B2D9-A2ADE7774792}"/>
+              </a:ext>
+            </a:extLst>
+          </p:cNvPr>
+          <p:cNvSpPr txBox="1"/>
+          <p:nvPr/>
+        </p:nvSpPr>
+        <p:spPr>
+          <a:xfrm>
+            <a:off x="612397" y="646429"/>
+            <a:ext cx="1595309" cy="646331"/>
+          </a:xfrm>
+          <a:prstGeom prst="rect">
+            <a:avLst/>
+          </a:prstGeom>
+          <a:noFill/>
+        </p:spPr>
+        <p:txBody>
+          <a:bodyPr wrap="none" rtlCol="0">
+            <a:spAutoFit/>
+          </a:bodyPr>
+          <a:lstStyle/>
+          <a:p>
+            <a:r>
+              <a:rPr lang="en-US" altLang="zh-TW" sz="3600" dirty="0">
+                <a:latin typeface="Arial" panose="020B0604020202020204" pitchFamily="34" charset="0"/>
+                <a:cs typeface="Arial" panose="020B0604020202020204" pitchFamily="34" charset="0"/>
+              </a:rPr>
+              <a:t>branch</a:t>
+            </a:r>
+          </a:p>
+        </p:txBody>
+      </p:sp>
+      <p:sp>
+        <p:nvSpPr>
+          <p:cNvPr id="6" name="矩形 5">
+            <a:extLst>
+              <a:ext uri="{FF2B5EF4-FFF2-40B4-BE49-F238E27FC236}">
+                <a16:creationId xmlns:a16="http://schemas.microsoft.com/office/drawing/2014/main" id="{DFC472AC-C814-4264-B516-AEF54EEC4967}"/>
+              </a:ext>
+            </a:extLst>
+          </p:cNvPr>
+          <p:cNvSpPr/>
+          <p:nvPr/>
+        </p:nvSpPr>
+        <p:spPr>
+          <a:xfrm>
+            <a:off x="889233" y="1734084"/>
+            <a:ext cx="7365534" cy="2575420"/>
+          </a:xfrm>
+          <a:prstGeom prst="rect">
+            <a:avLst/>
+          </a:prstGeom>
+          <a:solidFill>
+            <a:schemeClr val="accent3">
+              <a:lumMod val="20000"/>
+              <a:lumOff val="80000"/>
+            </a:schemeClr>
+          </a:solidFill>
+        </p:spPr>
+        <p:style>
+          <a:lnRef idx="2">
+            <a:schemeClr val="dk1"/>
+          </a:lnRef>
+          <a:fillRef idx="1">
+            <a:schemeClr val="lt1"/>
+          </a:fillRef>
+          <a:effectRef idx="0">
+            <a:schemeClr val="dk1"/>
+          </a:effectRef>
+          <a:fontRef idx="minor">
+            <a:schemeClr val="dk1"/>
+          </a:fontRef>
+        </p:style>
+        <p:txBody>
+          <a:bodyPr rtlCol="0" anchor="ctr"/>
+          <a:lstStyle/>
+          <a:p>
+            <a:pPr algn="ctr"/>
+            <a:endParaRPr lang="zh-TW" altLang="en-US"/>
+          </a:p>
+        </p:txBody>
+      </p:sp>
+      <p:sp>
+        <p:nvSpPr>
+          <p:cNvPr id="7" name="文字方塊 6">
+            <a:extLst>
+              <a:ext uri="{FF2B5EF4-FFF2-40B4-BE49-F238E27FC236}">
+                <a16:creationId xmlns:a16="http://schemas.microsoft.com/office/drawing/2014/main" id="{1EBF860A-F73D-4938-89CB-809C81B30BE8}"/>
+              </a:ext>
+            </a:extLst>
+          </p:cNvPr>
+          <p:cNvSpPr txBox="1"/>
+          <p:nvPr/>
+        </p:nvSpPr>
+        <p:spPr>
+          <a:xfrm>
+            <a:off x="1241332" y="2236964"/>
+            <a:ext cx="6661336" cy="1569660"/>
+          </a:xfrm>
+          <a:prstGeom prst="rect">
+            <a:avLst/>
+          </a:prstGeom>
+          <a:noFill/>
+        </p:spPr>
+        <p:txBody>
+          <a:bodyPr wrap="square" rtlCol="0">
+            <a:spAutoFit/>
+          </a:bodyPr>
+          <a:lstStyle/>
+          <a:p>
+            <a:pPr algn="just"/>
+            <a:r>
+              <a:rPr lang="en-US" altLang="zh-TW" sz="3200" dirty="0">
+                <a:latin typeface="Arial" panose="020B0604020202020204" pitchFamily="34" charset="0"/>
+                <a:cs typeface="Arial" panose="020B0604020202020204" pitchFamily="34" charset="0"/>
+              </a:rPr>
+              <a:t>The default branch git create for you when a new git repo is initialized is called “master”.</a:t>
+            </a:r>
+          </a:p>
+        </p:txBody>
+      </p:sp>
     </p:spTree>
     <p:extLst>
       <p:ext uri="{BB962C8B-B14F-4D97-AF65-F5344CB8AC3E}">
@@ -7280,6 +7421,95 @@
           </a:prstGeom>
         </p:spPr>
       </p:pic>
+      <p:sp>
+        <p:nvSpPr>
+          <p:cNvPr id="5" name="矩形 4">
+            <a:extLst>
+              <a:ext uri="{FF2B5EF4-FFF2-40B4-BE49-F238E27FC236}">
+                <a16:creationId xmlns:a16="http://schemas.microsoft.com/office/drawing/2014/main" id="{350A71E6-8087-47AB-83A3-4704D41A90E2}"/>
+              </a:ext>
+            </a:extLst>
+          </p:cNvPr>
+          <p:cNvSpPr/>
+          <p:nvPr/>
+        </p:nvSpPr>
+        <p:spPr>
+          <a:xfrm>
+            <a:off x="889233" y="1734084"/>
+            <a:ext cx="7365534" cy="2575420"/>
+          </a:xfrm>
+          <a:prstGeom prst="rect">
+            <a:avLst/>
+          </a:prstGeom>
+          <a:solidFill>
+            <a:schemeClr val="accent3">
+              <a:lumMod val="20000"/>
+              <a:lumOff val="80000"/>
+            </a:schemeClr>
+          </a:solidFill>
+        </p:spPr>
+        <p:style>
+          <a:lnRef idx="2">
+            <a:schemeClr val="dk1"/>
+          </a:lnRef>
+          <a:fillRef idx="1">
+            <a:schemeClr val="lt1"/>
+          </a:fillRef>
+          <a:effectRef idx="0">
+            <a:schemeClr val="dk1"/>
+          </a:effectRef>
+          <a:fontRef idx="minor">
+            <a:schemeClr val="dk1"/>
+          </a:fontRef>
+        </p:style>
+        <p:txBody>
+          <a:bodyPr rtlCol="0" anchor="ctr"/>
+          <a:lstStyle/>
+          <a:p>
+            <a:pPr algn="ctr"/>
+            <a:endParaRPr lang="zh-TW" altLang="en-US"/>
+          </a:p>
+        </p:txBody>
+      </p:sp>
+      <p:sp>
+        <p:nvSpPr>
+          <p:cNvPr id="6" name="文字方塊 5">
+            <a:extLst>
+              <a:ext uri="{FF2B5EF4-FFF2-40B4-BE49-F238E27FC236}">
+                <a16:creationId xmlns:a16="http://schemas.microsoft.com/office/drawing/2014/main" id="{66E182E2-8101-480C-AC1D-3278E5B34E3E}"/>
+              </a:ext>
+            </a:extLst>
+          </p:cNvPr>
+          <p:cNvSpPr txBox="1"/>
+          <p:nvPr/>
+        </p:nvSpPr>
+        <p:spPr>
+          <a:xfrm>
+            <a:off x="1241332" y="2236964"/>
+            <a:ext cx="6661336" cy="1569660"/>
+          </a:xfrm>
+          <a:prstGeom prst="rect">
+            <a:avLst/>
+          </a:prstGeom>
+          <a:noFill/>
+        </p:spPr>
+        <p:txBody>
+          <a:bodyPr wrap="square" rtlCol="0">
+            <a:spAutoFit/>
+          </a:bodyPr>
+          <a:lstStyle/>
+          <a:p>
+            <a:pPr algn="just"/>
+            <a:r>
+              <a:rPr lang="en-US" altLang="zh-TW" sz="3200" dirty="0">
+                <a:latin typeface="Arial" panose="020B0604020202020204" pitchFamily="34" charset="0"/>
+                <a:cs typeface="Arial" panose="020B0604020202020204" pitchFamily="34" charset="0"/>
+              </a:rPr>
+              <a:t>Branches enable changes to be worked on without disruption the most current working state,</a:t>
+            </a:r>
+          </a:p>
+        </p:txBody>
+      </p:sp>
     </p:spTree>
     <p:extLst>
       <p:ext uri="{BB962C8B-B14F-4D97-AF65-F5344CB8AC3E}">
@@ -7382,6 +7612,155 @@
           </a:prstGeom>
         </p:spPr>
       </p:pic>
+      <p:pic>
+        <p:nvPicPr>
+          <p:cNvPr id="5" name="圖片 4">
+            <a:extLst>
+              <a:ext uri="{FF2B5EF4-FFF2-40B4-BE49-F238E27FC236}">
+                <a16:creationId xmlns:a16="http://schemas.microsoft.com/office/drawing/2014/main" id="{AF3458E4-59B0-4B08-A818-697C2ED81E6C}"/>
+              </a:ext>
+            </a:extLst>
+          </p:cNvPr>
+          <p:cNvPicPr>
+            <a:picLocks noChangeAspect="1"/>
+          </p:cNvPicPr>
+          <p:nvPr/>
+        </p:nvPicPr>
+        <p:blipFill>
+          <a:blip r:embed="rId4">
+            <a:extLst>
+              <a:ext uri="{28A0092B-C50C-407E-A947-70E740481C1C}">
+                <a14:useLocalDpi xmlns:a14="http://schemas.microsoft.com/office/drawing/2010/main" val="0"/>
+              </a:ext>
+            </a:extLst>
+          </a:blip>
+          <a:stretch>
+            <a:fillRect/>
+          </a:stretch>
+        </p:blipFill>
+        <p:spPr>
+          <a:xfrm>
+            <a:off x="1547744" y="3873945"/>
+            <a:ext cx="6048511" cy="518444"/>
+          </a:xfrm>
+          <a:prstGeom prst="rect">
+            <a:avLst/>
+          </a:prstGeom>
+        </p:spPr>
+      </p:pic>
+      <p:sp>
+        <p:nvSpPr>
+          <p:cNvPr id="6" name="矩形 5">
+            <a:extLst>
+              <a:ext uri="{FF2B5EF4-FFF2-40B4-BE49-F238E27FC236}">
+                <a16:creationId xmlns:a16="http://schemas.microsoft.com/office/drawing/2014/main" id="{6478E4DF-B4DB-4C34-A11D-5DE72C3BF409}"/>
+              </a:ext>
+            </a:extLst>
+          </p:cNvPr>
+          <p:cNvSpPr/>
+          <p:nvPr/>
+        </p:nvSpPr>
+        <p:spPr>
+          <a:xfrm>
+            <a:off x="1547744" y="1747232"/>
+            <a:ext cx="6048511" cy="1224792"/>
+          </a:xfrm>
+          <a:prstGeom prst="rect">
+            <a:avLst/>
+          </a:prstGeom>
+          <a:solidFill>
+            <a:schemeClr val="accent3">
+              <a:lumMod val="20000"/>
+              <a:lumOff val="80000"/>
+            </a:schemeClr>
+          </a:solidFill>
+          <a:ln w="38100">
+            <a:solidFill>
+              <a:schemeClr val="tx1"/>
+            </a:solidFill>
+          </a:ln>
+        </p:spPr>
+        <p:style>
+          <a:lnRef idx="2">
+            <a:schemeClr val="accent1">
+              <a:shade val="50000"/>
+            </a:schemeClr>
+          </a:lnRef>
+          <a:fillRef idx="1">
+            <a:schemeClr val="accent1"/>
+          </a:fillRef>
+          <a:effectRef idx="0">
+            <a:schemeClr val="accent1"/>
+          </a:effectRef>
+          <a:fontRef idx="minor">
+            <a:schemeClr val="lt1"/>
+          </a:fontRef>
+        </p:style>
+        <p:txBody>
+          <a:bodyPr rtlCol="0" anchor="ctr"/>
+          <a:lstStyle/>
+          <a:p>
+            <a:pPr algn="ctr"/>
+            <a:endParaRPr lang="zh-TW" altLang="en-US"/>
+          </a:p>
+        </p:txBody>
+      </p:sp>
+      <p:sp>
+        <p:nvSpPr>
+          <p:cNvPr id="7" name="文字方塊 6">
+            <a:extLst>
+              <a:ext uri="{FF2B5EF4-FFF2-40B4-BE49-F238E27FC236}">
+                <a16:creationId xmlns:a16="http://schemas.microsoft.com/office/drawing/2014/main" id="{63B6A64A-1E37-4FBC-B723-7EFCF0CF2F9F}"/>
+              </a:ext>
+            </a:extLst>
+          </p:cNvPr>
+          <p:cNvSpPr txBox="1"/>
+          <p:nvPr/>
+        </p:nvSpPr>
+        <p:spPr>
+          <a:xfrm>
+            <a:off x="1967488" y="2067240"/>
+            <a:ext cx="5079859" cy="584775"/>
+          </a:xfrm>
+          <a:prstGeom prst="rect">
+            <a:avLst/>
+          </a:prstGeom>
+          <a:noFill/>
+        </p:spPr>
+        <p:txBody>
+          <a:bodyPr wrap="square" rtlCol="0">
+            <a:spAutoFit/>
+          </a:bodyPr>
+          <a:lstStyle/>
+          <a:p>
+            <a:r>
+              <a:rPr lang="zh-TW" altLang="en-US" sz="3200" dirty="0">
+                <a:latin typeface="Arial" panose="020B0604020202020204" pitchFamily="34" charset="0"/>
+                <a:cs typeface="Arial" panose="020B0604020202020204" pitchFamily="34" charset="0"/>
+              </a:rPr>
+              <a:t>．</a:t>
+            </a:r>
+            <a:r>
+              <a:rPr lang="en-US" altLang="zh-TW" sz="3200" dirty="0">
+                <a:latin typeface="Arial" panose="020B0604020202020204" pitchFamily="34" charset="0"/>
+                <a:cs typeface="Arial" panose="020B0604020202020204" pitchFamily="34" charset="0"/>
+              </a:rPr>
+              <a:t>git branch </a:t>
+            </a:r>
+            <a:r>
+              <a:rPr lang="en-US" altLang="zh-TW" sz="3200" dirty="0" err="1">
+                <a:latin typeface="Arial" panose="020B0604020202020204" pitchFamily="34" charset="0"/>
+                <a:cs typeface="Arial" panose="020B0604020202020204" pitchFamily="34" charset="0"/>
+              </a:rPr>
+              <a:t>branch_name</a:t>
+            </a:r>
+            <a:endParaRPr lang="en-US" altLang="zh-TW" sz="3200" dirty="0">
+              <a:latin typeface="Arial" panose="020B0604020202020204" pitchFamily="34" charset="0"/>
+              <a:cs typeface="Arial" panose="020B0604020202020204" pitchFamily="34" charset="0"/>
+            </a:endParaRPr>
+          </a:p>
+        </p:txBody>
+      </p:sp>
     </p:spTree>
     <p:extLst>
       <p:ext uri="{BB962C8B-B14F-4D97-AF65-F5344CB8AC3E}">
@@ -7484,10 +7863,1322 @@
           </a:prstGeom>
         </p:spPr>
       </p:pic>
+      <p:sp>
+        <p:nvSpPr>
+          <p:cNvPr id="6" name="矩形 5">
+            <a:extLst>
+              <a:ext uri="{FF2B5EF4-FFF2-40B4-BE49-F238E27FC236}">
+                <a16:creationId xmlns:a16="http://schemas.microsoft.com/office/drawing/2014/main" id="{27BA8308-0E71-42BC-9714-02D5FFF2E137}"/>
+              </a:ext>
+            </a:extLst>
+          </p:cNvPr>
+          <p:cNvSpPr/>
+          <p:nvPr/>
+        </p:nvSpPr>
+        <p:spPr>
+          <a:xfrm>
+            <a:off x="2545086" y="1253290"/>
+            <a:ext cx="3485650" cy="1224792"/>
+          </a:xfrm>
+          <a:prstGeom prst="rect">
+            <a:avLst/>
+          </a:prstGeom>
+          <a:solidFill>
+            <a:schemeClr val="accent3">
+              <a:lumMod val="20000"/>
+              <a:lumOff val="80000"/>
+            </a:schemeClr>
+          </a:solidFill>
+          <a:ln w="38100">
+            <a:solidFill>
+              <a:schemeClr val="tx1"/>
+            </a:solidFill>
+          </a:ln>
+        </p:spPr>
+        <p:style>
+          <a:lnRef idx="2">
+            <a:schemeClr val="accent1">
+              <a:shade val="50000"/>
+            </a:schemeClr>
+          </a:lnRef>
+          <a:fillRef idx="1">
+            <a:schemeClr val="accent1"/>
+          </a:fillRef>
+          <a:effectRef idx="0">
+            <a:schemeClr val="accent1"/>
+          </a:effectRef>
+          <a:fontRef idx="minor">
+            <a:schemeClr val="lt1"/>
+          </a:fontRef>
+        </p:style>
+        <p:txBody>
+          <a:bodyPr rtlCol="0" anchor="ctr"/>
+          <a:lstStyle/>
+          <a:p>
+            <a:pPr algn="ctr"/>
+            <a:endParaRPr lang="zh-TW" altLang="en-US"/>
+          </a:p>
+        </p:txBody>
+      </p:sp>
+      <p:sp>
+        <p:nvSpPr>
+          <p:cNvPr id="7" name="文字方塊 6">
+            <a:extLst>
+              <a:ext uri="{FF2B5EF4-FFF2-40B4-BE49-F238E27FC236}">
+                <a16:creationId xmlns:a16="http://schemas.microsoft.com/office/drawing/2014/main" id="{1732E131-8FBC-482E-9A54-9B01F26C3535}"/>
+              </a:ext>
+            </a:extLst>
+          </p:cNvPr>
+          <p:cNvSpPr txBox="1"/>
+          <p:nvPr/>
+        </p:nvSpPr>
+        <p:spPr>
+          <a:xfrm>
+            <a:off x="2862599" y="1566723"/>
+            <a:ext cx="2706742" cy="584775"/>
+          </a:xfrm>
+          <a:prstGeom prst="rect">
+            <a:avLst/>
+          </a:prstGeom>
+          <a:noFill/>
+        </p:spPr>
+        <p:txBody>
+          <a:bodyPr wrap="square" rtlCol="0">
+            <a:spAutoFit/>
+          </a:bodyPr>
+          <a:lstStyle/>
+          <a:p>
+            <a:r>
+              <a:rPr lang="zh-TW" altLang="en-US" sz="3200" dirty="0">
+                <a:latin typeface="Arial" panose="020B0604020202020204" pitchFamily="34" charset="0"/>
+                <a:cs typeface="Arial" panose="020B0604020202020204" pitchFamily="34" charset="0"/>
+              </a:rPr>
+              <a:t>．</a:t>
+            </a:r>
+            <a:r>
+              <a:rPr lang="en-US" altLang="zh-TW" sz="3200" dirty="0">
+                <a:latin typeface="Arial" panose="020B0604020202020204" pitchFamily="34" charset="0"/>
+                <a:cs typeface="Arial" panose="020B0604020202020204" pitchFamily="34" charset="0"/>
+              </a:rPr>
+              <a:t>git branch</a:t>
+            </a:r>
+          </a:p>
+        </p:txBody>
+      </p:sp>
+      <p:pic>
+        <p:nvPicPr>
+          <p:cNvPr id="8" name="圖片 7" descr="一張含有 文字 的圖片&#10;&#10;自動產生的描述">
+            <a:extLst>
+              <a:ext uri="{FF2B5EF4-FFF2-40B4-BE49-F238E27FC236}">
+                <a16:creationId xmlns:a16="http://schemas.microsoft.com/office/drawing/2014/main" id="{E3291D27-DD2B-4404-961E-C5BDE4896889}"/>
+              </a:ext>
+            </a:extLst>
+          </p:cNvPr>
+          <p:cNvPicPr>
+            <a:picLocks noChangeAspect="1"/>
+          </p:cNvPicPr>
+          <p:nvPr/>
+        </p:nvPicPr>
+        <p:blipFill>
+          <a:blip r:embed="rId4">
+            <a:extLst>
+              <a:ext uri="{28A0092B-C50C-407E-A947-70E740481C1C}">
+                <a14:useLocalDpi xmlns:a14="http://schemas.microsoft.com/office/drawing/2010/main" val="0"/>
+              </a:ext>
+            </a:extLst>
+          </a:blip>
+          <a:stretch>
+            <a:fillRect/>
+          </a:stretch>
+        </p:blipFill>
+        <p:spPr>
+          <a:xfrm>
+            <a:off x="1298795" y="3294895"/>
+            <a:ext cx="6546409" cy="2309815"/>
+          </a:xfrm>
+          <a:prstGeom prst="rect">
+            <a:avLst/>
+          </a:prstGeom>
+        </p:spPr>
+      </p:pic>
     </p:spTree>
     <p:extLst>
       <p:ext uri="{BB962C8B-B14F-4D97-AF65-F5344CB8AC3E}">
         <p14:creationId xmlns:p14="http://schemas.microsoft.com/office/powerpoint/2010/main" val="1659399492"/>
+      </p:ext>
+    </p:extLst>
+  </p:cSld>
+  <p:clrMapOvr>
+    <a:masterClrMapping/>
+  </p:clrMapOvr>
+</p:sld>
+</file>
+
+<file path=ppt/slides/slide28.xml><?xml version="1.0" encoding="utf-8"?>
+<p:sld xmlns:a="http://schemas.openxmlformats.org/drawingml/2006/main" xmlns:r="http://schemas.openxmlformats.org/officeDocument/2006/relationships" xmlns:p="http://schemas.openxmlformats.org/presentationml/2006/main">
+  <p:cSld>
+    <p:spTree>
+      <p:nvGrpSpPr>
+        <p:cNvPr id="1" name=""/>
+        <p:cNvGrpSpPr/>
+        <p:nvPr/>
+      </p:nvGrpSpPr>
+      <p:grpSpPr>
+        <a:xfrm>
+          <a:off x="0" y="0"/>
+          <a:ext cx="0" cy="0"/>
+          <a:chOff x="0" y="0"/>
+          <a:chExt cx="0" cy="0"/>
+        </a:xfrm>
+      </p:grpSpPr>
+      <p:pic>
+        <p:nvPicPr>
+          <p:cNvPr id="3" name="圖片 2">
+            <a:extLst>
+              <a:ext uri="{FF2B5EF4-FFF2-40B4-BE49-F238E27FC236}">
+                <a16:creationId xmlns:a16="http://schemas.microsoft.com/office/drawing/2014/main" id="{1202EBDE-7F64-43BD-86B7-6C228CCEC2D0}"/>
+              </a:ext>
+            </a:extLst>
+          </p:cNvPr>
+          <p:cNvPicPr>
+            <a:picLocks noChangeAspect="1"/>
+          </p:cNvPicPr>
+          <p:nvPr/>
+        </p:nvPicPr>
+        <p:blipFill>
+          <a:blip r:embed="rId2" cstate="print">
+            <a:extLst>
+              <a:ext uri="{28A0092B-C50C-407E-A947-70E740481C1C}">
+                <a14:useLocalDpi xmlns:a14="http://schemas.microsoft.com/office/drawing/2010/main" val="0"/>
+              </a:ext>
+            </a:extLst>
+          </a:blip>
+          <a:stretch>
+            <a:fillRect/>
+          </a:stretch>
+        </p:blipFill>
+        <p:spPr>
+          <a:xfrm>
+            <a:off x="6598915" y="0"/>
+            <a:ext cx="2545085" cy="3294895"/>
+          </a:xfrm>
+          <a:prstGeom prst="rect">
+            <a:avLst/>
+          </a:prstGeom>
+        </p:spPr>
+      </p:pic>
+      <p:pic>
+        <p:nvPicPr>
+          <p:cNvPr id="4" name="圖片 3">
+            <a:extLst>
+              <a:ext uri="{FF2B5EF4-FFF2-40B4-BE49-F238E27FC236}">
+                <a16:creationId xmlns:a16="http://schemas.microsoft.com/office/drawing/2014/main" id="{AEFF5069-0FA7-44E7-AEEE-225463C6B1AC}"/>
+              </a:ext>
+            </a:extLst>
+          </p:cNvPr>
+          <p:cNvPicPr>
+            <a:picLocks noChangeAspect="1"/>
+          </p:cNvPicPr>
+          <p:nvPr/>
+        </p:nvPicPr>
+        <p:blipFill>
+          <a:blip r:embed="rId3" cstate="print">
+            <a:extLst>
+              <a:ext uri="{28A0092B-C50C-407E-A947-70E740481C1C}">
+                <a14:useLocalDpi xmlns:a14="http://schemas.microsoft.com/office/drawing/2010/main" val="0"/>
+              </a:ext>
+            </a:extLst>
+          </a:blip>
+          <a:stretch>
+            <a:fillRect/>
+          </a:stretch>
+        </p:blipFill>
+        <p:spPr>
+          <a:xfrm>
+            <a:off x="0" y="4169659"/>
+            <a:ext cx="3934976" cy="2688341"/>
+          </a:xfrm>
+          <a:prstGeom prst="rect">
+            <a:avLst/>
+          </a:prstGeom>
+        </p:spPr>
+      </p:pic>
+      <p:sp>
+        <p:nvSpPr>
+          <p:cNvPr id="5" name="文字方塊 4">
+            <a:extLst>
+              <a:ext uri="{FF2B5EF4-FFF2-40B4-BE49-F238E27FC236}">
+                <a16:creationId xmlns:a16="http://schemas.microsoft.com/office/drawing/2014/main" id="{48465F4D-92C8-4218-A958-29D62F6B1A97}"/>
+              </a:ext>
+            </a:extLst>
+          </p:cNvPr>
+          <p:cNvSpPr txBox="1"/>
+          <p:nvPr/>
+        </p:nvSpPr>
+        <p:spPr>
+          <a:xfrm>
+            <a:off x="386372" y="324441"/>
+            <a:ext cx="2004491" cy="523220"/>
+          </a:xfrm>
+          <a:prstGeom prst="rect">
+            <a:avLst/>
+          </a:prstGeom>
+          <a:noFill/>
+        </p:spPr>
+        <p:txBody>
+          <a:bodyPr wrap="square" rtlCol="0">
+            <a:spAutoFit/>
+          </a:bodyPr>
+          <a:lstStyle/>
+          <a:p>
+            <a:r>
+              <a:rPr lang="zh-TW" altLang="en-US" sz="2800" dirty="0">
+                <a:latin typeface="Arial" panose="020B0604020202020204" pitchFamily="34" charset="0"/>
+                <a:cs typeface="Arial" panose="020B0604020202020204" pitchFamily="34" charset="0"/>
+              </a:rPr>
+              <a:t> ＊</a:t>
+            </a:r>
+            <a:r>
+              <a:rPr lang="en-US" altLang="zh-TW" sz="2800" dirty="0">
+                <a:latin typeface="Arial" panose="020B0604020202020204" pitchFamily="34" charset="0"/>
+                <a:cs typeface="Arial" panose="020B0604020202020204" pitchFamily="34" charset="0"/>
+              </a:rPr>
+              <a:t>master</a:t>
+            </a:r>
+          </a:p>
+        </p:txBody>
+      </p:sp>
+      <p:sp>
+        <p:nvSpPr>
+          <p:cNvPr id="6" name="文字方塊 5">
+            <a:extLst>
+              <a:ext uri="{FF2B5EF4-FFF2-40B4-BE49-F238E27FC236}">
+                <a16:creationId xmlns:a16="http://schemas.microsoft.com/office/drawing/2014/main" id="{8481A8F0-C2E1-4577-AC58-35B8EFAE7EBC}"/>
+              </a:ext>
+            </a:extLst>
+          </p:cNvPr>
+          <p:cNvSpPr txBox="1"/>
+          <p:nvPr/>
+        </p:nvSpPr>
+        <p:spPr>
+          <a:xfrm>
+            <a:off x="349046" y="1058886"/>
+            <a:ext cx="2110327" cy="523220"/>
+          </a:xfrm>
+          <a:prstGeom prst="rect">
+            <a:avLst/>
+          </a:prstGeom>
+        </p:spPr>
+        <p:style>
+          <a:lnRef idx="2">
+            <a:schemeClr val="dk1"/>
+          </a:lnRef>
+          <a:fillRef idx="1">
+            <a:schemeClr val="lt1"/>
+          </a:fillRef>
+          <a:effectRef idx="0">
+            <a:schemeClr val="dk1"/>
+          </a:effectRef>
+          <a:fontRef idx="minor">
+            <a:schemeClr val="dk1"/>
+          </a:fontRef>
+        </p:style>
+        <p:txBody>
+          <a:bodyPr wrap="square" rtlCol="0">
+            <a:spAutoFit/>
+          </a:bodyPr>
+          <a:lstStyle/>
+          <a:p>
+            <a:r>
+              <a:rPr lang="zh-TW" altLang="en-US" sz="2800" dirty="0">
+                <a:latin typeface="Arial" panose="020B0604020202020204" pitchFamily="34" charset="0"/>
+                <a:cs typeface="Arial" panose="020B0604020202020204" pitchFamily="34" charset="0"/>
+              </a:rPr>
+              <a:t>。</a:t>
+            </a:r>
+            <a:r>
+              <a:rPr lang="en-US" altLang="zh-TW" sz="2800" dirty="0">
+                <a:latin typeface="Arial" panose="020B0604020202020204" pitchFamily="34" charset="0"/>
+                <a:cs typeface="Arial" panose="020B0604020202020204" pitchFamily="34" charset="0"/>
+              </a:rPr>
+              <a:t>main file</a:t>
+            </a:r>
+          </a:p>
+        </p:txBody>
+      </p:sp>
+      <p:sp>
+        <p:nvSpPr>
+          <p:cNvPr id="7" name="文字方塊 6">
+            <a:extLst>
+              <a:ext uri="{FF2B5EF4-FFF2-40B4-BE49-F238E27FC236}">
+                <a16:creationId xmlns:a16="http://schemas.microsoft.com/office/drawing/2014/main" id="{FC0A0403-E86E-4D4B-A9EC-7255B9A71DC6}"/>
+              </a:ext>
+            </a:extLst>
+          </p:cNvPr>
+          <p:cNvSpPr txBox="1"/>
+          <p:nvPr/>
+        </p:nvSpPr>
+        <p:spPr>
+          <a:xfrm>
+            <a:off x="1669409" y="2314568"/>
+            <a:ext cx="2110327" cy="523220"/>
+          </a:xfrm>
+          <a:prstGeom prst="rect">
+            <a:avLst/>
+          </a:prstGeom>
+        </p:spPr>
+        <p:style>
+          <a:lnRef idx="2">
+            <a:schemeClr val="dk1"/>
+          </a:lnRef>
+          <a:fillRef idx="1">
+            <a:schemeClr val="lt1"/>
+          </a:fillRef>
+          <a:effectRef idx="0">
+            <a:schemeClr val="dk1"/>
+          </a:effectRef>
+          <a:fontRef idx="minor">
+            <a:schemeClr val="dk1"/>
+          </a:fontRef>
+        </p:style>
+        <p:txBody>
+          <a:bodyPr wrap="square" rtlCol="0">
+            <a:spAutoFit/>
+          </a:bodyPr>
+          <a:lstStyle/>
+          <a:p>
+            <a:r>
+              <a:rPr lang="zh-TW" altLang="en-US" sz="2800" dirty="0">
+                <a:latin typeface="Arial" panose="020B0604020202020204" pitchFamily="34" charset="0"/>
+                <a:cs typeface="Arial" panose="020B0604020202020204" pitchFamily="34" charset="0"/>
+              </a:rPr>
+              <a:t>。</a:t>
+            </a:r>
+            <a:r>
+              <a:rPr lang="en-US" altLang="zh-TW" sz="2800" dirty="0">
+                <a:latin typeface="Arial" panose="020B0604020202020204" pitchFamily="34" charset="0"/>
+                <a:cs typeface="Arial" panose="020B0604020202020204" pitchFamily="34" charset="0"/>
+              </a:rPr>
+              <a:t>main file</a:t>
+            </a:r>
+          </a:p>
+        </p:txBody>
+      </p:sp>
+      <p:cxnSp>
+        <p:nvCxnSpPr>
+          <p:cNvPr id="8" name="接點: 肘形 7">
+            <a:extLst>
+              <a:ext uri="{FF2B5EF4-FFF2-40B4-BE49-F238E27FC236}">
+                <a16:creationId xmlns:a16="http://schemas.microsoft.com/office/drawing/2014/main" id="{7EADF4EE-F288-43EB-A2A7-D9F30DA40375}"/>
+              </a:ext>
+            </a:extLst>
+          </p:cNvPr>
+          <p:cNvCxnSpPr>
+            <a:cxnSpLocks/>
+            <a:stCxn id="6" idx="3"/>
+            <a:endCxn id="7" idx="0"/>
+          </p:cNvCxnSpPr>
+          <p:nvPr/>
+        </p:nvCxnSpPr>
+        <p:spPr>
+          <a:xfrm>
+            <a:off x="2459373" y="1320496"/>
+            <a:ext cx="265200" cy="994072"/>
+          </a:xfrm>
+          <a:prstGeom prst="bentConnector2">
+            <a:avLst/>
+          </a:prstGeom>
+          <a:ln w="38100">
+            <a:solidFill>
+              <a:schemeClr val="tx1"/>
+            </a:solidFill>
+            <a:tailEnd type="triangle"/>
+          </a:ln>
+        </p:spPr>
+        <p:style>
+          <a:lnRef idx="1">
+            <a:schemeClr val="accent1"/>
+          </a:lnRef>
+          <a:fillRef idx="0">
+            <a:schemeClr val="accent1"/>
+          </a:fillRef>
+          <a:effectRef idx="0">
+            <a:schemeClr val="accent1"/>
+          </a:effectRef>
+          <a:fontRef idx="minor">
+            <a:schemeClr val="tx1"/>
+          </a:fontRef>
+        </p:style>
+      </p:cxnSp>
+      <p:sp>
+        <p:nvSpPr>
+          <p:cNvPr id="10" name="文字方塊 9">
+            <a:extLst>
+              <a:ext uri="{FF2B5EF4-FFF2-40B4-BE49-F238E27FC236}">
+                <a16:creationId xmlns:a16="http://schemas.microsoft.com/office/drawing/2014/main" id="{ECA7307C-CF29-4344-871F-39CBDF1B0055}"/>
+              </a:ext>
+            </a:extLst>
+          </p:cNvPr>
+          <p:cNvSpPr txBox="1"/>
+          <p:nvPr/>
+        </p:nvSpPr>
+        <p:spPr>
+          <a:xfrm>
+            <a:off x="2915344" y="1417422"/>
+            <a:ext cx="3451167" cy="400110"/>
+          </a:xfrm>
+          <a:prstGeom prst="rect">
+            <a:avLst/>
+          </a:prstGeom>
+          <a:noFill/>
+        </p:spPr>
+        <p:txBody>
+          <a:bodyPr wrap="square" rtlCol="0">
+            <a:spAutoFit/>
+          </a:bodyPr>
+          <a:lstStyle/>
+          <a:p>
+            <a:r>
+              <a:rPr lang="en-US" altLang="zh-TW" sz="2000" dirty="0">
+                <a:latin typeface="Arial" panose="020B0604020202020204" pitchFamily="34" charset="0"/>
+                <a:cs typeface="Arial" panose="020B0604020202020204" pitchFamily="34" charset="0"/>
+              </a:rPr>
+              <a:t>git checkout –b </a:t>
+            </a:r>
+            <a:r>
+              <a:rPr lang="en-US" altLang="zh-TW" sz="2000" dirty="0" err="1">
+                <a:latin typeface="Arial" panose="020B0604020202020204" pitchFamily="34" charset="0"/>
+                <a:cs typeface="Arial" panose="020B0604020202020204" pitchFamily="34" charset="0"/>
+              </a:rPr>
+              <a:t>new_branch</a:t>
+            </a:r>
+            <a:endParaRPr lang="en-US" altLang="zh-TW" sz="2000" dirty="0">
+              <a:latin typeface="Arial" panose="020B0604020202020204" pitchFamily="34" charset="0"/>
+              <a:cs typeface="Arial" panose="020B0604020202020204" pitchFamily="34" charset="0"/>
+            </a:endParaRPr>
+          </a:p>
+        </p:txBody>
+      </p:sp>
+      <p:sp>
+        <p:nvSpPr>
+          <p:cNvPr id="16" name="文字方塊 15">
+            <a:extLst>
+              <a:ext uri="{FF2B5EF4-FFF2-40B4-BE49-F238E27FC236}">
+                <a16:creationId xmlns:a16="http://schemas.microsoft.com/office/drawing/2014/main" id="{5363C442-B1E3-43CD-B532-2E2556292ED2}"/>
+              </a:ext>
+            </a:extLst>
+          </p:cNvPr>
+          <p:cNvSpPr txBox="1"/>
+          <p:nvPr/>
+        </p:nvSpPr>
+        <p:spPr>
+          <a:xfrm>
+            <a:off x="6114410" y="2105740"/>
+            <a:ext cx="2110328" cy="954107"/>
+          </a:xfrm>
+          <a:prstGeom prst="rect">
+            <a:avLst/>
+          </a:prstGeom>
+        </p:spPr>
+        <p:style>
+          <a:lnRef idx="2">
+            <a:schemeClr val="dk1"/>
+          </a:lnRef>
+          <a:fillRef idx="1">
+            <a:schemeClr val="lt1"/>
+          </a:fillRef>
+          <a:effectRef idx="0">
+            <a:schemeClr val="dk1"/>
+          </a:effectRef>
+          <a:fontRef idx="minor">
+            <a:schemeClr val="dk1"/>
+          </a:fontRef>
+        </p:style>
+        <p:txBody>
+          <a:bodyPr wrap="square" rtlCol="0">
+            <a:spAutoFit/>
+          </a:bodyPr>
+          <a:lstStyle/>
+          <a:p>
+            <a:r>
+              <a:rPr lang="zh-TW" altLang="en-US" sz="2800" dirty="0">
+                <a:latin typeface="Arial" panose="020B0604020202020204" pitchFamily="34" charset="0"/>
+                <a:cs typeface="Arial" panose="020B0604020202020204" pitchFamily="34" charset="0"/>
+              </a:rPr>
+              <a:t>。</a:t>
+            </a:r>
+            <a:r>
+              <a:rPr lang="en-US" altLang="zh-TW" sz="2800" dirty="0">
+                <a:latin typeface="Arial" panose="020B0604020202020204" pitchFamily="34" charset="0"/>
+                <a:cs typeface="Arial" panose="020B0604020202020204" pitchFamily="34" charset="0"/>
+              </a:rPr>
+              <a:t>main file</a:t>
+            </a:r>
+          </a:p>
+          <a:p>
+            <a:r>
+              <a:rPr lang="zh-TW" altLang="en-US" sz="2800" dirty="0">
+                <a:latin typeface="Arial" panose="020B0604020202020204" pitchFamily="34" charset="0"/>
+                <a:cs typeface="Arial" panose="020B0604020202020204" pitchFamily="34" charset="0"/>
+              </a:rPr>
+              <a:t>．</a:t>
+            </a:r>
+            <a:r>
+              <a:rPr lang="en-US" altLang="zh-TW" sz="2800" dirty="0">
+                <a:latin typeface="Arial" panose="020B0604020202020204" pitchFamily="34" charset="0"/>
+                <a:cs typeface="Arial" panose="020B0604020202020204" pitchFamily="34" charset="0"/>
+              </a:rPr>
+              <a:t>new file</a:t>
+            </a:r>
+          </a:p>
+        </p:txBody>
+      </p:sp>
+      <p:cxnSp>
+        <p:nvCxnSpPr>
+          <p:cNvPr id="18" name="直線單箭頭接點 17">
+            <a:extLst>
+              <a:ext uri="{FF2B5EF4-FFF2-40B4-BE49-F238E27FC236}">
+                <a16:creationId xmlns:a16="http://schemas.microsoft.com/office/drawing/2014/main" id="{D33E09B5-2ABD-4400-824C-B26610015F89}"/>
+              </a:ext>
+            </a:extLst>
+          </p:cNvPr>
+          <p:cNvCxnSpPr>
+            <a:cxnSpLocks/>
+            <a:stCxn id="7" idx="3"/>
+            <a:endCxn id="16" idx="1"/>
+          </p:cNvCxnSpPr>
+          <p:nvPr/>
+        </p:nvCxnSpPr>
+        <p:spPr>
+          <a:xfrm>
+            <a:off x="3779736" y="2576178"/>
+            <a:ext cx="2334674" cy="6616"/>
+          </a:xfrm>
+          <a:prstGeom prst="straightConnector1">
+            <a:avLst/>
+          </a:prstGeom>
+          <a:ln w="38100">
+            <a:solidFill>
+              <a:schemeClr val="tx1"/>
+            </a:solidFill>
+            <a:tailEnd type="triangle"/>
+          </a:ln>
+        </p:spPr>
+        <p:style>
+          <a:lnRef idx="1">
+            <a:schemeClr val="accent1"/>
+          </a:lnRef>
+          <a:fillRef idx="0">
+            <a:schemeClr val="accent1"/>
+          </a:fillRef>
+          <a:effectRef idx="0">
+            <a:schemeClr val="accent1"/>
+          </a:effectRef>
+          <a:fontRef idx="minor">
+            <a:schemeClr val="tx1"/>
+          </a:fontRef>
+        </p:style>
+      </p:cxnSp>
+      <p:sp>
+        <p:nvSpPr>
+          <p:cNvPr id="22" name="文字方塊 21">
+            <a:extLst>
+              <a:ext uri="{FF2B5EF4-FFF2-40B4-BE49-F238E27FC236}">
+                <a16:creationId xmlns:a16="http://schemas.microsoft.com/office/drawing/2014/main" id="{79DDA0F3-83F4-4BB3-BBBA-2509FAA4F2A3}"/>
+              </a:ext>
+            </a:extLst>
+          </p:cNvPr>
+          <p:cNvSpPr txBox="1"/>
+          <p:nvPr/>
+        </p:nvSpPr>
+        <p:spPr>
+          <a:xfrm>
+            <a:off x="4376428" y="2114513"/>
+            <a:ext cx="933805" cy="400110"/>
+          </a:xfrm>
+          <a:prstGeom prst="rect">
+            <a:avLst/>
+          </a:prstGeom>
+          <a:noFill/>
+        </p:spPr>
+        <p:txBody>
+          <a:bodyPr wrap="square" rtlCol="0">
+            <a:spAutoFit/>
+          </a:bodyPr>
+          <a:lstStyle/>
+          <a:p>
+            <a:r>
+              <a:rPr lang="en-US" altLang="zh-TW" sz="2000" dirty="0">
+                <a:latin typeface="Arial" panose="020B0604020202020204" pitchFamily="34" charset="0"/>
+                <a:cs typeface="Arial" panose="020B0604020202020204" pitchFamily="34" charset="0"/>
+              </a:rPr>
+              <a:t>modify</a:t>
+            </a:r>
+          </a:p>
+        </p:txBody>
+      </p:sp>
+      <p:sp>
+        <p:nvSpPr>
+          <p:cNvPr id="23" name="文字方塊 22">
+            <a:extLst>
+              <a:ext uri="{FF2B5EF4-FFF2-40B4-BE49-F238E27FC236}">
+                <a16:creationId xmlns:a16="http://schemas.microsoft.com/office/drawing/2014/main" id="{1F468E26-20E0-441C-9F7E-9891B9ACA69B}"/>
+              </a:ext>
+            </a:extLst>
+          </p:cNvPr>
+          <p:cNvSpPr txBox="1"/>
+          <p:nvPr/>
+        </p:nvSpPr>
+        <p:spPr>
+          <a:xfrm>
+            <a:off x="1669408" y="3646439"/>
+            <a:ext cx="2110328" cy="954107"/>
+          </a:xfrm>
+          <a:prstGeom prst="rect">
+            <a:avLst/>
+          </a:prstGeom>
+        </p:spPr>
+        <p:style>
+          <a:lnRef idx="2">
+            <a:schemeClr val="dk1"/>
+          </a:lnRef>
+          <a:fillRef idx="1">
+            <a:schemeClr val="lt1"/>
+          </a:fillRef>
+          <a:effectRef idx="0">
+            <a:schemeClr val="dk1"/>
+          </a:effectRef>
+          <a:fontRef idx="minor">
+            <a:schemeClr val="dk1"/>
+          </a:fontRef>
+        </p:style>
+        <p:txBody>
+          <a:bodyPr wrap="square" rtlCol="0">
+            <a:spAutoFit/>
+          </a:bodyPr>
+          <a:lstStyle/>
+          <a:p>
+            <a:r>
+              <a:rPr lang="zh-TW" altLang="en-US" sz="2800" dirty="0">
+                <a:latin typeface="Arial" panose="020B0604020202020204" pitchFamily="34" charset="0"/>
+                <a:cs typeface="Arial" panose="020B0604020202020204" pitchFamily="34" charset="0"/>
+              </a:rPr>
+              <a:t>。</a:t>
+            </a:r>
+            <a:r>
+              <a:rPr lang="en-US" altLang="zh-TW" sz="2800" dirty="0">
+                <a:latin typeface="Arial" panose="020B0604020202020204" pitchFamily="34" charset="0"/>
+                <a:cs typeface="Arial" panose="020B0604020202020204" pitchFamily="34" charset="0"/>
+              </a:rPr>
+              <a:t>main file</a:t>
+            </a:r>
+          </a:p>
+          <a:p>
+            <a:r>
+              <a:rPr lang="zh-TW" altLang="en-US" sz="2800" dirty="0">
+                <a:latin typeface="Arial" panose="020B0604020202020204" pitchFamily="34" charset="0"/>
+                <a:cs typeface="Arial" panose="020B0604020202020204" pitchFamily="34" charset="0"/>
+              </a:rPr>
+              <a:t>．</a:t>
+            </a:r>
+            <a:r>
+              <a:rPr lang="en-US" altLang="zh-TW" sz="2800" dirty="0">
+                <a:latin typeface="Arial" panose="020B0604020202020204" pitchFamily="34" charset="0"/>
+                <a:cs typeface="Arial" panose="020B0604020202020204" pitchFamily="34" charset="0"/>
+              </a:rPr>
+              <a:t>new file</a:t>
+            </a:r>
+          </a:p>
+        </p:txBody>
+      </p:sp>
+      <p:cxnSp>
+        <p:nvCxnSpPr>
+          <p:cNvPr id="24" name="直線單箭頭接點 23">
+            <a:extLst>
+              <a:ext uri="{FF2B5EF4-FFF2-40B4-BE49-F238E27FC236}">
+                <a16:creationId xmlns:a16="http://schemas.microsoft.com/office/drawing/2014/main" id="{AC2572B1-8983-4F84-8AB1-414999449184}"/>
+              </a:ext>
+            </a:extLst>
+          </p:cNvPr>
+          <p:cNvCxnSpPr>
+            <a:cxnSpLocks/>
+            <a:stCxn id="7" idx="2"/>
+            <a:endCxn id="23" idx="0"/>
+          </p:cNvCxnSpPr>
+          <p:nvPr/>
+        </p:nvCxnSpPr>
+        <p:spPr>
+          <a:xfrm flipH="1">
+            <a:off x="2724572" y="2837788"/>
+            <a:ext cx="1" cy="808651"/>
+          </a:xfrm>
+          <a:prstGeom prst="straightConnector1">
+            <a:avLst/>
+          </a:prstGeom>
+          <a:ln w="38100">
+            <a:solidFill>
+              <a:schemeClr val="tx1"/>
+            </a:solidFill>
+            <a:tailEnd type="triangle"/>
+          </a:ln>
+        </p:spPr>
+        <p:style>
+          <a:lnRef idx="1">
+            <a:schemeClr val="accent1"/>
+          </a:lnRef>
+          <a:fillRef idx="0">
+            <a:schemeClr val="accent1"/>
+          </a:fillRef>
+          <a:effectRef idx="0">
+            <a:schemeClr val="accent1"/>
+          </a:effectRef>
+          <a:fontRef idx="minor">
+            <a:schemeClr val="tx1"/>
+          </a:fontRef>
+        </p:style>
+      </p:cxnSp>
+      <p:cxnSp>
+        <p:nvCxnSpPr>
+          <p:cNvPr id="27" name="接點: 肘形 26">
+            <a:extLst>
+              <a:ext uri="{FF2B5EF4-FFF2-40B4-BE49-F238E27FC236}">
+                <a16:creationId xmlns:a16="http://schemas.microsoft.com/office/drawing/2014/main" id="{2E528F29-0DD3-4E23-9397-6B2F6F355E7B}"/>
+              </a:ext>
+            </a:extLst>
+          </p:cNvPr>
+          <p:cNvCxnSpPr>
+            <a:cxnSpLocks/>
+            <a:stCxn id="16" idx="2"/>
+            <a:endCxn id="23" idx="3"/>
+          </p:cNvCxnSpPr>
+          <p:nvPr/>
+        </p:nvCxnSpPr>
+        <p:spPr>
+          <a:xfrm rot="5400000">
+            <a:off x="4942832" y="1896751"/>
+            <a:ext cx="1063646" cy="3389838"/>
+          </a:xfrm>
+          <a:prstGeom prst="bentConnector2">
+            <a:avLst/>
+          </a:prstGeom>
+          <a:ln w="38100">
+            <a:solidFill>
+              <a:schemeClr val="tx1"/>
+            </a:solidFill>
+            <a:tailEnd type="triangle"/>
+          </a:ln>
+        </p:spPr>
+        <p:style>
+          <a:lnRef idx="1">
+            <a:schemeClr val="accent1"/>
+          </a:lnRef>
+          <a:fillRef idx="0">
+            <a:schemeClr val="accent1"/>
+          </a:fillRef>
+          <a:effectRef idx="0">
+            <a:schemeClr val="accent1"/>
+          </a:effectRef>
+          <a:fontRef idx="minor">
+            <a:schemeClr val="tx1"/>
+          </a:fontRef>
+        </p:style>
+      </p:cxnSp>
+      <p:sp>
+        <p:nvSpPr>
+          <p:cNvPr id="30" name="文字方塊 29">
+            <a:extLst>
+              <a:ext uri="{FF2B5EF4-FFF2-40B4-BE49-F238E27FC236}">
+                <a16:creationId xmlns:a16="http://schemas.microsoft.com/office/drawing/2014/main" id="{FEBF6538-9CDD-4F5A-BCB3-757B8725C0BA}"/>
+              </a:ext>
+            </a:extLst>
+          </p:cNvPr>
+          <p:cNvSpPr txBox="1"/>
+          <p:nvPr/>
+        </p:nvSpPr>
+        <p:spPr>
+          <a:xfrm>
+            <a:off x="4652057" y="3686176"/>
+            <a:ext cx="1714454" cy="400110"/>
+          </a:xfrm>
+          <a:prstGeom prst="rect">
+            <a:avLst/>
+          </a:prstGeom>
+          <a:noFill/>
+        </p:spPr>
+        <p:txBody>
+          <a:bodyPr wrap="square" rtlCol="0">
+            <a:spAutoFit/>
+          </a:bodyPr>
+          <a:lstStyle/>
+          <a:p>
+            <a:r>
+              <a:rPr lang="en-US" altLang="zh-TW" sz="2000" dirty="0">
+                <a:latin typeface="Arial" panose="020B0604020202020204" pitchFamily="34" charset="0"/>
+                <a:cs typeface="Arial" panose="020B0604020202020204" pitchFamily="34" charset="0"/>
+              </a:rPr>
+              <a:t>add, commit</a:t>
+            </a:r>
+          </a:p>
+        </p:txBody>
+      </p:sp>
+      <p:cxnSp>
+        <p:nvCxnSpPr>
+          <p:cNvPr id="33" name="直線單箭頭接點 32">
+            <a:extLst>
+              <a:ext uri="{FF2B5EF4-FFF2-40B4-BE49-F238E27FC236}">
+                <a16:creationId xmlns:a16="http://schemas.microsoft.com/office/drawing/2014/main" id="{A76451C5-833B-4D40-98B0-22044EE7228D}"/>
+              </a:ext>
+            </a:extLst>
+          </p:cNvPr>
+          <p:cNvCxnSpPr>
+            <a:cxnSpLocks/>
+            <a:stCxn id="6" idx="2"/>
+            <a:endCxn id="36" idx="0"/>
+          </p:cNvCxnSpPr>
+          <p:nvPr/>
+        </p:nvCxnSpPr>
+        <p:spPr>
+          <a:xfrm flipH="1">
+            <a:off x="1404209" y="1582106"/>
+            <a:ext cx="1" cy="3643180"/>
+          </a:xfrm>
+          <a:prstGeom prst="straightConnector1">
+            <a:avLst/>
+          </a:prstGeom>
+          <a:ln w="38100">
+            <a:solidFill>
+              <a:schemeClr val="tx1"/>
+            </a:solidFill>
+            <a:tailEnd type="triangle"/>
+          </a:ln>
+        </p:spPr>
+        <p:style>
+          <a:lnRef idx="1">
+            <a:schemeClr val="accent1"/>
+          </a:lnRef>
+          <a:fillRef idx="0">
+            <a:schemeClr val="accent1"/>
+          </a:fillRef>
+          <a:effectRef idx="0">
+            <a:schemeClr val="accent1"/>
+          </a:effectRef>
+          <a:fontRef idx="minor">
+            <a:schemeClr val="tx1"/>
+          </a:fontRef>
+        </p:style>
+      </p:cxnSp>
+      <p:sp>
+        <p:nvSpPr>
+          <p:cNvPr id="36" name="文字方塊 35">
+            <a:extLst>
+              <a:ext uri="{FF2B5EF4-FFF2-40B4-BE49-F238E27FC236}">
+                <a16:creationId xmlns:a16="http://schemas.microsoft.com/office/drawing/2014/main" id="{518804E3-8FC2-4488-87D4-F4A9F33849D8}"/>
+              </a:ext>
+            </a:extLst>
+          </p:cNvPr>
+          <p:cNvSpPr txBox="1"/>
+          <p:nvPr/>
+        </p:nvSpPr>
+        <p:spPr>
+          <a:xfrm>
+            <a:off x="937306" y="5225286"/>
+            <a:ext cx="933805" cy="400110"/>
+          </a:xfrm>
+          <a:prstGeom prst="rect">
+            <a:avLst/>
+          </a:prstGeom>
+          <a:noFill/>
+        </p:spPr>
+        <p:txBody>
+          <a:bodyPr wrap="square" rtlCol="0">
+            <a:spAutoFit/>
+          </a:bodyPr>
+          <a:lstStyle/>
+          <a:p>
+            <a:r>
+              <a:rPr lang="en-US" altLang="zh-TW" sz="2000" dirty="0">
+                <a:latin typeface="Arial" panose="020B0604020202020204" pitchFamily="34" charset="0"/>
+                <a:cs typeface="Arial" panose="020B0604020202020204" pitchFamily="34" charset="0"/>
+              </a:rPr>
+              <a:t>merge</a:t>
+            </a:r>
+          </a:p>
+        </p:txBody>
+      </p:sp>
+      <p:cxnSp>
+        <p:nvCxnSpPr>
+          <p:cNvPr id="40" name="接點: 肘形 39">
+            <a:extLst>
+              <a:ext uri="{FF2B5EF4-FFF2-40B4-BE49-F238E27FC236}">
+                <a16:creationId xmlns:a16="http://schemas.microsoft.com/office/drawing/2014/main" id="{FEB8B8ED-CAB0-4C11-9628-33C7EB66C3FA}"/>
+              </a:ext>
+            </a:extLst>
+          </p:cNvPr>
+          <p:cNvCxnSpPr>
+            <a:cxnSpLocks/>
+            <a:stCxn id="23" idx="2"/>
+            <a:endCxn id="36" idx="3"/>
+          </p:cNvCxnSpPr>
+          <p:nvPr/>
+        </p:nvCxnSpPr>
+        <p:spPr>
+          <a:xfrm rot="5400000">
+            <a:off x="1885445" y="4586213"/>
+            <a:ext cx="824795" cy="853461"/>
+          </a:xfrm>
+          <a:prstGeom prst="bentConnector2">
+            <a:avLst/>
+          </a:prstGeom>
+          <a:ln w="38100">
+            <a:solidFill>
+              <a:schemeClr val="tx1"/>
+            </a:solidFill>
+            <a:tailEnd type="triangle"/>
+          </a:ln>
+        </p:spPr>
+        <p:style>
+          <a:lnRef idx="1">
+            <a:schemeClr val="accent1"/>
+          </a:lnRef>
+          <a:fillRef idx="0">
+            <a:schemeClr val="accent1"/>
+          </a:fillRef>
+          <a:effectRef idx="0">
+            <a:schemeClr val="accent1"/>
+          </a:effectRef>
+          <a:fontRef idx="minor">
+            <a:schemeClr val="tx1"/>
+          </a:fontRef>
+        </p:style>
+      </p:cxnSp>
+      <p:cxnSp>
+        <p:nvCxnSpPr>
+          <p:cNvPr id="43" name="直線單箭頭接點 42">
+            <a:extLst>
+              <a:ext uri="{FF2B5EF4-FFF2-40B4-BE49-F238E27FC236}">
+                <a16:creationId xmlns:a16="http://schemas.microsoft.com/office/drawing/2014/main" id="{4CBCE9BE-B1B4-49CC-AA1D-6C0C71B98ADB}"/>
+              </a:ext>
+            </a:extLst>
+          </p:cNvPr>
+          <p:cNvCxnSpPr>
+            <a:cxnSpLocks/>
+            <a:stCxn id="36" idx="2"/>
+          </p:cNvCxnSpPr>
+          <p:nvPr/>
+        </p:nvCxnSpPr>
+        <p:spPr>
+          <a:xfrm>
+            <a:off x="1404209" y="5625396"/>
+            <a:ext cx="0" cy="473400"/>
+          </a:xfrm>
+          <a:prstGeom prst="straightConnector1">
+            <a:avLst/>
+          </a:prstGeom>
+          <a:ln w="38100">
+            <a:solidFill>
+              <a:schemeClr val="tx1"/>
+            </a:solidFill>
+            <a:tailEnd type="triangle"/>
+          </a:ln>
+        </p:spPr>
+        <p:style>
+          <a:lnRef idx="1">
+            <a:schemeClr val="accent1"/>
+          </a:lnRef>
+          <a:fillRef idx="0">
+            <a:schemeClr val="accent1"/>
+          </a:fillRef>
+          <a:effectRef idx="0">
+            <a:schemeClr val="accent1"/>
+          </a:effectRef>
+          <a:fontRef idx="minor">
+            <a:schemeClr val="tx1"/>
+          </a:fontRef>
+        </p:style>
+      </p:cxnSp>
+    </p:spTree>
+    <p:extLst>
+      <p:ext uri="{BB962C8B-B14F-4D97-AF65-F5344CB8AC3E}">
+        <p14:creationId xmlns:p14="http://schemas.microsoft.com/office/powerpoint/2010/main" val="3095387095"/>
+      </p:ext>
+    </p:extLst>
+  </p:cSld>
+  <p:clrMapOvr>
+    <a:masterClrMapping/>
+  </p:clrMapOvr>
+</p:sld>
+</file>
+
+<file path=ppt/slides/slide29.xml><?xml version="1.0" encoding="utf-8"?>
+<p:sld xmlns:a="http://schemas.openxmlformats.org/drawingml/2006/main" xmlns:r="http://schemas.openxmlformats.org/officeDocument/2006/relationships" xmlns:p="http://schemas.openxmlformats.org/presentationml/2006/main">
+  <p:cSld>
+    <p:spTree>
+      <p:nvGrpSpPr>
+        <p:cNvPr id="1" name=""/>
+        <p:cNvGrpSpPr/>
+        <p:nvPr/>
+      </p:nvGrpSpPr>
+      <p:grpSpPr>
+        <a:xfrm>
+          <a:off x="0" y="0"/>
+          <a:ext cx="0" cy="0"/>
+          <a:chOff x="0" y="0"/>
+          <a:chExt cx="0" cy="0"/>
+        </a:xfrm>
+      </p:grpSpPr>
+      <p:pic>
+        <p:nvPicPr>
+          <p:cNvPr id="3" name="圖片 2">
+            <a:extLst>
+              <a:ext uri="{FF2B5EF4-FFF2-40B4-BE49-F238E27FC236}">
+                <a16:creationId xmlns:a16="http://schemas.microsoft.com/office/drawing/2014/main" id="{1202EBDE-7F64-43BD-86B7-6C228CCEC2D0}"/>
+              </a:ext>
+            </a:extLst>
+          </p:cNvPr>
+          <p:cNvPicPr>
+            <a:picLocks noChangeAspect="1"/>
+          </p:cNvPicPr>
+          <p:nvPr/>
+        </p:nvPicPr>
+        <p:blipFill>
+          <a:blip r:embed="rId2" cstate="print">
+            <a:extLst>
+              <a:ext uri="{28A0092B-C50C-407E-A947-70E740481C1C}">
+                <a14:useLocalDpi xmlns:a14="http://schemas.microsoft.com/office/drawing/2010/main" val="0"/>
+              </a:ext>
+            </a:extLst>
+          </a:blip>
+          <a:stretch>
+            <a:fillRect/>
+          </a:stretch>
+        </p:blipFill>
+        <p:spPr>
+          <a:xfrm>
+            <a:off x="6598915" y="0"/>
+            <a:ext cx="2545085" cy="3294895"/>
+          </a:xfrm>
+          <a:prstGeom prst="rect">
+            <a:avLst/>
+          </a:prstGeom>
+        </p:spPr>
+      </p:pic>
+      <p:pic>
+        <p:nvPicPr>
+          <p:cNvPr id="4" name="圖片 3">
+            <a:extLst>
+              <a:ext uri="{FF2B5EF4-FFF2-40B4-BE49-F238E27FC236}">
+                <a16:creationId xmlns:a16="http://schemas.microsoft.com/office/drawing/2014/main" id="{AEFF5069-0FA7-44E7-AEEE-225463C6B1AC}"/>
+              </a:ext>
+            </a:extLst>
+          </p:cNvPr>
+          <p:cNvPicPr>
+            <a:picLocks noChangeAspect="1"/>
+          </p:cNvPicPr>
+          <p:nvPr/>
+        </p:nvPicPr>
+        <p:blipFill>
+          <a:blip r:embed="rId3" cstate="print">
+            <a:extLst>
+              <a:ext uri="{28A0092B-C50C-407E-A947-70E740481C1C}">
+                <a14:useLocalDpi xmlns:a14="http://schemas.microsoft.com/office/drawing/2010/main" val="0"/>
+              </a:ext>
+            </a:extLst>
+          </a:blip>
+          <a:stretch>
+            <a:fillRect/>
+          </a:stretch>
+        </p:blipFill>
+        <p:spPr>
+          <a:xfrm>
+            <a:off x="0" y="4169659"/>
+            <a:ext cx="3934976" cy="2688341"/>
+          </a:xfrm>
+          <a:prstGeom prst="rect">
+            <a:avLst/>
+          </a:prstGeom>
+        </p:spPr>
+      </p:pic>
+      <p:sp>
+        <p:nvSpPr>
+          <p:cNvPr id="5" name="文字方塊 4">
+            <a:extLst>
+              <a:ext uri="{FF2B5EF4-FFF2-40B4-BE49-F238E27FC236}">
+                <a16:creationId xmlns:a16="http://schemas.microsoft.com/office/drawing/2014/main" id="{C16ED53E-9866-436B-893D-42D9B6177B63}"/>
+              </a:ext>
+            </a:extLst>
+          </p:cNvPr>
+          <p:cNvSpPr txBox="1"/>
+          <p:nvPr/>
+        </p:nvSpPr>
+        <p:spPr>
+          <a:xfrm>
+            <a:off x="661169" y="767632"/>
+            <a:ext cx="8039380" cy="4433073"/>
+          </a:xfrm>
+          <a:prstGeom prst="rect">
+            <a:avLst/>
+          </a:prstGeom>
+          <a:noFill/>
+        </p:spPr>
+        <p:txBody>
+          <a:bodyPr wrap="none" rtlCol="0">
+            <a:spAutoFit/>
+          </a:bodyPr>
+          <a:lstStyle/>
+          <a:p>
+            <a:pPr>
+              <a:lnSpc>
+                <a:spcPct val="150000"/>
+              </a:lnSpc>
+            </a:pPr>
+            <a:r>
+              <a:rPr lang="zh-TW" altLang="en-US" sz="3200" dirty="0">
+                <a:latin typeface="Arial" panose="020B0604020202020204" pitchFamily="34" charset="0"/>
+                <a:cs typeface="Arial" panose="020B0604020202020204" pitchFamily="34" charset="0"/>
+              </a:rPr>
+              <a:t>．</a:t>
+            </a:r>
+            <a:r>
+              <a:rPr lang="en-US" altLang="zh-TW" sz="3200" dirty="0">
+                <a:latin typeface="Arial" panose="020B0604020202020204" pitchFamily="34" charset="0"/>
+                <a:cs typeface="Arial" panose="020B0604020202020204" pitchFamily="34" charset="0"/>
+              </a:rPr>
+              <a:t>history of diff. branches are diff.</a:t>
+            </a:r>
+          </a:p>
+          <a:p>
+            <a:pPr>
+              <a:lnSpc>
+                <a:spcPct val="150000"/>
+              </a:lnSpc>
+            </a:pPr>
+            <a:r>
+              <a:rPr lang="zh-TW" altLang="en-US" sz="3200" dirty="0">
+                <a:latin typeface="Arial" panose="020B0604020202020204" pitchFamily="34" charset="0"/>
+                <a:cs typeface="Arial" panose="020B0604020202020204" pitchFamily="34" charset="0"/>
+              </a:rPr>
+              <a:t>．</a:t>
+            </a:r>
+            <a:r>
+              <a:rPr lang="en-US" altLang="zh-TW" sz="3200" dirty="0">
+                <a:latin typeface="Arial" panose="020B0604020202020204" pitchFamily="34" charset="0"/>
+                <a:cs typeface="Arial" panose="020B0604020202020204" pitchFamily="34" charset="0"/>
+              </a:rPr>
+              <a:t>git branch –d </a:t>
+            </a:r>
+            <a:r>
+              <a:rPr lang="en-US" altLang="zh-TW" sz="3200" dirty="0" err="1">
+                <a:latin typeface="Arial" panose="020B0604020202020204" pitchFamily="34" charset="0"/>
+                <a:cs typeface="Arial" panose="020B0604020202020204" pitchFamily="34" charset="0"/>
+              </a:rPr>
+              <a:t>branch_name</a:t>
+            </a:r>
+            <a:endParaRPr lang="en-US" altLang="zh-TW" sz="3200" dirty="0">
+              <a:latin typeface="Arial" panose="020B0604020202020204" pitchFamily="34" charset="0"/>
+              <a:cs typeface="Arial" panose="020B0604020202020204" pitchFamily="34" charset="0"/>
+            </a:endParaRPr>
+          </a:p>
+          <a:p>
+            <a:pPr>
+              <a:lnSpc>
+                <a:spcPct val="150000"/>
+              </a:lnSpc>
+            </a:pPr>
+            <a:r>
+              <a:rPr lang="zh-TW" altLang="en-US" sz="3200" dirty="0">
+                <a:latin typeface="Arial" panose="020B0604020202020204" pitchFamily="34" charset="0"/>
+                <a:cs typeface="Arial" panose="020B0604020202020204" pitchFamily="34" charset="0"/>
+              </a:rPr>
+              <a:t>．</a:t>
+            </a:r>
+            <a:r>
+              <a:rPr lang="en-US" altLang="zh-TW" sz="3200" dirty="0">
+                <a:latin typeface="Arial" panose="020B0604020202020204" pitchFamily="34" charset="0"/>
+                <a:cs typeface="Arial" panose="020B0604020202020204" pitchFamily="34" charset="0"/>
+              </a:rPr>
+              <a:t>git merge </a:t>
+            </a:r>
+            <a:r>
+              <a:rPr lang="en-US" altLang="zh-TW" sz="3200" dirty="0" err="1">
+                <a:latin typeface="Arial" panose="020B0604020202020204" pitchFamily="34" charset="0"/>
+                <a:cs typeface="Arial" panose="020B0604020202020204" pitchFamily="34" charset="0"/>
+              </a:rPr>
+              <a:t>branch_name</a:t>
+            </a:r>
+            <a:endParaRPr lang="en-US" altLang="zh-TW" sz="3200" dirty="0">
+              <a:latin typeface="Arial" panose="020B0604020202020204" pitchFamily="34" charset="0"/>
+              <a:cs typeface="Arial" panose="020B0604020202020204" pitchFamily="34" charset="0"/>
+            </a:endParaRPr>
+          </a:p>
+          <a:p>
+            <a:pPr>
+              <a:lnSpc>
+                <a:spcPct val="150000"/>
+              </a:lnSpc>
+            </a:pPr>
+            <a:r>
+              <a:rPr lang="zh-TW" altLang="en-US" sz="3200" dirty="0">
+                <a:latin typeface="Arial" panose="020B0604020202020204" pitchFamily="34" charset="0"/>
+                <a:cs typeface="Arial" panose="020B0604020202020204" pitchFamily="34" charset="0"/>
+              </a:rPr>
+              <a:t>．</a:t>
+            </a:r>
+            <a:r>
+              <a:rPr lang="en-US" altLang="zh-TW" sz="3200" dirty="0">
+                <a:latin typeface="Arial" panose="020B0604020202020204" pitchFamily="34" charset="0"/>
+                <a:cs typeface="Arial" panose="020B0604020202020204" pitchFamily="34" charset="0"/>
+              </a:rPr>
+              <a:t>fast-forward merge (when no diverge)</a:t>
+            </a:r>
+          </a:p>
+          <a:p>
+            <a:pPr>
+              <a:lnSpc>
+                <a:spcPct val="150000"/>
+              </a:lnSpc>
+            </a:pPr>
+            <a:r>
+              <a:rPr lang="zh-TW" altLang="en-US" sz="3200" dirty="0">
+                <a:latin typeface="Arial" panose="020B0604020202020204" pitchFamily="34" charset="0"/>
+                <a:cs typeface="Arial" panose="020B0604020202020204" pitchFamily="34" charset="0"/>
+              </a:rPr>
+              <a:t>．</a:t>
+            </a:r>
+            <a:r>
+              <a:rPr lang="en-US" altLang="zh-TW" sz="3200" dirty="0">
+                <a:latin typeface="Arial" panose="020B0604020202020204" pitchFamily="34" charset="0"/>
+                <a:cs typeface="Arial" panose="020B0604020202020204" pitchFamily="34" charset="0"/>
+              </a:rPr>
+              <a:t>three-way merge (diverge but no conflict)</a:t>
+            </a:r>
+          </a:p>
+          <a:p>
+            <a:pPr>
+              <a:lnSpc>
+                <a:spcPct val="150000"/>
+              </a:lnSpc>
+            </a:pPr>
+            <a:r>
+              <a:rPr lang="zh-TW" altLang="en-US" sz="3200" dirty="0">
+                <a:latin typeface="Arial" panose="020B0604020202020204" pitchFamily="34" charset="0"/>
+                <a:cs typeface="Arial" panose="020B0604020202020204" pitchFamily="34" charset="0"/>
+              </a:rPr>
+              <a:t>．</a:t>
+            </a:r>
+            <a:r>
+              <a:rPr lang="en-US" altLang="zh-TW" sz="3200" dirty="0">
+                <a:latin typeface="Arial" panose="020B0604020202020204" pitchFamily="34" charset="0"/>
+                <a:cs typeface="Arial" panose="020B0604020202020204" pitchFamily="34" charset="0"/>
+              </a:rPr>
+              <a:t>conflict ? Fix it, add, and commit </a:t>
+            </a:r>
+          </a:p>
+        </p:txBody>
+      </p:sp>
+    </p:spTree>
+    <p:extLst>
+      <p:ext uri="{BB962C8B-B14F-4D97-AF65-F5344CB8AC3E}">
+        <p14:creationId xmlns:p14="http://schemas.microsoft.com/office/powerpoint/2010/main" val="1609292287"/>
       </p:ext>
     </p:extLst>
   </p:cSld>
@@ -7852,6 +9543,1241 @@
 </p:sld>
 </file>
 
+<file path=ppt/slides/slide30.xml><?xml version="1.0" encoding="utf-8"?>
+<p:sld xmlns:a="http://schemas.openxmlformats.org/drawingml/2006/main" xmlns:r="http://schemas.openxmlformats.org/officeDocument/2006/relationships" xmlns:p="http://schemas.openxmlformats.org/presentationml/2006/main">
+  <p:cSld>
+    <p:spTree>
+      <p:nvGrpSpPr>
+        <p:cNvPr id="1" name=""/>
+        <p:cNvGrpSpPr/>
+        <p:nvPr/>
+      </p:nvGrpSpPr>
+      <p:grpSpPr>
+        <a:xfrm>
+          <a:off x="0" y="0"/>
+          <a:ext cx="0" cy="0"/>
+          <a:chOff x="0" y="0"/>
+          <a:chExt cx="0" cy="0"/>
+        </a:xfrm>
+      </p:grpSpPr>
+      <p:pic>
+        <p:nvPicPr>
+          <p:cNvPr id="3" name="圖片 2">
+            <a:extLst>
+              <a:ext uri="{FF2B5EF4-FFF2-40B4-BE49-F238E27FC236}">
+                <a16:creationId xmlns:a16="http://schemas.microsoft.com/office/drawing/2014/main" id="{1202EBDE-7F64-43BD-86B7-6C228CCEC2D0}"/>
+              </a:ext>
+            </a:extLst>
+          </p:cNvPr>
+          <p:cNvPicPr>
+            <a:picLocks noChangeAspect="1"/>
+          </p:cNvPicPr>
+          <p:nvPr/>
+        </p:nvPicPr>
+        <p:blipFill>
+          <a:blip r:embed="rId2" cstate="print">
+            <a:extLst>
+              <a:ext uri="{28A0092B-C50C-407E-A947-70E740481C1C}">
+                <a14:useLocalDpi xmlns:a14="http://schemas.microsoft.com/office/drawing/2010/main" val="0"/>
+              </a:ext>
+            </a:extLst>
+          </a:blip>
+          <a:stretch>
+            <a:fillRect/>
+          </a:stretch>
+        </p:blipFill>
+        <p:spPr>
+          <a:xfrm>
+            <a:off x="6598915" y="0"/>
+            <a:ext cx="2545085" cy="3294895"/>
+          </a:xfrm>
+          <a:prstGeom prst="rect">
+            <a:avLst/>
+          </a:prstGeom>
+        </p:spPr>
+      </p:pic>
+      <p:pic>
+        <p:nvPicPr>
+          <p:cNvPr id="4" name="圖片 3">
+            <a:extLst>
+              <a:ext uri="{FF2B5EF4-FFF2-40B4-BE49-F238E27FC236}">
+                <a16:creationId xmlns:a16="http://schemas.microsoft.com/office/drawing/2014/main" id="{AEFF5069-0FA7-44E7-AEEE-225463C6B1AC}"/>
+              </a:ext>
+            </a:extLst>
+          </p:cNvPr>
+          <p:cNvPicPr>
+            <a:picLocks noChangeAspect="1"/>
+          </p:cNvPicPr>
+          <p:nvPr/>
+        </p:nvPicPr>
+        <p:blipFill>
+          <a:blip r:embed="rId3" cstate="print">
+            <a:extLst>
+              <a:ext uri="{28A0092B-C50C-407E-A947-70E740481C1C}">
+                <a14:useLocalDpi xmlns:a14="http://schemas.microsoft.com/office/drawing/2010/main" val="0"/>
+              </a:ext>
+            </a:extLst>
+          </a:blip>
+          <a:stretch>
+            <a:fillRect/>
+          </a:stretch>
+        </p:blipFill>
+        <p:spPr>
+          <a:xfrm>
+            <a:off x="0" y="4169659"/>
+            <a:ext cx="3934976" cy="2688341"/>
+          </a:xfrm>
+          <a:prstGeom prst="rect">
+            <a:avLst/>
+          </a:prstGeom>
+        </p:spPr>
+      </p:pic>
+      <p:cxnSp>
+        <p:nvCxnSpPr>
+          <p:cNvPr id="5" name="直線接點 4">
+            <a:extLst>
+              <a:ext uri="{FF2B5EF4-FFF2-40B4-BE49-F238E27FC236}">
+                <a16:creationId xmlns:a16="http://schemas.microsoft.com/office/drawing/2014/main" id="{D1762274-47D1-40FE-B255-A9D5DEA69D48}"/>
+              </a:ext>
+            </a:extLst>
+          </p:cNvPr>
+          <p:cNvCxnSpPr>
+            <a:cxnSpLocks/>
+          </p:cNvCxnSpPr>
+          <p:nvPr/>
+        </p:nvCxnSpPr>
+        <p:spPr>
+          <a:xfrm>
+            <a:off x="678535" y="637564"/>
+            <a:ext cx="285226" cy="503339"/>
+          </a:xfrm>
+          <a:prstGeom prst="line">
+            <a:avLst/>
+          </a:prstGeom>
+          <a:ln w="28575">
+            <a:solidFill>
+              <a:schemeClr val="bg1">
+                <a:lumMod val="50000"/>
+              </a:schemeClr>
+            </a:solidFill>
+          </a:ln>
+        </p:spPr>
+        <p:style>
+          <a:lnRef idx="1">
+            <a:schemeClr val="accent1"/>
+          </a:lnRef>
+          <a:fillRef idx="0">
+            <a:schemeClr val="accent1"/>
+          </a:fillRef>
+          <a:effectRef idx="0">
+            <a:schemeClr val="accent1"/>
+          </a:effectRef>
+          <a:fontRef idx="minor">
+            <a:schemeClr val="tx1"/>
+          </a:fontRef>
+        </p:style>
+      </p:cxnSp>
+      <p:cxnSp>
+        <p:nvCxnSpPr>
+          <p:cNvPr id="6" name="直線接點 5">
+            <a:extLst>
+              <a:ext uri="{FF2B5EF4-FFF2-40B4-BE49-F238E27FC236}">
+                <a16:creationId xmlns:a16="http://schemas.microsoft.com/office/drawing/2014/main" id="{E2569004-F964-4D54-83A1-1EDA6D9EF198}"/>
+              </a:ext>
+            </a:extLst>
+          </p:cNvPr>
+          <p:cNvCxnSpPr>
+            <a:cxnSpLocks/>
+          </p:cNvCxnSpPr>
+          <p:nvPr/>
+        </p:nvCxnSpPr>
+        <p:spPr>
+          <a:xfrm>
+            <a:off x="963761" y="1140903"/>
+            <a:ext cx="3162650" cy="0"/>
+          </a:xfrm>
+          <a:prstGeom prst="line">
+            <a:avLst/>
+          </a:prstGeom>
+          <a:ln w="28575">
+            <a:solidFill>
+              <a:schemeClr val="bg1">
+                <a:lumMod val="50000"/>
+              </a:schemeClr>
+            </a:solidFill>
+          </a:ln>
+        </p:spPr>
+        <p:style>
+          <a:lnRef idx="1">
+            <a:schemeClr val="accent1"/>
+          </a:lnRef>
+          <a:fillRef idx="0">
+            <a:schemeClr val="accent1"/>
+          </a:fillRef>
+          <a:effectRef idx="0">
+            <a:schemeClr val="accent1"/>
+          </a:effectRef>
+          <a:fontRef idx="minor">
+            <a:schemeClr val="tx1"/>
+          </a:fontRef>
+        </p:style>
+      </p:cxnSp>
+      <p:cxnSp>
+        <p:nvCxnSpPr>
+          <p:cNvPr id="7" name="直線接點 6">
+            <a:extLst>
+              <a:ext uri="{FF2B5EF4-FFF2-40B4-BE49-F238E27FC236}">
+                <a16:creationId xmlns:a16="http://schemas.microsoft.com/office/drawing/2014/main" id="{139F4661-2B2F-46A0-8E8F-96ADBA363B4C}"/>
+              </a:ext>
+            </a:extLst>
+          </p:cNvPr>
+          <p:cNvCxnSpPr>
+            <a:cxnSpLocks/>
+          </p:cNvCxnSpPr>
+          <p:nvPr/>
+        </p:nvCxnSpPr>
+        <p:spPr>
+          <a:xfrm>
+            <a:off x="4126411" y="1140904"/>
+            <a:ext cx="285226" cy="503339"/>
+          </a:xfrm>
+          <a:prstGeom prst="line">
+            <a:avLst/>
+          </a:prstGeom>
+          <a:ln w="28575">
+            <a:solidFill>
+              <a:schemeClr val="bg1">
+                <a:lumMod val="50000"/>
+              </a:schemeClr>
+            </a:solidFill>
+          </a:ln>
+        </p:spPr>
+        <p:style>
+          <a:lnRef idx="1">
+            <a:schemeClr val="accent1"/>
+          </a:lnRef>
+          <a:fillRef idx="0">
+            <a:schemeClr val="accent1"/>
+          </a:fillRef>
+          <a:effectRef idx="0">
+            <a:schemeClr val="accent1"/>
+          </a:effectRef>
+          <a:fontRef idx="minor">
+            <a:schemeClr val="tx1"/>
+          </a:fontRef>
+        </p:style>
+      </p:cxnSp>
+      <p:sp>
+        <p:nvSpPr>
+          <p:cNvPr id="8" name="文字方塊 7">
+            <a:extLst>
+              <a:ext uri="{FF2B5EF4-FFF2-40B4-BE49-F238E27FC236}">
+                <a16:creationId xmlns:a16="http://schemas.microsoft.com/office/drawing/2014/main" id="{2E3C98C0-256E-47E3-92E0-EFFAA4DD8CD0}"/>
+              </a:ext>
+            </a:extLst>
+          </p:cNvPr>
+          <p:cNvSpPr txBox="1"/>
+          <p:nvPr/>
+        </p:nvSpPr>
+        <p:spPr>
+          <a:xfrm>
+            <a:off x="963761" y="433017"/>
+            <a:ext cx="1909497" cy="707886"/>
+          </a:xfrm>
+          <a:prstGeom prst="rect">
+            <a:avLst/>
+          </a:prstGeom>
+          <a:noFill/>
+        </p:spPr>
+        <p:txBody>
+          <a:bodyPr wrap="none" rtlCol="0">
+            <a:spAutoFit/>
+          </a:bodyPr>
+          <a:lstStyle/>
+          <a:p>
+            <a:r>
+              <a:rPr lang="en-US" altLang="zh-TW" sz="4000" dirty="0">
+                <a:latin typeface="微軟正黑體" panose="020B0604030504040204" pitchFamily="34" charset="-120"/>
+                <a:ea typeface="微軟正黑體" panose="020B0604030504040204" pitchFamily="34" charset="-120"/>
+                <a:cs typeface="Times New Roman" panose="02020603050405020304" pitchFamily="18" charset="0"/>
+              </a:rPr>
+              <a:t>GitHub</a:t>
+            </a:r>
+            <a:endParaRPr lang="zh-TW" altLang="en-US" sz="4000" dirty="0">
+              <a:latin typeface="微軟正黑體" panose="020B0604030504040204" pitchFamily="34" charset="-120"/>
+              <a:ea typeface="微軟正黑體" panose="020B0604030504040204" pitchFamily="34" charset="-120"/>
+              <a:cs typeface="Times New Roman" panose="02020603050405020304" pitchFamily="18" charset="0"/>
+            </a:endParaRPr>
+          </a:p>
+        </p:txBody>
+      </p:sp>
+      <p:pic>
+        <p:nvPicPr>
+          <p:cNvPr id="10" name="圖片 9">
+            <a:hlinkClick r:id="rId4"/>
+            <a:extLst>
+              <a:ext uri="{FF2B5EF4-FFF2-40B4-BE49-F238E27FC236}">
+                <a16:creationId xmlns:a16="http://schemas.microsoft.com/office/drawing/2014/main" id="{65BE1B23-F44B-401E-B019-58749DAFAF89}"/>
+              </a:ext>
+            </a:extLst>
+          </p:cNvPr>
+          <p:cNvPicPr>
+            <a:picLocks noChangeAspect="1"/>
+          </p:cNvPicPr>
+          <p:nvPr/>
+        </p:nvPicPr>
+        <p:blipFill rotWithShape="1">
+          <a:blip r:embed="rId5">
+            <a:extLst>
+              <a:ext uri="{28A0092B-C50C-407E-A947-70E740481C1C}">
+                <a14:useLocalDpi xmlns:a14="http://schemas.microsoft.com/office/drawing/2010/main" val="0"/>
+              </a:ext>
+            </a:extLst>
+          </a:blip>
+          <a:srcRect l="19450" r="19633"/>
+          <a:stretch/>
+        </p:blipFill>
+        <p:spPr>
+          <a:xfrm>
+            <a:off x="2570337" y="2259784"/>
+            <a:ext cx="4003325" cy="3450155"/>
+          </a:xfrm>
+          <a:prstGeom prst="rect">
+            <a:avLst/>
+          </a:prstGeom>
+        </p:spPr>
+      </p:pic>
+    </p:spTree>
+    <p:extLst>
+      <p:ext uri="{BB962C8B-B14F-4D97-AF65-F5344CB8AC3E}">
+        <p14:creationId xmlns:p14="http://schemas.microsoft.com/office/powerpoint/2010/main" val="2013825449"/>
+      </p:ext>
+    </p:extLst>
+  </p:cSld>
+  <p:clrMapOvr>
+    <a:masterClrMapping/>
+  </p:clrMapOvr>
+</p:sld>
+</file>
+
+<file path=ppt/slides/slide31.xml><?xml version="1.0" encoding="utf-8"?>
+<p:sld xmlns:a="http://schemas.openxmlformats.org/drawingml/2006/main" xmlns:r="http://schemas.openxmlformats.org/officeDocument/2006/relationships" xmlns:p="http://schemas.openxmlformats.org/presentationml/2006/main">
+  <p:cSld>
+    <p:spTree>
+      <p:nvGrpSpPr>
+        <p:cNvPr id="1" name=""/>
+        <p:cNvGrpSpPr/>
+        <p:nvPr/>
+      </p:nvGrpSpPr>
+      <p:grpSpPr>
+        <a:xfrm>
+          <a:off x="0" y="0"/>
+          <a:ext cx="0" cy="0"/>
+          <a:chOff x="0" y="0"/>
+          <a:chExt cx="0" cy="0"/>
+        </a:xfrm>
+      </p:grpSpPr>
+      <p:pic>
+        <p:nvPicPr>
+          <p:cNvPr id="3" name="圖片 2">
+            <a:extLst>
+              <a:ext uri="{FF2B5EF4-FFF2-40B4-BE49-F238E27FC236}">
+                <a16:creationId xmlns:a16="http://schemas.microsoft.com/office/drawing/2014/main" id="{1202EBDE-7F64-43BD-86B7-6C228CCEC2D0}"/>
+              </a:ext>
+            </a:extLst>
+          </p:cNvPr>
+          <p:cNvPicPr>
+            <a:picLocks noChangeAspect="1"/>
+          </p:cNvPicPr>
+          <p:nvPr/>
+        </p:nvPicPr>
+        <p:blipFill>
+          <a:blip r:embed="rId2" cstate="print">
+            <a:extLst>
+              <a:ext uri="{28A0092B-C50C-407E-A947-70E740481C1C}">
+                <a14:useLocalDpi xmlns:a14="http://schemas.microsoft.com/office/drawing/2010/main" val="0"/>
+              </a:ext>
+            </a:extLst>
+          </a:blip>
+          <a:stretch>
+            <a:fillRect/>
+          </a:stretch>
+        </p:blipFill>
+        <p:spPr>
+          <a:xfrm>
+            <a:off x="6598915" y="0"/>
+            <a:ext cx="2545085" cy="3294895"/>
+          </a:xfrm>
+          <a:prstGeom prst="rect">
+            <a:avLst/>
+          </a:prstGeom>
+        </p:spPr>
+      </p:pic>
+      <p:pic>
+        <p:nvPicPr>
+          <p:cNvPr id="4" name="圖片 3">
+            <a:extLst>
+              <a:ext uri="{FF2B5EF4-FFF2-40B4-BE49-F238E27FC236}">
+                <a16:creationId xmlns:a16="http://schemas.microsoft.com/office/drawing/2014/main" id="{AEFF5069-0FA7-44E7-AEEE-225463C6B1AC}"/>
+              </a:ext>
+            </a:extLst>
+          </p:cNvPr>
+          <p:cNvPicPr>
+            <a:picLocks noChangeAspect="1"/>
+          </p:cNvPicPr>
+          <p:nvPr/>
+        </p:nvPicPr>
+        <p:blipFill>
+          <a:blip r:embed="rId3" cstate="print">
+            <a:extLst>
+              <a:ext uri="{28A0092B-C50C-407E-A947-70E740481C1C}">
+                <a14:useLocalDpi xmlns:a14="http://schemas.microsoft.com/office/drawing/2010/main" val="0"/>
+              </a:ext>
+            </a:extLst>
+          </a:blip>
+          <a:stretch>
+            <a:fillRect/>
+          </a:stretch>
+        </p:blipFill>
+        <p:spPr>
+          <a:xfrm>
+            <a:off x="0" y="4169659"/>
+            <a:ext cx="3934976" cy="2688341"/>
+          </a:xfrm>
+          <a:prstGeom prst="rect">
+            <a:avLst/>
+          </a:prstGeom>
+        </p:spPr>
+      </p:pic>
+    </p:spTree>
+    <p:extLst>
+      <p:ext uri="{BB962C8B-B14F-4D97-AF65-F5344CB8AC3E}">
+        <p14:creationId xmlns:p14="http://schemas.microsoft.com/office/powerpoint/2010/main" val="680710026"/>
+      </p:ext>
+    </p:extLst>
+  </p:cSld>
+  <p:clrMapOvr>
+    <a:masterClrMapping/>
+  </p:clrMapOvr>
+</p:sld>
+</file>
+
+<file path=ppt/slides/slide32.xml><?xml version="1.0" encoding="utf-8"?>
+<p:sld xmlns:a="http://schemas.openxmlformats.org/drawingml/2006/main" xmlns:r="http://schemas.openxmlformats.org/officeDocument/2006/relationships" xmlns:p="http://schemas.openxmlformats.org/presentationml/2006/main">
+  <p:cSld>
+    <p:spTree>
+      <p:nvGrpSpPr>
+        <p:cNvPr id="1" name=""/>
+        <p:cNvGrpSpPr/>
+        <p:nvPr/>
+      </p:nvGrpSpPr>
+      <p:grpSpPr>
+        <a:xfrm>
+          <a:off x="0" y="0"/>
+          <a:ext cx="0" cy="0"/>
+          <a:chOff x="0" y="0"/>
+          <a:chExt cx="0" cy="0"/>
+        </a:xfrm>
+      </p:grpSpPr>
+      <p:pic>
+        <p:nvPicPr>
+          <p:cNvPr id="3" name="圖片 2">
+            <a:extLst>
+              <a:ext uri="{FF2B5EF4-FFF2-40B4-BE49-F238E27FC236}">
+                <a16:creationId xmlns:a16="http://schemas.microsoft.com/office/drawing/2014/main" id="{1202EBDE-7F64-43BD-86B7-6C228CCEC2D0}"/>
+              </a:ext>
+            </a:extLst>
+          </p:cNvPr>
+          <p:cNvPicPr>
+            <a:picLocks noChangeAspect="1"/>
+          </p:cNvPicPr>
+          <p:nvPr/>
+        </p:nvPicPr>
+        <p:blipFill>
+          <a:blip r:embed="rId2" cstate="print">
+            <a:extLst>
+              <a:ext uri="{28A0092B-C50C-407E-A947-70E740481C1C}">
+                <a14:useLocalDpi xmlns:a14="http://schemas.microsoft.com/office/drawing/2010/main" val="0"/>
+              </a:ext>
+            </a:extLst>
+          </a:blip>
+          <a:stretch>
+            <a:fillRect/>
+          </a:stretch>
+        </p:blipFill>
+        <p:spPr>
+          <a:xfrm>
+            <a:off x="6598915" y="0"/>
+            <a:ext cx="2545085" cy="3294895"/>
+          </a:xfrm>
+          <a:prstGeom prst="rect">
+            <a:avLst/>
+          </a:prstGeom>
+        </p:spPr>
+      </p:pic>
+      <p:pic>
+        <p:nvPicPr>
+          <p:cNvPr id="4" name="圖片 3">
+            <a:extLst>
+              <a:ext uri="{FF2B5EF4-FFF2-40B4-BE49-F238E27FC236}">
+                <a16:creationId xmlns:a16="http://schemas.microsoft.com/office/drawing/2014/main" id="{AEFF5069-0FA7-44E7-AEEE-225463C6B1AC}"/>
+              </a:ext>
+            </a:extLst>
+          </p:cNvPr>
+          <p:cNvPicPr>
+            <a:picLocks noChangeAspect="1"/>
+          </p:cNvPicPr>
+          <p:nvPr/>
+        </p:nvPicPr>
+        <p:blipFill>
+          <a:blip r:embed="rId3" cstate="print">
+            <a:extLst>
+              <a:ext uri="{28A0092B-C50C-407E-A947-70E740481C1C}">
+                <a14:useLocalDpi xmlns:a14="http://schemas.microsoft.com/office/drawing/2010/main" val="0"/>
+              </a:ext>
+            </a:extLst>
+          </a:blip>
+          <a:stretch>
+            <a:fillRect/>
+          </a:stretch>
+        </p:blipFill>
+        <p:spPr>
+          <a:xfrm>
+            <a:off x="0" y="4169659"/>
+            <a:ext cx="3934976" cy="2688341"/>
+          </a:xfrm>
+          <a:prstGeom prst="rect">
+            <a:avLst/>
+          </a:prstGeom>
+        </p:spPr>
+      </p:pic>
+    </p:spTree>
+    <p:extLst>
+      <p:ext uri="{BB962C8B-B14F-4D97-AF65-F5344CB8AC3E}">
+        <p14:creationId xmlns:p14="http://schemas.microsoft.com/office/powerpoint/2010/main" val="3810482808"/>
+      </p:ext>
+    </p:extLst>
+  </p:cSld>
+  <p:clrMapOvr>
+    <a:masterClrMapping/>
+  </p:clrMapOvr>
+</p:sld>
+</file>
+
+<file path=ppt/slides/slide33.xml><?xml version="1.0" encoding="utf-8"?>
+<p:sld xmlns:a="http://schemas.openxmlformats.org/drawingml/2006/main" xmlns:r="http://schemas.openxmlformats.org/officeDocument/2006/relationships" xmlns:p="http://schemas.openxmlformats.org/presentationml/2006/main">
+  <p:cSld>
+    <p:spTree>
+      <p:nvGrpSpPr>
+        <p:cNvPr id="1" name=""/>
+        <p:cNvGrpSpPr/>
+        <p:nvPr/>
+      </p:nvGrpSpPr>
+      <p:grpSpPr>
+        <a:xfrm>
+          <a:off x="0" y="0"/>
+          <a:ext cx="0" cy="0"/>
+          <a:chOff x="0" y="0"/>
+          <a:chExt cx="0" cy="0"/>
+        </a:xfrm>
+      </p:grpSpPr>
+      <p:pic>
+        <p:nvPicPr>
+          <p:cNvPr id="3" name="圖片 2">
+            <a:extLst>
+              <a:ext uri="{FF2B5EF4-FFF2-40B4-BE49-F238E27FC236}">
+                <a16:creationId xmlns:a16="http://schemas.microsoft.com/office/drawing/2014/main" id="{1202EBDE-7F64-43BD-86B7-6C228CCEC2D0}"/>
+              </a:ext>
+            </a:extLst>
+          </p:cNvPr>
+          <p:cNvPicPr>
+            <a:picLocks noChangeAspect="1"/>
+          </p:cNvPicPr>
+          <p:nvPr/>
+        </p:nvPicPr>
+        <p:blipFill>
+          <a:blip r:embed="rId2" cstate="print">
+            <a:extLst>
+              <a:ext uri="{28A0092B-C50C-407E-A947-70E740481C1C}">
+                <a14:useLocalDpi xmlns:a14="http://schemas.microsoft.com/office/drawing/2010/main" val="0"/>
+              </a:ext>
+            </a:extLst>
+          </a:blip>
+          <a:stretch>
+            <a:fillRect/>
+          </a:stretch>
+        </p:blipFill>
+        <p:spPr>
+          <a:xfrm>
+            <a:off x="6598915" y="0"/>
+            <a:ext cx="2545085" cy="3294895"/>
+          </a:xfrm>
+          <a:prstGeom prst="rect">
+            <a:avLst/>
+          </a:prstGeom>
+        </p:spPr>
+      </p:pic>
+      <p:pic>
+        <p:nvPicPr>
+          <p:cNvPr id="4" name="圖片 3">
+            <a:extLst>
+              <a:ext uri="{FF2B5EF4-FFF2-40B4-BE49-F238E27FC236}">
+                <a16:creationId xmlns:a16="http://schemas.microsoft.com/office/drawing/2014/main" id="{AEFF5069-0FA7-44E7-AEEE-225463C6B1AC}"/>
+              </a:ext>
+            </a:extLst>
+          </p:cNvPr>
+          <p:cNvPicPr>
+            <a:picLocks noChangeAspect="1"/>
+          </p:cNvPicPr>
+          <p:nvPr/>
+        </p:nvPicPr>
+        <p:blipFill>
+          <a:blip r:embed="rId3" cstate="print">
+            <a:extLst>
+              <a:ext uri="{28A0092B-C50C-407E-A947-70E740481C1C}">
+                <a14:useLocalDpi xmlns:a14="http://schemas.microsoft.com/office/drawing/2010/main" val="0"/>
+              </a:ext>
+            </a:extLst>
+          </a:blip>
+          <a:stretch>
+            <a:fillRect/>
+          </a:stretch>
+        </p:blipFill>
+        <p:spPr>
+          <a:xfrm>
+            <a:off x="0" y="4169659"/>
+            <a:ext cx="3934976" cy="2688341"/>
+          </a:xfrm>
+          <a:prstGeom prst="rect">
+            <a:avLst/>
+          </a:prstGeom>
+        </p:spPr>
+      </p:pic>
+    </p:spTree>
+    <p:extLst>
+      <p:ext uri="{BB962C8B-B14F-4D97-AF65-F5344CB8AC3E}">
+        <p14:creationId xmlns:p14="http://schemas.microsoft.com/office/powerpoint/2010/main" val="4116190145"/>
+      </p:ext>
+    </p:extLst>
+  </p:cSld>
+  <p:clrMapOvr>
+    <a:masterClrMapping/>
+  </p:clrMapOvr>
+</p:sld>
+</file>
+
+<file path=ppt/slides/slide34.xml><?xml version="1.0" encoding="utf-8"?>
+<p:sld xmlns:a="http://schemas.openxmlformats.org/drawingml/2006/main" xmlns:r="http://schemas.openxmlformats.org/officeDocument/2006/relationships" xmlns:p="http://schemas.openxmlformats.org/presentationml/2006/main">
+  <p:cSld>
+    <p:spTree>
+      <p:nvGrpSpPr>
+        <p:cNvPr id="1" name=""/>
+        <p:cNvGrpSpPr/>
+        <p:nvPr/>
+      </p:nvGrpSpPr>
+      <p:grpSpPr>
+        <a:xfrm>
+          <a:off x="0" y="0"/>
+          <a:ext cx="0" cy="0"/>
+          <a:chOff x="0" y="0"/>
+          <a:chExt cx="0" cy="0"/>
+        </a:xfrm>
+      </p:grpSpPr>
+      <p:pic>
+        <p:nvPicPr>
+          <p:cNvPr id="3" name="圖片 2">
+            <a:extLst>
+              <a:ext uri="{FF2B5EF4-FFF2-40B4-BE49-F238E27FC236}">
+                <a16:creationId xmlns:a16="http://schemas.microsoft.com/office/drawing/2014/main" id="{1202EBDE-7F64-43BD-86B7-6C228CCEC2D0}"/>
+              </a:ext>
+            </a:extLst>
+          </p:cNvPr>
+          <p:cNvPicPr>
+            <a:picLocks noChangeAspect="1"/>
+          </p:cNvPicPr>
+          <p:nvPr/>
+        </p:nvPicPr>
+        <p:blipFill>
+          <a:blip r:embed="rId2" cstate="print">
+            <a:extLst>
+              <a:ext uri="{28A0092B-C50C-407E-A947-70E740481C1C}">
+                <a14:useLocalDpi xmlns:a14="http://schemas.microsoft.com/office/drawing/2010/main" val="0"/>
+              </a:ext>
+            </a:extLst>
+          </a:blip>
+          <a:stretch>
+            <a:fillRect/>
+          </a:stretch>
+        </p:blipFill>
+        <p:spPr>
+          <a:xfrm>
+            <a:off x="6598915" y="0"/>
+            <a:ext cx="2545085" cy="3294895"/>
+          </a:xfrm>
+          <a:prstGeom prst="rect">
+            <a:avLst/>
+          </a:prstGeom>
+        </p:spPr>
+      </p:pic>
+      <p:pic>
+        <p:nvPicPr>
+          <p:cNvPr id="4" name="圖片 3">
+            <a:extLst>
+              <a:ext uri="{FF2B5EF4-FFF2-40B4-BE49-F238E27FC236}">
+                <a16:creationId xmlns:a16="http://schemas.microsoft.com/office/drawing/2014/main" id="{AEFF5069-0FA7-44E7-AEEE-225463C6B1AC}"/>
+              </a:ext>
+            </a:extLst>
+          </p:cNvPr>
+          <p:cNvPicPr>
+            <a:picLocks noChangeAspect="1"/>
+          </p:cNvPicPr>
+          <p:nvPr/>
+        </p:nvPicPr>
+        <p:blipFill>
+          <a:blip r:embed="rId3" cstate="print">
+            <a:extLst>
+              <a:ext uri="{28A0092B-C50C-407E-A947-70E740481C1C}">
+                <a14:useLocalDpi xmlns:a14="http://schemas.microsoft.com/office/drawing/2010/main" val="0"/>
+              </a:ext>
+            </a:extLst>
+          </a:blip>
+          <a:stretch>
+            <a:fillRect/>
+          </a:stretch>
+        </p:blipFill>
+        <p:spPr>
+          <a:xfrm>
+            <a:off x="0" y="4169659"/>
+            <a:ext cx="3934976" cy="2688341"/>
+          </a:xfrm>
+          <a:prstGeom prst="rect">
+            <a:avLst/>
+          </a:prstGeom>
+        </p:spPr>
+      </p:pic>
+    </p:spTree>
+    <p:extLst>
+      <p:ext uri="{BB962C8B-B14F-4D97-AF65-F5344CB8AC3E}">
+        <p14:creationId xmlns:p14="http://schemas.microsoft.com/office/powerpoint/2010/main" val="753813999"/>
+      </p:ext>
+    </p:extLst>
+  </p:cSld>
+  <p:clrMapOvr>
+    <a:masterClrMapping/>
+  </p:clrMapOvr>
+</p:sld>
+</file>
+
+<file path=ppt/slides/slide35.xml><?xml version="1.0" encoding="utf-8"?>
+<p:sld xmlns:a="http://schemas.openxmlformats.org/drawingml/2006/main" xmlns:r="http://schemas.openxmlformats.org/officeDocument/2006/relationships" xmlns:p="http://schemas.openxmlformats.org/presentationml/2006/main">
+  <p:cSld>
+    <p:spTree>
+      <p:nvGrpSpPr>
+        <p:cNvPr id="1" name=""/>
+        <p:cNvGrpSpPr/>
+        <p:nvPr/>
+      </p:nvGrpSpPr>
+      <p:grpSpPr>
+        <a:xfrm>
+          <a:off x="0" y="0"/>
+          <a:ext cx="0" cy="0"/>
+          <a:chOff x="0" y="0"/>
+          <a:chExt cx="0" cy="0"/>
+        </a:xfrm>
+      </p:grpSpPr>
+      <p:pic>
+        <p:nvPicPr>
+          <p:cNvPr id="3" name="圖片 2">
+            <a:extLst>
+              <a:ext uri="{FF2B5EF4-FFF2-40B4-BE49-F238E27FC236}">
+                <a16:creationId xmlns:a16="http://schemas.microsoft.com/office/drawing/2014/main" id="{1202EBDE-7F64-43BD-86B7-6C228CCEC2D0}"/>
+              </a:ext>
+            </a:extLst>
+          </p:cNvPr>
+          <p:cNvPicPr>
+            <a:picLocks noChangeAspect="1"/>
+          </p:cNvPicPr>
+          <p:nvPr/>
+        </p:nvPicPr>
+        <p:blipFill>
+          <a:blip r:embed="rId2" cstate="print">
+            <a:extLst>
+              <a:ext uri="{28A0092B-C50C-407E-A947-70E740481C1C}">
+                <a14:useLocalDpi xmlns:a14="http://schemas.microsoft.com/office/drawing/2010/main" val="0"/>
+              </a:ext>
+            </a:extLst>
+          </a:blip>
+          <a:stretch>
+            <a:fillRect/>
+          </a:stretch>
+        </p:blipFill>
+        <p:spPr>
+          <a:xfrm>
+            <a:off x="6598915" y="0"/>
+            <a:ext cx="2545085" cy="3294895"/>
+          </a:xfrm>
+          <a:prstGeom prst="rect">
+            <a:avLst/>
+          </a:prstGeom>
+        </p:spPr>
+      </p:pic>
+      <p:pic>
+        <p:nvPicPr>
+          <p:cNvPr id="4" name="圖片 3">
+            <a:extLst>
+              <a:ext uri="{FF2B5EF4-FFF2-40B4-BE49-F238E27FC236}">
+                <a16:creationId xmlns:a16="http://schemas.microsoft.com/office/drawing/2014/main" id="{AEFF5069-0FA7-44E7-AEEE-225463C6B1AC}"/>
+              </a:ext>
+            </a:extLst>
+          </p:cNvPr>
+          <p:cNvPicPr>
+            <a:picLocks noChangeAspect="1"/>
+          </p:cNvPicPr>
+          <p:nvPr/>
+        </p:nvPicPr>
+        <p:blipFill>
+          <a:blip r:embed="rId3" cstate="print">
+            <a:extLst>
+              <a:ext uri="{28A0092B-C50C-407E-A947-70E740481C1C}">
+                <a14:useLocalDpi xmlns:a14="http://schemas.microsoft.com/office/drawing/2010/main" val="0"/>
+              </a:ext>
+            </a:extLst>
+          </a:blip>
+          <a:stretch>
+            <a:fillRect/>
+          </a:stretch>
+        </p:blipFill>
+        <p:spPr>
+          <a:xfrm>
+            <a:off x="0" y="4169659"/>
+            <a:ext cx="3934976" cy="2688341"/>
+          </a:xfrm>
+          <a:prstGeom prst="rect">
+            <a:avLst/>
+          </a:prstGeom>
+        </p:spPr>
+      </p:pic>
+    </p:spTree>
+    <p:extLst>
+      <p:ext uri="{BB962C8B-B14F-4D97-AF65-F5344CB8AC3E}">
+        <p14:creationId xmlns:p14="http://schemas.microsoft.com/office/powerpoint/2010/main" val="1430568939"/>
+      </p:ext>
+    </p:extLst>
+  </p:cSld>
+  <p:clrMapOvr>
+    <a:masterClrMapping/>
+  </p:clrMapOvr>
+</p:sld>
+</file>
+
+<file path=ppt/slides/slide36.xml><?xml version="1.0" encoding="utf-8"?>
+<p:sld xmlns:a="http://schemas.openxmlformats.org/drawingml/2006/main" xmlns:r="http://schemas.openxmlformats.org/officeDocument/2006/relationships" xmlns:p="http://schemas.openxmlformats.org/presentationml/2006/main">
+  <p:cSld>
+    <p:spTree>
+      <p:nvGrpSpPr>
+        <p:cNvPr id="1" name=""/>
+        <p:cNvGrpSpPr/>
+        <p:nvPr/>
+      </p:nvGrpSpPr>
+      <p:grpSpPr>
+        <a:xfrm>
+          <a:off x="0" y="0"/>
+          <a:ext cx="0" cy="0"/>
+          <a:chOff x="0" y="0"/>
+          <a:chExt cx="0" cy="0"/>
+        </a:xfrm>
+      </p:grpSpPr>
+      <p:pic>
+        <p:nvPicPr>
+          <p:cNvPr id="3" name="圖片 2">
+            <a:extLst>
+              <a:ext uri="{FF2B5EF4-FFF2-40B4-BE49-F238E27FC236}">
+                <a16:creationId xmlns:a16="http://schemas.microsoft.com/office/drawing/2014/main" id="{1202EBDE-7F64-43BD-86B7-6C228CCEC2D0}"/>
+              </a:ext>
+            </a:extLst>
+          </p:cNvPr>
+          <p:cNvPicPr>
+            <a:picLocks noChangeAspect="1"/>
+          </p:cNvPicPr>
+          <p:nvPr/>
+        </p:nvPicPr>
+        <p:blipFill>
+          <a:blip r:embed="rId2" cstate="print">
+            <a:extLst>
+              <a:ext uri="{28A0092B-C50C-407E-A947-70E740481C1C}">
+                <a14:useLocalDpi xmlns:a14="http://schemas.microsoft.com/office/drawing/2010/main" val="0"/>
+              </a:ext>
+            </a:extLst>
+          </a:blip>
+          <a:stretch>
+            <a:fillRect/>
+          </a:stretch>
+        </p:blipFill>
+        <p:spPr>
+          <a:xfrm>
+            <a:off x="6598915" y="0"/>
+            <a:ext cx="2545085" cy="3294895"/>
+          </a:xfrm>
+          <a:prstGeom prst="rect">
+            <a:avLst/>
+          </a:prstGeom>
+        </p:spPr>
+      </p:pic>
+      <p:pic>
+        <p:nvPicPr>
+          <p:cNvPr id="4" name="圖片 3">
+            <a:extLst>
+              <a:ext uri="{FF2B5EF4-FFF2-40B4-BE49-F238E27FC236}">
+                <a16:creationId xmlns:a16="http://schemas.microsoft.com/office/drawing/2014/main" id="{AEFF5069-0FA7-44E7-AEEE-225463C6B1AC}"/>
+              </a:ext>
+            </a:extLst>
+          </p:cNvPr>
+          <p:cNvPicPr>
+            <a:picLocks noChangeAspect="1"/>
+          </p:cNvPicPr>
+          <p:nvPr/>
+        </p:nvPicPr>
+        <p:blipFill>
+          <a:blip r:embed="rId3" cstate="print">
+            <a:extLst>
+              <a:ext uri="{28A0092B-C50C-407E-A947-70E740481C1C}">
+                <a14:useLocalDpi xmlns:a14="http://schemas.microsoft.com/office/drawing/2010/main" val="0"/>
+              </a:ext>
+            </a:extLst>
+          </a:blip>
+          <a:stretch>
+            <a:fillRect/>
+          </a:stretch>
+        </p:blipFill>
+        <p:spPr>
+          <a:xfrm>
+            <a:off x="0" y="4169659"/>
+            <a:ext cx="3934976" cy="2688341"/>
+          </a:xfrm>
+          <a:prstGeom prst="rect">
+            <a:avLst/>
+          </a:prstGeom>
+        </p:spPr>
+      </p:pic>
+    </p:spTree>
+    <p:extLst>
+      <p:ext uri="{BB962C8B-B14F-4D97-AF65-F5344CB8AC3E}">
+        <p14:creationId xmlns:p14="http://schemas.microsoft.com/office/powerpoint/2010/main" val="1615937117"/>
+      </p:ext>
+    </p:extLst>
+  </p:cSld>
+  <p:clrMapOvr>
+    <a:masterClrMapping/>
+  </p:clrMapOvr>
+</p:sld>
+</file>
+
+<file path=ppt/slides/slide37.xml><?xml version="1.0" encoding="utf-8"?>
+<p:sld xmlns:a="http://schemas.openxmlformats.org/drawingml/2006/main" xmlns:r="http://schemas.openxmlformats.org/officeDocument/2006/relationships" xmlns:p="http://schemas.openxmlformats.org/presentationml/2006/main">
+  <p:cSld>
+    <p:spTree>
+      <p:nvGrpSpPr>
+        <p:cNvPr id="1" name=""/>
+        <p:cNvGrpSpPr/>
+        <p:nvPr/>
+      </p:nvGrpSpPr>
+      <p:grpSpPr>
+        <a:xfrm>
+          <a:off x="0" y="0"/>
+          <a:ext cx="0" cy="0"/>
+          <a:chOff x="0" y="0"/>
+          <a:chExt cx="0" cy="0"/>
+        </a:xfrm>
+      </p:grpSpPr>
+      <p:pic>
+        <p:nvPicPr>
+          <p:cNvPr id="3" name="圖片 2">
+            <a:extLst>
+              <a:ext uri="{FF2B5EF4-FFF2-40B4-BE49-F238E27FC236}">
+                <a16:creationId xmlns:a16="http://schemas.microsoft.com/office/drawing/2014/main" id="{1202EBDE-7F64-43BD-86B7-6C228CCEC2D0}"/>
+              </a:ext>
+            </a:extLst>
+          </p:cNvPr>
+          <p:cNvPicPr>
+            <a:picLocks noChangeAspect="1"/>
+          </p:cNvPicPr>
+          <p:nvPr/>
+        </p:nvPicPr>
+        <p:blipFill>
+          <a:blip r:embed="rId2" cstate="print">
+            <a:extLst>
+              <a:ext uri="{28A0092B-C50C-407E-A947-70E740481C1C}">
+                <a14:useLocalDpi xmlns:a14="http://schemas.microsoft.com/office/drawing/2010/main" val="0"/>
+              </a:ext>
+            </a:extLst>
+          </a:blip>
+          <a:stretch>
+            <a:fillRect/>
+          </a:stretch>
+        </p:blipFill>
+        <p:spPr>
+          <a:xfrm>
+            <a:off x="6598915" y="0"/>
+            <a:ext cx="2545085" cy="3294895"/>
+          </a:xfrm>
+          <a:prstGeom prst="rect">
+            <a:avLst/>
+          </a:prstGeom>
+        </p:spPr>
+      </p:pic>
+      <p:pic>
+        <p:nvPicPr>
+          <p:cNvPr id="4" name="圖片 3">
+            <a:extLst>
+              <a:ext uri="{FF2B5EF4-FFF2-40B4-BE49-F238E27FC236}">
+                <a16:creationId xmlns:a16="http://schemas.microsoft.com/office/drawing/2014/main" id="{AEFF5069-0FA7-44E7-AEEE-225463C6B1AC}"/>
+              </a:ext>
+            </a:extLst>
+          </p:cNvPr>
+          <p:cNvPicPr>
+            <a:picLocks noChangeAspect="1"/>
+          </p:cNvPicPr>
+          <p:nvPr/>
+        </p:nvPicPr>
+        <p:blipFill>
+          <a:blip r:embed="rId3" cstate="print">
+            <a:extLst>
+              <a:ext uri="{28A0092B-C50C-407E-A947-70E740481C1C}">
+                <a14:useLocalDpi xmlns:a14="http://schemas.microsoft.com/office/drawing/2010/main" val="0"/>
+              </a:ext>
+            </a:extLst>
+          </a:blip>
+          <a:stretch>
+            <a:fillRect/>
+          </a:stretch>
+        </p:blipFill>
+        <p:spPr>
+          <a:xfrm>
+            <a:off x="0" y="4169659"/>
+            <a:ext cx="3934976" cy="2688341"/>
+          </a:xfrm>
+          <a:prstGeom prst="rect">
+            <a:avLst/>
+          </a:prstGeom>
+        </p:spPr>
+      </p:pic>
+    </p:spTree>
+    <p:extLst>
+      <p:ext uri="{BB962C8B-B14F-4D97-AF65-F5344CB8AC3E}">
+        <p14:creationId xmlns:p14="http://schemas.microsoft.com/office/powerpoint/2010/main" val="1509265716"/>
+      </p:ext>
+    </p:extLst>
+  </p:cSld>
+  <p:clrMapOvr>
+    <a:masterClrMapping/>
+  </p:clrMapOvr>
+</p:sld>
+</file>
+
+<file path=ppt/slides/slide38.xml><?xml version="1.0" encoding="utf-8"?>
+<p:sld xmlns:a="http://schemas.openxmlformats.org/drawingml/2006/main" xmlns:r="http://schemas.openxmlformats.org/officeDocument/2006/relationships" xmlns:p="http://schemas.openxmlformats.org/presentationml/2006/main">
+  <p:cSld>
+    <p:spTree>
+      <p:nvGrpSpPr>
+        <p:cNvPr id="1" name=""/>
+        <p:cNvGrpSpPr/>
+        <p:nvPr/>
+      </p:nvGrpSpPr>
+      <p:grpSpPr>
+        <a:xfrm>
+          <a:off x="0" y="0"/>
+          <a:ext cx="0" cy="0"/>
+          <a:chOff x="0" y="0"/>
+          <a:chExt cx="0" cy="0"/>
+        </a:xfrm>
+      </p:grpSpPr>
+      <p:pic>
+        <p:nvPicPr>
+          <p:cNvPr id="3" name="圖片 2">
+            <a:extLst>
+              <a:ext uri="{FF2B5EF4-FFF2-40B4-BE49-F238E27FC236}">
+                <a16:creationId xmlns:a16="http://schemas.microsoft.com/office/drawing/2014/main" id="{1202EBDE-7F64-43BD-86B7-6C228CCEC2D0}"/>
+              </a:ext>
+            </a:extLst>
+          </p:cNvPr>
+          <p:cNvPicPr>
+            <a:picLocks noChangeAspect="1"/>
+          </p:cNvPicPr>
+          <p:nvPr/>
+        </p:nvPicPr>
+        <p:blipFill>
+          <a:blip r:embed="rId2" cstate="print">
+            <a:extLst>
+              <a:ext uri="{28A0092B-C50C-407E-A947-70E740481C1C}">
+                <a14:useLocalDpi xmlns:a14="http://schemas.microsoft.com/office/drawing/2010/main" val="0"/>
+              </a:ext>
+            </a:extLst>
+          </a:blip>
+          <a:stretch>
+            <a:fillRect/>
+          </a:stretch>
+        </p:blipFill>
+        <p:spPr>
+          <a:xfrm>
+            <a:off x="6598915" y="0"/>
+            <a:ext cx="2545085" cy="3294895"/>
+          </a:xfrm>
+          <a:prstGeom prst="rect">
+            <a:avLst/>
+          </a:prstGeom>
+        </p:spPr>
+      </p:pic>
+      <p:pic>
+        <p:nvPicPr>
+          <p:cNvPr id="4" name="圖片 3">
+            <a:extLst>
+              <a:ext uri="{FF2B5EF4-FFF2-40B4-BE49-F238E27FC236}">
+                <a16:creationId xmlns:a16="http://schemas.microsoft.com/office/drawing/2014/main" id="{AEFF5069-0FA7-44E7-AEEE-225463C6B1AC}"/>
+              </a:ext>
+            </a:extLst>
+          </p:cNvPr>
+          <p:cNvPicPr>
+            <a:picLocks noChangeAspect="1"/>
+          </p:cNvPicPr>
+          <p:nvPr/>
+        </p:nvPicPr>
+        <p:blipFill>
+          <a:blip r:embed="rId3" cstate="print">
+            <a:extLst>
+              <a:ext uri="{28A0092B-C50C-407E-A947-70E740481C1C}">
+                <a14:useLocalDpi xmlns:a14="http://schemas.microsoft.com/office/drawing/2010/main" val="0"/>
+              </a:ext>
+            </a:extLst>
+          </a:blip>
+          <a:stretch>
+            <a:fillRect/>
+          </a:stretch>
+        </p:blipFill>
+        <p:spPr>
+          <a:xfrm>
+            <a:off x="0" y="4169659"/>
+            <a:ext cx="3934976" cy="2688341"/>
+          </a:xfrm>
+          <a:prstGeom prst="rect">
+            <a:avLst/>
+          </a:prstGeom>
+        </p:spPr>
+      </p:pic>
+    </p:spTree>
+    <p:extLst>
+      <p:ext uri="{BB962C8B-B14F-4D97-AF65-F5344CB8AC3E}">
+        <p14:creationId xmlns:p14="http://schemas.microsoft.com/office/powerpoint/2010/main" val="2624269977"/>
+      </p:ext>
+    </p:extLst>
+  </p:cSld>
+  <p:clrMapOvr>
+    <a:masterClrMapping/>
+  </p:clrMapOvr>
+</p:sld>
+</file>
+
+<file path=ppt/slides/slide39.xml><?xml version="1.0" encoding="utf-8"?>
+<p:sld xmlns:a="http://schemas.openxmlformats.org/drawingml/2006/main" xmlns:r="http://schemas.openxmlformats.org/officeDocument/2006/relationships" xmlns:p="http://schemas.openxmlformats.org/presentationml/2006/main">
+  <p:cSld>
+    <p:spTree>
+      <p:nvGrpSpPr>
+        <p:cNvPr id="1" name=""/>
+        <p:cNvGrpSpPr/>
+        <p:nvPr/>
+      </p:nvGrpSpPr>
+      <p:grpSpPr>
+        <a:xfrm>
+          <a:off x="0" y="0"/>
+          <a:ext cx="0" cy="0"/>
+          <a:chOff x="0" y="0"/>
+          <a:chExt cx="0" cy="0"/>
+        </a:xfrm>
+      </p:grpSpPr>
+      <p:pic>
+        <p:nvPicPr>
+          <p:cNvPr id="3" name="圖片 2">
+            <a:extLst>
+              <a:ext uri="{FF2B5EF4-FFF2-40B4-BE49-F238E27FC236}">
+                <a16:creationId xmlns:a16="http://schemas.microsoft.com/office/drawing/2014/main" id="{1202EBDE-7F64-43BD-86B7-6C228CCEC2D0}"/>
+              </a:ext>
+            </a:extLst>
+          </p:cNvPr>
+          <p:cNvPicPr>
+            <a:picLocks noChangeAspect="1"/>
+          </p:cNvPicPr>
+          <p:nvPr/>
+        </p:nvPicPr>
+        <p:blipFill>
+          <a:blip r:embed="rId2" cstate="print">
+            <a:extLst>
+              <a:ext uri="{28A0092B-C50C-407E-A947-70E740481C1C}">
+                <a14:useLocalDpi xmlns:a14="http://schemas.microsoft.com/office/drawing/2010/main" val="0"/>
+              </a:ext>
+            </a:extLst>
+          </a:blip>
+          <a:stretch>
+            <a:fillRect/>
+          </a:stretch>
+        </p:blipFill>
+        <p:spPr>
+          <a:xfrm>
+            <a:off x="6598915" y="0"/>
+            <a:ext cx="2545085" cy="3294895"/>
+          </a:xfrm>
+          <a:prstGeom prst="rect">
+            <a:avLst/>
+          </a:prstGeom>
+        </p:spPr>
+      </p:pic>
+      <p:pic>
+        <p:nvPicPr>
+          <p:cNvPr id="4" name="圖片 3">
+            <a:extLst>
+              <a:ext uri="{FF2B5EF4-FFF2-40B4-BE49-F238E27FC236}">
+                <a16:creationId xmlns:a16="http://schemas.microsoft.com/office/drawing/2014/main" id="{AEFF5069-0FA7-44E7-AEEE-225463C6B1AC}"/>
+              </a:ext>
+            </a:extLst>
+          </p:cNvPr>
+          <p:cNvPicPr>
+            <a:picLocks noChangeAspect="1"/>
+          </p:cNvPicPr>
+          <p:nvPr/>
+        </p:nvPicPr>
+        <p:blipFill>
+          <a:blip r:embed="rId3" cstate="print">
+            <a:extLst>
+              <a:ext uri="{28A0092B-C50C-407E-A947-70E740481C1C}">
+                <a14:useLocalDpi xmlns:a14="http://schemas.microsoft.com/office/drawing/2010/main" val="0"/>
+              </a:ext>
+            </a:extLst>
+          </a:blip>
+          <a:stretch>
+            <a:fillRect/>
+          </a:stretch>
+        </p:blipFill>
+        <p:spPr>
+          <a:xfrm>
+            <a:off x="0" y="4169659"/>
+            <a:ext cx="3934976" cy="2688341"/>
+          </a:xfrm>
+          <a:prstGeom prst="rect">
+            <a:avLst/>
+          </a:prstGeom>
+        </p:spPr>
+      </p:pic>
+    </p:spTree>
+    <p:extLst>
+      <p:ext uri="{BB962C8B-B14F-4D97-AF65-F5344CB8AC3E}">
+        <p14:creationId xmlns:p14="http://schemas.microsoft.com/office/powerpoint/2010/main" val="3887989850"/>
+      </p:ext>
+    </p:extLst>
+  </p:cSld>
+  <p:clrMapOvr>
+    <a:masterClrMapping/>
+  </p:clrMapOvr>
+</p:sld>
+</file>
+
 <file path=ppt/slides/slide4.xml><?xml version="1.0" encoding="utf-8"?>
 <p:sld xmlns:a="http://schemas.openxmlformats.org/drawingml/2006/main" xmlns:r="http://schemas.openxmlformats.org/officeDocument/2006/relationships" xmlns:p="http://schemas.openxmlformats.org/presentationml/2006/main">
   <p:cSld>
@@ -8034,6 +10960,312 @@
     <p:extLst>
       <p:ext uri="{BB962C8B-B14F-4D97-AF65-F5344CB8AC3E}">
         <p14:creationId xmlns:p14="http://schemas.microsoft.com/office/powerpoint/2010/main" val="4236992931"/>
+      </p:ext>
+    </p:extLst>
+  </p:cSld>
+  <p:clrMapOvr>
+    <a:masterClrMapping/>
+  </p:clrMapOvr>
+</p:sld>
+</file>
+
+<file path=ppt/slides/slide40.xml><?xml version="1.0" encoding="utf-8"?>
+<p:sld xmlns:a="http://schemas.openxmlformats.org/drawingml/2006/main" xmlns:r="http://schemas.openxmlformats.org/officeDocument/2006/relationships" xmlns:p="http://schemas.openxmlformats.org/presentationml/2006/main">
+  <p:cSld>
+    <p:spTree>
+      <p:nvGrpSpPr>
+        <p:cNvPr id="1" name=""/>
+        <p:cNvGrpSpPr/>
+        <p:nvPr/>
+      </p:nvGrpSpPr>
+      <p:grpSpPr>
+        <a:xfrm>
+          <a:off x="0" y="0"/>
+          <a:ext cx="0" cy="0"/>
+          <a:chOff x="0" y="0"/>
+          <a:chExt cx="0" cy="0"/>
+        </a:xfrm>
+      </p:grpSpPr>
+      <p:pic>
+        <p:nvPicPr>
+          <p:cNvPr id="3" name="圖片 2">
+            <a:extLst>
+              <a:ext uri="{FF2B5EF4-FFF2-40B4-BE49-F238E27FC236}">
+                <a16:creationId xmlns:a16="http://schemas.microsoft.com/office/drawing/2014/main" id="{1202EBDE-7F64-43BD-86B7-6C228CCEC2D0}"/>
+              </a:ext>
+            </a:extLst>
+          </p:cNvPr>
+          <p:cNvPicPr>
+            <a:picLocks noChangeAspect="1"/>
+          </p:cNvPicPr>
+          <p:nvPr/>
+        </p:nvPicPr>
+        <p:blipFill>
+          <a:blip r:embed="rId2" cstate="print">
+            <a:extLst>
+              <a:ext uri="{28A0092B-C50C-407E-A947-70E740481C1C}">
+                <a14:useLocalDpi xmlns:a14="http://schemas.microsoft.com/office/drawing/2010/main" val="0"/>
+              </a:ext>
+            </a:extLst>
+          </a:blip>
+          <a:stretch>
+            <a:fillRect/>
+          </a:stretch>
+        </p:blipFill>
+        <p:spPr>
+          <a:xfrm>
+            <a:off x="6598915" y="0"/>
+            <a:ext cx="2545085" cy="3294895"/>
+          </a:xfrm>
+          <a:prstGeom prst="rect">
+            <a:avLst/>
+          </a:prstGeom>
+        </p:spPr>
+      </p:pic>
+      <p:pic>
+        <p:nvPicPr>
+          <p:cNvPr id="4" name="圖片 3">
+            <a:extLst>
+              <a:ext uri="{FF2B5EF4-FFF2-40B4-BE49-F238E27FC236}">
+                <a16:creationId xmlns:a16="http://schemas.microsoft.com/office/drawing/2014/main" id="{AEFF5069-0FA7-44E7-AEEE-225463C6B1AC}"/>
+              </a:ext>
+            </a:extLst>
+          </p:cNvPr>
+          <p:cNvPicPr>
+            <a:picLocks noChangeAspect="1"/>
+          </p:cNvPicPr>
+          <p:nvPr/>
+        </p:nvPicPr>
+        <p:blipFill>
+          <a:blip r:embed="rId3" cstate="print">
+            <a:extLst>
+              <a:ext uri="{28A0092B-C50C-407E-A947-70E740481C1C}">
+                <a14:useLocalDpi xmlns:a14="http://schemas.microsoft.com/office/drawing/2010/main" val="0"/>
+              </a:ext>
+            </a:extLst>
+          </a:blip>
+          <a:stretch>
+            <a:fillRect/>
+          </a:stretch>
+        </p:blipFill>
+        <p:spPr>
+          <a:xfrm>
+            <a:off x="0" y="4169659"/>
+            <a:ext cx="3934976" cy="2688341"/>
+          </a:xfrm>
+          <a:prstGeom prst="rect">
+            <a:avLst/>
+          </a:prstGeom>
+        </p:spPr>
+      </p:pic>
+    </p:spTree>
+    <p:extLst>
+      <p:ext uri="{BB962C8B-B14F-4D97-AF65-F5344CB8AC3E}">
+        <p14:creationId xmlns:p14="http://schemas.microsoft.com/office/powerpoint/2010/main" val="124486230"/>
+      </p:ext>
+    </p:extLst>
+  </p:cSld>
+  <p:clrMapOvr>
+    <a:masterClrMapping/>
+  </p:clrMapOvr>
+</p:sld>
+</file>
+
+<file path=ppt/slides/slide41.xml><?xml version="1.0" encoding="utf-8"?>
+<p:sld xmlns:a="http://schemas.openxmlformats.org/drawingml/2006/main" xmlns:r="http://schemas.openxmlformats.org/officeDocument/2006/relationships" xmlns:p="http://schemas.openxmlformats.org/presentationml/2006/main">
+  <p:cSld>
+    <p:spTree>
+      <p:nvGrpSpPr>
+        <p:cNvPr id="1" name=""/>
+        <p:cNvGrpSpPr/>
+        <p:nvPr/>
+      </p:nvGrpSpPr>
+      <p:grpSpPr>
+        <a:xfrm>
+          <a:off x="0" y="0"/>
+          <a:ext cx="0" cy="0"/>
+          <a:chOff x="0" y="0"/>
+          <a:chExt cx="0" cy="0"/>
+        </a:xfrm>
+      </p:grpSpPr>
+      <p:pic>
+        <p:nvPicPr>
+          <p:cNvPr id="3" name="圖片 2">
+            <a:extLst>
+              <a:ext uri="{FF2B5EF4-FFF2-40B4-BE49-F238E27FC236}">
+                <a16:creationId xmlns:a16="http://schemas.microsoft.com/office/drawing/2014/main" id="{1202EBDE-7F64-43BD-86B7-6C228CCEC2D0}"/>
+              </a:ext>
+            </a:extLst>
+          </p:cNvPr>
+          <p:cNvPicPr>
+            <a:picLocks noChangeAspect="1"/>
+          </p:cNvPicPr>
+          <p:nvPr/>
+        </p:nvPicPr>
+        <p:blipFill>
+          <a:blip r:embed="rId2" cstate="print">
+            <a:extLst>
+              <a:ext uri="{28A0092B-C50C-407E-A947-70E740481C1C}">
+                <a14:useLocalDpi xmlns:a14="http://schemas.microsoft.com/office/drawing/2010/main" val="0"/>
+              </a:ext>
+            </a:extLst>
+          </a:blip>
+          <a:stretch>
+            <a:fillRect/>
+          </a:stretch>
+        </p:blipFill>
+        <p:spPr>
+          <a:xfrm>
+            <a:off x="6598915" y="0"/>
+            <a:ext cx="2545085" cy="3294895"/>
+          </a:xfrm>
+          <a:prstGeom prst="rect">
+            <a:avLst/>
+          </a:prstGeom>
+        </p:spPr>
+      </p:pic>
+      <p:pic>
+        <p:nvPicPr>
+          <p:cNvPr id="4" name="圖片 3">
+            <a:extLst>
+              <a:ext uri="{FF2B5EF4-FFF2-40B4-BE49-F238E27FC236}">
+                <a16:creationId xmlns:a16="http://schemas.microsoft.com/office/drawing/2014/main" id="{AEFF5069-0FA7-44E7-AEEE-225463C6B1AC}"/>
+              </a:ext>
+            </a:extLst>
+          </p:cNvPr>
+          <p:cNvPicPr>
+            <a:picLocks noChangeAspect="1"/>
+          </p:cNvPicPr>
+          <p:nvPr/>
+        </p:nvPicPr>
+        <p:blipFill>
+          <a:blip r:embed="rId3" cstate="print">
+            <a:extLst>
+              <a:ext uri="{28A0092B-C50C-407E-A947-70E740481C1C}">
+                <a14:useLocalDpi xmlns:a14="http://schemas.microsoft.com/office/drawing/2010/main" val="0"/>
+              </a:ext>
+            </a:extLst>
+          </a:blip>
+          <a:stretch>
+            <a:fillRect/>
+          </a:stretch>
+        </p:blipFill>
+        <p:spPr>
+          <a:xfrm>
+            <a:off x="0" y="4169659"/>
+            <a:ext cx="3934976" cy="2688341"/>
+          </a:xfrm>
+          <a:prstGeom prst="rect">
+            <a:avLst/>
+          </a:prstGeom>
+        </p:spPr>
+      </p:pic>
+    </p:spTree>
+    <p:extLst>
+      <p:ext uri="{BB962C8B-B14F-4D97-AF65-F5344CB8AC3E}">
+        <p14:creationId xmlns:p14="http://schemas.microsoft.com/office/powerpoint/2010/main" val="76552849"/>
+      </p:ext>
+    </p:extLst>
+  </p:cSld>
+  <p:clrMapOvr>
+    <a:masterClrMapping/>
+  </p:clrMapOvr>
+</p:sld>
+</file>
+
+<file path=ppt/slides/slide42.xml><?xml version="1.0" encoding="utf-8"?>
+<p:sld xmlns:a="http://schemas.openxmlformats.org/drawingml/2006/main" xmlns:r="http://schemas.openxmlformats.org/officeDocument/2006/relationships" xmlns:p="http://schemas.openxmlformats.org/presentationml/2006/main">
+  <p:cSld>
+    <p:spTree>
+      <p:nvGrpSpPr>
+        <p:cNvPr id="1" name=""/>
+        <p:cNvGrpSpPr/>
+        <p:nvPr/>
+      </p:nvGrpSpPr>
+      <p:grpSpPr>
+        <a:xfrm>
+          <a:off x="0" y="0"/>
+          <a:ext cx="0" cy="0"/>
+          <a:chOff x="0" y="0"/>
+          <a:chExt cx="0" cy="0"/>
+        </a:xfrm>
+      </p:grpSpPr>
+      <p:pic>
+        <p:nvPicPr>
+          <p:cNvPr id="3" name="圖片 2">
+            <a:extLst>
+              <a:ext uri="{FF2B5EF4-FFF2-40B4-BE49-F238E27FC236}">
+                <a16:creationId xmlns:a16="http://schemas.microsoft.com/office/drawing/2014/main" id="{1202EBDE-7F64-43BD-86B7-6C228CCEC2D0}"/>
+              </a:ext>
+            </a:extLst>
+          </p:cNvPr>
+          <p:cNvPicPr>
+            <a:picLocks noChangeAspect="1"/>
+          </p:cNvPicPr>
+          <p:nvPr/>
+        </p:nvPicPr>
+        <p:blipFill>
+          <a:blip r:embed="rId2" cstate="print">
+            <a:extLst>
+              <a:ext uri="{28A0092B-C50C-407E-A947-70E740481C1C}">
+                <a14:useLocalDpi xmlns:a14="http://schemas.microsoft.com/office/drawing/2010/main" val="0"/>
+              </a:ext>
+            </a:extLst>
+          </a:blip>
+          <a:stretch>
+            <a:fillRect/>
+          </a:stretch>
+        </p:blipFill>
+        <p:spPr>
+          <a:xfrm>
+            <a:off x="6598915" y="0"/>
+            <a:ext cx="2545085" cy="3294895"/>
+          </a:xfrm>
+          <a:prstGeom prst="rect">
+            <a:avLst/>
+          </a:prstGeom>
+        </p:spPr>
+      </p:pic>
+      <p:pic>
+        <p:nvPicPr>
+          <p:cNvPr id="4" name="圖片 3">
+            <a:extLst>
+              <a:ext uri="{FF2B5EF4-FFF2-40B4-BE49-F238E27FC236}">
+                <a16:creationId xmlns:a16="http://schemas.microsoft.com/office/drawing/2014/main" id="{AEFF5069-0FA7-44E7-AEEE-225463C6B1AC}"/>
+              </a:ext>
+            </a:extLst>
+          </p:cNvPr>
+          <p:cNvPicPr>
+            <a:picLocks noChangeAspect="1"/>
+          </p:cNvPicPr>
+          <p:nvPr/>
+        </p:nvPicPr>
+        <p:blipFill>
+          <a:blip r:embed="rId3" cstate="print">
+            <a:extLst>
+              <a:ext uri="{28A0092B-C50C-407E-A947-70E740481C1C}">
+                <a14:useLocalDpi xmlns:a14="http://schemas.microsoft.com/office/drawing/2010/main" val="0"/>
+              </a:ext>
+            </a:extLst>
+          </a:blip>
+          <a:stretch>
+            <a:fillRect/>
+          </a:stretch>
+        </p:blipFill>
+        <p:spPr>
+          <a:xfrm>
+            <a:off x="0" y="4169659"/>
+            <a:ext cx="3934976" cy="2688341"/>
+          </a:xfrm>
+          <a:prstGeom prst="rect">
+            <a:avLst/>
+          </a:prstGeom>
+        </p:spPr>
+      </p:pic>
+    </p:spTree>
+    <p:extLst>
+      <p:ext uri="{BB962C8B-B14F-4D97-AF65-F5344CB8AC3E}">
+        <p14:creationId xmlns:p14="http://schemas.microsoft.com/office/powerpoint/2010/main" val="2818705360"/>
       </p:ext>
     </p:extLst>
   </p:cSld>
@@ -9028,7 +12260,7 @@
         <p:spPr>
           <a:xfrm>
             <a:off x="584853" y="463989"/>
-            <a:ext cx="3624710" cy="584775"/>
+            <a:ext cx="4057521" cy="646331"/>
           </a:xfrm>
           <a:prstGeom prst="rect">
             <a:avLst/>
@@ -9042,7 +12274,7 @@
           <a:lstStyle/>
           <a:p>
             <a:r>
-              <a:rPr lang="en-US" altLang="zh-TW" sz="3200" dirty="0">
+              <a:rPr lang="en-US" altLang="zh-TW" sz="3600" dirty="0">
                 <a:latin typeface="Arial" panose="020B0604020202020204" pitchFamily="34" charset="0"/>
                 <a:cs typeface="Arial" panose="020B0604020202020204" pitchFamily="34" charset="0"/>
               </a:rPr>
@@ -9079,7 +12311,7 @@
         </p:blipFill>
         <p:spPr>
           <a:xfrm>
-            <a:off x="3475543" y="3294895"/>
+            <a:off x="3511993" y="3550763"/>
             <a:ext cx="5215449" cy="2924985"/>
           </a:xfrm>
           <a:prstGeom prst="rect">
@@ -9115,7 +12347,7 @@
         </p:blipFill>
         <p:spPr>
           <a:xfrm>
-            <a:off x="707795" y="1340977"/>
+            <a:off x="691017" y="1513223"/>
             <a:ext cx="5063829" cy="2828682"/>
           </a:xfrm>
           <a:prstGeom prst="rect">

</xml_diff>

<commit_message>
Revert "Finish the Git part in PPT"
This reverts commit a8eb5df44ebf3900b67fcb382e65e637d6106dbd.
</commit_message>
<xml_diff>
--- a/TA_Class_III.pptx
+++ b/TA_Class_III.pptx
@@ -32,21 +32,6 @@
     <p:sldId id="317" r:id="rId26"/>
     <p:sldId id="318" r:id="rId27"/>
     <p:sldId id="319" r:id="rId28"/>
-    <p:sldId id="320" r:id="rId29"/>
-    <p:sldId id="321" r:id="rId30"/>
-    <p:sldId id="322" r:id="rId31"/>
-    <p:sldId id="323" r:id="rId32"/>
-    <p:sldId id="324" r:id="rId33"/>
-    <p:sldId id="325" r:id="rId34"/>
-    <p:sldId id="326" r:id="rId35"/>
-    <p:sldId id="327" r:id="rId36"/>
-    <p:sldId id="328" r:id="rId37"/>
-    <p:sldId id="329" r:id="rId38"/>
-    <p:sldId id="330" r:id="rId39"/>
-    <p:sldId id="331" r:id="rId40"/>
-    <p:sldId id="332" r:id="rId41"/>
-    <p:sldId id="333" r:id="rId42"/>
-    <p:sldId id="334" r:id="rId43"/>
   </p:sldIdLst>
   <p:sldSz cx="9144000" cy="6858000" type="screen4x3"/>
   <p:notesSz cx="6858000" cy="9144000"/>
@@ -3474,7 +3459,7 @@
         <p:spPr>
           <a:xfrm>
             <a:off x="662730" y="963329"/>
-            <a:ext cx="2732736" cy="646331"/>
+            <a:ext cx="2447273" cy="584775"/>
           </a:xfrm>
           <a:prstGeom prst="rect">
             <a:avLst/>
@@ -3488,7 +3473,7 @@
           <a:lstStyle/>
           <a:p>
             <a:r>
-              <a:rPr lang="en-US" altLang="zh-TW" sz="3600" dirty="0">
+              <a:rPr lang="en-US" altLang="zh-TW" sz="3200" dirty="0">
                 <a:latin typeface="Arial" panose="020B0604020202020204" pitchFamily="34" charset="0"/>
                 <a:cs typeface="Arial" panose="020B0604020202020204" pitchFamily="34" charset="0"/>
               </a:rPr>
@@ -3671,7 +3656,7 @@
         <p:spPr>
           <a:xfrm>
             <a:off x="935048" y="924016"/>
-            <a:ext cx="1665841" cy="584775"/>
+            <a:ext cx="1779654" cy="584775"/>
           </a:xfrm>
           <a:prstGeom prst="rect">
             <a:avLst/>
@@ -3689,7 +3674,7 @@
                 <a:latin typeface="Arial" panose="020B0604020202020204" pitchFamily="34" charset="0"/>
                 <a:cs typeface="Arial" panose="020B0604020202020204" pitchFamily="34" charset="0"/>
               </a:rPr>
-              <a:t>．</a:t>
+              <a:t>． </a:t>
             </a:r>
             <a:r>
               <a:rPr lang="en-US" altLang="zh-TW" sz="3200" dirty="0">
@@ -4525,7 +4510,7 @@
         <p:spPr>
           <a:xfrm>
             <a:off x="935048" y="924016"/>
-            <a:ext cx="2234907" cy="584775"/>
+            <a:ext cx="2348720" cy="584775"/>
           </a:xfrm>
           <a:prstGeom prst="rect">
             <a:avLst/>
@@ -4543,7 +4528,7 @@
                 <a:latin typeface="Arial" panose="020B0604020202020204" pitchFamily="34" charset="0"/>
                 <a:cs typeface="Arial" panose="020B0604020202020204" pitchFamily="34" charset="0"/>
               </a:rPr>
-              <a:t>．</a:t>
+              <a:t>． </a:t>
             </a:r>
             <a:r>
               <a:rPr lang="en-US" altLang="zh-TW" sz="3200" dirty="0">
@@ -4764,7 +4749,7 @@
         <p:spPr>
           <a:xfrm>
             <a:off x="935048" y="924016"/>
-            <a:ext cx="1824538" cy="584775"/>
+            <a:ext cx="1938351" cy="584775"/>
           </a:xfrm>
           <a:prstGeom prst="rect">
             <a:avLst/>
@@ -4782,7 +4767,7 @@
                 <a:latin typeface="Arial" panose="020B0604020202020204" pitchFamily="34" charset="0"/>
                 <a:cs typeface="Arial" panose="020B0604020202020204" pitchFamily="34" charset="0"/>
               </a:rPr>
-              <a:t>．</a:t>
+              <a:t>． </a:t>
             </a:r>
             <a:r>
               <a:rPr lang="en-US" altLang="zh-TW" sz="3200" dirty="0">
@@ -5021,7 +5006,7 @@
                 <a:latin typeface="Arial" panose="020B0604020202020204" pitchFamily="34" charset="0"/>
                 <a:cs typeface="Arial" panose="020B0604020202020204" pitchFamily="34" charset="0"/>
               </a:rPr>
-              <a:t>．</a:t>
+              <a:t>． </a:t>
             </a:r>
             <a:r>
               <a:rPr lang="en-US" altLang="zh-TW" sz="3200" dirty="0">
@@ -5709,7 +5694,7 @@
         <p:spPr>
           <a:xfrm>
             <a:off x="935048" y="924016"/>
-            <a:ext cx="2348720" cy="584775"/>
+            <a:ext cx="2462534" cy="584775"/>
           </a:xfrm>
           <a:prstGeom prst="rect">
             <a:avLst/>
@@ -5727,7 +5712,7 @@
                 <a:latin typeface="Arial" panose="020B0604020202020204" pitchFamily="34" charset="0"/>
                 <a:cs typeface="Arial" panose="020B0604020202020204" pitchFamily="34" charset="0"/>
               </a:rPr>
-              <a:t>．</a:t>
+              <a:t>． </a:t>
             </a:r>
             <a:r>
               <a:rPr lang="en-US" altLang="zh-TW" sz="3200" dirty="0">
@@ -6094,10 +6079,10 @@
       </p:pic>
       <p:pic>
         <p:nvPicPr>
-          <p:cNvPr id="10" name="圖片 9">
-            <a:extLst>
-              <a:ext uri="{FF2B5EF4-FFF2-40B4-BE49-F238E27FC236}">
-                <a16:creationId xmlns:a16="http://schemas.microsoft.com/office/drawing/2014/main" id="{4729305C-8EC1-4C8A-8DF7-78F88F335A8C}"/>
+          <p:cNvPr id="11" name="圖片 10" descr="一張含有 文字 的圖片&#10;&#10;自動產生的描述">
+            <a:extLst>
+              <a:ext uri="{FF2B5EF4-FFF2-40B4-BE49-F238E27FC236}">
+                <a16:creationId xmlns:a16="http://schemas.microsoft.com/office/drawing/2014/main" id="{32A2A153-8C9D-44F6-8B12-1F51E589F1C1}"/>
               </a:ext>
             </a:extLst>
           </p:cNvPr>
@@ -6106,7 +6091,7 @@
           </p:cNvPicPr>
           <p:nvPr/>
         </p:nvPicPr>
-        <p:blipFill rotWithShape="1">
+        <p:blipFill>
           <a:blip r:embed="rId5">
             <a:extLst>
               <a:ext uri="{28A0092B-C50C-407E-A947-70E740481C1C}">
@@ -6114,13 +6099,14 @@
               </a:ext>
             </a:extLst>
           </a:blip>
-          <a:srcRect l="8034" t="17384" r="12037" b="33220"/>
-          <a:stretch/>
+          <a:stretch>
+            <a:fillRect/>
+          </a:stretch>
         </p:blipFill>
         <p:spPr>
           <a:xfrm>
-            <a:off x="3422709" y="3922727"/>
-            <a:ext cx="4857225" cy="1689085"/>
+            <a:off x="3442070" y="4169658"/>
+            <a:ext cx="4429387" cy="1472771"/>
           </a:xfrm>
           <a:prstGeom prst="rect">
             <a:avLst/>
@@ -6301,7 +6287,7 @@
         <p:spPr>
           <a:xfrm>
             <a:off x="935048" y="924016"/>
-            <a:ext cx="2462534" cy="584775"/>
+            <a:ext cx="2576346" cy="584775"/>
           </a:xfrm>
           <a:prstGeom prst="rect">
             <a:avLst/>
@@ -6319,7 +6305,7 @@
                 <a:latin typeface="Arial" panose="020B0604020202020204" pitchFamily="34" charset="0"/>
                 <a:cs typeface="Arial" panose="020B0604020202020204" pitchFamily="34" charset="0"/>
               </a:rPr>
-              <a:t>．</a:t>
+              <a:t>． </a:t>
             </a:r>
             <a:r>
               <a:rPr lang="en-US" altLang="zh-TW" sz="3200" dirty="0">
@@ -6541,7 +6527,7 @@
         <p:spPr>
           <a:xfrm>
             <a:off x="935048" y="924016"/>
-            <a:ext cx="1233030" cy="584775"/>
+            <a:ext cx="1346844" cy="584775"/>
           </a:xfrm>
           <a:prstGeom prst="rect">
             <a:avLst/>
@@ -6559,7 +6545,7 @@
                 <a:latin typeface="Arial" panose="020B0604020202020204" pitchFamily="34" charset="0"/>
                 <a:cs typeface="Arial" panose="020B0604020202020204" pitchFamily="34" charset="0"/>
               </a:rPr>
-              <a:t>．</a:t>
+              <a:t>． </a:t>
             </a:r>
             <a:r>
               <a:rPr lang="en-US" altLang="zh-TW" sz="3200" dirty="0">
@@ -7024,7 +7010,7 @@
         <p:spPr>
           <a:xfrm>
             <a:off x="935048" y="924016"/>
-            <a:ext cx="1688283" cy="584775"/>
+            <a:ext cx="1802096" cy="584775"/>
           </a:xfrm>
           <a:prstGeom prst="rect">
             <a:avLst/>
@@ -7042,7 +7028,7 @@
                 <a:latin typeface="Arial" panose="020B0604020202020204" pitchFamily="34" charset="0"/>
                 <a:cs typeface="Arial" panose="020B0604020202020204" pitchFamily="34" charset="0"/>
               </a:rPr>
-              <a:t>．</a:t>
+              <a:t>． </a:t>
             </a:r>
             <a:r>
               <a:rPr lang="en-US" altLang="zh-TW" sz="3200" dirty="0">
@@ -7192,133 +7178,6 @@
           </a:prstGeom>
         </p:spPr>
       </p:pic>
-      <p:sp>
-        <p:nvSpPr>
-          <p:cNvPr id="5" name="文字方塊 4">
-            <a:extLst>
-              <a:ext uri="{FF2B5EF4-FFF2-40B4-BE49-F238E27FC236}">
-                <a16:creationId xmlns:a16="http://schemas.microsoft.com/office/drawing/2014/main" id="{81F06AE7-3921-42C6-B2D9-A2ADE7774792}"/>
-              </a:ext>
-            </a:extLst>
-          </p:cNvPr>
-          <p:cNvSpPr txBox="1"/>
-          <p:nvPr/>
-        </p:nvSpPr>
-        <p:spPr>
-          <a:xfrm>
-            <a:off x="612397" y="646429"/>
-            <a:ext cx="1595309" cy="646331"/>
-          </a:xfrm>
-          <a:prstGeom prst="rect">
-            <a:avLst/>
-          </a:prstGeom>
-          <a:noFill/>
-        </p:spPr>
-        <p:txBody>
-          <a:bodyPr wrap="none" rtlCol="0">
-            <a:spAutoFit/>
-          </a:bodyPr>
-          <a:lstStyle/>
-          <a:p>
-            <a:r>
-              <a:rPr lang="en-US" altLang="zh-TW" sz="3600" dirty="0">
-                <a:latin typeface="Arial" panose="020B0604020202020204" pitchFamily="34" charset="0"/>
-                <a:cs typeface="Arial" panose="020B0604020202020204" pitchFamily="34" charset="0"/>
-              </a:rPr>
-              <a:t>branch</a:t>
-            </a:r>
-          </a:p>
-        </p:txBody>
-      </p:sp>
-      <p:sp>
-        <p:nvSpPr>
-          <p:cNvPr id="6" name="矩形 5">
-            <a:extLst>
-              <a:ext uri="{FF2B5EF4-FFF2-40B4-BE49-F238E27FC236}">
-                <a16:creationId xmlns:a16="http://schemas.microsoft.com/office/drawing/2014/main" id="{DFC472AC-C814-4264-B516-AEF54EEC4967}"/>
-              </a:ext>
-            </a:extLst>
-          </p:cNvPr>
-          <p:cNvSpPr/>
-          <p:nvPr/>
-        </p:nvSpPr>
-        <p:spPr>
-          <a:xfrm>
-            <a:off x="889233" y="1734084"/>
-            <a:ext cx="7365534" cy="2575420"/>
-          </a:xfrm>
-          <a:prstGeom prst="rect">
-            <a:avLst/>
-          </a:prstGeom>
-          <a:solidFill>
-            <a:schemeClr val="accent3">
-              <a:lumMod val="20000"/>
-              <a:lumOff val="80000"/>
-            </a:schemeClr>
-          </a:solidFill>
-        </p:spPr>
-        <p:style>
-          <a:lnRef idx="2">
-            <a:schemeClr val="dk1"/>
-          </a:lnRef>
-          <a:fillRef idx="1">
-            <a:schemeClr val="lt1"/>
-          </a:fillRef>
-          <a:effectRef idx="0">
-            <a:schemeClr val="dk1"/>
-          </a:effectRef>
-          <a:fontRef idx="minor">
-            <a:schemeClr val="dk1"/>
-          </a:fontRef>
-        </p:style>
-        <p:txBody>
-          <a:bodyPr rtlCol="0" anchor="ctr"/>
-          <a:lstStyle/>
-          <a:p>
-            <a:pPr algn="ctr"/>
-            <a:endParaRPr lang="zh-TW" altLang="en-US"/>
-          </a:p>
-        </p:txBody>
-      </p:sp>
-      <p:sp>
-        <p:nvSpPr>
-          <p:cNvPr id="7" name="文字方塊 6">
-            <a:extLst>
-              <a:ext uri="{FF2B5EF4-FFF2-40B4-BE49-F238E27FC236}">
-                <a16:creationId xmlns:a16="http://schemas.microsoft.com/office/drawing/2014/main" id="{1EBF860A-F73D-4938-89CB-809C81B30BE8}"/>
-              </a:ext>
-            </a:extLst>
-          </p:cNvPr>
-          <p:cNvSpPr txBox="1"/>
-          <p:nvPr/>
-        </p:nvSpPr>
-        <p:spPr>
-          <a:xfrm>
-            <a:off x="1241332" y="2236964"/>
-            <a:ext cx="6661336" cy="1569660"/>
-          </a:xfrm>
-          <a:prstGeom prst="rect">
-            <a:avLst/>
-          </a:prstGeom>
-          <a:noFill/>
-        </p:spPr>
-        <p:txBody>
-          <a:bodyPr wrap="square" rtlCol="0">
-            <a:spAutoFit/>
-          </a:bodyPr>
-          <a:lstStyle/>
-          <a:p>
-            <a:pPr algn="just"/>
-            <a:r>
-              <a:rPr lang="en-US" altLang="zh-TW" sz="3200" dirty="0">
-                <a:latin typeface="Arial" panose="020B0604020202020204" pitchFamily="34" charset="0"/>
-                <a:cs typeface="Arial" panose="020B0604020202020204" pitchFamily="34" charset="0"/>
-              </a:rPr>
-              <a:t>The default branch git create for you when a new git repo is initialized is called “master”.</a:t>
-            </a:r>
-          </a:p>
-        </p:txBody>
-      </p:sp>
     </p:spTree>
     <p:extLst>
       <p:ext uri="{BB962C8B-B14F-4D97-AF65-F5344CB8AC3E}">
@@ -7421,95 +7280,6 @@
           </a:prstGeom>
         </p:spPr>
       </p:pic>
-      <p:sp>
-        <p:nvSpPr>
-          <p:cNvPr id="5" name="矩形 4">
-            <a:extLst>
-              <a:ext uri="{FF2B5EF4-FFF2-40B4-BE49-F238E27FC236}">
-                <a16:creationId xmlns:a16="http://schemas.microsoft.com/office/drawing/2014/main" id="{350A71E6-8087-47AB-83A3-4704D41A90E2}"/>
-              </a:ext>
-            </a:extLst>
-          </p:cNvPr>
-          <p:cNvSpPr/>
-          <p:nvPr/>
-        </p:nvSpPr>
-        <p:spPr>
-          <a:xfrm>
-            <a:off x="889233" y="1734084"/>
-            <a:ext cx="7365534" cy="2575420"/>
-          </a:xfrm>
-          <a:prstGeom prst="rect">
-            <a:avLst/>
-          </a:prstGeom>
-          <a:solidFill>
-            <a:schemeClr val="accent3">
-              <a:lumMod val="20000"/>
-              <a:lumOff val="80000"/>
-            </a:schemeClr>
-          </a:solidFill>
-        </p:spPr>
-        <p:style>
-          <a:lnRef idx="2">
-            <a:schemeClr val="dk1"/>
-          </a:lnRef>
-          <a:fillRef idx="1">
-            <a:schemeClr val="lt1"/>
-          </a:fillRef>
-          <a:effectRef idx="0">
-            <a:schemeClr val="dk1"/>
-          </a:effectRef>
-          <a:fontRef idx="minor">
-            <a:schemeClr val="dk1"/>
-          </a:fontRef>
-        </p:style>
-        <p:txBody>
-          <a:bodyPr rtlCol="0" anchor="ctr"/>
-          <a:lstStyle/>
-          <a:p>
-            <a:pPr algn="ctr"/>
-            <a:endParaRPr lang="zh-TW" altLang="en-US"/>
-          </a:p>
-        </p:txBody>
-      </p:sp>
-      <p:sp>
-        <p:nvSpPr>
-          <p:cNvPr id="6" name="文字方塊 5">
-            <a:extLst>
-              <a:ext uri="{FF2B5EF4-FFF2-40B4-BE49-F238E27FC236}">
-                <a16:creationId xmlns:a16="http://schemas.microsoft.com/office/drawing/2014/main" id="{66E182E2-8101-480C-AC1D-3278E5B34E3E}"/>
-              </a:ext>
-            </a:extLst>
-          </p:cNvPr>
-          <p:cNvSpPr txBox="1"/>
-          <p:nvPr/>
-        </p:nvSpPr>
-        <p:spPr>
-          <a:xfrm>
-            <a:off x="1241332" y="2236964"/>
-            <a:ext cx="6661336" cy="1569660"/>
-          </a:xfrm>
-          <a:prstGeom prst="rect">
-            <a:avLst/>
-          </a:prstGeom>
-          <a:noFill/>
-        </p:spPr>
-        <p:txBody>
-          <a:bodyPr wrap="square" rtlCol="0">
-            <a:spAutoFit/>
-          </a:bodyPr>
-          <a:lstStyle/>
-          <a:p>
-            <a:pPr algn="just"/>
-            <a:r>
-              <a:rPr lang="en-US" altLang="zh-TW" sz="3200" dirty="0">
-                <a:latin typeface="Arial" panose="020B0604020202020204" pitchFamily="34" charset="0"/>
-                <a:cs typeface="Arial" panose="020B0604020202020204" pitchFamily="34" charset="0"/>
-              </a:rPr>
-              <a:t>Branches enable changes to be worked on without disruption the most current working state,</a:t>
-            </a:r>
-          </a:p>
-        </p:txBody>
-      </p:sp>
     </p:spTree>
     <p:extLst>
       <p:ext uri="{BB962C8B-B14F-4D97-AF65-F5344CB8AC3E}">
@@ -7612,155 +7382,6 @@
           </a:prstGeom>
         </p:spPr>
       </p:pic>
-      <p:pic>
-        <p:nvPicPr>
-          <p:cNvPr id="5" name="圖片 4">
-            <a:extLst>
-              <a:ext uri="{FF2B5EF4-FFF2-40B4-BE49-F238E27FC236}">
-                <a16:creationId xmlns:a16="http://schemas.microsoft.com/office/drawing/2014/main" id="{AF3458E4-59B0-4B08-A818-697C2ED81E6C}"/>
-              </a:ext>
-            </a:extLst>
-          </p:cNvPr>
-          <p:cNvPicPr>
-            <a:picLocks noChangeAspect="1"/>
-          </p:cNvPicPr>
-          <p:nvPr/>
-        </p:nvPicPr>
-        <p:blipFill>
-          <a:blip r:embed="rId4">
-            <a:extLst>
-              <a:ext uri="{28A0092B-C50C-407E-A947-70E740481C1C}">
-                <a14:useLocalDpi xmlns:a14="http://schemas.microsoft.com/office/drawing/2010/main" val="0"/>
-              </a:ext>
-            </a:extLst>
-          </a:blip>
-          <a:stretch>
-            <a:fillRect/>
-          </a:stretch>
-        </p:blipFill>
-        <p:spPr>
-          <a:xfrm>
-            <a:off x="1547744" y="3873945"/>
-            <a:ext cx="6048511" cy="518444"/>
-          </a:xfrm>
-          <a:prstGeom prst="rect">
-            <a:avLst/>
-          </a:prstGeom>
-        </p:spPr>
-      </p:pic>
-      <p:sp>
-        <p:nvSpPr>
-          <p:cNvPr id="6" name="矩形 5">
-            <a:extLst>
-              <a:ext uri="{FF2B5EF4-FFF2-40B4-BE49-F238E27FC236}">
-                <a16:creationId xmlns:a16="http://schemas.microsoft.com/office/drawing/2014/main" id="{6478E4DF-B4DB-4C34-A11D-5DE72C3BF409}"/>
-              </a:ext>
-            </a:extLst>
-          </p:cNvPr>
-          <p:cNvSpPr/>
-          <p:nvPr/>
-        </p:nvSpPr>
-        <p:spPr>
-          <a:xfrm>
-            <a:off x="1547744" y="1747232"/>
-            <a:ext cx="6048511" cy="1224792"/>
-          </a:xfrm>
-          <a:prstGeom prst="rect">
-            <a:avLst/>
-          </a:prstGeom>
-          <a:solidFill>
-            <a:schemeClr val="accent3">
-              <a:lumMod val="20000"/>
-              <a:lumOff val="80000"/>
-            </a:schemeClr>
-          </a:solidFill>
-          <a:ln w="38100">
-            <a:solidFill>
-              <a:schemeClr val="tx1"/>
-            </a:solidFill>
-          </a:ln>
-        </p:spPr>
-        <p:style>
-          <a:lnRef idx="2">
-            <a:schemeClr val="accent1">
-              <a:shade val="50000"/>
-            </a:schemeClr>
-          </a:lnRef>
-          <a:fillRef idx="1">
-            <a:schemeClr val="accent1"/>
-          </a:fillRef>
-          <a:effectRef idx="0">
-            <a:schemeClr val="accent1"/>
-          </a:effectRef>
-          <a:fontRef idx="minor">
-            <a:schemeClr val="lt1"/>
-          </a:fontRef>
-        </p:style>
-        <p:txBody>
-          <a:bodyPr rtlCol="0" anchor="ctr"/>
-          <a:lstStyle/>
-          <a:p>
-            <a:pPr algn="ctr"/>
-            <a:endParaRPr lang="zh-TW" altLang="en-US"/>
-          </a:p>
-        </p:txBody>
-      </p:sp>
-      <p:sp>
-        <p:nvSpPr>
-          <p:cNvPr id="7" name="文字方塊 6">
-            <a:extLst>
-              <a:ext uri="{FF2B5EF4-FFF2-40B4-BE49-F238E27FC236}">
-                <a16:creationId xmlns:a16="http://schemas.microsoft.com/office/drawing/2014/main" id="{63B6A64A-1E37-4FBC-B723-7EFCF0CF2F9F}"/>
-              </a:ext>
-            </a:extLst>
-          </p:cNvPr>
-          <p:cNvSpPr txBox="1"/>
-          <p:nvPr/>
-        </p:nvSpPr>
-        <p:spPr>
-          <a:xfrm>
-            <a:off x="1967488" y="2067240"/>
-            <a:ext cx="5079859" cy="584775"/>
-          </a:xfrm>
-          <a:prstGeom prst="rect">
-            <a:avLst/>
-          </a:prstGeom>
-          <a:noFill/>
-        </p:spPr>
-        <p:txBody>
-          <a:bodyPr wrap="square" rtlCol="0">
-            <a:spAutoFit/>
-          </a:bodyPr>
-          <a:lstStyle/>
-          <a:p>
-            <a:r>
-              <a:rPr lang="zh-TW" altLang="en-US" sz="3200" dirty="0">
-                <a:latin typeface="Arial" panose="020B0604020202020204" pitchFamily="34" charset="0"/>
-                <a:cs typeface="Arial" panose="020B0604020202020204" pitchFamily="34" charset="0"/>
-              </a:rPr>
-              <a:t>．</a:t>
-            </a:r>
-            <a:r>
-              <a:rPr lang="en-US" altLang="zh-TW" sz="3200" dirty="0">
-                <a:latin typeface="Arial" panose="020B0604020202020204" pitchFamily="34" charset="0"/>
-                <a:cs typeface="Arial" panose="020B0604020202020204" pitchFamily="34" charset="0"/>
-              </a:rPr>
-              <a:t>git branch </a:t>
-            </a:r>
-            <a:r>
-              <a:rPr lang="en-US" altLang="zh-TW" sz="3200" dirty="0" err="1">
-                <a:latin typeface="Arial" panose="020B0604020202020204" pitchFamily="34" charset="0"/>
-                <a:cs typeface="Arial" panose="020B0604020202020204" pitchFamily="34" charset="0"/>
-              </a:rPr>
-              <a:t>branch_name</a:t>
-            </a:r>
-            <a:endParaRPr lang="en-US" altLang="zh-TW" sz="3200" dirty="0">
-              <a:latin typeface="Arial" panose="020B0604020202020204" pitchFamily="34" charset="0"/>
-              <a:cs typeface="Arial" panose="020B0604020202020204" pitchFamily="34" charset="0"/>
-            </a:endParaRPr>
-          </a:p>
-        </p:txBody>
-      </p:sp>
     </p:spTree>
     <p:extLst>
       <p:ext uri="{BB962C8B-B14F-4D97-AF65-F5344CB8AC3E}">
@@ -7863,1322 +7484,10 @@
           </a:prstGeom>
         </p:spPr>
       </p:pic>
-      <p:sp>
-        <p:nvSpPr>
-          <p:cNvPr id="6" name="矩形 5">
-            <a:extLst>
-              <a:ext uri="{FF2B5EF4-FFF2-40B4-BE49-F238E27FC236}">
-                <a16:creationId xmlns:a16="http://schemas.microsoft.com/office/drawing/2014/main" id="{27BA8308-0E71-42BC-9714-02D5FFF2E137}"/>
-              </a:ext>
-            </a:extLst>
-          </p:cNvPr>
-          <p:cNvSpPr/>
-          <p:nvPr/>
-        </p:nvSpPr>
-        <p:spPr>
-          <a:xfrm>
-            <a:off x="2545086" y="1253290"/>
-            <a:ext cx="3485650" cy="1224792"/>
-          </a:xfrm>
-          <a:prstGeom prst="rect">
-            <a:avLst/>
-          </a:prstGeom>
-          <a:solidFill>
-            <a:schemeClr val="accent3">
-              <a:lumMod val="20000"/>
-              <a:lumOff val="80000"/>
-            </a:schemeClr>
-          </a:solidFill>
-          <a:ln w="38100">
-            <a:solidFill>
-              <a:schemeClr val="tx1"/>
-            </a:solidFill>
-          </a:ln>
-        </p:spPr>
-        <p:style>
-          <a:lnRef idx="2">
-            <a:schemeClr val="accent1">
-              <a:shade val="50000"/>
-            </a:schemeClr>
-          </a:lnRef>
-          <a:fillRef idx="1">
-            <a:schemeClr val="accent1"/>
-          </a:fillRef>
-          <a:effectRef idx="0">
-            <a:schemeClr val="accent1"/>
-          </a:effectRef>
-          <a:fontRef idx="minor">
-            <a:schemeClr val="lt1"/>
-          </a:fontRef>
-        </p:style>
-        <p:txBody>
-          <a:bodyPr rtlCol="0" anchor="ctr"/>
-          <a:lstStyle/>
-          <a:p>
-            <a:pPr algn="ctr"/>
-            <a:endParaRPr lang="zh-TW" altLang="en-US"/>
-          </a:p>
-        </p:txBody>
-      </p:sp>
-      <p:sp>
-        <p:nvSpPr>
-          <p:cNvPr id="7" name="文字方塊 6">
-            <a:extLst>
-              <a:ext uri="{FF2B5EF4-FFF2-40B4-BE49-F238E27FC236}">
-                <a16:creationId xmlns:a16="http://schemas.microsoft.com/office/drawing/2014/main" id="{1732E131-8FBC-482E-9A54-9B01F26C3535}"/>
-              </a:ext>
-            </a:extLst>
-          </p:cNvPr>
-          <p:cNvSpPr txBox="1"/>
-          <p:nvPr/>
-        </p:nvSpPr>
-        <p:spPr>
-          <a:xfrm>
-            <a:off x="2862599" y="1566723"/>
-            <a:ext cx="2706742" cy="584775"/>
-          </a:xfrm>
-          <a:prstGeom prst="rect">
-            <a:avLst/>
-          </a:prstGeom>
-          <a:noFill/>
-        </p:spPr>
-        <p:txBody>
-          <a:bodyPr wrap="square" rtlCol="0">
-            <a:spAutoFit/>
-          </a:bodyPr>
-          <a:lstStyle/>
-          <a:p>
-            <a:r>
-              <a:rPr lang="zh-TW" altLang="en-US" sz="3200" dirty="0">
-                <a:latin typeface="Arial" panose="020B0604020202020204" pitchFamily="34" charset="0"/>
-                <a:cs typeface="Arial" panose="020B0604020202020204" pitchFamily="34" charset="0"/>
-              </a:rPr>
-              <a:t>．</a:t>
-            </a:r>
-            <a:r>
-              <a:rPr lang="en-US" altLang="zh-TW" sz="3200" dirty="0">
-                <a:latin typeface="Arial" panose="020B0604020202020204" pitchFamily="34" charset="0"/>
-                <a:cs typeface="Arial" panose="020B0604020202020204" pitchFamily="34" charset="0"/>
-              </a:rPr>
-              <a:t>git branch</a:t>
-            </a:r>
-          </a:p>
-        </p:txBody>
-      </p:sp>
-      <p:pic>
-        <p:nvPicPr>
-          <p:cNvPr id="8" name="圖片 7" descr="一張含有 文字 的圖片&#10;&#10;自動產生的描述">
-            <a:extLst>
-              <a:ext uri="{FF2B5EF4-FFF2-40B4-BE49-F238E27FC236}">
-                <a16:creationId xmlns:a16="http://schemas.microsoft.com/office/drawing/2014/main" id="{E3291D27-DD2B-4404-961E-C5BDE4896889}"/>
-              </a:ext>
-            </a:extLst>
-          </p:cNvPr>
-          <p:cNvPicPr>
-            <a:picLocks noChangeAspect="1"/>
-          </p:cNvPicPr>
-          <p:nvPr/>
-        </p:nvPicPr>
-        <p:blipFill>
-          <a:blip r:embed="rId4">
-            <a:extLst>
-              <a:ext uri="{28A0092B-C50C-407E-A947-70E740481C1C}">
-                <a14:useLocalDpi xmlns:a14="http://schemas.microsoft.com/office/drawing/2010/main" val="0"/>
-              </a:ext>
-            </a:extLst>
-          </a:blip>
-          <a:stretch>
-            <a:fillRect/>
-          </a:stretch>
-        </p:blipFill>
-        <p:spPr>
-          <a:xfrm>
-            <a:off x="1298795" y="3294895"/>
-            <a:ext cx="6546409" cy="2309815"/>
-          </a:xfrm>
-          <a:prstGeom prst="rect">
-            <a:avLst/>
-          </a:prstGeom>
-        </p:spPr>
-      </p:pic>
     </p:spTree>
     <p:extLst>
       <p:ext uri="{BB962C8B-B14F-4D97-AF65-F5344CB8AC3E}">
         <p14:creationId xmlns:p14="http://schemas.microsoft.com/office/powerpoint/2010/main" val="1659399492"/>
-      </p:ext>
-    </p:extLst>
-  </p:cSld>
-  <p:clrMapOvr>
-    <a:masterClrMapping/>
-  </p:clrMapOvr>
-</p:sld>
-</file>
-
-<file path=ppt/slides/slide28.xml><?xml version="1.0" encoding="utf-8"?>
-<p:sld xmlns:a="http://schemas.openxmlformats.org/drawingml/2006/main" xmlns:r="http://schemas.openxmlformats.org/officeDocument/2006/relationships" xmlns:p="http://schemas.openxmlformats.org/presentationml/2006/main">
-  <p:cSld>
-    <p:spTree>
-      <p:nvGrpSpPr>
-        <p:cNvPr id="1" name=""/>
-        <p:cNvGrpSpPr/>
-        <p:nvPr/>
-      </p:nvGrpSpPr>
-      <p:grpSpPr>
-        <a:xfrm>
-          <a:off x="0" y="0"/>
-          <a:ext cx="0" cy="0"/>
-          <a:chOff x="0" y="0"/>
-          <a:chExt cx="0" cy="0"/>
-        </a:xfrm>
-      </p:grpSpPr>
-      <p:pic>
-        <p:nvPicPr>
-          <p:cNvPr id="3" name="圖片 2">
-            <a:extLst>
-              <a:ext uri="{FF2B5EF4-FFF2-40B4-BE49-F238E27FC236}">
-                <a16:creationId xmlns:a16="http://schemas.microsoft.com/office/drawing/2014/main" id="{1202EBDE-7F64-43BD-86B7-6C228CCEC2D0}"/>
-              </a:ext>
-            </a:extLst>
-          </p:cNvPr>
-          <p:cNvPicPr>
-            <a:picLocks noChangeAspect="1"/>
-          </p:cNvPicPr>
-          <p:nvPr/>
-        </p:nvPicPr>
-        <p:blipFill>
-          <a:blip r:embed="rId2" cstate="print">
-            <a:extLst>
-              <a:ext uri="{28A0092B-C50C-407E-A947-70E740481C1C}">
-                <a14:useLocalDpi xmlns:a14="http://schemas.microsoft.com/office/drawing/2010/main" val="0"/>
-              </a:ext>
-            </a:extLst>
-          </a:blip>
-          <a:stretch>
-            <a:fillRect/>
-          </a:stretch>
-        </p:blipFill>
-        <p:spPr>
-          <a:xfrm>
-            <a:off x="6598915" y="0"/>
-            <a:ext cx="2545085" cy="3294895"/>
-          </a:xfrm>
-          <a:prstGeom prst="rect">
-            <a:avLst/>
-          </a:prstGeom>
-        </p:spPr>
-      </p:pic>
-      <p:pic>
-        <p:nvPicPr>
-          <p:cNvPr id="4" name="圖片 3">
-            <a:extLst>
-              <a:ext uri="{FF2B5EF4-FFF2-40B4-BE49-F238E27FC236}">
-                <a16:creationId xmlns:a16="http://schemas.microsoft.com/office/drawing/2014/main" id="{AEFF5069-0FA7-44E7-AEEE-225463C6B1AC}"/>
-              </a:ext>
-            </a:extLst>
-          </p:cNvPr>
-          <p:cNvPicPr>
-            <a:picLocks noChangeAspect="1"/>
-          </p:cNvPicPr>
-          <p:nvPr/>
-        </p:nvPicPr>
-        <p:blipFill>
-          <a:blip r:embed="rId3" cstate="print">
-            <a:extLst>
-              <a:ext uri="{28A0092B-C50C-407E-A947-70E740481C1C}">
-                <a14:useLocalDpi xmlns:a14="http://schemas.microsoft.com/office/drawing/2010/main" val="0"/>
-              </a:ext>
-            </a:extLst>
-          </a:blip>
-          <a:stretch>
-            <a:fillRect/>
-          </a:stretch>
-        </p:blipFill>
-        <p:spPr>
-          <a:xfrm>
-            <a:off x="0" y="4169659"/>
-            <a:ext cx="3934976" cy="2688341"/>
-          </a:xfrm>
-          <a:prstGeom prst="rect">
-            <a:avLst/>
-          </a:prstGeom>
-        </p:spPr>
-      </p:pic>
-      <p:sp>
-        <p:nvSpPr>
-          <p:cNvPr id="5" name="文字方塊 4">
-            <a:extLst>
-              <a:ext uri="{FF2B5EF4-FFF2-40B4-BE49-F238E27FC236}">
-                <a16:creationId xmlns:a16="http://schemas.microsoft.com/office/drawing/2014/main" id="{48465F4D-92C8-4218-A958-29D62F6B1A97}"/>
-              </a:ext>
-            </a:extLst>
-          </p:cNvPr>
-          <p:cNvSpPr txBox="1"/>
-          <p:nvPr/>
-        </p:nvSpPr>
-        <p:spPr>
-          <a:xfrm>
-            <a:off x="386372" y="324441"/>
-            <a:ext cx="2004491" cy="523220"/>
-          </a:xfrm>
-          <a:prstGeom prst="rect">
-            <a:avLst/>
-          </a:prstGeom>
-          <a:noFill/>
-        </p:spPr>
-        <p:txBody>
-          <a:bodyPr wrap="square" rtlCol="0">
-            <a:spAutoFit/>
-          </a:bodyPr>
-          <a:lstStyle/>
-          <a:p>
-            <a:r>
-              <a:rPr lang="zh-TW" altLang="en-US" sz="2800" dirty="0">
-                <a:latin typeface="Arial" panose="020B0604020202020204" pitchFamily="34" charset="0"/>
-                <a:cs typeface="Arial" panose="020B0604020202020204" pitchFamily="34" charset="0"/>
-              </a:rPr>
-              <a:t> ＊</a:t>
-            </a:r>
-            <a:r>
-              <a:rPr lang="en-US" altLang="zh-TW" sz="2800" dirty="0">
-                <a:latin typeface="Arial" panose="020B0604020202020204" pitchFamily="34" charset="0"/>
-                <a:cs typeface="Arial" panose="020B0604020202020204" pitchFamily="34" charset="0"/>
-              </a:rPr>
-              <a:t>master</a:t>
-            </a:r>
-          </a:p>
-        </p:txBody>
-      </p:sp>
-      <p:sp>
-        <p:nvSpPr>
-          <p:cNvPr id="6" name="文字方塊 5">
-            <a:extLst>
-              <a:ext uri="{FF2B5EF4-FFF2-40B4-BE49-F238E27FC236}">
-                <a16:creationId xmlns:a16="http://schemas.microsoft.com/office/drawing/2014/main" id="{8481A8F0-C2E1-4577-AC58-35B8EFAE7EBC}"/>
-              </a:ext>
-            </a:extLst>
-          </p:cNvPr>
-          <p:cNvSpPr txBox="1"/>
-          <p:nvPr/>
-        </p:nvSpPr>
-        <p:spPr>
-          <a:xfrm>
-            <a:off x="349046" y="1058886"/>
-            <a:ext cx="2110327" cy="523220"/>
-          </a:xfrm>
-          <a:prstGeom prst="rect">
-            <a:avLst/>
-          </a:prstGeom>
-        </p:spPr>
-        <p:style>
-          <a:lnRef idx="2">
-            <a:schemeClr val="dk1"/>
-          </a:lnRef>
-          <a:fillRef idx="1">
-            <a:schemeClr val="lt1"/>
-          </a:fillRef>
-          <a:effectRef idx="0">
-            <a:schemeClr val="dk1"/>
-          </a:effectRef>
-          <a:fontRef idx="minor">
-            <a:schemeClr val="dk1"/>
-          </a:fontRef>
-        </p:style>
-        <p:txBody>
-          <a:bodyPr wrap="square" rtlCol="0">
-            <a:spAutoFit/>
-          </a:bodyPr>
-          <a:lstStyle/>
-          <a:p>
-            <a:r>
-              <a:rPr lang="zh-TW" altLang="en-US" sz="2800" dirty="0">
-                <a:latin typeface="Arial" panose="020B0604020202020204" pitchFamily="34" charset="0"/>
-                <a:cs typeface="Arial" panose="020B0604020202020204" pitchFamily="34" charset="0"/>
-              </a:rPr>
-              <a:t>。</a:t>
-            </a:r>
-            <a:r>
-              <a:rPr lang="en-US" altLang="zh-TW" sz="2800" dirty="0">
-                <a:latin typeface="Arial" panose="020B0604020202020204" pitchFamily="34" charset="0"/>
-                <a:cs typeface="Arial" panose="020B0604020202020204" pitchFamily="34" charset="0"/>
-              </a:rPr>
-              <a:t>main file</a:t>
-            </a:r>
-          </a:p>
-        </p:txBody>
-      </p:sp>
-      <p:sp>
-        <p:nvSpPr>
-          <p:cNvPr id="7" name="文字方塊 6">
-            <a:extLst>
-              <a:ext uri="{FF2B5EF4-FFF2-40B4-BE49-F238E27FC236}">
-                <a16:creationId xmlns:a16="http://schemas.microsoft.com/office/drawing/2014/main" id="{FC0A0403-E86E-4D4B-A9EC-7255B9A71DC6}"/>
-              </a:ext>
-            </a:extLst>
-          </p:cNvPr>
-          <p:cNvSpPr txBox="1"/>
-          <p:nvPr/>
-        </p:nvSpPr>
-        <p:spPr>
-          <a:xfrm>
-            <a:off x="1669409" y="2314568"/>
-            <a:ext cx="2110327" cy="523220"/>
-          </a:xfrm>
-          <a:prstGeom prst="rect">
-            <a:avLst/>
-          </a:prstGeom>
-        </p:spPr>
-        <p:style>
-          <a:lnRef idx="2">
-            <a:schemeClr val="dk1"/>
-          </a:lnRef>
-          <a:fillRef idx="1">
-            <a:schemeClr val="lt1"/>
-          </a:fillRef>
-          <a:effectRef idx="0">
-            <a:schemeClr val="dk1"/>
-          </a:effectRef>
-          <a:fontRef idx="minor">
-            <a:schemeClr val="dk1"/>
-          </a:fontRef>
-        </p:style>
-        <p:txBody>
-          <a:bodyPr wrap="square" rtlCol="0">
-            <a:spAutoFit/>
-          </a:bodyPr>
-          <a:lstStyle/>
-          <a:p>
-            <a:r>
-              <a:rPr lang="zh-TW" altLang="en-US" sz="2800" dirty="0">
-                <a:latin typeface="Arial" panose="020B0604020202020204" pitchFamily="34" charset="0"/>
-                <a:cs typeface="Arial" panose="020B0604020202020204" pitchFamily="34" charset="0"/>
-              </a:rPr>
-              <a:t>。</a:t>
-            </a:r>
-            <a:r>
-              <a:rPr lang="en-US" altLang="zh-TW" sz="2800" dirty="0">
-                <a:latin typeface="Arial" panose="020B0604020202020204" pitchFamily="34" charset="0"/>
-                <a:cs typeface="Arial" panose="020B0604020202020204" pitchFamily="34" charset="0"/>
-              </a:rPr>
-              <a:t>main file</a:t>
-            </a:r>
-          </a:p>
-        </p:txBody>
-      </p:sp>
-      <p:cxnSp>
-        <p:nvCxnSpPr>
-          <p:cNvPr id="8" name="接點: 肘形 7">
-            <a:extLst>
-              <a:ext uri="{FF2B5EF4-FFF2-40B4-BE49-F238E27FC236}">
-                <a16:creationId xmlns:a16="http://schemas.microsoft.com/office/drawing/2014/main" id="{7EADF4EE-F288-43EB-A2A7-D9F30DA40375}"/>
-              </a:ext>
-            </a:extLst>
-          </p:cNvPr>
-          <p:cNvCxnSpPr>
-            <a:cxnSpLocks/>
-            <a:stCxn id="6" idx="3"/>
-            <a:endCxn id="7" idx="0"/>
-          </p:cNvCxnSpPr>
-          <p:nvPr/>
-        </p:nvCxnSpPr>
-        <p:spPr>
-          <a:xfrm>
-            <a:off x="2459373" y="1320496"/>
-            <a:ext cx="265200" cy="994072"/>
-          </a:xfrm>
-          <a:prstGeom prst="bentConnector2">
-            <a:avLst/>
-          </a:prstGeom>
-          <a:ln w="38100">
-            <a:solidFill>
-              <a:schemeClr val="tx1"/>
-            </a:solidFill>
-            <a:tailEnd type="triangle"/>
-          </a:ln>
-        </p:spPr>
-        <p:style>
-          <a:lnRef idx="1">
-            <a:schemeClr val="accent1"/>
-          </a:lnRef>
-          <a:fillRef idx="0">
-            <a:schemeClr val="accent1"/>
-          </a:fillRef>
-          <a:effectRef idx="0">
-            <a:schemeClr val="accent1"/>
-          </a:effectRef>
-          <a:fontRef idx="minor">
-            <a:schemeClr val="tx1"/>
-          </a:fontRef>
-        </p:style>
-      </p:cxnSp>
-      <p:sp>
-        <p:nvSpPr>
-          <p:cNvPr id="10" name="文字方塊 9">
-            <a:extLst>
-              <a:ext uri="{FF2B5EF4-FFF2-40B4-BE49-F238E27FC236}">
-                <a16:creationId xmlns:a16="http://schemas.microsoft.com/office/drawing/2014/main" id="{ECA7307C-CF29-4344-871F-39CBDF1B0055}"/>
-              </a:ext>
-            </a:extLst>
-          </p:cNvPr>
-          <p:cNvSpPr txBox="1"/>
-          <p:nvPr/>
-        </p:nvSpPr>
-        <p:spPr>
-          <a:xfrm>
-            <a:off x="2915344" y="1417422"/>
-            <a:ext cx="3451167" cy="400110"/>
-          </a:xfrm>
-          <a:prstGeom prst="rect">
-            <a:avLst/>
-          </a:prstGeom>
-          <a:noFill/>
-        </p:spPr>
-        <p:txBody>
-          <a:bodyPr wrap="square" rtlCol="0">
-            <a:spAutoFit/>
-          </a:bodyPr>
-          <a:lstStyle/>
-          <a:p>
-            <a:r>
-              <a:rPr lang="en-US" altLang="zh-TW" sz="2000" dirty="0">
-                <a:latin typeface="Arial" panose="020B0604020202020204" pitchFamily="34" charset="0"/>
-                <a:cs typeface="Arial" panose="020B0604020202020204" pitchFamily="34" charset="0"/>
-              </a:rPr>
-              <a:t>git checkout –b </a:t>
-            </a:r>
-            <a:r>
-              <a:rPr lang="en-US" altLang="zh-TW" sz="2000" dirty="0" err="1">
-                <a:latin typeface="Arial" panose="020B0604020202020204" pitchFamily="34" charset="0"/>
-                <a:cs typeface="Arial" panose="020B0604020202020204" pitchFamily="34" charset="0"/>
-              </a:rPr>
-              <a:t>new_branch</a:t>
-            </a:r>
-            <a:endParaRPr lang="en-US" altLang="zh-TW" sz="2000" dirty="0">
-              <a:latin typeface="Arial" panose="020B0604020202020204" pitchFamily="34" charset="0"/>
-              <a:cs typeface="Arial" panose="020B0604020202020204" pitchFamily="34" charset="0"/>
-            </a:endParaRPr>
-          </a:p>
-        </p:txBody>
-      </p:sp>
-      <p:sp>
-        <p:nvSpPr>
-          <p:cNvPr id="16" name="文字方塊 15">
-            <a:extLst>
-              <a:ext uri="{FF2B5EF4-FFF2-40B4-BE49-F238E27FC236}">
-                <a16:creationId xmlns:a16="http://schemas.microsoft.com/office/drawing/2014/main" id="{5363C442-B1E3-43CD-B532-2E2556292ED2}"/>
-              </a:ext>
-            </a:extLst>
-          </p:cNvPr>
-          <p:cNvSpPr txBox="1"/>
-          <p:nvPr/>
-        </p:nvSpPr>
-        <p:spPr>
-          <a:xfrm>
-            <a:off x="6114410" y="2105740"/>
-            <a:ext cx="2110328" cy="954107"/>
-          </a:xfrm>
-          <a:prstGeom prst="rect">
-            <a:avLst/>
-          </a:prstGeom>
-        </p:spPr>
-        <p:style>
-          <a:lnRef idx="2">
-            <a:schemeClr val="dk1"/>
-          </a:lnRef>
-          <a:fillRef idx="1">
-            <a:schemeClr val="lt1"/>
-          </a:fillRef>
-          <a:effectRef idx="0">
-            <a:schemeClr val="dk1"/>
-          </a:effectRef>
-          <a:fontRef idx="minor">
-            <a:schemeClr val="dk1"/>
-          </a:fontRef>
-        </p:style>
-        <p:txBody>
-          <a:bodyPr wrap="square" rtlCol="0">
-            <a:spAutoFit/>
-          </a:bodyPr>
-          <a:lstStyle/>
-          <a:p>
-            <a:r>
-              <a:rPr lang="zh-TW" altLang="en-US" sz="2800" dirty="0">
-                <a:latin typeface="Arial" panose="020B0604020202020204" pitchFamily="34" charset="0"/>
-                <a:cs typeface="Arial" panose="020B0604020202020204" pitchFamily="34" charset="0"/>
-              </a:rPr>
-              <a:t>。</a:t>
-            </a:r>
-            <a:r>
-              <a:rPr lang="en-US" altLang="zh-TW" sz="2800" dirty="0">
-                <a:latin typeface="Arial" panose="020B0604020202020204" pitchFamily="34" charset="0"/>
-                <a:cs typeface="Arial" panose="020B0604020202020204" pitchFamily="34" charset="0"/>
-              </a:rPr>
-              <a:t>main file</a:t>
-            </a:r>
-          </a:p>
-          <a:p>
-            <a:r>
-              <a:rPr lang="zh-TW" altLang="en-US" sz="2800" dirty="0">
-                <a:latin typeface="Arial" panose="020B0604020202020204" pitchFamily="34" charset="0"/>
-                <a:cs typeface="Arial" panose="020B0604020202020204" pitchFamily="34" charset="0"/>
-              </a:rPr>
-              <a:t>．</a:t>
-            </a:r>
-            <a:r>
-              <a:rPr lang="en-US" altLang="zh-TW" sz="2800" dirty="0">
-                <a:latin typeface="Arial" panose="020B0604020202020204" pitchFamily="34" charset="0"/>
-                <a:cs typeface="Arial" panose="020B0604020202020204" pitchFamily="34" charset="0"/>
-              </a:rPr>
-              <a:t>new file</a:t>
-            </a:r>
-          </a:p>
-        </p:txBody>
-      </p:sp>
-      <p:cxnSp>
-        <p:nvCxnSpPr>
-          <p:cNvPr id="18" name="直線單箭頭接點 17">
-            <a:extLst>
-              <a:ext uri="{FF2B5EF4-FFF2-40B4-BE49-F238E27FC236}">
-                <a16:creationId xmlns:a16="http://schemas.microsoft.com/office/drawing/2014/main" id="{D33E09B5-2ABD-4400-824C-B26610015F89}"/>
-              </a:ext>
-            </a:extLst>
-          </p:cNvPr>
-          <p:cNvCxnSpPr>
-            <a:cxnSpLocks/>
-            <a:stCxn id="7" idx="3"/>
-            <a:endCxn id="16" idx="1"/>
-          </p:cNvCxnSpPr>
-          <p:nvPr/>
-        </p:nvCxnSpPr>
-        <p:spPr>
-          <a:xfrm>
-            <a:off x="3779736" y="2576178"/>
-            <a:ext cx="2334674" cy="6616"/>
-          </a:xfrm>
-          <a:prstGeom prst="straightConnector1">
-            <a:avLst/>
-          </a:prstGeom>
-          <a:ln w="38100">
-            <a:solidFill>
-              <a:schemeClr val="tx1"/>
-            </a:solidFill>
-            <a:tailEnd type="triangle"/>
-          </a:ln>
-        </p:spPr>
-        <p:style>
-          <a:lnRef idx="1">
-            <a:schemeClr val="accent1"/>
-          </a:lnRef>
-          <a:fillRef idx="0">
-            <a:schemeClr val="accent1"/>
-          </a:fillRef>
-          <a:effectRef idx="0">
-            <a:schemeClr val="accent1"/>
-          </a:effectRef>
-          <a:fontRef idx="minor">
-            <a:schemeClr val="tx1"/>
-          </a:fontRef>
-        </p:style>
-      </p:cxnSp>
-      <p:sp>
-        <p:nvSpPr>
-          <p:cNvPr id="22" name="文字方塊 21">
-            <a:extLst>
-              <a:ext uri="{FF2B5EF4-FFF2-40B4-BE49-F238E27FC236}">
-                <a16:creationId xmlns:a16="http://schemas.microsoft.com/office/drawing/2014/main" id="{79DDA0F3-83F4-4BB3-BBBA-2509FAA4F2A3}"/>
-              </a:ext>
-            </a:extLst>
-          </p:cNvPr>
-          <p:cNvSpPr txBox="1"/>
-          <p:nvPr/>
-        </p:nvSpPr>
-        <p:spPr>
-          <a:xfrm>
-            <a:off x="4376428" y="2114513"/>
-            <a:ext cx="933805" cy="400110"/>
-          </a:xfrm>
-          <a:prstGeom prst="rect">
-            <a:avLst/>
-          </a:prstGeom>
-          <a:noFill/>
-        </p:spPr>
-        <p:txBody>
-          <a:bodyPr wrap="square" rtlCol="0">
-            <a:spAutoFit/>
-          </a:bodyPr>
-          <a:lstStyle/>
-          <a:p>
-            <a:r>
-              <a:rPr lang="en-US" altLang="zh-TW" sz="2000" dirty="0">
-                <a:latin typeface="Arial" panose="020B0604020202020204" pitchFamily="34" charset="0"/>
-                <a:cs typeface="Arial" panose="020B0604020202020204" pitchFamily="34" charset="0"/>
-              </a:rPr>
-              <a:t>modify</a:t>
-            </a:r>
-          </a:p>
-        </p:txBody>
-      </p:sp>
-      <p:sp>
-        <p:nvSpPr>
-          <p:cNvPr id="23" name="文字方塊 22">
-            <a:extLst>
-              <a:ext uri="{FF2B5EF4-FFF2-40B4-BE49-F238E27FC236}">
-                <a16:creationId xmlns:a16="http://schemas.microsoft.com/office/drawing/2014/main" id="{1F468E26-20E0-441C-9F7E-9891B9ACA69B}"/>
-              </a:ext>
-            </a:extLst>
-          </p:cNvPr>
-          <p:cNvSpPr txBox="1"/>
-          <p:nvPr/>
-        </p:nvSpPr>
-        <p:spPr>
-          <a:xfrm>
-            <a:off x="1669408" y="3646439"/>
-            <a:ext cx="2110328" cy="954107"/>
-          </a:xfrm>
-          <a:prstGeom prst="rect">
-            <a:avLst/>
-          </a:prstGeom>
-        </p:spPr>
-        <p:style>
-          <a:lnRef idx="2">
-            <a:schemeClr val="dk1"/>
-          </a:lnRef>
-          <a:fillRef idx="1">
-            <a:schemeClr val="lt1"/>
-          </a:fillRef>
-          <a:effectRef idx="0">
-            <a:schemeClr val="dk1"/>
-          </a:effectRef>
-          <a:fontRef idx="minor">
-            <a:schemeClr val="dk1"/>
-          </a:fontRef>
-        </p:style>
-        <p:txBody>
-          <a:bodyPr wrap="square" rtlCol="0">
-            <a:spAutoFit/>
-          </a:bodyPr>
-          <a:lstStyle/>
-          <a:p>
-            <a:r>
-              <a:rPr lang="zh-TW" altLang="en-US" sz="2800" dirty="0">
-                <a:latin typeface="Arial" panose="020B0604020202020204" pitchFamily="34" charset="0"/>
-                <a:cs typeface="Arial" panose="020B0604020202020204" pitchFamily="34" charset="0"/>
-              </a:rPr>
-              <a:t>。</a:t>
-            </a:r>
-            <a:r>
-              <a:rPr lang="en-US" altLang="zh-TW" sz="2800" dirty="0">
-                <a:latin typeface="Arial" panose="020B0604020202020204" pitchFamily="34" charset="0"/>
-                <a:cs typeface="Arial" panose="020B0604020202020204" pitchFamily="34" charset="0"/>
-              </a:rPr>
-              <a:t>main file</a:t>
-            </a:r>
-          </a:p>
-          <a:p>
-            <a:r>
-              <a:rPr lang="zh-TW" altLang="en-US" sz="2800" dirty="0">
-                <a:latin typeface="Arial" panose="020B0604020202020204" pitchFamily="34" charset="0"/>
-                <a:cs typeface="Arial" panose="020B0604020202020204" pitchFamily="34" charset="0"/>
-              </a:rPr>
-              <a:t>．</a:t>
-            </a:r>
-            <a:r>
-              <a:rPr lang="en-US" altLang="zh-TW" sz="2800" dirty="0">
-                <a:latin typeface="Arial" panose="020B0604020202020204" pitchFamily="34" charset="0"/>
-                <a:cs typeface="Arial" panose="020B0604020202020204" pitchFamily="34" charset="0"/>
-              </a:rPr>
-              <a:t>new file</a:t>
-            </a:r>
-          </a:p>
-        </p:txBody>
-      </p:sp>
-      <p:cxnSp>
-        <p:nvCxnSpPr>
-          <p:cNvPr id="24" name="直線單箭頭接點 23">
-            <a:extLst>
-              <a:ext uri="{FF2B5EF4-FFF2-40B4-BE49-F238E27FC236}">
-                <a16:creationId xmlns:a16="http://schemas.microsoft.com/office/drawing/2014/main" id="{AC2572B1-8983-4F84-8AB1-414999449184}"/>
-              </a:ext>
-            </a:extLst>
-          </p:cNvPr>
-          <p:cNvCxnSpPr>
-            <a:cxnSpLocks/>
-            <a:stCxn id="7" idx="2"/>
-            <a:endCxn id="23" idx="0"/>
-          </p:cNvCxnSpPr>
-          <p:nvPr/>
-        </p:nvCxnSpPr>
-        <p:spPr>
-          <a:xfrm flipH="1">
-            <a:off x="2724572" y="2837788"/>
-            <a:ext cx="1" cy="808651"/>
-          </a:xfrm>
-          <a:prstGeom prst="straightConnector1">
-            <a:avLst/>
-          </a:prstGeom>
-          <a:ln w="38100">
-            <a:solidFill>
-              <a:schemeClr val="tx1"/>
-            </a:solidFill>
-            <a:tailEnd type="triangle"/>
-          </a:ln>
-        </p:spPr>
-        <p:style>
-          <a:lnRef idx="1">
-            <a:schemeClr val="accent1"/>
-          </a:lnRef>
-          <a:fillRef idx="0">
-            <a:schemeClr val="accent1"/>
-          </a:fillRef>
-          <a:effectRef idx="0">
-            <a:schemeClr val="accent1"/>
-          </a:effectRef>
-          <a:fontRef idx="minor">
-            <a:schemeClr val="tx1"/>
-          </a:fontRef>
-        </p:style>
-      </p:cxnSp>
-      <p:cxnSp>
-        <p:nvCxnSpPr>
-          <p:cNvPr id="27" name="接點: 肘形 26">
-            <a:extLst>
-              <a:ext uri="{FF2B5EF4-FFF2-40B4-BE49-F238E27FC236}">
-                <a16:creationId xmlns:a16="http://schemas.microsoft.com/office/drawing/2014/main" id="{2E528F29-0DD3-4E23-9397-6B2F6F355E7B}"/>
-              </a:ext>
-            </a:extLst>
-          </p:cNvPr>
-          <p:cNvCxnSpPr>
-            <a:cxnSpLocks/>
-            <a:stCxn id="16" idx="2"/>
-            <a:endCxn id="23" idx="3"/>
-          </p:cNvCxnSpPr>
-          <p:nvPr/>
-        </p:nvCxnSpPr>
-        <p:spPr>
-          <a:xfrm rot="5400000">
-            <a:off x="4942832" y="1896751"/>
-            <a:ext cx="1063646" cy="3389838"/>
-          </a:xfrm>
-          <a:prstGeom prst="bentConnector2">
-            <a:avLst/>
-          </a:prstGeom>
-          <a:ln w="38100">
-            <a:solidFill>
-              <a:schemeClr val="tx1"/>
-            </a:solidFill>
-            <a:tailEnd type="triangle"/>
-          </a:ln>
-        </p:spPr>
-        <p:style>
-          <a:lnRef idx="1">
-            <a:schemeClr val="accent1"/>
-          </a:lnRef>
-          <a:fillRef idx="0">
-            <a:schemeClr val="accent1"/>
-          </a:fillRef>
-          <a:effectRef idx="0">
-            <a:schemeClr val="accent1"/>
-          </a:effectRef>
-          <a:fontRef idx="minor">
-            <a:schemeClr val="tx1"/>
-          </a:fontRef>
-        </p:style>
-      </p:cxnSp>
-      <p:sp>
-        <p:nvSpPr>
-          <p:cNvPr id="30" name="文字方塊 29">
-            <a:extLst>
-              <a:ext uri="{FF2B5EF4-FFF2-40B4-BE49-F238E27FC236}">
-                <a16:creationId xmlns:a16="http://schemas.microsoft.com/office/drawing/2014/main" id="{FEBF6538-9CDD-4F5A-BCB3-757B8725C0BA}"/>
-              </a:ext>
-            </a:extLst>
-          </p:cNvPr>
-          <p:cNvSpPr txBox="1"/>
-          <p:nvPr/>
-        </p:nvSpPr>
-        <p:spPr>
-          <a:xfrm>
-            <a:off x="4652057" y="3686176"/>
-            <a:ext cx="1714454" cy="400110"/>
-          </a:xfrm>
-          <a:prstGeom prst="rect">
-            <a:avLst/>
-          </a:prstGeom>
-          <a:noFill/>
-        </p:spPr>
-        <p:txBody>
-          <a:bodyPr wrap="square" rtlCol="0">
-            <a:spAutoFit/>
-          </a:bodyPr>
-          <a:lstStyle/>
-          <a:p>
-            <a:r>
-              <a:rPr lang="en-US" altLang="zh-TW" sz="2000" dirty="0">
-                <a:latin typeface="Arial" panose="020B0604020202020204" pitchFamily="34" charset="0"/>
-                <a:cs typeface="Arial" panose="020B0604020202020204" pitchFamily="34" charset="0"/>
-              </a:rPr>
-              <a:t>add, commit</a:t>
-            </a:r>
-          </a:p>
-        </p:txBody>
-      </p:sp>
-      <p:cxnSp>
-        <p:nvCxnSpPr>
-          <p:cNvPr id="33" name="直線單箭頭接點 32">
-            <a:extLst>
-              <a:ext uri="{FF2B5EF4-FFF2-40B4-BE49-F238E27FC236}">
-                <a16:creationId xmlns:a16="http://schemas.microsoft.com/office/drawing/2014/main" id="{A76451C5-833B-4D40-98B0-22044EE7228D}"/>
-              </a:ext>
-            </a:extLst>
-          </p:cNvPr>
-          <p:cNvCxnSpPr>
-            <a:cxnSpLocks/>
-            <a:stCxn id="6" idx="2"/>
-            <a:endCxn id="36" idx="0"/>
-          </p:cNvCxnSpPr>
-          <p:nvPr/>
-        </p:nvCxnSpPr>
-        <p:spPr>
-          <a:xfrm flipH="1">
-            <a:off x="1404209" y="1582106"/>
-            <a:ext cx="1" cy="3643180"/>
-          </a:xfrm>
-          <a:prstGeom prst="straightConnector1">
-            <a:avLst/>
-          </a:prstGeom>
-          <a:ln w="38100">
-            <a:solidFill>
-              <a:schemeClr val="tx1"/>
-            </a:solidFill>
-            <a:tailEnd type="triangle"/>
-          </a:ln>
-        </p:spPr>
-        <p:style>
-          <a:lnRef idx="1">
-            <a:schemeClr val="accent1"/>
-          </a:lnRef>
-          <a:fillRef idx="0">
-            <a:schemeClr val="accent1"/>
-          </a:fillRef>
-          <a:effectRef idx="0">
-            <a:schemeClr val="accent1"/>
-          </a:effectRef>
-          <a:fontRef idx="minor">
-            <a:schemeClr val="tx1"/>
-          </a:fontRef>
-        </p:style>
-      </p:cxnSp>
-      <p:sp>
-        <p:nvSpPr>
-          <p:cNvPr id="36" name="文字方塊 35">
-            <a:extLst>
-              <a:ext uri="{FF2B5EF4-FFF2-40B4-BE49-F238E27FC236}">
-                <a16:creationId xmlns:a16="http://schemas.microsoft.com/office/drawing/2014/main" id="{518804E3-8FC2-4488-87D4-F4A9F33849D8}"/>
-              </a:ext>
-            </a:extLst>
-          </p:cNvPr>
-          <p:cNvSpPr txBox="1"/>
-          <p:nvPr/>
-        </p:nvSpPr>
-        <p:spPr>
-          <a:xfrm>
-            <a:off x="937306" y="5225286"/>
-            <a:ext cx="933805" cy="400110"/>
-          </a:xfrm>
-          <a:prstGeom prst="rect">
-            <a:avLst/>
-          </a:prstGeom>
-          <a:noFill/>
-        </p:spPr>
-        <p:txBody>
-          <a:bodyPr wrap="square" rtlCol="0">
-            <a:spAutoFit/>
-          </a:bodyPr>
-          <a:lstStyle/>
-          <a:p>
-            <a:r>
-              <a:rPr lang="en-US" altLang="zh-TW" sz="2000" dirty="0">
-                <a:latin typeface="Arial" panose="020B0604020202020204" pitchFamily="34" charset="0"/>
-                <a:cs typeface="Arial" panose="020B0604020202020204" pitchFamily="34" charset="0"/>
-              </a:rPr>
-              <a:t>merge</a:t>
-            </a:r>
-          </a:p>
-        </p:txBody>
-      </p:sp>
-      <p:cxnSp>
-        <p:nvCxnSpPr>
-          <p:cNvPr id="40" name="接點: 肘形 39">
-            <a:extLst>
-              <a:ext uri="{FF2B5EF4-FFF2-40B4-BE49-F238E27FC236}">
-                <a16:creationId xmlns:a16="http://schemas.microsoft.com/office/drawing/2014/main" id="{FEB8B8ED-CAB0-4C11-9628-33C7EB66C3FA}"/>
-              </a:ext>
-            </a:extLst>
-          </p:cNvPr>
-          <p:cNvCxnSpPr>
-            <a:cxnSpLocks/>
-            <a:stCxn id="23" idx="2"/>
-            <a:endCxn id="36" idx="3"/>
-          </p:cNvCxnSpPr>
-          <p:nvPr/>
-        </p:nvCxnSpPr>
-        <p:spPr>
-          <a:xfrm rot="5400000">
-            <a:off x="1885445" y="4586213"/>
-            <a:ext cx="824795" cy="853461"/>
-          </a:xfrm>
-          <a:prstGeom prst="bentConnector2">
-            <a:avLst/>
-          </a:prstGeom>
-          <a:ln w="38100">
-            <a:solidFill>
-              <a:schemeClr val="tx1"/>
-            </a:solidFill>
-            <a:tailEnd type="triangle"/>
-          </a:ln>
-        </p:spPr>
-        <p:style>
-          <a:lnRef idx="1">
-            <a:schemeClr val="accent1"/>
-          </a:lnRef>
-          <a:fillRef idx="0">
-            <a:schemeClr val="accent1"/>
-          </a:fillRef>
-          <a:effectRef idx="0">
-            <a:schemeClr val="accent1"/>
-          </a:effectRef>
-          <a:fontRef idx="minor">
-            <a:schemeClr val="tx1"/>
-          </a:fontRef>
-        </p:style>
-      </p:cxnSp>
-      <p:cxnSp>
-        <p:nvCxnSpPr>
-          <p:cNvPr id="43" name="直線單箭頭接點 42">
-            <a:extLst>
-              <a:ext uri="{FF2B5EF4-FFF2-40B4-BE49-F238E27FC236}">
-                <a16:creationId xmlns:a16="http://schemas.microsoft.com/office/drawing/2014/main" id="{4CBCE9BE-B1B4-49CC-AA1D-6C0C71B98ADB}"/>
-              </a:ext>
-            </a:extLst>
-          </p:cNvPr>
-          <p:cNvCxnSpPr>
-            <a:cxnSpLocks/>
-            <a:stCxn id="36" idx="2"/>
-          </p:cNvCxnSpPr>
-          <p:nvPr/>
-        </p:nvCxnSpPr>
-        <p:spPr>
-          <a:xfrm>
-            <a:off x="1404209" y="5625396"/>
-            <a:ext cx="0" cy="473400"/>
-          </a:xfrm>
-          <a:prstGeom prst="straightConnector1">
-            <a:avLst/>
-          </a:prstGeom>
-          <a:ln w="38100">
-            <a:solidFill>
-              <a:schemeClr val="tx1"/>
-            </a:solidFill>
-            <a:tailEnd type="triangle"/>
-          </a:ln>
-        </p:spPr>
-        <p:style>
-          <a:lnRef idx="1">
-            <a:schemeClr val="accent1"/>
-          </a:lnRef>
-          <a:fillRef idx="0">
-            <a:schemeClr val="accent1"/>
-          </a:fillRef>
-          <a:effectRef idx="0">
-            <a:schemeClr val="accent1"/>
-          </a:effectRef>
-          <a:fontRef idx="minor">
-            <a:schemeClr val="tx1"/>
-          </a:fontRef>
-        </p:style>
-      </p:cxnSp>
-    </p:spTree>
-    <p:extLst>
-      <p:ext uri="{BB962C8B-B14F-4D97-AF65-F5344CB8AC3E}">
-        <p14:creationId xmlns:p14="http://schemas.microsoft.com/office/powerpoint/2010/main" val="3095387095"/>
-      </p:ext>
-    </p:extLst>
-  </p:cSld>
-  <p:clrMapOvr>
-    <a:masterClrMapping/>
-  </p:clrMapOvr>
-</p:sld>
-</file>
-
-<file path=ppt/slides/slide29.xml><?xml version="1.0" encoding="utf-8"?>
-<p:sld xmlns:a="http://schemas.openxmlformats.org/drawingml/2006/main" xmlns:r="http://schemas.openxmlformats.org/officeDocument/2006/relationships" xmlns:p="http://schemas.openxmlformats.org/presentationml/2006/main">
-  <p:cSld>
-    <p:spTree>
-      <p:nvGrpSpPr>
-        <p:cNvPr id="1" name=""/>
-        <p:cNvGrpSpPr/>
-        <p:nvPr/>
-      </p:nvGrpSpPr>
-      <p:grpSpPr>
-        <a:xfrm>
-          <a:off x="0" y="0"/>
-          <a:ext cx="0" cy="0"/>
-          <a:chOff x="0" y="0"/>
-          <a:chExt cx="0" cy="0"/>
-        </a:xfrm>
-      </p:grpSpPr>
-      <p:pic>
-        <p:nvPicPr>
-          <p:cNvPr id="3" name="圖片 2">
-            <a:extLst>
-              <a:ext uri="{FF2B5EF4-FFF2-40B4-BE49-F238E27FC236}">
-                <a16:creationId xmlns:a16="http://schemas.microsoft.com/office/drawing/2014/main" id="{1202EBDE-7F64-43BD-86B7-6C228CCEC2D0}"/>
-              </a:ext>
-            </a:extLst>
-          </p:cNvPr>
-          <p:cNvPicPr>
-            <a:picLocks noChangeAspect="1"/>
-          </p:cNvPicPr>
-          <p:nvPr/>
-        </p:nvPicPr>
-        <p:blipFill>
-          <a:blip r:embed="rId2" cstate="print">
-            <a:extLst>
-              <a:ext uri="{28A0092B-C50C-407E-A947-70E740481C1C}">
-                <a14:useLocalDpi xmlns:a14="http://schemas.microsoft.com/office/drawing/2010/main" val="0"/>
-              </a:ext>
-            </a:extLst>
-          </a:blip>
-          <a:stretch>
-            <a:fillRect/>
-          </a:stretch>
-        </p:blipFill>
-        <p:spPr>
-          <a:xfrm>
-            <a:off x="6598915" y="0"/>
-            <a:ext cx="2545085" cy="3294895"/>
-          </a:xfrm>
-          <a:prstGeom prst="rect">
-            <a:avLst/>
-          </a:prstGeom>
-        </p:spPr>
-      </p:pic>
-      <p:pic>
-        <p:nvPicPr>
-          <p:cNvPr id="4" name="圖片 3">
-            <a:extLst>
-              <a:ext uri="{FF2B5EF4-FFF2-40B4-BE49-F238E27FC236}">
-                <a16:creationId xmlns:a16="http://schemas.microsoft.com/office/drawing/2014/main" id="{AEFF5069-0FA7-44E7-AEEE-225463C6B1AC}"/>
-              </a:ext>
-            </a:extLst>
-          </p:cNvPr>
-          <p:cNvPicPr>
-            <a:picLocks noChangeAspect="1"/>
-          </p:cNvPicPr>
-          <p:nvPr/>
-        </p:nvPicPr>
-        <p:blipFill>
-          <a:blip r:embed="rId3" cstate="print">
-            <a:extLst>
-              <a:ext uri="{28A0092B-C50C-407E-A947-70E740481C1C}">
-                <a14:useLocalDpi xmlns:a14="http://schemas.microsoft.com/office/drawing/2010/main" val="0"/>
-              </a:ext>
-            </a:extLst>
-          </a:blip>
-          <a:stretch>
-            <a:fillRect/>
-          </a:stretch>
-        </p:blipFill>
-        <p:spPr>
-          <a:xfrm>
-            <a:off x="0" y="4169659"/>
-            <a:ext cx="3934976" cy="2688341"/>
-          </a:xfrm>
-          <a:prstGeom prst="rect">
-            <a:avLst/>
-          </a:prstGeom>
-        </p:spPr>
-      </p:pic>
-      <p:sp>
-        <p:nvSpPr>
-          <p:cNvPr id="5" name="文字方塊 4">
-            <a:extLst>
-              <a:ext uri="{FF2B5EF4-FFF2-40B4-BE49-F238E27FC236}">
-                <a16:creationId xmlns:a16="http://schemas.microsoft.com/office/drawing/2014/main" id="{C16ED53E-9866-436B-893D-42D9B6177B63}"/>
-              </a:ext>
-            </a:extLst>
-          </p:cNvPr>
-          <p:cNvSpPr txBox="1"/>
-          <p:nvPr/>
-        </p:nvSpPr>
-        <p:spPr>
-          <a:xfrm>
-            <a:off x="661169" y="767632"/>
-            <a:ext cx="8039380" cy="4433073"/>
-          </a:xfrm>
-          <a:prstGeom prst="rect">
-            <a:avLst/>
-          </a:prstGeom>
-          <a:noFill/>
-        </p:spPr>
-        <p:txBody>
-          <a:bodyPr wrap="none" rtlCol="0">
-            <a:spAutoFit/>
-          </a:bodyPr>
-          <a:lstStyle/>
-          <a:p>
-            <a:pPr>
-              <a:lnSpc>
-                <a:spcPct val="150000"/>
-              </a:lnSpc>
-            </a:pPr>
-            <a:r>
-              <a:rPr lang="zh-TW" altLang="en-US" sz="3200" dirty="0">
-                <a:latin typeface="Arial" panose="020B0604020202020204" pitchFamily="34" charset="0"/>
-                <a:cs typeface="Arial" panose="020B0604020202020204" pitchFamily="34" charset="0"/>
-              </a:rPr>
-              <a:t>．</a:t>
-            </a:r>
-            <a:r>
-              <a:rPr lang="en-US" altLang="zh-TW" sz="3200" dirty="0">
-                <a:latin typeface="Arial" panose="020B0604020202020204" pitchFamily="34" charset="0"/>
-                <a:cs typeface="Arial" panose="020B0604020202020204" pitchFamily="34" charset="0"/>
-              </a:rPr>
-              <a:t>history of diff. branches are diff.</a:t>
-            </a:r>
-          </a:p>
-          <a:p>
-            <a:pPr>
-              <a:lnSpc>
-                <a:spcPct val="150000"/>
-              </a:lnSpc>
-            </a:pPr>
-            <a:r>
-              <a:rPr lang="zh-TW" altLang="en-US" sz="3200" dirty="0">
-                <a:latin typeface="Arial" panose="020B0604020202020204" pitchFamily="34" charset="0"/>
-                <a:cs typeface="Arial" panose="020B0604020202020204" pitchFamily="34" charset="0"/>
-              </a:rPr>
-              <a:t>．</a:t>
-            </a:r>
-            <a:r>
-              <a:rPr lang="en-US" altLang="zh-TW" sz="3200" dirty="0">
-                <a:latin typeface="Arial" panose="020B0604020202020204" pitchFamily="34" charset="0"/>
-                <a:cs typeface="Arial" panose="020B0604020202020204" pitchFamily="34" charset="0"/>
-              </a:rPr>
-              <a:t>git branch –d </a:t>
-            </a:r>
-            <a:r>
-              <a:rPr lang="en-US" altLang="zh-TW" sz="3200" dirty="0" err="1">
-                <a:latin typeface="Arial" panose="020B0604020202020204" pitchFamily="34" charset="0"/>
-                <a:cs typeface="Arial" panose="020B0604020202020204" pitchFamily="34" charset="0"/>
-              </a:rPr>
-              <a:t>branch_name</a:t>
-            </a:r>
-            <a:endParaRPr lang="en-US" altLang="zh-TW" sz="3200" dirty="0">
-              <a:latin typeface="Arial" panose="020B0604020202020204" pitchFamily="34" charset="0"/>
-              <a:cs typeface="Arial" panose="020B0604020202020204" pitchFamily="34" charset="0"/>
-            </a:endParaRPr>
-          </a:p>
-          <a:p>
-            <a:pPr>
-              <a:lnSpc>
-                <a:spcPct val="150000"/>
-              </a:lnSpc>
-            </a:pPr>
-            <a:r>
-              <a:rPr lang="zh-TW" altLang="en-US" sz="3200" dirty="0">
-                <a:latin typeface="Arial" panose="020B0604020202020204" pitchFamily="34" charset="0"/>
-                <a:cs typeface="Arial" panose="020B0604020202020204" pitchFamily="34" charset="0"/>
-              </a:rPr>
-              <a:t>．</a:t>
-            </a:r>
-            <a:r>
-              <a:rPr lang="en-US" altLang="zh-TW" sz="3200" dirty="0">
-                <a:latin typeface="Arial" panose="020B0604020202020204" pitchFamily="34" charset="0"/>
-                <a:cs typeface="Arial" panose="020B0604020202020204" pitchFamily="34" charset="0"/>
-              </a:rPr>
-              <a:t>git merge </a:t>
-            </a:r>
-            <a:r>
-              <a:rPr lang="en-US" altLang="zh-TW" sz="3200" dirty="0" err="1">
-                <a:latin typeface="Arial" panose="020B0604020202020204" pitchFamily="34" charset="0"/>
-                <a:cs typeface="Arial" panose="020B0604020202020204" pitchFamily="34" charset="0"/>
-              </a:rPr>
-              <a:t>branch_name</a:t>
-            </a:r>
-            <a:endParaRPr lang="en-US" altLang="zh-TW" sz="3200" dirty="0">
-              <a:latin typeface="Arial" panose="020B0604020202020204" pitchFamily="34" charset="0"/>
-              <a:cs typeface="Arial" panose="020B0604020202020204" pitchFamily="34" charset="0"/>
-            </a:endParaRPr>
-          </a:p>
-          <a:p>
-            <a:pPr>
-              <a:lnSpc>
-                <a:spcPct val="150000"/>
-              </a:lnSpc>
-            </a:pPr>
-            <a:r>
-              <a:rPr lang="zh-TW" altLang="en-US" sz="3200" dirty="0">
-                <a:latin typeface="Arial" panose="020B0604020202020204" pitchFamily="34" charset="0"/>
-                <a:cs typeface="Arial" panose="020B0604020202020204" pitchFamily="34" charset="0"/>
-              </a:rPr>
-              <a:t>．</a:t>
-            </a:r>
-            <a:r>
-              <a:rPr lang="en-US" altLang="zh-TW" sz="3200" dirty="0">
-                <a:latin typeface="Arial" panose="020B0604020202020204" pitchFamily="34" charset="0"/>
-                <a:cs typeface="Arial" panose="020B0604020202020204" pitchFamily="34" charset="0"/>
-              </a:rPr>
-              <a:t>fast-forward merge (when no diverge)</a:t>
-            </a:r>
-          </a:p>
-          <a:p>
-            <a:pPr>
-              <a:lnSpc>
-                <a:spcPct val="150000"/>
-              </a:lnSpc>
-            </a:pPr>
-            <a:r>
-              <a:rPr lang="zh-TW" altLang="en-US" sz="3200" dirty="0">
-                <a:latin typeface="Arial" panose="020B0604020202020204" pitchFamily="34" charset="0"/>
-                <a:cs typeface="Arial" panose="020B0604020202020204" pitchFamily="34" charset="0"/>
-              </a:rPr>
-              <a:t>．</a:t>
-            </a:r>
-            <a:r>
-              <a:rPr lang="en-US" altLang="zh-TW" sz="3200" dirty="0">
-                <a:latin typeface="Arial" panose="020B0604020202020204" pitchFamily="34" charset="0"/>
-                <a:cs typeface="Arial" panose="020B0604020202020204" pitchFamily="34" charset="0"/>
-              </a:rPr>
-              <a:t>three-way merge (diverge but no conflict)</a:t>
-            </a:r>
-          </a:p>
-          <a:p>
-            <a:pPr>
-              <a:lnSpc>
-                <a:spcPct val="150000"/>
-              </a:lnSpc>
-            </a:pPr>
-            <a:r>
-              <a:rPr lang="zh-TW" altLang="en-US" sz="3200" dirty="0">
-                <a:latin typeface="Arial" panose="020B0604020202020204" pitchFamily="34" charset="0"/>
-                <a:cs typeface="Arial" panose="020B0604020202020204" pitchFamily="34" charset="0"/>
-              </a:rPr>
-              <a:t>．</a:t>
-            </a:r>
-            <a:r>
-              <a:rPr lang="en-US" altLang="zh-TW" sz="3200" dirty="0">
-                <a:latin typeface="Arial" panose="020B0604020202020204" pitchFamily="34" charset="0"/>
-                <a:cs typeface="Arial" panose="020B0604020202020204" pitchFamily="34" charset="0"/>
-              </a:rPr>
-              <a:t>conflict ? Fix it, add, and commit </a:t>
-            </a:r>
-          </a:p>
-        </p:txBody>
-      </p:sp>
-    </p:spTree>
-    <p:extLst>
-      <p:ext uri="{BB962C8B-B14F-4D97-AF65-F5344CB8AC3E}">
-        <p14:creationId xmlns:p14="http://schemas.microsoft.com/office/powerpoint/2010/main" val="1609292287"/>
       </p:ext>
     </p:extLst>
   </p:cSld>
@@ -9543,1241 +7852,6 @@
 </p:sld>
 </file>
 
-<file path=ppt/slides/slide30.xml><?xml version="1.0" encoding="utf-8"?>
-<p:sld xmlns:a="http://schemas.openxmlformats.org/drawingml/2006/main" xmlns:r="http://schemas.openxmlformats.org/officeDocument/2006/relationships" xmlns:p="http://schemas.openxmlformats.org/presentationml/2006/main">
-  <p:cSld>
-    <p:spTree>
-      <p:nvGrpSpPr>
-        <p:cNvPr id="1" name=""/>
-        <p:cNvGrpSpPr/>
-        <p:nvPr/>
-      </p:nvGrpSpPr>
-      <p:grpSpPr>
-        <a:xfrm>
-          <a:off x="0" y="0"/>
-          <a:ext cx="0" cy="0"/>
-          <a:chOff x="0" y="0"/>
-          <a:chExt cx="0" cy="0"/>
-        </a:xfrm>
-      </p:grpSpPr>
-      <p:pic>
-        <p:nvPicPr>
-          <p:cNvPr id="3" name="圖片 2">
-            <a:extLst>
-              <a:ext uri="{FF2B5EF4-FFF2-40B4-BE49-F238E27FC236}">
-                <a16:creationId xmlns:a16="http://schemas.microsoft.com/office/drawing/2014/main" id="{1202EBDE-7F64-43BD-86B7-6C228CCEC2D0}"/>
-              </a:ext>
-            </a:extLst>
-          </p:cNvPr>
-          <p:cNvPicPr>
-            <a:picLocks noChangeAspect="1"/>
-          </p:cNvPicPr>
-          <p:nvPr/>
-        </p:nvPicPr>
-        <p:blipFill>
-          <a:blip r:embed="rId2" cstate="print">
-            <a:extLst>
-              <a:ext uri="{28A0092B-C50C-407E-A947-70E740481C1C}">
-                <a14:useLocalDpi xmlns:a14="http://schemas.microsoft.com/office/drawing/2010/main" val="0"/>
-              </a:ext>
-            </a:extLst>
-          </a:blip>
-          <a:stretch>
-            <a:fillRect/>
-          </a:stretch>
-        </p:blipFill>
-        <p:spPr>
-          <a:xfrm>
-            <a:off x="6598915" y="0"/>
-            <a:ext cx="2545085" cy="3294895"/>
-          </a:xfrm>
-          <a:prstGeom prst="rect">
-            <a:avLst/>
-          </a:prstGeom>
-        </p:spPr>
-      </p:pic>
-      <p:pic>
-        <p:nvPicPr>
-          <p:cNvPr id="4" name="圖片 3">
-            <a:extLst>
-              <a:ext uri="{FF2B5EF4-FFF2-40B4-BE49-F238E27FC236}">
-                <a16:creationId xmlns:a16="http://schemas.microsoft.com/office/drawing/2014/main" id="{AEFF5069-0FA7-44E7-AEEE-225463C6B1AC}"/>
-              </a:ext>
-            </a:extLst>
-          </p:cNvPr>
-          <p:cNvPicPr>
-            <a:picLocks noChangeAspect="1"/>
-          </p:cNvPicPr>
-          <p:nvPr/>
-        </p:nvPicPr>
-        <p:blipFill>
-          <a:blip r:embed="rId3" cstate="print">
-            <a:extLst>
-              <a:ext uri="{28A0092B-C50C-407E-A947-70E740481C1C}">
-                <a14:useLocalDpi xmlns:a14="http://schemas.microsoft.com/office/drawing/2010/main" val="0"/>
-              </a:ext>
-            </a:extLst>
-          </a:blip>
-          <a:stretch>
-            <a:fillRect/>
-          </a:stretch>
-        </p:blipFill>
-        <p:spPr>
-          <a:xfrm>
-            <a:off x="0" y="4169659"/>
-            <a:ext cx="3934976" cy="2688341"/>
-          </a:xfrm>
-          <a:prstGeom prst="rect">
-            <a:avLst/>
-          </a:prstGeom>
-        </p:spPr>
-      </p:pic>
-      <p:cxnSp>
-        <p:nvCxnSpPr>
-          <p:cNvPr id="5" name="直線接點 4">
-            <a:extLst>
-              <a:ext uri="{FF2B5EF4-FFF2-40B4-BE49-F238E27FC236}">
-                <a16:creationId xmlns:a16="http://schemas.microsoft.com/office/drawing/2014/main" id="{D1762274-47D1-40FE-B255-A9D5DEA69D48}"/>
-              </a:ext>
-            </a:extLst>
-          </p:cNvPr>
-          <p:cNvCxnSpPr>
-            <a:cxnSpLocks/>
-          </p:cNvCxnSpPr>
-          <p:nvPr/>
-        </p:nvCxnSpPr>
-        <p:spPr>
-          <a:xfrm>
-            <a:off x="678535" y="637564"/>
-            <a:ext cx="285226" cy="503339"/>
-          </a:xfrm>
-          <a:prstGeom prst="line">
-            <a:avLst/>
-          </a:prstGeom>
-          <a:ln w="28575">
-            <a:solidFill>
-              <a:schemeClr val="bg1">
-                <a:lumMod val="50000"/>
-              </a:schemeClr>
-            </a:solidFill>
-          </a:ln>
-        </p:spPr>
-        <p:style>
-          <a:lnRef idx="1">
-            <a:schemeClr val="accent1"/>
-          </a:lnRef>
-          <a:fillRef idx="0">
-            <a:schemeClr val="accent1"/>
-          </a:fillRef>
-          <a:effectRef idx="0">
-            <a:schemeClr val="accent1"/>
-          </a:effectRef>
-          <a:fontRef idx="minor">
-            <a:schemeClr val="tx1"/>
-          </a:fontRef>
-        </p:style>
-      </p:cxnSp>
-      <p:cxnSp>
-        <p:nvCxnSpPr>
-          <p:cNvPr id="6" name="直線接點 5">
-            <a:extLst>
-              <a:ext uri="{FF2B5EF4-FFF2-40B4-BE49-F238E27FC236}">
-                <a16:creationId xmlns:a16="http://schemas.microsoft.com/office/drawing/2014/main" id="{E2569004-F964-4D54-83A1-1EDA6D9EF198}"/>
-              </a:ext>
-            </a:extLst>
-          </p:cNvPr>
-          <p:cNvCxnSpPr>
-            <a:cxnSpLocks/>
-          </p:cNvCxnSpPr>
-          <p:nvPr/>
-        </p:nvCxnSpPr>
-        <p:spPr>
-          <a:xfrm>
-            <a:off x="963761" y="1140903"/>
-            <a:ext cx="3162650" cy="0"/>
-          </a:xfrm>
-          <a:prstGeom prst="line">
-            <a:avLst/>
-          </a:prstGeom>
-          <a:ln w="28575">
-            <a:solidFill>
-              <a:schemeClr val="bg1">
-                <a:lumMod val="50000"/>
-              </a:schemeClr>
-            </a:solidFill>
-          </a:ln>
-        </p:spPr>
-        <p:style>
-          <a:lnRef idx="1">
-            <a:schemeClr val="accent1"/>
-          </a:lnRef>
-          <a:fillRef idx="0">
-            <a:schemeClr val="accent1"/>
-          </a:fillRef>
-          <a:effectRef idx="0">
-            <a:schemeClr val="accent1"/>
-          </a:effectRef>
-          <a:fontRef idx="minor">
-            <a:schemeClr val="tx1"/>
-          </a:fontRef>
-        </p:style>
-      </p:cxnSp>
-      <p:cxnSp>
-        <p:nvCxnSpPr>
-          <p:cNvPr id="7" name="直線接點 6">
-            <a:extLst>
-              <a:ext uri="{FF2B5EF4-FFF2-40B4-BE49-F238E27FC236}">
-                <a16:creationId xmlns:a16="http://schemas.microsoft.com/office/drawing/2014/main" id="{139F4661-2B2F-46A0-8E8F-96ADBA363B4C}"/>
-              </a:ext>
-            </a:extLst>
-          </p:cNvPr>
-          <p:cNvCxnSpPr>
-            <a:cxnSpLocks/>
-          </p:cNvCxnSpPr>
-          <p:nvPr/>
-        </p:nvCxnSpPr>
-        <p:spPr>
-          <a:xfrm>
-            <a:off x="4126411" y="1140904"/>
-            <a:ext cx="285226" cy="503339"/>
-          </a:xfrm>
-          <a:prstGeom prst="line">
-            <a:avLst/>
-          </a:prstGeom>
-          <a:ln w="28575">
-            <a:solidFill>
-              <a:schemeClr val="bg1">
-                <a:lumMod val="50000"/>
-              </a:schemeClr>
-            </a:solidFill>
-          </a:ln>
-        </p:spPr>
-        <p:style>
-          <a:lnRef idx="1">
-            <a:schemeClr val="accent1"/>
-          </a:lnRef>
-          <a:fillRef idx="0">
-            <a:schemeClr val="accent1"/>
-          </a:fillRef>
-          <a:effectRef idx="0">
-            <a:schemeClr val="accent1"/>
-          </a:effectRef>
-          <a:fontRef idx="minor">
-            <a:schemeClr val="tx1"/>
-          </a:fontRef>
-        </p:style>
-      </p:cxnSp>
-      <p:sp>
-        <p:nvSpPr>
-          <p:cNvPr id="8" name="文字方塊 7">
-            <a:extLst>
-              <a:ext uri="{FF2B5EF4-FFF2-40B4-BE49-F238E27FC236}">
-                <a16:creationId xmlns:a16="http://schemas.microsoft.com/office/drawing/2014/main" id="{2E3C98C0-256E-47E3-92E0-EFFAA4DD8CD0}"/>
-              </a:ext>
-            </a:extLst>
-          </p:cNvPr>
-          <p:cNvSpPr txBox="1"/>
-          <p:nvPr/>
-        </p:nvSpPr>
-        <p:spPr>
-          <a:xfrm>
-            <a:off x="963761" y="433017"/>
-            <a:ext cx="1909497" cy="707886"/>
-          </a:xfrm>
-          <a:prstGeom prst="rect">
-            <a:avLst/>
-          </a:prstGeom>
-          <a:noFill/>
-        </p:spPr>
-        <p:txBody>
-          <a:bodyPr wrap="none" rtlCol="0">
-            <a:spAutoFit/>
-          </a:bodyPr>
-          <a:lstStyle/>
-          <a:p>
-            <a:r>
-              <a:rPr lang="en-US" altLang="zh-TW" sz="4000" dirty="0">
-                <a:latin typeface="微軟正黑體" panose="020B0604030504040204" pitchFamily="34" charset="-120"/>
-                <a:ea typeface="微軟正黑體" panose="020B0604030504040204" pitchFamily="34" charset="-120"/>
-                <a:cs typeface="Times New Roman" panose="02020603050405020304" pitchFamily="18" charset="0"/>
-              </a:rPr>
-              <a:t>GitHub</a:t>
-            </a:r>
-            <a:endParaRPr lang="zh-TW" altLang="en-US" sz="4000" dirty="0">
-              <a:latin typeface="微軟正黑體" panose="020B0604030504040204" pitchFamily="34" charset="-120"/>
-              <a:ea typeface="微軟正黑體" panose="020B0604030504040204" pitchFamily="34" charset="-120"/>
-              <a:cs typeface="Times New Roman" panose="02020603050405020304" pitchFamily="18" charset="0"/>
-            </a:endParaRPr>
-          </a:p>
-        </p:txBody>
-      </p:sp>
-      <p:pic>
-        <p:nvPicPr>
-          <p:cNvPr id="10" name="圖片 9">
-            <a:hlinkClick r:id="rId4"/>
-            <a:extLst>
-              <a:ext uri="{FF2B5EF4-FFF2-40B4-BE49-F238E27FC236}">
-                <a16:creationId xmlns:a16="http://schemas.microsoft.com/office/drawing/2014/main" id="{65BE1B23-F44B-401E-B019-58749DAFAF89}"/>
-              </a:ext>
-            </a:extLst>
-          </p:cNvPr>
-          <p:cNvPicPr>
-            <a:picLocks noChangeAspect="1"/>
-          </p:cNvPicPr>
-          <p:nvPr/>
-        </p:nvPicPr>
-        <p:blipFill rotWithShape="1">
-          <a:blip r:embed="rId5">
-            <a:extLst>
-              <a:ext uri="{28A0092B-C50C-407E-A947-70E740481C1C}">
-                <a14:useLocalDpi xmlns:a14="http://schemas.microsoft.com/office/drawing/2010/main" val="0"/>
-              </a:ext>
-            </a:extLst>
-          </a:blip>
-          <a:srcRect l="19450" r="19633"/>
-          <a:stretch/>
-        </p:blipFill>
-        <p:spPr>
-          <a:xfrm>
-            <a:off x="2570337" y="2259784"/>
-            <a:ext cx="4003325" cy="3450155"/>
-          </a:xfrm>
-          <a:prstGeom prst="rect">
-            <a:avLst/>
-          </a:prstGeom>
-        </p:spPr>
-      </p:pic>
-    </p:spTree>
-    <p:extLst>
-      <p:ext uri="{BB962C8B-B14F-4D97-AF65-F5344CB8AC3E}">
-        <p14:creationId xmlns:p14="http://schemas.microsoft.com/office/powerpoint/2010/main" val="2013825449"/>
-      </p:ext>
-    </p:extLst>
-  </p:cSld>
-  <p:clrMapOvr>
-    <a:masterClrMapping/>
-  </p:clrMapOvr>
-</p:sld>
-</file>
-
-<file path=ppt/slides/slide31.xml><?xml version="1.0" encoding="utf-8"?>
-<p:sld xmlns:a="http://schemas.openxmlformats.org/drawingml/2006/main" xmlns:r="http://schemas.openxmlformats.org/officeDocument/2006/relationships" xmlns:p="http://schemas.openxmlformats.org/presentationml/2006/main">
-  <p:cSld>
-    <p:spTree>
-      <p:nvGrpSpPr>
-        <p:cNvPr id="1" name=""/>
-        <p:cNvGrpSpPr/>
-        <p:nvPr/>
-      </p:nvGrpSpPr>
-      <p:grpSpPr>
-        <a:xfrm>
-          <a:off x="0" y="0"/>
-          <a:ext cx="0" cy="0"/>
-          <a:chOff x="0" y="0"/>
-          <a:chExt cx="0" cy="0"/>
-        </a:xfrm>
-      </p:grpSpPr>
-      <p:pic>
-        <p:nvPicPr>
-          <p:cNvPr id="3" name="圖片 2">
-            <a:extLst>
-              <a:ext uri="{FF2B5EF4-FFF2-40B4-BE49-F238E27FC236}">
-                <a16:creationId xmlns:a16="http://schemas.microsoft.com/office/drawing/2014/main" id="{1202EBDE-7F64-43BD-86B7-6C228CCEC2D0}"/>
-              </a:ext>
-            </a:extLst>
-          </p:cNvPr>
-          <p:cNvPicPr>
-            <a:picLocks noChangeAspect="1"/>
-          </p:cNvPicPr>
-          <p:nvPr/>
-        </p:nvPicPr>
-        <p:blipFill>
-          <a:blip r:embed="rId2" cstate="print">
-            <a:extLst>
-              <a:ext uri="{28A0092B-C50C-407E-A947-70E740481C1C}">
-                <a14:useLocalDpi xmlns:a14="http://schemas.microsoft.com/office/drawing/2010/main" val="0"/>
-              </a:ext>
-            </a:extLst>
-          </a:blip>
-          <a:stretch>
-            <a:fillRect/>
-          </a:stretch>
-        </p:blipFill>
-        <p:spPr>
-          <a:xfrm>
-            <a:off x="6598915" y="0"/>
-            <a:ext cx="2545085" cy="3294895"/>
-          </a:xfrm>
-          <a:prstGeom prst="rect">
-            <a:avLst/>
-          </a:prstGeom>
-        </p:spPr>
-      </p:pic>
-      <p:pic>
-        <p:nvPicPr>
-          <p:cNvPr id="4" name="圖片 3">
-            <a:extLst>
-              <a:ext uri="{FF2B5EF4-FFF2-40B4-BE49-F238E27FC236}">
-                <a16:creationId xmlns:a16="http://schemas.microsoft.com/office/drawing/2014/main" id="{AEFF5069-0FA7-44E7-AEEE-225463C6B1AC}"/>
-              </a:ext>
-            </a:extLst>
-          </p:cNvPr>
-          <p:cNvPicPr>
-            <a:picLocks noChangeAspect="1"/>
-          </p:cNvPicPr>
-          <p:nvPr/>
-        </p:nvPicPr>
-        <p:blipFill>
-          <a:blip r:embed="rId3" cstate="print">
-            <a:extLst>
-              <a:ext uri="{28A0092B-C50C-407E-A947-70E740481C1C}">
-                <a14:useLocalDpi xmlns:a14="http://schemas.microsoft.com/office/drawing/2010/main" val="0"/>
-              </a:ext>
-            </a:extLst>
-          </a:blip>
-          <a:stretch>
-            <a:fillRect/>
-          </a:stretch>
-        </p:blipFill>
-        <p:spPr>
-          <a:xfrm>
-            <a:off x="0" y="4169659"/>
-            <a:ext cx="3934976" cy="2688341"/>
-          </a:xfrm>
-          <a:prstGeom prst="rect">
-            <a:avLst/>
-          </a:prstGeom>
-        </p:spPr>
-      </p:pic>
-    </p:spTree>
-    <p:extLst>
-      <p:ext uri="{BB962C8B-B14F-4D97-AF65-F5344CB8AC3E}">
-        <p14:creationId xmlns:p14="http://schemas.microsoft.com/office/powerpoint/2010/main" val="680710026"/>
-      </p:ext>
-    </p:extLst>
-  </p:cSld>
-  <p:clrMapOvr>
-    <a:masterClrMapping/>
-  </p:clrMapOvr>
-</p:sld>
-</file>
-
-<file path=ppt/slides/slide32.xml><?xml version="1.0" encoding="utf-8"?>
-<p:sld xmlns:a="http://schemas.openxmlformats.org/drawingml/2006/main" xmlns:r="http://schemas.openxmlformats.org/officeDocument/2006/relationships" xmlns:p="http://schemas.openxmlformats.org/presentationml/2006/main">
-  <p:cSld>
-    <p:spTree>
-      <p:nvGrpSpPr>
-        <p:cNvPr id="1" name=""/>
-        <p:cNvGrpSpPr/>
-        <p:nvPr/>
-      </p:nvGrpSpPr>
-      <p:grpSpPr>
-        <a:xfrm>
-          <a:off x="0" y="0"/>
-          <a:ext cx="0" cy="0"/>
-          <a:chOff x="0" y="0"/>
-          <a:chExt cx="0" cy="0"/>
-        </a:xfrm>
-      </p:grpSpPr>
-      <p:pic>
-        <p:nvPicPr>
-          <p:cNvPr id="3" name="圖片 2">
-            <a:extLst>
-              <a:ext uri="{FF2B5EF4-FFF2-40B4-BE49-F238E27FC236}">
-                <a16:creationId xmlns:a16="http://schemas.microsoft.com/office/drawing/2014/main" id="{1202EBDE-7F64-43BD-86B7-6C228CCEC2D0}"/>
-              </a:ext>
-            </a:extLst>
-          </p:cNvPr>
-          <p:cNvPicPr>
-            <a:picLocks noChangeAspect="1"/>
-          </p:cNvPicPr>
-          <p:nvPr/>
-        </p:nvPicPr>
-        <p:blipFill>
-          <a:blip r:embed="rId2" cstate="print">
-            <a:extLst>
-              <a:ext uri="{28A0092B-C50C-407E-A947-70E740481C1C}">
-                <a14:useLocalDpi xmlns:a14="http://schemas.microsoft.com/office/drawing/2010/main" val="0"/>
-              </a:ext>
-            </a:extLst>
-          </a:blip>
-          <a:stretch>
-            <a:fillRect/>
-          </a:stretch>
-        </p:blipFill>
-        <p:spPr>
-          <a:xfrm>
-            <a:off x="6598915" y="0"/>
-            <a:ext cx="2545085" cy="3294895"/>
-          </a:xfrm>
-          <a:prstGeom prst="rect">
-            <a:avLst/>
-          </a:prstGeom>
-        </p:spPr>
-      </p:pic>
-      <p:pic>
-        <p:nvPicPr>
-          <p:cNvPr id="4" name="圖片 3">
-            <a:extLst>
-              <a:ext uri="{FF2B5EF4-FFF2-40B4-BE49-F238E27FC236}">
-                <a16:creationId xmlns:a16="http://schemas.microsoft.com/office/drawing/2014/main" id="{AEFF5069-0FA7-44E7-AEEE-225463C6B1AC}"/>
-              </a:ext>
-            </a:extLst>
-          </p:cNvPr>
-          <p:cNvPicPr>
-            <a:picLocks noChangeAspect="1"/>
-          </p:cNvPicPr>
-          <p:nvPr/>
-        </p:nvPicPr>
-        <p:blipFill>
-          <a:blip r:embed="rId3" cstate="print">
-            <a:extLst>
-              <a:ext uri="{28A0092B-C50C-407E-A947-70E740481C1C}">
-                <a14:useLocalDpi xmlns:a14="http://schemas.microsoft.com/office/drawing/2010/main" val="0"/>
-              </a:ext>
-            </a:extLst>
-          </a:blip>
-          <a:stretch>
-            <a:fillRect/>
-          </a:stretch>
-        </p:blipFill>
-        <p:spPr>
-          <a:xfrm>
-            <a:off x="0" y="4169659"/>
-            <a:ext cx="3934976" cy="2688341"/>
-          </a:xfrm>
-          <a:prstGeom prst="rect">
-            <a:avLst/>
-          </a:prstGeom>
-        </p:spPr>
-      </p:pic>
-    </p:spTree>
-    <p:extLst>
-      <p:ext uri="{BB962C8B-B14F-4D97-AF65-F5344CB8AC3E}">
-        <p14:creationId xmlns:p14="http://schemas.microsoft.com/office/powerpoint/2010/main" val="3810482808"/>
-      </p:ext>
-    </p:extLst>
-  </p:cSld>
-  <p:clrMapOvr>
-    <a:masterClrMapping/>
-  </p:clrMapOvr>
-</p:sld>
-</file>
-
-<file path=ppt/slides/slide33.xml><?xml version="1.0" encoding="utf-8"?>
-<p:sld xmlns:a="http://schemas.openxmlformats.org/drawingml/2006/main" xmlns:r="http://schemas.openxmlformats.org/officeDocument/2006/relationships" xmlns:p="http://schemas.openxmlformats.org/presentationml/2006/main">
-  <p:cSld>
-    <p:spTree>
-      <p:nvGrpSpPr>
-        <p:cNvPr id="1" name=""/>
-        <p:cNvGrpSpPr/>
-        <p:nvPr/>
-      </p:nvGrpSpPr>
-      <p:grpSpPr>
-        <a:xfrm>
-          <a:off x="0" y="0"/>
-          <a:ext cx="0" cy="0"/>
-          <a:chOff x="0" y="0"/>
-          <a:chExt cx="0" cy="0"/>
-        </a:xfrm>
-      </p:grpSpPr>
-      <p:pic>
-        <p:nvPicPr>
-          <p:cNvPr id="3" name="圖片 2">
-            <a:extLst>
-              <a:ext uri="{FF2B5EF4-FFF2-40B4-BE49-F238E27FC236}">
-                <a16:creationId xmlns:a16="http://schemas.microsoft.com/office/drawing/2014/main" id="{1202EBDE-7F64-43BD-86B7-6C228CCEC2D0}"/>
-              </a:ext>
-            </a:extLst>
-          </p:cNvPr>
-          <p:cNvPicPr>
-            <a:picLocks noChangeAspect="1"/>
-          </p:cNvPicPr>
-          <p:nvPr/>
-        </p:nvPicPr>
-        <p:blipFill>
-          <a:blip r:embed="rId2" cstate="print">
-            <a:extLst>
-              <a:ext uri="{28A0092B-C50C-407E-A947-70E740481C1C}">
-                <a14:useLocalDpi xmlns:a14="http://schemas.microsoft.com/office/drawing/2010/main" val="0"/>
-              </a:ext>
-            </a:extLst>
-          </a:blip>
-          <a:stretch>
-            <a:fillRect/>
-          </a:stretch>
-        </p:blipFill>
-        <p:spPr>
-          <a:xfrm>
-            <a:off x="6598915" y="0"/>
-            <a:ext cx="2545085" cy="3294895"/>
-          </a:xfrm>
-          <a:prstGeom prst="rect">
-            <a:avLst/>
-          </a:prstGeom>
-        </p:spPr>
-      </p:pic>
-      <p:pic>
-        <p:nvPicPr>
-          <p:cNvPr id="4" name="圖片 3">
-            <a:extLst>
-              <a:ext uri="{FF2B5EF4-FFF2-40B4-BE49-F238E27FC236}">
-                <a16:creationId xmlns:a16="http://schemas.microsoft.com/office/drawing/2014/main" id="{AEFF5069-0FA7-44E7-AEEE-225463C6B1AC}"/>
-              </a:ext>
-            </a:extLst>
-          </p:cNvPr>
-          <p:cNvPicPr>
-            <a:picLocks noChangeAspect="1"/>
-          </p:cNvPicPr>
-          <p:nvPr/>
-        </p:nvPicPr>
-        <p:blipFill>
-          <a:blip r:embed="rId3" cstate="print">
-            <a:extLst>
-              <a:ext uri="{28A0092B-C50C-407E-A947-70E740481C1C}">
-                <a14:useLocalDpi xmlns:a14="http://schemas.microsoft.com/office/drawing/2010/main" val="0"/>
-              </a:ext>
-            </a:extLst>
-          </a:blip>
-          <a:stretch>
-            <a:fillRect/>
-          </a:stretch>
-        </p:blipFill>
-        <p:spPr>
-          <a:xfrm>
-            <a:off x="0" y="4169659"/>
-            <a:ext cx="3934976" cy="2688341"/>
-          </a:xfrm>
-          <a:prstGeom prst="rect">
-            <a:avLst/>
-          </a:prstGeom>
-        </p:spPr>
-      </p:pic>
-    </p:spTree>
-    <p:extLst>
-      <p:ext uri="{BB962C8B-B14F-4D97-AF65-F5344CB8AC3E}">
-        <p14:creationId xmlns:p14="http://schemas.microsoft.com/office/powerpoint/2010/main" val="4116190145"/>
-      </p:ext>
-    </p:extLst>
-  </p:cSld>
-  <p:clrMapOvr>
-    <a:masterClrMapping/>
-  </p:clrMapOvr>
-</p:sld>
-</file>
-
-<file path=ppt/slides/slide34.xml><?xml version="1.0" encoding="utf-8"?>
-<p:sld xmlns:a="http://schemas.openxmlformats.org/drawingml/2006/main" xmlns:r="http://schemas.openxmlformats.org/officeDocument/2006/relationships" xmlns:p="http://schemas.openxmlformats.org/presentationml/2006/main">
-  <p:cSld>
-    <p:spTree>
-      <p:nvGrpSpPr>
-        <p:cNvPr id="1" name=""/>
-        <p:cNvGrpSpPr/>
-        <p:nvPr/>
-      </p:nvGrpSpPr>
-      <p:grpSpPr>
-        <a:xfrm>
-          <a:off x="0" y="0"/>
-          <a:ext cx="0" cy="0"/>
-          <a:chOff x="0" y="0"/>
-          <a:chExt cx="0" cy="0"/>
-        </a:xfrm>
-      </p:grpSpPr>
-      <p:pic>
-        <p:nvPicPr>
-          <p:cNvPr id="3" name="圖片 2">
-            <a:extLst>
-              <a:ext uri="{FF2B5EF4-FFF2-40B4-BE49-F238E27FC236}">
-                <a16:creationId xmlns:a16="http://schemas.microsoft.com/office/drawing/2014/main" id="{1202EBDE-7F64-43BD-86B7-6C228CCEC2D0}"/>
-              </a:ext>
-            </a:extLst>
-          </p:cNvPr>
-          <p:cNvPicPr>
-            <a:picLocks noChangeAspect="1"/>
-          </p:cNvPicPr>
-          <p:nvPr/>
-        </p:nvPicPr>
-        <p:blipFill>
-          <a:blip r:embed="rId2" cstate="print">
-            <a:extLst>
-              <a:ext uri="{28A0092B-C50C-407E-A947-70E740481C1C}">
-                <a14:useLocalDpi xmlns:a14="http://schemas.microsoft.com/office/drawing/2010/main" val="0"/>
-              </a:ext>
-            </a:extLst>
-          </a:blip>
-          <a:stretch>
-            <a:fillRect/>
-          </a:stretch>
-        </p:blipFill>
-        <p:spPr>
-          <a:xfrm>
-            <a:off x="6598915" y="0"/>
-            <a:ext cx="2545085" cy="3294895"/>
-          </a:xfrm>
-          <a:prstGeom prst="rect">
-            <a:avLst/>
-          </a:prstGeom>
-        </p:spPr>
-      </p:pic>
-      <p:pic>
-        <p:nvPicPr>
-          <p:cNvPr id="4" name="圖片 3">
-            <a:extLst>
-              <a:ext uri="{FF2B5EF4-FFF2-40B4-BE49-F238E27FC236}">
-                <a16:creationId xmlns:a16="http://schemas.microsoft.com/office/drawing/2014/main" id="{AEFF5069-0FA7-44E7-AEEE-225463C6B1AC}"/>
-              </a:ext>
-            </a:extLst>
-          </p:cNvPr>
-          <p:cNvPicPr>
-            <a:picLocks noChangeAspect="1"/>
-          </p:cNvPicPr>
-          <p:nvPr/>
-        </p:nvPicPr>
-        <p:blipFill>
-          <a:blip r:embed="rId3" cstate="print">
-            <a:extLst>
-              <a:ext uri="{28A0092B-C50C-407E-A947-70E740481C1C}">
-                <a14:useLocalDpi xmlns:a14="http://schemas.microsoft.com/office/drawing/2010/main" val="0"/>
-              </a:ext>
-            </a:extLst>
-          </a:blip>
-          <a:stretch>
-            <a:fillRect/>
-          </a:stretch>
-        </p:blipFill>
-        <p:spPr>
-          <a:xfrm>
-            <a:off x="0" y="4169659"/>
-            <a:ext cx="3934976" cy="2688341"/>
-          </a:xfrm>
-          <a:prstGeom prst="rect">
-            <a:avLst/>
-          </a:prstGeom>
-        </p:spPr>
-      </p:pic>
-    </p:spTree>
-    <p:extLst>
-      <p:ext uri="{BB962C8B-B14F-4D97-AF65-F5344CB8AC3E}">
-        <p14:creationId xmlns:p14="http://schemas.microsoft.com/office/powerpoint/2010/main" val="753813999"/>
-      </p:ext>
-    </p:extLst>
-  </p:cSld>
-  <p:clrMapOvr>
-    <a:masterClrMapping/>
-  </p:clrMapOvr>
-</p:sld>
-</file>
-
-<file path=ppt/slides/slide35.xml><?xml version="1.0" encoding="utf-8"?>
-<p:sld xmlns:a="http://schemas.openxmlformats.org/drawingml/2006/main" xmlns:r="http://schemas.openxmlformats.org/officeDocument/2006/relationships" xmlns:p="http://schemas.openxmlformats.org/presentationml/2006/main">
-  <p:cSld>
-    <p:spTree>
-      <p:nvGrpSpPr>
-        <p:cNvPr id="1" name=""/>
-        <p:cNvGrpSpPr/>
-        <p:nvPr/>
-      </p:nvGrpSpPr>
-      <p:grpSpPr>
-        <a:xfrm>
-          <a:off x="0" y="0"/>
-          <a:ext cx="0" cy="0"/>
-          <a:chOff x="0" y="0"/>
-          <a:chExt cx="0" cy="0"/>
-        </a:xfrm>
-      </p:grpSpPr>
-      <p:pic>
-        <p:nvPicPr>
-          <p:cNvPr id="3" name="圖片 2">
-            <a:extLst>
-              <a:ext uri="{FF2B5EF4-FFF2-40B4-BE49-F238E27FC236}">
-                <a16:creationId xmlns:a16="http://schemas.microsoft.com/office/drawing/2014/main" id="{1202EBDE-7F64-43BD-86B7-6C228CCEC2D0}"/>
-              </a:ext>
-            </a:extLst>
-          </p:cNvPr>
-          <p:cNvPicPr>
-            <a:picLocks noChangeAspect="1"/>
-          </p:cNvPicPr>
-          <p:nvPr/>
-        </p:nvPicPr>
-        <p:blipFill>
-          <a:blip r:embed="rId2" cstate="print">
-            <a:extLst>
-              <a:ext uri="{28A0092B-C50C-407E-A947-70E740481C1C}">
-                <a14:useLocalDpi xmlns:a14="http://schemas.microsoft.com/office/drawing/2010/main" val="0"/>
-              </a:ext>
-            </a:extLst>
-          </a:blip>
-          <a:stretch>
-            <a:fillRect/>
-          </a:stretch>
-        </p:blipFill>
-        <p:spPr>
-          <a:xfrm>
-            <a:off x="6598915" y="0"/>
-            <a:ext cx="2545085" cy="3294895"/>
-          </a:xfrm>
-          <a:prstGeom prst="rect">
-            <a:avLst/>
-          </a:prstGeom>
-        </p:spPr>
-      </p:pic>
-      <p:pic>
-        <p:nvPicPr>
-          <p:cNvPr id="4" name="圖片 3">
-            <a:extLst>
-              <a:ext uri="{FF2B5EF4-FFF2-40B4-BE49-F238E27FC236}">
-                <a16:creationId xmlns:a16="http://schemas.microsoft.com/office/drawing/2014/main" id="{AEFF5069-0FA7-44E7-AEEE-225463C6B1AC}"/>
-              </a:ext>
-            </a:extLst>
-          </p:cNvPr>
-          <p:cNvPicPr>
-            <a:picLocks noChangeAspect="1"/>
-          </p:cNvPicPr>
-          <p:nvPr/>
-        </p:nvPicPr>
-        <p:blipFill>
-          <a:blip r:embed="rId3" cstate="print">
-            <a:extLst>
-              <a:ext uri="{28A0092B-C50C-407E-A947-70E740481C1C}">
-                <a14:useLocalDpi xmlns:a14="http://schemas.microsoft.com/office/drawing/2010/main" val="0"/>
-              </a:ext>
-            </a:extLst>
-          </a:blip>
-          <a:stretch>
-            <a:fillRect/>
-          </a:stretch>
-        </p:blipFill>
-        <p:spPr>
-          <a:xfrm>
-            <a:off x="0" y="4169659"/>
-            <a:ext cx="3934976" cy="2688341"/>
-          </a:xfrm>
-          <a:prstGeom prst="rect">
-            <a:avLst/>
-          </a:prstGeom>
-        </p:spPr>
-      </p:pic>
-    </p:spTree>
-    <p:extLst>
-      <p:ext uri="{BB962C8B-B14F-4D97-AF65-F5344CB8AC3E}">
-        <p14:creationId xmlns:p14="http://schemas.microsoft.com/office/powerpoint/2010/main" val="1430568939"/>
-      </p:ext>
-    </p:extLst>
-  </p:cSld>
-  <p:clrMapOvr>
-    <a:masterClrMapping/>
-  </p:clrMapOvr>
-</p:sld>
-</file>
-
-<file path=ppt/slides/slide36.xml><?xml version="1.0" encoding="utf-8"?>
-<p:sld xmlns:a="http://schemas.openxmlformats.org/drawingml/2006/main" xmlns:r="http://schemas.openxmlformats.org/officeDocument/2006/relationships" xmlns:p="http://schemas.openxmlformats.org/presentationml/2006/main">
-  <p:cSld>
-    <p:spTree>
-      <p:nvGrpSpPr>
-        <p:cNvPr id="1" name=""/>
-        <p:cNvGrpSpPr/>
-        <p:nvPr/>
-      </p:nvGrpSpPr>
-      <p:grpSpPr>
-        <a:xfrm>
-          <a:off x="0" y="0"/>
-          <a:ext cx="0" cy="0"/>
-          <a:chOff x="0" y="0"/>
-          <a:chExt cx="0" cy="0"/>
-        </a:xfrm>
-      </p:grpSpPr>
-      <p:pic>
-        <p:nvPicPr>
-          <p:cNvPr id="3" name="圖片 2">
-            <a:extLst>
-              <a:ext uri="{FF2B5EF4-FFF2-40B4-BE49-F238E27FC236}">
-                <a16:creationId xmlns:a16="http://schemas.microsoft.com/office/drawing/2014/main" id="{1202EBDE-7F64-43BD-86B7-6C228CCEC2D0}"/>
-              </a:ext>
-            </a:extLst>
-          </p:cNvPr>
-          <p:cNvPicPr>
-            <a:picLocks noChangeAspect="1"/>
-          </p:cNvPicPr>
-          <p:nvPr/>
-        </p:nvPicPr>
-        <p:blipFill>
-          <a:blip r:embed="rId2" cstate="print">
-            <a:extLst>
-              <a:ext uri="{28A0092B-C50C-407E-A947-70E740481C1C}">
-                <a14:useLocalDpi xmlns:a14="http://schemas.microsoft.com/office/drawing/2010/main" val="0"/>
-              </a:ext>
-            </a:extLst>
-          </a:blip>
-          <a:stretch>
-            <a:fillRect/>
-          </a:stretch>
-        </p:blipFill>
-        <p:spPr>
-          <a:xfrm>
-            <a:off x="6598915" y="0"/>
-            <a:ext cx="2545085" cy="3294895"/>
-          </a:xfrm>
-          <a:prstGeom prst="rect">
-            <a:avLst/>
-          </a:prstGeom>
-        </p:spPr>
-      </p:pic>
-      <p:pic>
-        <p:nvPicPr>
-          <p:cNvPr id="4" name="圖片 3">
-            <a:extLst>
-              <a:ext uri="{FF2B5EF4-FFF2-40B4-BE49-F238E27FC236}">
-                <a16:creationId xmlns:a16="http://schemas.microsoft.com/office/drawing/2014/main" id="{AEFF5069-0FA7-44E7-AEEE-225463C6B1AC}"/>
-              </a:ext>
-            </a:extLst>
-          </p:cNvPr>
-          <p:cNvPicPr>
-            <a:picLocks noChangeAspect="1"/>
-          </p:cNvPicPr>
-          <p:nvPr/>
-        </p:nvPicPr>
-        <p:blipFill>
-          <a:blip r:embed="rId3" cstate="print">
-            <a:extLst>
-              <a:ext uri="{28A0092B-C50C-407E-A947-70E740481C1C}">
-                <a14:useLocalDpi xmlns:a14="http://schemas.microsoft.com/office/drawing/2010/main" val="0"/>
-              </a:ext>
-            </a:extLst>
-          </a:blip>
-          <a:stretch>
-            <a:fillRect/>
-          </a:stretch>
-        </p:blipFill>
-        <p:spPr>
-          <a:xfrm>
-            <a:off x="0" y="4169659"/>
-            <a:ext cx="3934976" cy="2688341"/>
-          </a:xfrm>
-          <a:prstGeom prst="rect">
-            <a:avLst/>
-          </a:prstGeom>
-        </p:spPr>
-      </p:pic>
-    </p:spTree>
-    <p:extLst>
-      <p:ext uri="{BB962C8B-B14F-4D97-AF65-F5344CB8AC3E}">
-        <p14:creationId xmlns:p14="http://schemas.microsoft.com/office/powerpoint/2010/main" val="1615937117"/>
-      </p:ext>
-    </p:extLst>
-  </p:cSld>
-  <p:clrMapOvr>
-    <a:masterClrMapping/>
-  </p:clrMapOvr>
-</p:sld>
-</file>
-
-<file path=ppt/slides/slide37.xml><?xml version="1.0" encoding="utf-8"?>
-<p:sld xmlns:a="http://schemas.openxmlformats.org/drawingml/2006/main" xmlns:r="http://schemas.openxmlformats.org/officeDocument/2006/relationships" xmlns:p="http://schemas.openxmlformats.org/presentationml/2006/main">
-  <p:cSld>
-    <p:spTree>
-      <p:nvGrpSpPr>
-        <p:cNvPr id="1" name=""/>
-        <p:cNvGrpSpPr/>
-        <p:nvPr/>
-      </p:nvGrpSpPr>
-      <p:grpSpPr>
-        <a:xfrm>
-          <a:off x="0" y="0"/>
-          <a:ext cx="0" cy="0"/>
-          <a:chOff x="0" y="0"/>
-          <a:chExt cx="0" cy="0"/>
-        </a:xfrm>
-      </p:grpSpPr>
-      <p:pic>
-        <p:nvPicPr>
-          <p:cNvPr id="3" name="圖片 2">
-            <a:extLst>
-              <a:ext uri="{FF2B5EF4-FFF2-40B4-BE49-F238E27FC236}">
-                <a16:creationId xmlns:a16="http://schemas.microsoft.com/office/drawing/2014/main" id="{1202EBDE-7F64-43BD-86B7-6C228CCEC2D0}"/>
-              </a:ext>
-            </a:extLst>
-          </p:cNvPr>
-          <p:cNvPicPr>
-            <a:picLocks noChangeAspect="1"/>
-          </p:cNvPicPr>
-          <p:nvPr/>
-        </p:nvPicPr>
-        <p:blipFill>
-          <a:blip r:embed="rId2" cstate="print">
-            <a:extLst>
-              <a:ext uri="{28A0092B-C50C-407E-A947-70E740481C1C}">
-                <a14:useLocalDpi xmlns:a14="http://schemas.microsoft.com/office/drawing/2010/main" val="0"/>
-              </a:ext>
-            </a:extLst>
-          </a:blip>
-          <a:stretch>
-            <a:fillRect/>
-          </a:stretch>
-        </p:blipFill>
-        <p:spPr>
-          <a:xfrm>
-            <a:off x="6598915" y="0"/>
-            <a:ext cx="2545085" cy="3294895"/>
-          </a:xfrm>
-          <a:prstGeom prst="rect">
-            <a:avLst/>
-          </a:prstGeom>
-        </p:spPr>
-      </p:pic>
-      <p:pic>
-        <p:nvPicPr>
-          <p:cNvPr id="4" name="圖片 3">
-            <a:extLst>
-              <a:ext uri="{FF2B5EF4-FFF2-40B4-BE49-F238E27FC236}">
-                <a16:creationId xmlns:a16="http://schemas.microsoft.com/office/drawing/2014/main" id="{AEFF5069-0FA7-44E7-AEEE-225463C6B1AC}"/>
-              </a:ext>
-            </a:extLst>
-          </p:cNvPr>
-          <p:cNvPicPr>
-            <a:picLocks noChangeAspect="1"/>
-          </p:cNvPicPr>
-          <p:nvPr/>
-        </p:nvPicPr>
-        <p:blipFill>
-          <a:blip r:embed="rId3" cstate="print">
-            <a:extLst>
-              <a:ext uri="{28A0092B-C50C-407E-A947-70E740481C1C}">
-                <a14:useLocalDpi xmlns:a14="http://schemas.microsoft.com/office/drawing/2010/main" val="0"/>
-              </a:ext>
-            </a:extLst>
-          </a:blip>
-          <a:stretch>
-            <a:fillRect/>
-          </a:stretch>
-        </p:blipFill>
-        <p:spPr>
-          <a:xfrm>
-            <a:off x="0" y="4169659"/>
-            <a:ext cx="3934976" cy="2688341"/>
-          </a:xfrm>
-          <a:prstGeom prst="rect">
-            <a:avLst/>
-          </a:prstGeom>
-        </p:spPr>
-      </p:pic>
-    </p:spTree>
-    <p:extLst>
-      <p:ext uri="{BB962C8B-B14F-4D97-AF65-F5344CB8AC3E}">
-        <p14:creationId xmlns:p14="http://schemas.microsoft.com/office/powerpoint/2010/main" val="1509265716"/>
-      </p:ext>
-    </p:extLst>
-  </p:cSld>
-  <p:clrMapOvr>
-    <a:masterClrMapping/>
-  </p:clrMapOvr>
-</p:sld>
-</file>
-
-<file path=ppt/slides/slide38.xml><?xml version="1.0" encoding="utf-8"?>
-<p:sld xmlns:a="http://schemas.openxmlformats.org/drawingml/2006/main" xmlns:r="http://schemas.openxmlformats.org/officeDocument/2006/relationships" xmlns:p="http://schemas.openxmlformats.org/presentationml/2006/main">
-  <p:cSld>
-    <p:spTree>
-      <p:nvGrpSpPr>
-        <p:cNvPr id="1" name=""/>
-        <p:cNvGrpSpPr/>
-        <p:nvPr/>
-      </p:nvGrpSpPr>
-      <p:grpSpPr>
-        <a:xfrm>
-          <a:off x="0" y="0"/>
-          <a:ext cx="0" cy="0"/>
-          <a:chOff x="0" y="0"/>
-          <a:chExt cx="0" cy="0"/>
-        </a:xfrm>
-      </p:grpSpPr>
-      <p:pic>
-        <p:nvPicPr>
-          <p:cNvPr id="3" name="圖片 2">
-            <a:extLst>
-              <a:ext uri="{FF2B5EF4-FFF2-40B4-BE49-F238E27FC236}">
-                <a16:creationId xmlns:a16="http://schemas.microsoft.com/office/drawing/2014/main" id="{1202EBDE-7F64-43BD-86B7-6C228CCEC2D0}"/>
-              </a:ext>
-            </a:extLst>
-          </p:cNvPr>
-          <p:cNvPicPr>
-            <a:picLocks noChangeAspect="1"/>
-          </p:cNvPicPr>
-          <p:nvPr/>
-        </p:nvPicPr>
-        <p:blipFill>
-          <a:blip r:embed="rId2" cstate="print">
-            <a:extLst>
-              <a:ext uri="{28A0092B-C50C-407E-A947-70E740481C1C}">
-                <a14:useLocalDpi xmlns:a14="http://schemas.microsoft.com/office/drawing/2010/main" val="0"/>
-              </a:ext>
-            </a:extLst>
-          </a:blip>
-          <a:stretch>
-            <a:fillRect/>
-          </a:stretch>
-        </p:blipFill>
-        <p:spPr>
-          <a:xfrm>
-            <a:off x="6598915" y="0"/>
-            <a:ext cx="2545085" cy="3294895"/>
-          </a:xfrm>
-          <a:prstGeom prst="rect">
-            <a:avLst/>
-          </a:prstGeom>
-        </p:spPr>
-      </p:pic>
-      <p:pic>
-        <p:nvPicPr>
-          <p:cNvPr id="4" name="圖片 3">
-            <a:extLst>
-              <a:ext uri="{FF2B5EF4-FFF2-40B4-BE49-F238E27FC236}">
-                <a16:creationId xmlns:a16="http://schemas.microsoft.com/office/drawing/2014/main" id="{AEFF5069-0FA7-44E7-AEEE-225463C6B1AC}"/>
-              </a:ext>
-            </a:extLst>
-          </p:cNvPr>
-          <p:cNvPicPr>
-            <a:picLocks noChangeAspect="1"/>
-          </p:cNvPicPr>
-          <p:nvPr/>
-        </p:nvPicPr>
-        <p:blipFill>
-          <a:blip r:embed="rId3" cstate="print">
-            <a:extLst>
-              <a:ext uri="{28A0092B-C50C-407E-A947-70E740481C1C}">
-                <a14:useLocalDpi xmlns:a14="http://schemas.microsoft.com/office/drawing/2010/main" val="0"/>
-              </a:ext>
-            </a:extLst>
-          </a:blip>
-          <a:stretch>
-            <a:fillRect/>
-          </a:stretch>
-        </p:blipFill>
-        <p:spPr>
-          <a:xfrm>
-            <a:off x="0" y="4169659"/>
-            <a:ext cx="3934976" cy="2688341"/>
-          </a:xfrm>
-          <a:prstGeom prst="rect">
-            <a:avLst/>
-          </a:prstGeom>
-        </p:spPr>
-      </p:pic>
-    </p:spTree>
-    <p:extLst>
-      <p:ext uri="{BB962C8B-B14F-4D97-AF65-F5344CB8AC3E}">
-        <p14:creationId xmlns:p14="http://schemas.microsoft.com/office/powerpoint/2010/main" val="2624269977"/>
-      </p:ext>
-    </p:extLst>
-  </p:cSld>
-  <p:clrMapOvr>
-    <a:masterClrMapping/>
-  </p:clrMapOvr>
-</p:sld>
-</file>
-
-<file path=ppt/slides/slide39.xml><?xml version="1.0" encoding="utf-8"?>
-<p:sld xmlns:a="http://schemas.openxmlformats.org/drawingml/2006/main" xmlns:r="http://schemas.openxmlformats.org/officeDocument/2006/relationships" xmlns:p="http://schemas.openxmlformats.org/presentationml/2006/main">
-  <p:cSld>
-    <p:spTree>
-      <p:nvGrpSpPr>
-        <p:cNvPr id="1" name=""/>
-        <p:cNvGrpSpPr/>
-        <p:nvPr/>
-      </p:nvGrpSpPr>
-      <p:grpSpPr>
-        <a:xfrm>
-          <a:off x="0" y="0"/>
-          <a:ext cx="0" cy="0"/>
-          <a:chOff x="0" y="0"/>
-          <a:chExt cx="0" cy="0"/>
-        </a:xfrm>
-      </p:grpSpPr>
-      <p:pic>
-        <p:nvPicPr>
-          <p:cNvPr id="3" name="圖片 2">
-            <a:extLst>
-              <a:ext uri="{FF2B5EF4-FFF2-40B4-BE49-F238E27FC236}">
-                <a16:creationId xmlns:a16="http://schemas.microsoft.com/office/drawing/2014/main" id="{1202EBDE-7F64-43BD-86B7-6C228CCEC2D0}"/>
-              </a:ext>
-            </a:extLst>
-          </p:cNvPr>
-          <p:cNvPicPr>
-            <a:picLocks noChangeAspect="1"/>
-          </p:cNvPicPr>
-          <p:nvPr/>
-        </p:nvPicPr>
-        <p:blipFill>
-          <a:blip r:embed="rId2" cstate="print">
-            <a:extLst>
-              <a:ext uri="{28A0092B-C50C-407E-A947-70E740481C1C}">
-                <a14:useLocalDpi xmlns:a14="http://schemas.microsoft.com/office/drawing/2010/main" val="0"/>
-              </a:ext>
-            </a:extLst>
-          </a:blip>
-          <a:stretch>
-            <a:fillRect/>
-          </a:stretch>
-        </p:blipFill>
-        <p:spPr>
-          <a:xfrm>
-            <a:off x="6598915" y="0"/>
-            <a:ext cx="2545085" cy="3294895"/>
-          </a:xfrm>
-          <a:prstGeom prst="rect">
-            <a:avLst/>
-          </a:prstGeom>
-        </p:spPr>
-      </p:pic>
-      <p:pic>
-        <p:nvPicPr>
-          <p:cNvPr id="4" name="圖片 3">
-            <a:extLst>
-              <a:ext uri="{FF2B5EF4-FFF2-40B4-BE49-F238E27FC236}">
-                <a16:creationId xmlns:a16="http://schemas.microsoft.com/office/drawing/2014/main" id="{AEFF5069-0FA7-44E7-AEEE-225463C6B1AC}"/>
-              </a:ext>
-            </a:extLst>
-          </p:cNvPr>
-          <p:cNvPicPr>
-            <a:picLocks noChangeAspect="1"/>
-          </p:cNvPicPr>
-          <p:nvPr/>
-        </p:nvPicPr>
-        <p:blipFill>
-          <a:blip r:embed="rId3" cstate="print">
-            <a:extLst>
-              <a:ext uri="{28A0092B-C50C-407E-A947-70E740481C1C}">
-                <a14:useLocalDpi xmlns:a14="http://schemas.microsoft.com/office/drawing/2010/main" val="0"/>
-              </a:ext>
-            </a:extLst>
-          </a:blip>
-          <a:stretch>
-            <a:fillRect/>
-          </a:stretch>
-        </p:blipFill>
-        <p:spPr>
-          <a:xfrm>
-            <a:off x="0" y="4169659"/>
-            <a:ext cx="3934976" cy="2688341"/>
-          </a:xfrm>
-          <a:prstGeom prst="rect">
-            <a:avLst/>
-          </a:prstGeom>
-        </p:spPr>
-      </p:pic>
-    </p:spTree>
-    <p:extLst>
-      <p:ext uri="{BB962C8B-B14F-4D97-AF65-F5344CB8AC3E}">
-        <p14:creationId xmlns:p14="http://schemas.microsoft.com/office/powerpoint/2010/main" val="3887989850"/>
-      </p:ext>
-    </p:extLst>
-  </p:cSld>
-  <p:clrMapOvr>
-    <a:masterClrMapping/>
-  </p:clrMapOvr>
-</p:sld>
-</file>
-
 <file path=ppt/slides/slide4.xml><?xml version="1.0" encoding="utf-8"?>
 <p:sld xmlns:a="http://schemas.openxmlformats.org/drawingml/2006/main" xmlns:r="http://schemas.openxmlformats.org/officeDocument/2006/relationships" xmlns:p="http://schemas.openxmlformats.org/presentationml/2006/main">
   <p:cSld>
@@ -10960,312 +8034,6 @@
     <p:extLst>
       <p:ext uri="{BB962C8B-B14F-4D97-AF65-F5344CB8AC3E}">
         <p14:creationId xmlns:p14="http://schemas.microsoft.com/office/powerpoint/2010/main" val="4236992931"/>
-      </p:ext>
-    </p:extLst>
-  </p:cSld>
-  <p:clrMapOvr>
-    <a:masterClrMapping/>
-  </p:clrMapOvr>
-</p:sld>
-</file>
-
-<file path=ppt/slides/slide40.xml><?xml version="1.0" encoding="utf-8"?>
-<p:sld xmlns:a="http://schemas.openxmlformats.org/drawingml/2006/main" xmlns:r="http://schemas.openxmlformats.org/officeDocument/2006/relationships" xmlns:p="http://schemas.openxmlformats.org/presentationml/2006/main">
-  <p:cSld>
-    <p:spTree>
-      <p:nvGrpSpPr>
-        <p:cNvPr id="1" name=""/>
-        <p:cNvGrpSpPr/>
-        <p:nvPr/>
-      </p:nvGrpSpPr>
-      <p:grpSpPr>
-        <a:xfrm>
-          <a:off x="0" y="0"/>
-          <a:ext cx="0" cy="0"/>
-          <a:chOff x="0" y="0"/>
-          <a:chExt cx="0" cy="0"/>
-        </a:xfrm>
-      </p:grpSpPr>
-      <p:pic>
-        <p:nvPicPr>
-          <p:cNvPr id="3" name="圖片 2">
-            <a:extLst>
-              <a:ext uri="{FF2B5EF4-FFF2-40B4-BE49-F238E27FC236}">
-                <a16:creationId xmlns:a16="http://schemas.microsoft.com/office/drawing/2014/main" id="{1202EBDE-7F64-43BD-86B7-6C228CCEC2D0}"/>
-              </a:ext>
-            </a:extLst>
-          </p:cNvPr>
-          <p:cNvPicPr>
-            <a:picLocks noChangeAspect="1"/>
-          </p:cNvPicPr>
-          <p:nvPr/>
-        </p:nvPicPr>
-        <p:blipFill>
-          <a:blip r:embed="rId2" cstate="print">
-            <a:extLst>
-              <a:ext uri="{28A0092B-C50C-407E-A947-70E740481C1C}">
-                <a14:useLocalDpi xmlns:a14="http://schemas.microsoft.com/office/drawing/2010/main" val="0"/>
-              </a:ext>
-            </a:extLst>
-          </a:blip>
-          <a:stretch>
-            <a:fillRect/>
-          </a:stretch>
-        </p:blipFill>
-        <p:spPr>
-          <a:xfrm>
-            <a:off x="6598915" y="0"/>
-            <a:ext cx="2545085" cy="3294895"/>
-          </a:xfrm>
-          <a:prstGeom prst="rect">
-            <a:avLst/>
-          </a:prstGeom>
-        </p:spPr>
-      </p:pic>
-      <p:pic>
-        <p:nvPicPr>
-          <p:cNvPr id="4" name="圖片 3">
-            <a:extLst>
-              <a:ext uri="{FF2B5EF4-FFF2-40B4-BE49-F238E27FC236}">
-                <a16:creationId xmlns:a16="http://schemas.microsoft.com/office/drawing/2014/main" id="{AEFF5069-0FA7-44E7-AEEE-225463C6B1AC}"/>
-              </a:ext>
-            </a:extLst>
-          </p:cNvPr>
-          <p:cNvPicPr>
-            <a:picLocks noChangeAspect="1"/>
-          </p:cNvPicPr>
-          <p:nvPr/>
-        </p:nvPicPr>
-        <p:blipFill>
-          <a:blip r:embed="rId3" cstate="print">
-            <a:extLst>
-              <a:ext uri="{28A0092B-C50C-407E-A947-70E740481C1C}">
-                <a14:useLocalDpi xmlns:a14="http://schemas.microsoft.com/office/drawing/2010/main" val="0"/>
-              </a:ext>
-            </a:extLst>
-          </a:blip>
-          <a:stretch>
-            <a:fillRect/>
-          </a:stretch>
-        </p:blipFill>
-        <p:spPr>
-          <a:xfrm>
-            <a:off x="0" y="4169659"/>
-            <a:ext cx="3934976" cy="2688341"/>
-          </a:xfrm>
-          <a:prstGeom prst="rect">
-            <a:avLst/>
-          </a:prstGeom>
-        </p:spPr>
-      </p:pic>
-    </p:spTree>
-    <p:extLst>
-      <p:ext uri="{BB962C8B-B14F-4D97-AF65-F5344CB8AC3E}">
-        <p14:creationId xmlns:p14="http://schemas.microsoft.com/office/powerpoint/2010/main" val="124486230"/>
-      </p:ext>
-    </p:extLst>
-  </p:cSld>
-  <p:clrMapOvr>
-    <a:masterClrMapping/>
-  </p:clrMapOvr>
-</p:sld>
-</file>
-
-<file path=ppt/slides/slide41.xml><?xml version="1.0" encoding="utf-8"?>
-<p:sld xmlns:a="http://schemas.openxmlformats.org/drawingml/2006/main" xmlns:r="http://schemas.openxmlformats.org/officeDocument/2006/relationships" xmlns:p="http://schemas.openxmlformats.org/presentationml/2006/main">
-  <p:cSld>
-    <p:spTree>
-      <p:nvGrpSpPr>
-        <p:cNvPr id="1" name=""/>
-        <p:cNvGrpSpPr/>
-        <p:nvPr/>
-      </p:nvGrpSpPr>
-      <p:grpSpPr>
-        <a:xfrm>
-          <a:off x="0" y="0"/>
-          <a:ext cx="0" cy="0"/>
-          <a:chOff x="0" y="0"/>
-          <a:chExt cx="0" cy="0"/>
-        </a:xfrm>
-      </p:grpSpPr>
-      <p:pic>
-        <p:nvPicPr>
-          <p:cNvPr id="3" name="圖片 2">
-            <a:extLst>
-              <a:ext uri="{FF2B5EF4-FFF2-40B4-BE49-F238E27FC236}">
-                <a16:creationId xmlns:a16="http://schemas.microsoft.com/office/drawing/2014/main" id="{1202EBDE-7F64-43BD-86B7-6C228CCEC2D0}"/>
-              </a:ext>
-            </a:extLst>
-          </p:cNvPr>
-          <p:cNvPicPr>
-            <a:picLocks noChangeAspect="1"/>
-          </p:cNvPicPr>
-          <p:nvPr/>
-        </p:nvPicPr>
-        <p:blipFill>
-          <a:blip r:embed="rId2" cstate="print">
-            <a:extLst>
-              <a:ext uri="{28A0092B-C50C-407E-A947-70E740481C1C}">
-                <a14:useLocalDpi xmlns:a14="http://schemas.microsoft.com/office/drawing/2010/main" val="0"/>
-              </a:ext>
-            </a:extLst>
-          </a:blip>
-          <a:stretch>
-            <a:fillRect/>
-          </a:stretch>
-        </p:blipFill>
-        <p:spPr>
-          <a:xfrm>
-            <a:off x="6598915" y="0"/>
-            <a:ext cx="2545085" cy="3294895"/>
-          </a:xfrm>
-          <a:prstGeom prst="rect">
-            <a:avLst/>
-          </a:prstGeom>
-        </p:spPr>
-      </p:pic>
-      <p:pic>
-        <p:nvPicPr>
-          <p:cNvPr id="4" name="圖片 3">
-            <a:extLst>
-              <a:ext uri="{FF2B5EF4-FFF2-40B4-BE49-F238E27FC236}">
-                <a16:creationId xmlns:a16="http://schemas.microsoft.com/office/drawing/2014/main" id="{AEFF5069-0FA7-44E7-AEEE-225463C6B1AC}"/>
-              </a:ext>
-            </a:extLst>
-          </p:cNvPr>
-          <p:cNvPicPr>
-            <a:picLocks noChangeAspect="1"/>
-          </p:cNvPicPr>
-          <p:nvPr/>
-        </p:nvPicPr>
-        <p:blipFill>
-          <a:blip r:embed="rId3" cstate="print">
-            <a:extLst>
-              <a:ext uri="{28A0092B-C50C-407E-A947-70E740481C1C}">
-                <a14:useLocalDpi xmlns:a14="http://schemas.microsoft.com/office/drawing/2010/main" val="0"/>
-              </a:ext>
-            </a:extLst>
-          </a:blip>
-          <a:stretch>
-            <a:fillRect/>
-          </a:stretch>
-        </p:blipFill>
-        <p:spPr>
-          <a:xfrm>
-            <a:off x="0" y="4169659"/>
-            <a:ext cx="3934976" cy="2688341"/>
-          </a:xfrm>
-          <a:prstGeom prst="rect">
-            <a:avLst/>
-          </a:prstGeom>
-        </p:spPr>
-      </p:pic>
-    </p:spTree>
-    <p:extLst>
-      <p:ext uri="{BB962C8B-B14F-4D97-AF65-F5344CB8AC3E}">
-        <p14:creationId xmlns:p14="http://schemas.microsoft.com/office/powerpoint/2010/main" val="76552849"/>
-      </p:ext>
-    </p:extLst>
-  </p:cSld>
-  <p:clrMapOvr>
-    <a:masterClrMapping/>
-  </p:clrMapOvr>
-</p:sld>
-</file>
-
-<file path=ppt/slides/slide42.xml><?xml version="1.0" encoding="utf-8"?>
-<p:sld xmlns:a="http://schemas.openxmlformats.org/drawingml/2006/main" xmlns:r="http://schemas.openxmlformats.org/officeDocument/2006/relationships" xmlns:p="http://schemas.openxmlformats.org/presentationml/2006/main">
-  <p:cSld>
-    <p:spTree>
-      <p:nvGrpSpPr>
-        <p:cNvPr id="1" name=""/>
-        <p:cNvGrpSpPr/>
-        <p:nvPr/>
-      </p:nvGrpSpPr>
-      <p:grpSpPr>
-        <a:xfrm>
-          <a:off x="0" y="0"/>
-          <a:ext cx="0" cy="0"/>
-          <a:chOff x="0" y="0"/>
-          <a:chExt cx="0" cy="0"/>
-        </a:xfrm>
-      </p:grpSpPr>
-      <p:pic>
-        <p:nvPicPr>
-          <p:cNvPr id="3" name="圖片 2">
-            <a:extLst>
-              <a:ext uri="{FF2B5EF4-FFF2-40B4-BE49-F238E27FC236}">
-                <a16:creationId xmlns:a16="http://schemas.microsoft.com/office/drawing/2014/main" id="{1202EBDE-7F64-43BD-86B7-6C228CCEC2D0}"/>
-              </a:ext>
-            </a:extLst>
-          </p:cNvPr>
-          <p:cNvPicPr>
-            <a:picLocks noChangeAspect="1"/>
-          </p:cNvPicPr>
-          <p:nvPr/>
-        </p:nvPicPr>
-        <p:blipFill>
-          <a:blip r:embed="rId2" cstate="print">
-            <a:extLst>
-              <a:ext uri="{28A0092B-C50C-407E-A947-70E740481C1C}">
-                <a14:useLocalDpi xmlns:a14="http://schemas.microsoft.com/office/drawing/2010/main" val="0"/>
-              </a:ext>
-            </a:extLst>
-          </a:blip>
-          <a:stretch>
-            <a:fillRect/>
-          </a:stretch>
-        </p:blipFill>
-        <p:spPr>
-          <a:xfrm>
-            <a:off x="6598915" y="0"/>
-            <a:ext cx="2545085" cy="3294895"/>
-          </a:xfrm>
-          <a:prstGeom prst="rect">
-            <a:avLst/>
-          </a:prstGeom>
-        </p:spPr>
-      </p:pic>
-      <p:pic>
-        <p:nvPicPr>
-          <p:cNvPr id="4" name="圖片 3">
-            <a:extLst>
-              <a:ext uri="{FF2B5EF4-FFF2-40B4-BE49-F238E27FC236}">
-                <a16:creationId xmlns:a16="http://schemas.microsoft.com/office/drawing/2014/main" id="{AEFF5069-0FA7-44E7-AEEE-225463C6B1AC}"/>
-              </a:ext>
-            </a:extLst>
-          </p:cNvPr>
-          <p:cNvPicPr>
-            <a:picLocks noChangeAspect="1"/>
-          </p:cNvPicPr>
-          <p:nvPr/>
-        </p:nvPicPr>
-        <p:blipFill>
-          <a:blip r:embed="rId3" cstate="print">
-            <a:extLst>
-              <a:ext uri="{28A0092B-C50C-407E-A947-70E740481C1C}">
-                <a14:useLocalDpi xmlns:a14="http://schemas.microsoft.com/office/drawing/2010/main" val="0"/>
-              </a:ext>
-            </a:extLst>
-          </a:blip>
-          <a:stretch>
-            <a:fillRect/>
-          </a:stretch>
-        </p:blipFill>
-        <p:spPr>
-          <a:xfrm>
-            <a:off x="0" y="4169659"/>
-            <a:ext cx="3934976" cy="2688341"/>
-          </a:xfrm>
-          <a:prstGeom prst="rect">
-            <a:avLst/>
-          </a:prstGeom>
-        </p:spPr>
-      </p:pic>
-    </p:spTree>
-    <p:extLst>
-      <p:ext uri="{BB962C8B-B14F-4D97-AF65-F5344CB8AC3E}">
-        <p14:creationId xmlns:p14="http://schemas.microsoft.com/office/powerpoint/2010/main" val="2818705360"/>
       </p:ext>
     </p:extLst>
   </p:cSld>
@@ -12260,7 +9028,7 @@
         <p:spPr>
           <a:xfrm>
             <a:off x="584853" y="463989"/>
-            <a:ext cx="4057521" cy="646331"/>
+            <a:ext cx="3624710" cy="584775"/>
           </a:xfrm>
           <a:prstGeom prst="rect">
             <a:avLst/>
@@ -12274,7 +9042,7 @@
           <a:lstStyle/>
           <a:p>
             <a:r>
-              <a:rPr lang="en-US" altLang="zh-TW" sz="3600" dirty="0">
+              <a:rPr lang="en-US" altLang="zh-TW" sz="3200" dirty="0">
                 <a:latin typeface="Arial" panose="020B0604020202020204" pitchFamily="34" charset="0"/>
                 <a:cs typeface="Arial" panose="020B0604020202020204" pitchFamily="34" charset="0"/>
               </a:rPr>
@@ -12311,7 +9079,7 @@
         </p:blipFill>
         <p:spPr>
           <a:xfrm>
-            <a:off x="3511993" y="3550763"/>
+            <a:off x="3475543" y="3294895"/>
             <a:ext cx="5215449" cy="2924985"/>
           </a:xfrm>
           <a:prstGeom prst="rect">
@@ -12347,7 +9115,7 @@
         </p:blipFill>
         <p:spPr>
           <a:xfrm>
-            <a:off x="691017" y="1513223"/>
+            <a:off x="707795" y="1340977"/>
             <a:ext cx="5063829" cy="2828682"/>
           </a:xfrm>
           <a:prstGeom prst="rect">

</xml_diff>

<commit_message>
Revert "Revert "Finish the Git part in PPT""
This reverts commit d17129fceceda6610433a82ccb32ddfc37a80cd5.
</commit_message>
<xml_diff>
--- a/TA_Class_III.pptx
+++ b/TA_Class_III.pptx
@@ -32,6 +32,21 @@
     <p:sldId id="317" r:id="rId26"/>
     <p:sldId id="318" r:id="rId27"/>
     <p:sldId id="319" r:id="rId28"/>
+    <p:sldId id="320" r:id="rId29"/>
+    <p:sldId id="321" r:id="rId30"/>
+    <p:sldId id="322" r:id="rId31"/>
+    <p:sldId id="323" r:id="rId32"/>
+    <p:sldId id="324" r:id="rId33"/>
+    <p:sldId id="325" r:id="rId34"/>
+    <p:sldId id="326" r:id="rId35"/>
+    <p:sldId id="327" r:id="rId36"/>
+    <p:sldId id="328" r:id="rId37"/>
+    <p:sldId id="329" r:id="rId38"/>
+    <p:sldId id="330" r:id="rId39"/>
+    <p:sldId id="331" r:id="rId40"/>
+    <p:sldId id="332" r:id="rId41"/>
+    <p:sldId id="333" r:id="rId42"/>
+    <p:sldId id="334" r:id="rId43"/>
   </p:sldIdLst>
   <p:sldSz cx="9144000" cy="6858000" type="screen4x3"/>
   <p:notesSz cx="6858000" cy="9144000"/>
@@ -3459,7 +3474,7 @@
         <p:spPr>
           <a:xfrm>
             <a:off x="662730" y="963329"/>
-            <a:ext cx="2447273" cy="584775"/>
+            <a:ext cx="2732736" cy="646331"/>
           </a:xfrm>
           <a:prstGeom prst="rect">
             <a:avLst/>
@@ -3473,7 +3488,7 @@
           <a:lstStyle/>
           <a:p>
             <a:r>
-              <a:rPr lang="en-US" altLang="zh-TW" sz="3200" dirty="0">
+              <a:rPr lang="en-US" altLang="zh-TW" sz="3600" dirty="0">
                 <a:latin typeface="Arial" panose="020B0604020202020204" pitchFamily="34" charset="0"/>
                 <a:cs typeface="Arial" panose="020B0604020202020204" pitchFamily="34" charset="0"/>
               </a:rPr>
@@ -3656,7 +3671,7 @@
         <p:spPr>
           <a:xfrm>
             <a:off x="935048" y="924016"/>
-            <a:ext cx="1779654" cy="584775"/>
+            <a:ext cx="1665841" cy="584775"/>
           </a:xfrm>
           <a:prstGeom prst="rect">
             <a:avLst/>
@@ -3674,7 +3689,7 @@
                 <a:latin typeface="Arial" panose="020B0604020202020204" pitchFamily="34" charset="0"/>
                 <a:cs typeface="Arial" panose="020B0604020202020204" pitchFamily="34" charset="0"/>
               </a:rPr>
-              <a:t>． </a:t>
+              <a:t>．</a:t>
             </a:r>
             <a:r>
               <a:rPr lang="en-US" altLang="zh-TW" sz="3200" dirty="0">
@@ -4510,7 +4525,7 @@
         <p:spPr>
           <a:xfrm>
             <a:off x="935048" y="924016"/>
-            <a:ext cx="2348720" cy="584775"/>
+            <a:ext cx="2234907" cy="584775"/>
           </a:xfrm>
           <a:prstGeom prst="rect">
             <a:avLst/>
@@ -4528,7 +4543,7 @@
                 <a:latin typeface="Arial" panose="020B0604020202020204" pitchFamily="34" charset="0"/>
                 <a:cs typeface="Arial" panose="020B0604020202020204" pitchFamily="34" charset="0"/>
               </a:rPr>
-              <a:t>． </a:t>
+              <a:t>．</a:t>
             </a:r>
             <a:r>
               <a:rPr lang="en-US" altLang="zh-TW" sz="3200" dirty="0">
@@ -4749,7 +4764,7 @@
         <p:spPr>
           <a:xfrm>
             <a:off x="935048" y="924016"/>
-            <a:ext cx="1938351" cy="584775"/>
+            <a:ext cx="1824538" cy="584775"/>
           </a:xfrm>
           <a:prstGeom prst="rect">
             <a:avLst/>
@@ -4767,7 +4782,7 @@
                 <a:latin typeface="Arial" panose="020B0604020202020204" pitchFamily="34" charset="0"/>
                 <a:cs typeface="Arial" panose="020B0604020202020204" pitchFamily="34" charset="0"/>
               </a:rPr>
-              <a:t>． </a:t>
+              <a:t>．</a:t>
             </a:r>
             <a:r>
               <a:rPr lang="en-US" altLang="zh-TW" sz="3200" dirty="0">
@@ -5006,7 +5021,7 @@
                 <a:latin typeface="Arial" panose="020B0604020202020204" pitchFamily="34" charset="0"/>
                 <a:cs typeface="Arial" panose="020B0604020202020204" pitchFamily="34" charset="0"/>
               </a:rPr>
-              <a:t>． </a:t>
+              <a:t>．</a:t>
             </a:r>
             <a:r>
               <a:rPr lang="en-US" altLang="zh-TW" sz="3200" dirty="0">
@@ -5694,7 +5709,7 @@
         <p:spPr>
           <a:xfrm>
             <a:off x="935048" y="924016"/>
-            <a:ext cx="2462534" cy="584775"/>
+            <a:ext cx="2348720" cy="584775"/>
           </a:xfrm>
           <a:prstGeom prst="rect">
             <a:avLst/>
@@ -5712,7 +5727,7 @@
                 <a:latin typeface="Arial" panose="020B0604020202020204" pitchFamily="34" charset="0"/>
                 <a:cs typeface="Arial" panose="020B0604020202020204" pitchFamily="34" charset="0"/>
               </a:rPr>
-              <a:t>． </a:t>
+              <a:t>．</a:t>
             </a:r>
             <a:r>
               <a:rPr lang="en-US" altLang="zh-TW" sz="3200" dirty="0">
@@ -6079,10 +6094,10 @@
       </p:pic>
       <p:pic>
         <p:nvPicPr>
-          <p:cNvPr id="11" name="圖片 10" descr="一張含有 文字 的圖片&#10;&#10;自動產生的描述">
-            <a:extLst>
-              <a:ext uri="{FF2B5EF4-FFF2-40B4-BE49-F238E27FC236}">
-                <a16:creationId xmlns:a16="http://schemas.microsoft.com/office/drawing/2014/main" id="{32A2A153-8C9D-44F6-8B12-1F51E589F1C1}"/>
+          <p:cNvPr id="10" name="圖片 9">
+            <a:extLst>
+              <a:ext uri="{FF2B5EF4-FFF2-40B4-BE49-F238E27FC236}">
+                <a16:creationId xmlns:a16="http://schemas.microsoft.com/office/drawing/2014/main" id="{4729305C-8EC1-4C8A-8DF7-78F88F335A8C}"/>
               </a:ext>
             </a:extLst>
           </p:cNvPr>
@@ -6091,7 +6106,7 @@
           </p:cNvPicPr>
           <p:nvPr/>
         </p:nvPicPr>
-        <p:blipFill>
+        <p:blipFill rotWithShape="1">
           <a:blip r:embed="rId5">
             <a:extLst>
               <a:ext uri="{28A0092B-C50C-407E-A947-70E740481C1C}">
@@ -6099,14 +6114,13 @@
               </a:ext>
             </a:extLst>
           </a:blip>
-          <a:stretch>
-            <a:fillRect/>
-          </a:stretch>
+          <a:srcRect l="8034" t="17384" r="12037" b="33220"/>
+          <a:stretch/>
         </p:blipFill>
         <p:spPr>
           <a:xfrm>
-            <a:off x="3442070" y="4169658"/>
-            <a:ext cx="4429387" cy="1472771"/>
+            <a:off x="3422709" y="3922727"/>
+            <a:ext cx="4857225" cy="1689085"/>
           </a:xfrm>
           <a:prstGeom prst="rect">
             <a:avLst/>
@@ -6287,7 +6301,7 @@
         <p:spPr>
           <a:xfrm>
             <a:off x="935048" y="924016"/>
-            <a:ext cx="2576346" cy="584775"/>
+            <a:ext cx="2462534" cy="584775"/>
           </a:xfrm>
           <a:prstGeom prst="rect">
             <a:avLst/>
@@ -6305,7 +6319,7 @@
                 <a:latin typeface="Arial" panose="020B0604020202020204" pitchFamily="34" charset="0"/>
                 <a:cs typeface="Arial" panose="020B0604020202020204" pitchFamily="34" charset="0"/>
               </a:rPr>
-              <a:t>． </a:t>
+              <a:t>．</a:t>
             </a:r>
             <a:r>
               <a:rPr lang="en-US" altLang="zh-TW" sz="3200" dirty="0">
@@ -6527,7 +6541,7 @@
         <p:spPr>
           <a:xfrm>
             <a:off x="935048" y="924016"/>
-            <a:ext cx="1346844" cy="584775"/>
+            <a:ext cx="1233030" cy="584775"/>
           </a:xfrm>
           <a:prstGeom prst="rect">
             <a:avLst/>
@@ -6545,7 +6559,7 @@
                 <a:latin typeface="Arial" panose="020B0604020202020204" pitchFamily="34" charset="0"/>
                 <a:cs typeface="Arial" panose="020B0604020202020204" pitchFamily="34" charset="0"/>
               </a:rPr>
-              <a:t>． </a:t>
+              <a:t>．</a:t>
             </a:r>
             <a:r>
               <a:rPr lang="en-US" altLang="zh-TW" sz="3200" dirty="0">
@@ -7010,7 +7024,7 @@
         <p:spPr>
           <a:xfrm>
             <a:off x="935048" y="924016"/>
-            <a:ext cx="1802096" cy="584775"/>
+            <a:ext cx="1688283" cy="584775"/>
           </a:xfrm>
           <a:prstGeom prst="rect">
             <a:avLst/>
@@ -7028,7 +7042,7 @@
                 <a:latin typeface="Arial" panose="020B0604020202020204" pitchFamily="34" charset="0"/>
                 <a:cs typeface="Arial" panose="020B0604020202020204" pitchFamily="34" charset="0"/>
               </a:rPr>
-              <a:t>． </a:t>
+              <a:t>．</a:t>
             </a:r>
             <a:r>
               <a:rPr lang="en-US" altLang="zh-TW" sz="3200" dirty="0">
@@ -7178,6 +7192,133 @@
           </a:prstGeom>
         </p:spPr>
       </p:pic>
+      <p:sp>
+        <p:nvSpPr>
+          <p:cNvPr id="5" name="文字方塊 4">
+            <a:extLst>
+              <a:ext uri="{FF2B5EF4-FFF2-40B4-BE49-F238E27FC236}">
+                <a16:creationId xmlns:a16="http://schemas.microsoft.com/office/drawing/2014/main" id="{81F06AE7-3921-42C6-B2D9-A2ADE7774792}"/>
+              </a:ext>
+            </a:extLst>
+          </p:cNvPr>
+          <p:cNvSpPr txBox="1"/>
+          <p:nvPr/>
+        </p:nvSpPr>
+        <p:spPr>
+          <a:xfrm>
+            <a:off x="612397" y="646429"/>
+            <a:ext cx="1595309" cy="646331"/>
+          </a:xfrm>
+          <a:prstGeom prst="rect">
+            <a:avLst/>
+          </a:prstGeom>
+          <a:noFill/>
+        </p:spPr>
+        <p:txBody>
+          <a:bodyPr wrap="none" rtlCol="0">
+            <a:spAutoFit/>
+          </a:bodyPr>
+          <a:lstStyle/>
+          <a:p>
+            <a:r>
+              <a:rPr lang="en-US" altLang="zh-TW" sz="3600" dirty="0">
+                <a:latin typeface="Arial" panose="020B0604020202020204" pitchFamily="34" charset="0"/>
+                <a:cs typeface="Arial" panose="020B0604020202020204" pitchFamily="34" charset="0"/>
+              </a:rPr>
+              <a:t>branch</a:t>
+            </a:r>
+          </a:p>
+        </p:txBody>
+      </p:sp>
+      <p:sp>
+        <p:nvSpPr>
+          <p:cNvPr id="6" name="矩形 5">
+            <a:extLst>
+              <a:ext uri="{FF2B5EF4-FFF2-40B4-BE49-F238E27FC236}">
+                <a16:creationId xmlns:a16="http://schemas.microsoft.com/office/drawing/2014/main" id="{DFC472AC-C814-4264-B516-AEF54EEC4967}"/>
+              </a:ext>
+            </a:extLst>
+          </p:cNvPr>
+          <p:cNvSpPr/>
+          <p:nvPr/>
+        </p:nvSpPr>
+        <p:spPr>
+          <a:xfrm>
+            <a:off x="889233" y="1734084"/>
+            <a:ext cx="7365534" cy="2575420"/>
+          </a:xfrm>
+          <a:prstGeom prst="rect">
+            <a:avLst/>
+          </a:prstGeom>
+          <a:solidFill>
+            <a:schemeClr val="accent3">
+              <a:lumMod val="20000"/>
+              <a:lumOff val="80000"/>
+            </a:schemeClr>
+          </a:solidFill>
+        </p:spPr>
+        <p:style>
+          <a:lnRef idx="2">
+            <a:schemeClr val="dk1"/>
+          </a:lnRef>
+          <a:fillRef idx="1">
+            <a:schemeClr val="lt1"/>
+          </a:fillRef>
+          <a:effectRef idx="0">
+            <a:schemeClr val="dk1"/>
+          </a:effectRef>
+          <a:fontRef idx="minor">
+            <a:schemeClr val="dk1"/>
+          </a:fontRef>
+        </p:style>
+        <p:txBody>
+          <a:bodyPr rtlCol="0" anchor="ctr"/>
+          <a:lstStyle/>
+          <a:p>
+            <a:pPr algn="ctr"/>
+            <a:endParaRPr lang="zh-TW" altLang="en-US"/>
+          </a:p>
+        </p:txBody>
+      </p:sp>
+      <p:sp>
+        <p:nvSpPr>
+          <p:cNvPr id="7" name="文字方塊 6">
+            <a:extLst>
+              <a:ext uri="{FF2B5EF4-FFF2-40B4-BE49-F238E27FC236}">
+                <a16:creationId xmlns:a16="http://schemas.microsoft.com/office/drawing/2014/main" id="{1EBF860A-F73D-4938-89CB-809C81B30BE8}"/>
+              </a:ext>
+            </a:extLst>
+          </p:cNvPr>
+          <p:cNvSpPr txBox="1"/>
+          <p:nvPr/>
+        </p:nvSpPr>
+        <p:spPr>
+          <a:xfrm>
+            <a:off x="1241332" y="2236964"/>
+            <a:ext cx="6661336" cy="1569660"/>
+          </a:xfrm>
+          <a:prstGeom prst="rect">
+            <a:avLst/>
+          </a:prstGeom>
+          <a:noFill/>
+        </p:spPr>
+        <p:txBody>
+          <a:bodyPr wrap="square" rtlCol="0">
+            <a:spAutoFit/>
+          </a:bodyPr>
+          <a:lstStyle/>
+          <a:p>
+            <a:pPr algn="just"/>
+            <a:r>
+              <a:rPr lang="en-US" altLang="zh-TW" sz="3200" dirty="0">
+                <a:latin typeface="Arial" panose="020B0604020202020204" pitchFamily="34" charset="0"/>
+                <a:cs typeface="Arial" panose="020B0604020202020204" pitchFamily="34" charset="0"/>
+              </a:rPr>
+              <a:t>The default branch git create for you when a new git repo is initialized is called “master”.</a:t>
+            </a:r>
+          </a:p>
+        </p:txBody>
+      </p:sp>
     </p:spTree>
     <p:extLst>
       <p:ext uri="{BB962C8B-B14F-4D97-AF65-F5344CB8AC3E}">
@@ -7280,6 +7421,95 @@
           </a:prstGeom>
         </p:spPr>
       </p:pic>
+      <p:sp>
+        <p:nvSpPr>
+          <p:cNvPr id="5" name="矩形 4">
+            <a:extLst>
+              <a:ext uri="{FF2B5EF4-FFF2-40B4-BE49-F238E27FC236}">
+                <a16:creationId xmlns:a16="http://schemas.microsoft.com/office/drawing/2014/main" id="{350A71E6-8087-47AB-83A3-4704D41A90E2}"/>
+              </a:ext>
+            </a:extLst>
+          </p:cNvPr>
+          <p:cNvSpPr/>
+          <p:nvPr/>
+        </p:nvSpPr>
+        <p:spPr>
+          <a:xfrm>
+            <a:off x="889233" y="1734084"/>
+            <a:ext cx="7365534" cy="2575420"/>
+          </a:xfrm>
+          <a:prstGeom prst="rect">
+            <a:avLst/>
+          </a:prstGeom>
+          <a:solidFill>
+            <a:schemeClr val="accent3">
+              <a:lumMod val="20000"/>
+              <a:lumOff val="80000"/>
+            </a:schemeClr>
+          </a:solidFill>
+        </p:spPr>
+        <p:style>
+          <a:lnRef idx="2">
+            <a:schemeClr val="dk1"/>
+          </a:lnRef>
+          <a:fillRef idx="1">
+            <a:schemeClr val="lt1"/>
+          </a:fillRef>
+          <a:effectRef idx="0">
+            <a:schemeClr val="dk1"/>
+          </a:effectRef>
+          <a:fontRef idx="minor">
+            <a:schemeClr val="dk1"/>
+          </a:fontRef>
+        </p:style>
+        <p:txBody>
+          <a:bodyPr rtlCol="0" anchor="ctr"/>
+          <a:lstStyle/>
+          <a:p>
+            <a:pPr algn="ctr"/>
+            <a:endParaRPr lang="zh-TW" altLang="en-US"/>
+          </a:p>
+        </p:txBody>
+      </p:sp>
+      <p:sp>
+        <p:nvSpPr>
+          <p:cNvPr id="6" name="文字方塊 5">
+            <a:extLst>
+              <a:ext uri="{FF2B5EF4-FFF2-40B4-BE49-F238E27FC236}">
+                <a16:creationId xmlns:a16="http://schemas.microsoft.com/office/drawing/2014/main" id="{66E182E2-8101-480C-AC1D-3278E5B34E3E}"/>
+              </a:ext>
+            </a:extLst>
+          </p:cNvPr>
+          <p:cNvSpPr txBox="1"/>
+          <p:nvPr/>
+        </p:nvSpPr>
+        <p:spPr>
+          <a:xfrm>
+            <a:off x="1241332" y="2236964"/>
+            <a:ext cx="6661336" cy="1569660"/>
+          </a:xfrm>
+          <a:prstGeom prst="rect">
+            <a:avLst/>
+          </a:prstGeom>
+          <a:noFill/>
+        </p:spPr>
+        <p:txBody>
+          <a:bodyPr wrap="square" rtlCol="0">
+            <a:spAutoFit/>
+          </a:bodyPr>
+          <a:lstStyle/>
+          <a:p>
+            <a:pPr algn="just"/>
+            <a:r>
+              <a:rPr lang="en-US" altLang="zh-TW" sz="3200" dirty="0">
+                <a:latin typeface="Arial" panose="020B0604020202020204" pitchFamily="34" charset="0"/>
+                <a:cs typeface="Arial" panose="020B0604020202020204" pitchFamily="34" charset="0"/>
+              </a:rPr>
+              <a:t>Branches enable changes to be worked on without disruption the most current working state,</a:t>
+            </a:r>
+          </a:p>
+        </p:txBody>
+      </p:sp>
     </p:spTree>
     <p:extLst>
       <p:ext uri="{BB962C8B-B14F-4D97-AF65-F5344CB8AC3E}">
@@ -7382,6 +7612,155 @@
           </a:prstGeom>
         </p:spPr>
       </p:pic>
+      <p:pic>
+        <p:nvPicPr>
+          <p:cNvPr id="5" name="圖片 4">
+            <a:extLst>
+              <a:ext uri="{FF2B5EF4-FFF2-40B4-BE49-F238E27FC236}">
+                <a16:creationId xmlns:a16="http://schemas.microsoft.com/office/drawing/2014/main" id="{AF3458E4-59B0-4B08-A818-697C2ED81E6C}"/>
+              </a:ext>
+            </a:extLst>
+          </p:cNvPr>
+          <p:cNvPicPr>
+            <a:picLocks noChangeAspect="1"/>
+          </p:cNvPicPr>
+          <p:nvPr/>
+        </p:nvPicPr>
+        <p:blipFill>
+          <a:blip r:embed="rId4">
+            <a:extLst>
+              <a:ext uri="{28A0092B-C50C-407E-A947-70E740481C1C}">
+                <a14:useLocalDpi xmlns:a14="http://schemas.microsoft.com/office/drawing/2010/main" val="0"/>
+              </a:ext>
+            </a:extLst>
+          </a:blip>
+          <a:stretch>
+            <a:fillRect/>
+          </a:stretch>
+        </p:blipFill>
+        <p:spPr>
+          <a:xfrm>
+            <a:off x="1547744" y="3873945"/>
+            <a:ext cx="6048511" cy="518444"/>
+          </a:xfrm>
+          <a:prstGeom prst="rect">
+            <a:avLst/>
+          </a:prstGeom>
+        </p:spPr>
+      </p:pic>
+      <p:sp>
+        <p:nvSpPr>
+          <p:cNvPr id="6" name="矩形 5">
+            <a:extLst>
+              <a:ext uri="{FF2B5EF4-FFF2-40B4-BE49-F238E27FC236}">
+                <a16:creationId xmlns:a16="http://schemas.microsoft.com/office/drawing/2014/main" id="{6478E4DF-B4DB-4C34-A11D-5DE72C3BF409}"/>
+              </a:ext>
+            </a:extLst>
+          </p:cNvPr>
+          <p:cNvSpPr/>
+          <p:nvPr/>
+        </p:nvSpPr>
+        <p:spPr>
+          <a:xfrm>
+            <a:off x="1547744" y="1747232"/>
+            <a:ext cx="6048511" cy="1224792"/>
+          </a:xfrm>
+          <a:prstGeom prst="rect">
+            <a:avLst/>
+          </a:prstGeom>
+          <a:solidFill>
+            <a:schemeClr val="accent3">
+              <a:lumMod val="20000"/>
+              <a:lumOff val="80000"/>
+            </a:schemeClr>
+          </a:solidFill>
+          <a:ln w="38100">
+            <a:solidFill>
+              <a:schemeClr val="tx1"/>
+            </a:solidFill>
+          </a:ln>
+        </p:spPr>
+        <p:style>
+          <a:lnRef idx="2">
+            <a:schemeClr val="accent1">
+              <a:shade val="50000"/>
+            </a:schemeClr>
+          </a:lnRef>
+          <a:fillRef idx="1">
+            <a:schemeClr val="accent1"/>
+          </a:fillRef>
+          <a:effectRef idx="0">
+            <a:schemeClr val="accent1"/>
+          </a:effectRef>
+          <a:fontRef idx="minor">
+            <a:schemeClr val="lt1"/>
+          </a:fontRef>
+        </p:style>
+        <p:txBody>
+          <a:bodyPr rtlCol="0" anchor="ctr"/>
+          <a:lstStyle/>
+          <a:p>
+            <a:pPr algn="ctr"/>
+            <a:endParaRPr lang="zh-TW" altLang="en-US"/>
+          </a:p>
+        </p:txBody>
+      </p:sp>
+      <p:sp>
+        <p:nvSpPr>
+          <p:cNvPr id="7" name="文字方塊 6">
+            <a:extLst>
+              <a:ext uri="{FF2B5EF4-FFF2-40B4-BE49-F238E27FC236}">
+                <a16:creationId xmlns:a16="http://schemas.microsoft.com/office/drawing/2014/main" id="{63B6A64A-1E37-4FBC-B723-7EFCF0CF2F9F}"/>
+              </a:ext>
+            </a:extLst>
+          </p:cNvPr>
+          <p:cNvSpPr txBox="1"/>
+          <p:nvPr/>
+        </p:nvSpPr>
+        <p:spPr>
+          <a:xfrm>
+            <a:off x="1967488" y="2067240"/>
+            <a:ext cx="5079859" cy="584775"/>
+          </a:xfrm>
+          <a:prstGeom prst="rect">
+            <a:avLst/>
+          </a:prstGeom>
+          <a:noFill/>
+        </p:spPr>
+        <p:txBody>
+          <a:bodyPr wrap="square" rtlCol="0">
+            <a:spAutoFit/>
+          </a:bodyPr>
+          <a:lstStyle/>
+          <a:p>
+            <a:r>
+              <a:rPr lang="zh-TW" altLang="en-US" sz="3200" dirty="0">
+                <a:latin typeface="Arial" panose="020B0604020202020204" pitchFamily="34" charset="0"/>
+                <a:cs typeface="Arial" panose="020B0604020202020204" pitchFamily="34" charset="0"/>
+              </a:rPr>
+              <a:t>．</a:t>
+            </a:r>
+            <a:r>
+              <a:rPr lang="en-US" altLang="zh-TW" sz="3200" dirty="0">
+                <a:latin typeface="Arial" panose="020B0604020202020204" pitchFamily="34" charset="0"/>
+                <a:cs typeface="Arial" panose="020B0604020202020204" pitchFamily="34" charset="0"/>
+              </a:rPr>
+              <a:t>git branch </a:t>
+            </a:r>
+            <a:r>
+              <a:rPr lang="en-US" altLang="zh-TW" sz="3200" dirty="0" err="1">
+                <a:latin typeface="Arial" panose="020B0604020202020204" pitchFamily="34" charset="0"/>
+                <a:cs typeface="Arial" panose="020B0604020202020204" pitchFamily="34" charset="0"/>
+              </a:rPr>
+              <a:t>branch_name</a:t>
+            </a:r>
+            <a:endParaRPr lang="en-US" altLang="zh-TW" sz="3200" dirty="0">
+              <a:latin typeface="Arial" panose="020B0604020202020204" pitchFamily="34" charset="0"/>
+              <a:cs typeface="Arial" panose="020B0604020202020204" pitchFamily="34" charset="0"/>
+            </a:endParaRPr>
+          </a:p>
+        </p:txBody>
+      </p:sp>
     </p:spTree>
     <p:extLst>
       <p:ext uri="{BB962C8B-B14F-4D97-AF65-F5344CB8AC3E}">
@@ -7484,10 +7863,1322 @@
           </a:prstGeom>
         </p:spPr>
       </p:pic>
+      <p:sp>
+        <p:nvSpPr>
+          <p:cNvPr id="6" name="矩形 5">
+            <a:extLst>
+              <a:ext uri="{FF2B5EF4-FFF2-40B4-BE49-F238E27FC236}">
+                <a16:creationId xmlns:a16="http://schemas.microsoft.com/office/drawing/2014/main" id="{27BA8308-0E71-42BC-9714-02D5FFF2E137}"/>
+              </a:ext>
+            </a:extLst>
+          </p:cNvPr>
+          <p:cNvSpPr/>
+          <p:nvPr/>
+        </p:nvSpPr>
+        <p:spPr>
+          <a:xfrm>
+            <a:off x="2545086" y="1253290"/>
+            <a:ext cx="3485650" cy="1224792"/>
+          </a:xfrm>
+          <a:prstGeom prst="rect">
+            <a:avLst/>
+          </a:prstGeom>
+          <a:solidFill>
+            <a:schemeClr val="accent3">
+              <a:lumMod val="20000"/>
+              <a:lumOff val="80000"/>
+            </a:schemeClr>
+          </a:solidFill>
+          <a:ln w="38100">
+            <a:solidFill>
+              <a:schemeClr val="tx1"/>
+            </a:solidFill>
+          </a:ln>
+        </p:spPr>
+        <p:style>
+          <a:lnRef idx="2">
+            <a:schemeClr val="accent1">
+              <a:shade val="50000"/>
+            </a:schemeClr>
+          </a:lnRef>
+          <a:fillRef idx="1">
+            <a:schemeClr val="accent1"/>
+          </a:fillRef>
+          <a:effectRef idx="0">
+            <a:schemeClr val="accent1"/>
+          </a:effectRef>
+          <a:fontRef idx="minor">
+            <a:schemeClr val="lt1"/>
+          </a:fontRef>
+        </p:style>
+        <p:txBody>
+          <a:bodyPr rtlCol="0" anchor="ctr"/>
+          <a:lstStyle/>
+          <a:p>
+            <a:pPr algn="ctr"/>
+            <a:endParaRPr lang="zh-TW" altLang="en-US"/>
+          </a:p>
+        </p:txBody>
+      </p:sp>
+      <p:sp>
+        <p:nvSpPr>
+          <p:cNvPr id="7" name="文字方塊 6">
+            <a:extLst>
+              <a:ext uri="{FF2B5EF4-FFF2-40B4-BE49-F238E27FC236}">
+                <a16:creationId xmlns:a16="http://schemas.microsoft.com/office/drawing/2014/main" id="{1732E131-8FBC-482E-9A54-9B01F26C3535}"/>
+              </a:ext>
+            </a:extLst>
+          </p:cNvPr>
+          <p:cNvSpPr txBox="1"/>
+          <p:nvPr/>
+        </p:nvSpPr>
+        <p:spPr>
+          <a:xfrm>
+            <a:off x="2862599" y="1566723"/>
+            <a:ext cx="2706742" cy="584775"/>
+          </a:xfrm>
+          <a:prstGeom prst="rect">
+            <a:avLst/>
+          </a:prstGeom>
+          <a:noFill/>
+        </p:spPr>
+        <p:txBody>
+          <a:bodyPr wrap="square" rtlCol="0">
+            <a:spAutoFit/>
+          </a:bodyPr>
+          <a:lstStyle/>
+          <a:p>
+            <a:r>
+              <a:rPr lang="zh-TW" altLang="en-US" sz="3200" dirty="0">
+                <a:latin typeface="Arial" panose="020B0604020202020204" pitchFamily="34" charset="0"/>
+                <a:cs typeface="Arial" panose="020B0604020202020204" pitchFamily="34" charset="0"/>
+              </a:rPr>
+              <a:t>．</a:t>
+            </a:r>
+            <a:r>
+              <a:rPr lang="en-US" altLang="zh-TW" sz="3200" dirty="0">
+                <a:latin typeface="Arial" panose="020B0604020202020204" pitchFamily="34" charset="0"/>
+                <a:cs typeface="Arial" panose="020B0604020202020204" pitchFamily="34" charset="0"/>
+              </a:rPr>
+              <a:t>git branch</a:t>
+            </a:r>
+          </a:p>
+        </p:txBody>
+      </p:sp>
+      <p:pic>
+        <p:nvPicPr>
+          <p:cNvPr id="8" name="圖片 7" descr="一張含有 文字 的圖片&#10;&#10;自動產生的描述">
+            <a:extLst>
+              <a:ext uri="{FF2B5EF4-FFF2-40B4-BE49-F238E27FC236}">
+                <a16:creationId xmlns:a16="http://schemas.microsoft.com/office/drawing/2014/main" id="{E3291D27-DD2B-4404-961E-C5BDE4896889}"/>
+              </a:ext>
+            </a:extLst>
+          </p:cNvPr>
+          <p:cNvPicPr>
+            <a:picLocks noChangeAspect="1"/>
+          </p:cNvPicPr>
+          <p:nvPr/>
+        </p:nvPicPr>
+        <p:blipFill>
+          <a:blip r:embed="rId4">
+            <a:extLst>
+              <a:ext uri="{28A0092B-C50C-407E-A947-70E740481C1C}">
+                <a14:useLocalDpi xmlns:a14="http://schemas.microsoft.com/office/drawing/2010/main" val="0"/>
+              </a:ext>
+            </a:extLst>
+          </a:blip>
+          <a:stretch>
+            <a:fillRect/>
+          </a:stretch>
+        </p:blipFill>
+        <p:spPr>
+          <a:xfrm>
+            <a:off x="1298795" y="3294895"/>
+            <a:ext cx="6546409" cy="2309815"/>
+          </a:xfrm>
+          <a:prstGeom prst="rect">
+            <a:avLst/>
+          </a:prstGeom>
+        </p:spPr>
+      </p:pic>
     </p:spTree>
     <p:extLst>
       <p:ext uri="{BB962C8B-B14F-4D97-AF65-F5344CB8AC3E}">
         <p14:creationId xmlns:p14="http://schemas.microsoft.com/office/powerpoint/2010/main" val="1659399492"/>
+      </p:ext>
+    </p:extLst>
+  </p:cSld>
+  <p:clrMapOvr>
+    <a:masterClrMapping/>
+  </p:clrMapOvr>
+</p:sld>
+</file>
+
+<file path=ppt/slides/slide28.xml><?xml version="1.0" encoding="utf-8"?>
+<p:sld xmlns:a="http://schemas.openxmlformats.org/drawingml/2006/main" xmlns:r="http://schemas.openxmlformats.org/officeDocument/2006/relationships" xmlns:p="http://schemas.openxmlformats.org/presentationml/2006/main">
+  <p:cSld>
+    <p:spTree>
+      <p:nvGrpSpPr>
+        <p:cNvPr id="1" name=""/>
+        <p:cNvGrpSpPr/>
+        <p:nvPr/>
+      </p:nvGrpSpPr>
+      <p:grpSpPr>
+        <a:xfrm>
+          <a:off x="0" y="0"/>
+          <a:ext cx="0" cy="0"/>
+          <a:chOff x="0" y="0"/>
+          <a:chExt cx="0" cy="0"/>
+        </a:xfrm>
+      </p:grpSpPr>
+      <p:pic>
+        <p:nvPicPr>
+          <p:cNvPr id="3" name="圖片 2">
+            <a:extLst>
+              <a:ext uri="{FF2B5EF4-FFF2-40B4-BE49-F238E27FC236}">
+                <a16:creationId xmlns:a16="http://schemas.microsoft.com/office/drawing/2014/main" id="{1202EBDE-7F64-43BD-86B7-6C228CCEC2D0}"/>
+              </a:ext>
+            </a:extLst>
+          </p:cNvPr>
+          <p:cNvPicPr>
+            <a:picLocks noChangeAspect="1"/>
+          </p:cNvPicPr>
+          <p:nvPr/>
+        </p:nvPicPr>
+        <p:blipFill>
+          <a:blip r:embed="rId2" cstate="print">
+            <a:extLst>
+              <a:ext uri="{28A0092B-C50C-407E-A947-70E740481C1C}">
+                <a14:useLocalDpi xmlns:a14="http://schemas.microsoft.com/office/drawing/2010/main" val="0"/>
+              </a:ext>
+            </a:extLst>
+          </a:blip>
+          <a:stretch>
+            <a:fillRect/>
+          </a:stretch>
+        </p:blipFill>
+        <p:spPr>
+          <a:xfrm>
+            <a:off x="6598915" y="0"/>
+            <a:ext cx="2545085" cy="3294895"/>
+          </a:xfrm>
+          <a:prstGeom prst="rect">
+            <a:avLst/>
+          </a:prstGeom>
+        </p:spPr>
+      </p:pic>
+      <p:pic>
+        <p:nvPicPr>
+          <p:cNvPr id="4" name="圖片 3">
+            <a:extLst>
+              <a:ext uri="{FF2B5EF4-FFF2-40B4-BE49-F238E27FC236}">
+                <a16:creationId xmlns:a16="http://schemas.microsoft.com/office/drawing/2014/main" id="{AEFF5069-0FA7-44E7-AEEE-225463C6B1AC}"/>
+              </a:ext>
+            </a:extLst>
+          </p:cNvPr>
+          <p:cNvPicPr>
+            <a:picLocks noChangeAspect="1"/>
+          </p:cNvPicPr>
+          <p:nvPr/>
+        </p:nvPicPr>
+        <p:blipFill>
+          <a:blip r:embed="rId3" cstate="print">
+            <a:extLst>
+              <a:ext uri="{28A0092B-C50C-407E-A947-70E740481C1C}">
+                <a14:useLocalDpi xmlns:a14="http://schemas.microsoft.com/office/drawing/2010/main" val="0"/>
+              </a:ext>
+            </a:extLst>
+          </a:blip>
+          <a:stretch>
+            <a:fillRect/>
+          </a:stretch>
+        </p:blipFill>
+        <p:spPr>
+          <a:xfrm>
+            <a:off x="0" y="4169659"/>
+            <a:ext cx="3934976" cy="2688341"/>
+          </a:xfrm>
+          <a:prstGeom prst="rect">
+            <a:avLst/>
+          </a:prstGeom>
+        </p:spPr>
+      </p:pic>
+      <p:sp>
+        <p:nvSpPr>
+          <p:cNvPr id="5" name="文字方塊 4">
+            <a:extLst>
+              <a:ext uri="{FF2B5EF4-FFF2-40B4-BE49-F238E27FC236}">
+                <a16:creationId xmlns:a16="http://schemas.microsoft.com/office/drawing/2014/main" id="{48465F4D-92C8-4218-A958-29D62F6B1A97}"/>
+              </a:ext>
+            </a:extLst>
+          </p:cNvPr>
+          <p:cNvSpPr txBox="1"/>
+          <p:nvPr/>
+        </p:nvSpPr>
+        <p:spPr>
+          <a:xfrm>
+            <a:off x="386372" y="324441"/>
+            <a:ext cx="2004491" cy="523220"/>
+          </a:xfrm>
+          <a:prstGeom prst="rect">
+            <a:avLst/>
+          </a:prstGeom>
+          <a:noFill/>
+        </p:spPr>
+        <p:txBody>
+          <a:bodyPr wrap="square" rtlCol="0">
+            <a:spAutoFit/>
+          </a:bodyPr>
+          <a:lstStyle/>
+          <a:p>
+            <a:r>
+              <a:rPr lang="zh-TW" altLang="en-US" sz="2800" dirty="0">
+                <a:latin typeface="Arial" panose="020B0604020202020204" pitchFamily="34" charset="0"/>
+                <a:cs typeface="Arial" panose="020B0604020202020204" pitchFamily="34" charset="0"/>
+              </a:rPr>
+              <a:t> ＊</a:t>
+            </a:r>
+            <a:r>
+              <a:rPr lang="en-US" altLang="zh-TW" sz="2800" dirty="0">
+                <a:latin typeface="Arial" panose="020B0604020202020204" pitchFamily="34" charset="0"/>
+                <a:cs typeface="Arial" panose="020B0604020202020204" pitchFamily="34" charset="0"/>
+              </a:rPr>
+              <a:t>master</a:t>
+            </a:r>
+          </a:p>
+        </p:txBody>
+      </p:sp>
+      <p:sp>
+        <p:nvSpPr>
+          <p:cNvPr id="6" name="文字方塊 5">
+            <a:extLst>
+              <a:ext uri="{FF2B5EF4-FFF2-40B4-BE49-F238E27FC236}">
+                <a16:creationId xmlns:a16="http://schemas.microsoft.com/office/drawing/2014/main" id="{8481A8F0-C2E1-4577-AC58-35B8EFAE7EBC}"/>
+              </a:ext>
+            </a:extLst>
+          </p:cNvPr>
+          <p:cNvSpPr txBox="1"/>
+          <p:nvPr/>
+        </p:nvSpPr>
+        <p:spPr>
+          <a:xfrm>
+            <a:off x="349046" y="1058886"/>
+            <a:ext cx="2110327" cy="523220"/>
+          </a:xfrm>
+          <a:prstGeom prst="rect">
+            <a:avLst/>
+          </a:prstGeom>
+        </p:spPr>
+        <p:style>
+          <a:lnRef idx="2">
+            <a:schemeClr val="dk1"/>
+          </a:lnRef>
+          <a:fillRef idx="1">
+            <a:schemeClr val="lt1"/>
+          </a:fillRef>
+          <a:effectRef idx="0">
+            <a:schemeClr val="dk1"/>
+          </a:effectRef>
+          <a:fontRef idx="minor">
+            <a:schemeClr val="dk1"/>
+          </a:fontRef>
+        </p:style>
+        <p:txBody>
+          <a:bodyPr wrap="square" rtlCol="0">
+            <a:spAutoFit/>
+          </a:bodyPr>
+          <a:lstStyle/>
+          <a:p>
+            <a:r>
+              <a:rPr lang="zh-TW" altLang="en-US" sz="2800" dirty="0">
+                <a:latin typeface="Arial" panose="020B0604020202020204" pitchFamily="34" charset="0"/>
+                <a:cs typeface="Arial" panose="020B0604020202020204" pitchFamily="34" charset="0"/>
+              </a:rPr>
+              <a:t>。</a:t>
+            </a:r>
+            <a:r>
+              <a:rPr lang="en-US" altLang="zh-TW" sz="2800" dirty="0">
+                <a:latin typeface="Arial" panose="020B0604020202020204" pitchFamily="34" charset="0"/>
+                <a:cs typeface="Arial" panose="020B0604020202020204" pitchFamily="34" charset="0"/>
+              </a:rPr>
+              <a:t>main file</a:t>
+            </a:r>
+          </a:p>
+        </p:txBody>
+      </p:sp>
+      <p:sp>
+        <p:nvSpPr>
+          <p:cNvPr id="7" name="文字方塊 6">
+            <a:extLst>
+              <a:ext uri="{FF2B5EF4-FFF2-40B4-BE49-F238E27FC236}">
+                <a16:creationId xmlns:a16="http://schemas.microsoft.com/office/drawing/2014/main" id="{FC0A0403-E86E-4D4B-A9EC-7255B9A71DC6}"/>
+              </a:ext>
+            </a:extLst>
+          </p:cNvPr>
+          <p:cNvSpPr txBox="1"/>
+          <p:nvPr/>
+        </p:nvSpPr>
+        <p:spPr>
+          <a:xfrm>
+            <a:off x="1669409" y="2314568"/>
+            <a:ext cx="2110327" cy="523220"/>
+          </a:xfrm>
+          <a:prstGeom prst="rect">
+            <a:avLst/>
+          </a:prstGeom>
+        </p:spPr>
+        <p:style>
+          <a:lnRef idx="2">
+            <a:schemeClr val="dk1"/>
+          </a:lnRef>
+          <a:fillRef idx="1">
+            <a:schemeClr val="lt1"/>
+          </a:fillRef>
+          <a:effectRef idx="0">
+            <a:schemeClr val="dk1"/>
+          </a:effectRef>
+          <a:fontRef idx="minor">
+            <a:schemeClr val="dk1"/>
+          </a:fontRef>
+        </p:style>
+        <p:txBody>
+          <a:bodyPr wrap="square" rtlCol="0">
+            <a:spAutoFit/>
+          </a:bodyPr>
+          <a:lstStyle/>
+          <a:p>
+            <a:r>
+              <a:rPr lang="zh-TW" altLang="en-US" sz="2800" dirty="0">
+                <a:latin typeface="Arial" panose="020B0604020202020204" pitchFamily="34" charset="0"/>
+                <a:cs typeface="Arial" panose="020B0604020202020204" pitchFamily="34" charset="0"/>
+              </a:rPr>
+              <a:t>。</a:t>
+            </a:r>
+            <a:r>
+              <a:rPr lang="en-US" altLang="zh-TW" sz="2800" dirty="0">
+                <a:latin typeface="Arial" panose="020B0604020202020204" pitchFamily="34" charset="0"/>
+                <a:cs typeface="Arial" panose="020B0604020202020204" pitchFamily="34" charset="0"/>
+              </a:rPr>
+              <a:t>main file</a:t>
+            </a:r>
+          </a:p>
+        </p:txBody>
+      </p:sp>
+      <p:cxnSp>
+        <p:nvCxnSpPr>
+          <p:cNvPr id="8" name="接點: 肘形 7">
+            <a:extLst>
+              <a:ext uri="{FF2B5EF4-FFF2-40B4-BE49-F238E27FC236}">
+                <a16:creationId xmlns:a16="http://schemas.microsoft.com/office/drawing/2014/main" id="{7EADF4EE-F288-43EB-A2A7-D9F30DA40375}"/>
+              </a:ext>
+            </a:extLst>
+          </p:cNvPr>
+          <p:cNvCxnSpPr>
+            <a:cxnSpLocks/>
+            <a:stCxn id="6" idx="3"/>
+            <a:endCxn id="7" idx="0"/>
+          </p:cNvCxnSpPr>
+          <p:nvPr/>
+        </p:nvCxnSpPr>
+        <p:spPr>
+          <a:xfrm>
+            <a:off x="2459373" y="1320496"/>
+            <a:ext cx="265200" cy="994072"/>
+          </a:xfrm>
+          <a:prstGeom prst="bentConnector2">
+            <a:avLst/>
+          </a:prstGeom>
+          <a:ln w="38100">
+            <a:solidFill>
+              <a:schemeClr val="tx1"/>
+            </a:solidFill>
+            <a:tailEnd type="triangle"/>
+          </a:ln>
+        </p:spPr>
+        <p:style>
+          <a:lnRef idx="1">
+            <a:schemeClr val="accent1"/>
+          </a:lnRef>
+          <a:fillRef idx="0">
+            <a:schemeClr val="accent1"/>
+          </a:fillRef>
+          <a:effectRef idx="0">
+            <a:schemeClr val="accent1"/>
+          </a:effectRef>
+          <a:fontRef idx="minor">
+            <a:schemeClr val="tx1"/>
+          </a:fontRef>
+        </p:style>
+      </p:cxnSp>
+      <p:sp>
+        <p:nvSpPr>
+          <p:cNvPr id="10" name="文字方塊 9">
+            <a:extLst>
+              <a:ext uri="{FF2B5EF4-FFF2-40B4-BE49-F238E27FC236}">
+                <a16:creationId xmlns:a16="http://schemas.microsoft.com/office/drawing/2014/main" id="{ECA7307C-CF29-4344-871F-39CBDF1B0055}"/>
+              </a:ext>
+            </a:extLst>
+          </p:cNvPr>
+          <p:cNvSpPr txBox="1"/>
+          <p:nvPr/>
+        </p:nvSpPr>
+        <p:spPr>
+          <a:xfrm>
+            <a:off x="2915344" y="1417422"/>
+            <a:ext cx="3451167" cy="400110"/>
+          </a:xfrm>
+          <a:prstGeom prst="rect">
+            <a:avLst/>
+          </a:prstGeom>
+          <a:noFill/>
+        </p:spPr>
+        <p:txBody>
+          <a:bodyPr wrap="square" rtlCol="0">
+            <a:spAutoFit/>
+          </a:bodyPr>
+          <a:lstStyle/>
+          <a:p>
+            <a:r>
+              <a:rPr lang="en-US" altLang="zh-TW" sz="2000" dirty="0">
+                <a:latin typeface="Arial" panose="020B0604020202020204" pitchFamily="34" charset="0"/>
+                <a:cs typeface="Arial" panose="020B0604020202020204" pitchFamily="34" charset="0"/>
+              </a:rPr>
+              <a:t>git checkout –b </a:t>
+            </a:r>
+            <a:r>
+              <a:rPr lang="en-US" altLang="zh-TW" sz="2000" dirty="0" err="1">
+                <a:latin typeface="Arial" panose="020B0604020202020204" pitchFamily="34" charset="0"/>
+                <a:cs typeface="Arial" panose="020B0604020202020204" pitchFamily="34" charset="0"/>
+              </a:rPr>
+              <a:t>new_branch</a:t>
+            </a:r>
+            <a:endParaRPr lang="en-US" altLang="zh-TW" sz="2000" dirty="0">
+              <a:latin typeface="Arial" panose="020B0604020202020204" pitchFamily="34" charset="0"/>
+              <a:cs typeface="Arial" panose="020B0604020202020204" pitchFamily="34" charset="0"/>
+            </a:endParaRPr>
+          </a:p>
+        </p:txBody>
+      </p:sp>
+      <p:sp>
+        <p:nvSpPr>
+          <p:cNvPr id="16" name="文字方塊 15">
+            <a:extLst>
+              <a:ext uri="{FF2B5EF4-FFF2-40B4-BE49-F238E27FC236}">
+                <a16:creationId xmlns:a16="http://schemas.microsoft.com/office/drawing/2014/main" id="{5363C442-B1E3-43CD-B532-2E2556292ED2}"/>
+              </a:ext>
+            </a:extLst>
+          </p:cNvPr>
+          <p:cNvSpPr txBox="1"/>
+          <p:nvPr/>
+        </p:nvSpPr>
+        <p:spPr>
+          <a:xfrm>
+            <a:off x="6114410" y="2105740"/>
+            <a:ext cx="2110328" cy="954107"/>
+          </a:xfrm>
+          <a:prstGeom prst="rect">
+            <a:avLst/>
+          </a:prstGeom>
+        </p:spPr>
+        <p:style>
+          <a:lnRef idx="2">
+            <a:schemeClr val="dk1"/>
+          </a:lnRef>
+          <a:fillRef idx="1">
+            <a:schemeClr val="lt1"/>
+          </a:fillRef>
+          <a:effectRef idx="0">
+            <a:schemeClr val="dk1"/>
+          </a:effectRef>
+          <a:fontRef idx="minor">
+            <a:schemeClr val="dk1"/>
+          </a:fontRef>
+        </p:style>
+        <p:txBody>
+          <a:bodyPr wrap="square" rtlCol="0">
+            <a:spAutoFit/>
+          </a:bodyPr>
+          <a:lstStyle/>
+          <a:p>
+            <a:r>
+              <a:rPr lang="zh-TW" altLang="en-US" sz="2800" dirty="0">
+                <a:latin typeface="Arial" panose="020B0604020202020204" pitchFamily="34" charset="0"/>
+                <a:cs typeface="Arial" panose="020B0604020202020204" pitchFamily="34" charset="0"/>
+              </a:rPr>
+              <a:t>。</a:t>
+            </a:r>
+            <a:r>
+              <a:rPr lang="en-US" altLang="zh-TW" sz="2800" dirty="0">
+                <a:latin typeface="Arial" panose="020B0604020202020204" pitchFamily="34" charset="0"/>
+                <a:cs typeface="Arial" panose="020B0604020202020204" pitchFamily="34" charset="0"/>
+              </a:rPr>
+              <a:t>main file</a:t>
+            </a:r>
+          </a:p>
+          <a:p>
+            <a:r>
+              <a:rPr lang="zh-TW" altLang="en-US" sz="2800" dirty="0">
+                <a:latin typeface="Arial" panose="020B0604020202020204" pitchFamily="34" charset="0"/>
+                <a:cs typeface="Arial" panose="020B0604020202020204" pitchFamily="34" charset="0"/>
+              </a:rPr>
+              <a:t>．</a:t>
+            </a:r>
+            <a:r>
+              <a:rPr lang="en-US" altLang="zh-TW" sz="2800" dirty="0">
+                <a:latin typeface="Arial" panose="020B0604020202020204" pitchFamily="34" charset="0"/>
+                <a:cs typeface="Arial" panose="020B0604020202020204" pitchFamily="34" charset="0"/>
+              </a:rPr>
+              <a:t>new file</a:t>
+            </a:r>
+          </a:p>
+        </p:txBody>
+      </p:sp>
+      <p:cxnSp>
+        <p:nvCxnSpPr>
+          <p:cNvPr id="18" name="直線單箭頭接點 17">
+            <a:extLst>
+              <a:ext uri="{FF2B5EF4-FFF2-40B4-BE49-F238E27FC236}">
+                <a16:creationId xmlns:a16="http://schemas.microsoft.com/office/drawing/2014/main" id="{D33E09B5-2ABD-4400-824C-B26610015F89}"/>
+              </a:ext>
+            </a:extLst>
+          </p:cNvPr>
+          <p:cNvCxnSpPr>
+            <a:cxnSpLocks/>
+            <a:stCxn id="7" idx="3"/>
+            <a:endCxn id="16" idx="1"/>
+          </p:cNvCxnSpPr>
+          <p:nvPr/>
+        </p:nvCxnSpPr>
+        <p:spPr>
+          <a:xfrm>
+            <a:off x="3779736" y="2576178"/>
+            <a:ext cx="2334674" cy="6616"/>
+          </a:xfrm>
+          <a:prstGeom prst="straightConnector1">
+            <a:avLst/>
+          </a:prstGeom>
+          <a:ln w="38100">
+            <a:solidFill>
+              <a:schemeClr val="tx1"/>
+            </a:solidFill>
+            <a:tailEnd type="triangle"/>
+          </a:ln>
+        </p:spPr>
+        <p:style>
+          <a:lnRef idx="1">
+            <a:schemeClr val="accent1"/>
+          </a:lnRef>
+          <a:fillRef idx="0">
+            <a:schemeClr val="accent1"/>
+          </a:fillRef>
+          <a:effectRef idx="0">
+            <a:schemeClr val="accent1"/>
+          </a:effectRef>
+          <a:fontRef idx="minor">
+            <a:schemeClr val="tx1"/>
+          </a:fontRef>
+        </p:style>
+      </p:cxnSp>
+      <p:sp>
+        <p:nvSpPr>
+          <p:cNvPr id="22" name="文字方塊 21">
+            <a:extLst>
+              <a:ext uri="{FF2B5EF4-FFF2-40B4-BE49-F238E27FC236}">
+                <a16:creationId xmlns:a16="http://schemas.microsoft.com/office/drawing/2014/main" id="{79DDA0F3-83F4-4BB3-BBBA-2509FAA4F2A3}"/>
+              </a:ext>
+            </a:extLst>
+          </p:cNvPr>
+          <p:cNvSpPr txBox="1"/>
+          <p:nvPr/>
+        </p:nvSpPr>
+        <p:spPr>
+          <a:xfrm>
+            <a:off x="4376428" y="2114513"/>
+            <a:ext cx="933805" cy="400110"/>
+          </a:xfrm>
+          <a:prstGeom prst="rect">
+            <a:avLst/>
+          </a:prstGeom>
+          <a:noFill/>
+        </p:spPr>
+        <p:txBody>
+          <a:bodyPr wrap="square" rtlCol="0">
+            <a:spAutoFit/>
+          </a:bodyPr>
+          <a:lstStyle/>
+          <a:p>
+            <a:r>
+              <a:rPr lang="en-US" altLang="zh-TW" sz="2000" dirty="0">
+                <a:latin typeface="Arial" panose="020B0604020202020204" pitchFamily="34" charset="0"/>
+                <a:cs typeface="Arial" panose="020B0604020202020204" pitchFamily="34" charset="0"/>
+              </a:rPr>
+              <a:t>modify</a:t>
+            </a:r>
+          </a:p>
+        </p:txBody>
+      </p:sp>
+      <p:sp>
+        <p:nvSpPr>
+          <p:cNvPr id="23" name="文字方塊 22">
+            <a:extLst>
+              <a:ext uri="{FF2B5EF4-FFF2-40B4-BE49-F238E27FC236}">
+                <a16:creationId xmlns:a16="http://schemas.microsoft.com/office/drawing/2014/main" id="{1F468E26-20E0-441C-9F7E-9891B9ACA69B}"/>
+              </a:ext>
+            </a:extLst>
+          </p:cNvPr>
+          <p:cNvSpPr txBox="1"/>
+          <p:nvPr/>
+        </p:nvSpPr>
+        <p:spPr>
+          <a:xfrm>
+            <a:off x="1669408" y="3646439"/>
+            <a:ext cx="2110328" cy="954107"/>
+          </a:xfrm>
+          <a:prstGeom prst="rect">
+            <a:avLst/>
+          </a:prstGeom>
+        </p:spPr>
+        <p:style>
+          <a:lnRef idx="2">
+            <a:schemeClr val="dk1"/>
+          </a:lnRef>
+          <a:fillRef idx="1">
+            <a:schemeClr val="lt1"/>
+          </a:fillRef>
+          <a:effectRef idx="0">
+            <a:schemeClr val="dk1"/>
+          </a:effectRef>
+          <a:fontRef idx="minor">
+            <a:schemeClr val="dk1"/>
+          </a:fontRef>
+        </p:style>
+        <p:txBody>
+          <a:bodyPr wrap="square" rtlCol="0">
+            <a:spAutoFit/>
+          </a:bodyPr>
+          <a:lstStyle/>
+          <a:p>
+            <a:r>
+              <a:rPr lang="zh-TW" altLang="en-US" sz="2800" dirty="0">
+                <a:latin typeface="Arial" panose="020B0604020202020204" pitchFamily="34" charset="0"/>
+                <a:cs typeface="Arial" panose="020B0604020202020204" pitchFamily="34" charset="0"/>
+              </a:rPr>
+              <a:t>。</a:t>
+            </a:r>
+            <a:r>
+              <a:rPr lang="en-US" altLang="zh-TW" sz="2800" dirty="0">
+                <a:latin typeface="Arial" panose="020B0604020202020204" pitchFamily="34" charset="0"/>
+                <a:cs typeface="Arial" panose="020B0604020202020204" pitchFamily="34" charset="0"/>
+              </a:rPr>
+              <a:t>main file</a:t>
+            </a:r>
+          </a:p>
+          <a:p>
+            <a:r>
+              <a:rPr lang="zh-TW" altLang="en-US" sz="2800" dirty="0">
+                <a:latin typeface="Arial" panose="020B0604020202020204" pitchFamily="34" charset="0"/>
+                <a:cs typeface="Arial" panose="020B0604020202020204" pitchFamily="34" charset="0"/>
+              </a:rPr>
+              <a:t>．</a:t>
+            </a:r>
+            <a:r>
+              <a:rPr lang="en-US" altLang="zh-TW" sz="2800" dirty="0">
+                <a:latin typeface="Arial" panose="020B0604020202020204" pitchFamily="34" charset="0"/>
+                <a:cs typeface="Arial" panose="020B0604020202020204" pitchFamily="34" charset="0"/>
+              </a:rPr>
+              <a:t>new file</a:t>
+            </a:r>
+          </a:p>
+        </p:txBody>
+      </p:sp>
+      <p:cxnSp>
+        <p:nvCxnSpPr>
+          <p:cNvPr id="24" name="直線單箭頭接點 23">
+            <a:extLst>
+              <a:ext uri="{FF2B5EF4-FFF2-40B4-BE49-F238E27FC236}">
+                <a16:creationId xmlns:a16="http://schemas.microsoft.com/office/drawing/2014/main" id="{AC2572B1-8983-4F84-8AB1-414999449184}"/>
+              </a:ext>
+            </a:extLst>
+          </p:cNvPr>
+          <p:cNvCxnSpPr>
+            <a:cxnSpLocks/>
+            <a:stCxn id="7" idx="2"/>
+            <a:endCxn id="23" idx="0"/>
+          </p:cNvCxnSpPr>
+          <p:nvPr/>
+        </p:nvCxnSpPr>
+        <p:spPr>
+          <a:xfrm flipH="1">
+            <a:off x="2724572" y="2837788"/>
+            <a:ext cx="1" cy="808651"/>
+          </a:xfrm>
+          <a:prstGeom prst="straightConnector1">
+            <a:avLst/>
+          </a:prstGeom>
+          <a:ln w="38100">
+            <a:solidFill>
+              <a:schemeClr val="tx1"/>
+            </a:solidFill>
+            <a:tailEnd type="triangle"/>
+          </a:ln>
+        </p:spPr>
+        <p:style>
+          <a:lnRef idx="1">
+            <a:schemeClr val="accent1"/>
+          </a:lnRef>
+          <a:fillRef idx="0">
+            <a:schemeClr val="accent1"/>
+          </a:fillRef>
+          <a:effectRef idx="0">
+            <a:schemeClr val="accent1"/>
+          </a:effectRef>
+          <a:fontRef idx="minor">
+            <a:schemeClr val="tx1"/>
+          </a:fontRef>
+        </p:style>
+      </p:cxnSp>
+      <p:cxnSp>
+        <p:nvCxnSpPr>
+          <p:cNvPr id="27" name="接點: 肘形 26">
+            <a:extLst>
+              <a:ext uri="{FF2B5EF4-FFF2-40B4-BE49-F238E27FC236}">
+                <a16:creationId xmlns:a16="http://schemas.microsoft.com/office/drawing/2014/main" id="{2E528F29-0DD3-4E23-9397-6B2F6F355E7B}"/>
+              </a:ext>
+            </a:extLst>
+          </p:cNvPr>
+          <p:cNvCxnSpPr>
+            <a:cxnSpLocks/>
+            <a:stCxn id="16" idx="2"/>
+            <a:endCxn id="23" idx="3"/>
+          </p:cNvCxnSpPr>
+          <p:nvPr/>
+        </p:nvCxnSpPr>
+        <p:spPr>
+          <a:xfrm rot="5400000">
+            <a:off x="4942832" y="1896751"/>
+            <a:ext cx="1063646" cy="3389838"/>
+          </a:xfrm>
+          <a:prstGeom prst="bentConnector2">
+            <a:avLst/>
+          </a:prstGeom>
+          <a:ln w="38100">
+            <a:solidFill>
+              <a:schemeClr val="tx1"/>
+            </a:solidFill>
+            <a:tailEnd type="triangle"/>
+          </a:ln>
+        </p:spPr>
+        <p:style>
+          <a:lnRef idx="1">
+            <a:schemeClr val="accent1"/>
+          </a:lnRef>
+          <a:fillRef idx="0">
+            <a:schemeClr val="accent1"/>
+          </a:fillRef>
+          <a:effectRef idx="0">
+            <a:schemeClr val="accent1"/>
+          </a:effectRef>
+          <a:fontRef idx="minor">
+            <a:schemeClr val="tx1"/>
+          </a:fontRef>
+        </p:style>
+      </p:cxnSp>
+      <p:sp>
+        <p:nvSpPr>
+          <p:cNvPr id="30" name="文字方塊 29">
+            <a:extLst>
+              <a:ext uri="{FF2B5EF4-FFF2-40B4-BE49-F238E27FC236}">
+                <a16:creationId xmlns:a16="http://schemas.microsoft.com/office/drawing/2014/main" id="{FEBF6538-9CDD-4F5A-BCB3-757B8725C0BA}"/>
+              </a:ext>
+            </a:extLst>
+          </p:cNvPr>
+          <p:cNvSpPr txBox="1"/>
+          <p:nvPr/>
+        </p:nvSpPr>
+        <p:spPr>
+          <a:xfrm>
+            <a:off x="4652057" y="3686176"/>
+            <a:ext cx="1714454" cy="400110"/>
+          </a:xfrm>
+          <a:prstGeom prst="rect">
+            <a:avLst/>
+          </a:prstGeom>
+          <a:noFill/>
+        </p:spPr>
+        <p:txBody>
+          <a:bodyPr wrap="square" rtlCol="0">
+            <a:spAutoFit/>
+          </a:bodyPr>
+          <a:lstStyle/>
+          <a:p>
+            <a:r>
+              <a:rPr lang="en-US" altLang="zh-TW" sz="2000" dirty="0">
+                <a:latin typeface="Arial" panose="020B0604020202020204" pitchFamily="34" charset="0"/>
+                <a:cs typeface="Arial" panose="020B0604020202020204" pitchFamily="34" charset="0"/>
+              </a:rPr>
+              <a:t>add, commit</a:t>
+            </a:r>
+          </a:p>
+        </p:txBody>
+      </p:sp>
+      <p:cxnSp>
+        <p:nvCxnSpPr>
+          <p:cNvPr id="33" name="直線單箭頭接點 32">
+            <a:extLst>
+              <a:ext uri="{FF2B5EF4-FFF2-40B4-BE49-F238E27FC236}">
+                <a16:creationId xmlns:a16="http://schemas.microsoft.com/office/drawing/2014/main" id="{A76451C5-833B-4D40-98B0-22044EE7228D}"/>
+              </a:ext>
+            </a:extLst>
+          </p:cNvPr>
+          <p:cNvCxnSpPr>
+            <a:cxnSpLocks/>
+            <a:stCxn id="6" idx="2"/>
+            <a:endCxn id="36" idx="0"/>
+          </p:cNvCxnSpPr>
+          <p:nvPr/>
+        </p:nvCxnSpPr>
+        <p:spPr>
+          <a:xfrm flipH="1">
+            <a:off x="1404209" y="1582106"/>
+            <a:ext cx="1" cy="3643180"/>
+          </a:xfrm>
+          <a:prstGeom prst="straightConnector1">
+            <a:avLst/>
+          </a:prstGeom>
+          <a:ln w="38100">
+            <a:solidFill>
+              <a:schemeClr val="tx1"/>
+            </a:solidFill>
+            <a:tailEnd type="triangle"/>
+          </a:ln>
+        </p:spPr>
+        <p:style>
+          <a:lnRef idx="1">
+            <a:schemeClr val="accent1"/>
+          </a:lnRef>
+          <a:fillRef idx="0">
+            <a:schemeClr val="accent1"/>
+          </a:fillRef>
+          <a:effectRef idx="0">
+            <a:schemeClr val="accent1"/>
+          </a:effectRef>
+          <a:fontRef idx="minor">
+            <a:schemeClr val="tx1"/>
+          </a:fontRef>
+        </p:style>
+      </p:cxnSp>
+      <p:sp>
+        <p:nvSpPr>
+          <p:cNvPr id="36" name="文字方塊 35">
+            <a:extLst>
+              <a:ext uri="{FF2B5EF4-FFF2-40B4-BE49-F238E27FC236}">
+                <a16:creationId xmlns:a16="http://schemas.microsoft.com/office/drawing/2014/main" id="{518804E3-8FC2-4488-87D4-F4A9F33849D8}"/>
+              </a:ext>
+            </a:extLst>
+          </p:cNvPr>
+          <p:cNvSpPr txBox="1"/>
+          <p:nvPr/>
+        </p:nvSpPr>
+        <p:spPr>
+          <a:xfrm>
+            <a:off x="937306" y="5225286"/>
+            <a:ext cx="933805" cy="400110"/>
+          </a:xfrm>
+          <a:prstGeom prst="rect">
+            <a:avLst/>
+          </a:prstGeom>
+          <a:noFill/>
+        </p:spPr>
+        <p:txBody>
+          <a:bodyPr wrap="square" rtlCol="0">
+            <a:spAutoFit/>
+          </a:bodyPr>
+          <a:lstStyle/>
+          <a:p>
+            <a:r>
+              <a:rPr lang="en-US" altLang="zh-TW" sz="2000" dirty="0">
+                <a:latin typeface="Arial" panose="020B0604020202020204" pitchFamily="34" charset="0"/>
+                <a:cs typeface="Arial" panose="020B0604020202020204" pitchFamily="34" charset="0"/>
+              </a:rPr>
+              <a:t>merge</a:t>
+            </a:r>
+          </a:p>
+        </p:txBody>
+      </p:sp>
+      <p:cxnSp>
+        <p:nvCxnSpPr>
+          <p:cNvPr id="40" name="接點: 肘形 39">
+            <a:extLst>
+              <a:ext uri="{FF2B5EF4-FFF2-40B4-BE49-F238E27FC236}">
+                <a16:creationId xmlns:a16="http://schemas.microsoft.com/office/drawing/2014/main" id="{FEB8B8ED-CAB0-4C11-9628-33C7EB66C3FA}"/>
+              </a:ext>
+            </a:extLst>
+          </p:cNvPr>
+          <p:cNvCxnSpPr>
+            <a:cxnSpLocks/>
+            <a:stCxn id="23" idx="2"/>
+            <a:endCxn id="36" idx="3"/>
+          </p:cNvCxnSpPr>
+          <p:nvPr/>
+        </p:nvCxnSpPr>
+        <p:spPr>
+          <a:xfrm rot="5400000">
+            <a:off x="1885445" y="4586213"/>
+            <a:ext cx="824795" cy="853461"/>
+          </a:xfrm>
+          <a:prstGeom prst="bentConnector2">
+            <a:avLst/>
+          </a:prstGeom>
+          <a:ln w="38100">
+            <a:solidFill>
+              <a:schemeClr val="tx1"/>
+            </a:solidFill>
+            <a:tailEnd type="triangle"/>
+          </a:ln>
+        </p:spPr>
+        <p:style>
+          <a:lnRef idx="1">
+            <a:schemeClr val="accent1"/>
+          </a:lnRef>
+          <a:fillRef idx="0">
+            <a:schemeClr val="accent1"/>
+          </a:fillRef>
+          <a:effectRef idx="0">
+            <a:schemeClr val="accent1"/>
+          </a:effectRef>
+          <a:fontRef idx="minor">
+            <a:schemeClr val="tx1"/>
+          </a:fontRef>
+        </p:style>
+      </p:cxnSp>
+      <p:cxnSp>
+        <p:nvCxnSpPr>
+          <p:cNvPr id="43" name="直線單箭頭接點 42">
+            <a:extLst>
+              <a:ext uri="{FF2B5EF4-FFF2-40B4-BE49-F238E27FC236}">
+                <a16:creationId xmlns:a16="http://schemas.microsoft.com/office/drawing/2014/main" id="{4CBCE9BE-B1B4-49CC-AA1D-6C0C71B98ADB}"/>
+              </a:ext>
+            </a:extLst>
+          </p:cNvPr>
+          <p:cNvCxnSpPr>
+            <a:cxnSpLocks/>
+            <a:stCxn id="36" idx="2"/>
+          </p:cNvCxnSpPr>
+          <p:nvPr/>
+        </p:nvCxnSpPr>
+        <p:spPr>
+          <a:xfrm>
+            <a:off x="1404209" y="5625396"/>
+            <a:ext cx="0" cy="473400"/>
+          </a:xfrm>
+          <a:prstGeom prst="straightConnector1">
+            <a:avLst/>
+          </a:prstGeom>
+          <a:ln w="38100">
+            <a:solidFill>
+              <a:schemeClr val="tx1"/>
+            </a:solidFill>
+            <a:tailEnd type="triangle"/>
+          </a:ln>
+        </p:spPr>
+        <p:style>
+          <a:lnRef idx="1">
+            <a:schemeClr val="accent1"/>
+          </a:lnRef>
+          <a:fillRef idx="0">
+            <a:schemeClr val="accent1"/>
+          </a:fillRef>
+          <a:effectRef idx="0">
+            <a:schemeClr val="accent1"/>
+          </a:effectRef>
+          <a:fontRef idx="minor">
+            <a:schemeClr val="tx1"/>
+          </a:fontRef>
+        </p:style>
+      </p:cxnSp>
+    </p:spTree>
+    <p:extLst>
+      <p:ext uri="{BB962C8B-B14F-4D97-AF65-F5344CB8AC3E}">
+        <p14:creationId xmlns:p14="http://schemas.microsoft.com/office/powerpoint/2010/main" val="3095387095"/>
+      </p:ext>
+    </p:extLst>
+  </p:cSld>
+  <p:clrMapOvr>
+    <a:masterClrMapping/>
+  </p:clrMapOvr>
+</p:sld>
+</file>
+
+<file path=ppt/slides/slide29.xml><?xml version="1.0" encoding="utf-8"?>
+<p:sld xmlns:a="http://schemas.openxmlformats.org/drawingml/2006/main" xmlns:r="http://schemas.openxmlformats.org/officeDocument/2006/relationships" xmlns:p="http://schemas.openxmlformats.org/presentationml/2006/main">
+  <p:cSld>
+    <p:spTree>
+      <p:nvGrpSpPr>
+        <p:cNvPr id="1" name=""/>
+        <p:cNvGrpSpPr/>
+        <p:nvPr/>
+      </p:nvGrpSpPr>
+      <p:grpSpPr>
+        <a:xfrm>
+          <a:off x="0" y="0"/>
+          <a:ext cx="0" cy="0"/>
+          <a:chOff x="0" y="0"/>
+          <a:chExt cx="0" cy="0"/>
+        </a:xfrm>
+      </p:grpSpPr>
+      <p:pic>
+        <p:nvPicPr>
+          <p:cNvPr id="3" name="圖片 2">
+            <a:extLst>
+              <a:ext uri="{FF2B5EF4-FFF2-40B4-BE49-F238E27FC236}">
+                <a16:creationId xmlns:a16="http://schemas.microsoft.com/office/drawing/2014/main" id="{1202EBDE-7F64-43BD-86B7-6C228CCEC2D0}"/>
+              </a:ext>
+            </a:extLst>
+          </p:cNvPr>
+          <p:cNvPicPr>
+            <a:picLocks noChangeAspect="1"/>
+          </p:cNvPicPr>
+          <p:nvPr/>
+        </p:nvPicPr>
+        <p:blipFill>
+          <a:blip r:embed="rId2" cstate="print">
+            <a:extLst>
+              <a:ext uri="{28A0092B-C50C-407E-A947-70E740481C1C}">
+                <a14:useLocalDpi xmlns:a14="http://schemas.microsoft.com/office/drawing/2010/main" val="0"/>
+              </a:ext>
+            </a:extLst>
+          </a:blip>
+          <a:stretch>
+            <a:fillRect/>
+          </a:stretch>
+        </p:blipFill>
+        <p:spPr>
+          <a:xfrm>
+            <a:off x="6598915" y="0"/>
+            <a:ext cx="2545085" cy="3294895"/>
+          </a:xfrm>
+          <a:prstGeom prst="rect">
+            <a:avLst/>
+          </a:prstGeom>
+        </p:spPr>
+      </p:pic>
+      <p:pic>
+        <p:nvPicPr>
+          <p:cNvPr id="4" name="圖片 3">
+            <a:extLst>
+              <a:ext uri="{FF2B5EF4-FFF2-40B4-BE49-F238E27FC236}">
+                <a16:creationId xmlns:a16="http://schemas.microsoft.com/office/drawing/2014/main" id="{AEFF5069-0FA7-44E7-AEEE-225463C6B1AC}"/>
+              </a:ext>
+            </a:extLst>
+          </p:cNvPr>
+          <p:cNvPicPr>
+            <a:picLocks noChangeAspect="1"/>
+          </p:cNvPicPr>
+          <p:nvPr/>
+        </p:nvPicPr>
+        <p:blipFill>
+          <a:blip r:embed="rId3" cstate="print">
+            <a:extLst>
+              <a:ext uri="{28A0092B-C50C-407E-A947-70E740481C1C}">
+                <a14:useLocalDpi xmlns:a14="http://schemas.microsoft.com/office/drawing/2010/main" val="0"/>
+              </a:ext>
+            </a:extLst>
+          </a:blip>
+          <a:stretch>
+            <a:fillRect/>
+          </a:stretch>
+        </p:blipFill>
+        <p:spPr>
+          <a:xfrm>
+            <a:off x="0" y="4169659"/>
+            <a:ext cx="3934976" cy="2688341"/>
+          </a:xfrm>
+          <a:prstGeom prst="rect">
+            <a:avLst/>
+          </a:prstGeom>
+        </p:spPr>
+      </p:pic>
+      <p:sp>
+        <p:nvSpPr>
+          <p:cNvPr id="5" name="文字方塊 4">
+            <a:extLst>
+              <a:ext uri="{FF2B5EF4-FFF2-40B4-BE49-F238E27FC236}">
+                <a16:creationId xmlns:a16="http://schemas.microsoft.com/office/drawing/2014/main" id="{C16ED53E-9866-436B-893D-42D9B6177B63}"/>
+              </a:ext>
+            </a:extLst>
+          </p:cNvPr>
+          <p:cNvSpPr txBox="1"/>
+          <p:nvPr/>
+        </p:nvSpPr>
+        <p:spPr>
+          <a:xfrm>
+            <a:off x="661169" y="767632"/>
+            <a:ext cx="8039380" cy="4433073"/>
+          </a:xfrm>
+          <a:prstGeom prst="rect">
+            <a:avLst/>
+          </a:prstGeom>
+          <a:noFill/>
+        </p:spPr>
+        <p:txBody>
+          <a:bodyPr wrap="none" rtlCol="0">
+            <a:spAutoFit/>
+          </a:bodyPr>
+          <a:lstStyle/>
+          <a:p>
+            <a:pPr>
+              <a:lnSpc>
+                <a:spcPct val="150000"/>
+              </a:lnSpc>
+            </a:pPr>
+            <a:r>
+              <a:rPr lang="zh-TW" altLang="en-US" sz="3200" dirty="0">
+                <a:latin typeface="Arial" panose="020B0604020202020204" pitchFamily="34" charset="0"/>
+                <a:cs typeface="Arial" panose="020B0604020202020204" pitchFamily="34" charset="0"/>
+              </a:rPr>
+              <a:t>．</a:t>
+            </a:r>
+            <a:r>
+              <a:rPr lang="en-US" altLang="zh-TW" sz="3200" dirty="0">
+                <a:latin typeface="Arial" panose="020B0604020202020204" pitchFamily="34" charset="0"/>
+                <a:cs typeface="Arial" panose="020B0604020202020204" pitchFamily="34" charset="0"/>
+              </a:rPr>
+              <a:t>history of diff. branches are diff.</a:t>
+            </a:r>
+          </a:p>
+          <a:p>
+            <a:pPr>
+              <a:lnSpc>
+                <a:spcPct val="150000"/>
+              </a:lnSpc>
+            </a:pPr>
+            <a:r>
+              <a:rPr lang="zh-TW" altLang="en-US" sz="3200" dirty="0">
+                <a:latin typeface="Arial" panose="020B0604020202020204" pitchFamily="34" charset="0"/>
+                <a:cs typeface="Arial" panose="020B0604020202020204" pitchFamily="34" charset="0"/>
+              </a:rPr>
+              <a:t>．</a:t>
+            </a:r>
+            <a:r>
+              <a:rPr lang="en-US" altLang="zh-TW" sz="3200" dirty="0">
+                <a:latin typeface="Arial" panose="020B0604020202020204" pitchFamily="34" charset="0"/>
+                <a:cs typeface="Arial" panose="020B0604020202020204" pitchFamily="34" charset="0"/>
+              </a:rPr>
+              <a:t>git branch –d </a:t>
+            </a:r>
+            <a:r>
+              <a:rPr lang="en-US" altLang="zh-TW" sz="3200" dirty="0" err="1">
+                <a:latin typeface="Arial" panose="020B0604020202020204" pitchFamily="34" charset="0"/>
+                <a:cs typeface="Arial" panose="020B0604020202020204" pitchFamily="34" charset="0"/>
+              </a:rPr>
+              <a:t>branch_name</a:t>
+            </a:r>
+            <a:endParaRPr lang="en-US" altLang="zh-TW" sz="3200" dirty="0">
+              <a:latin typeface="Arial" panose="020B0604020202020204" pitchFamily="34" charset="0"/>
+              <a:cs typeface="Arial" panose="020B0604020202020204" pitchFamily="34" charset="0"/>
+            </a:endParaRPr>
+          </a:p>
+          <a:p>
+            <a:pPr>
+              <a:lnSpc>
+                <a:spcPct val="150000"/>
+              </a:lnSpc>
+            </a:pPr>
+            <a:r>
+              <a:rPr lang="zh-TW" altLang="en-US" sz="3200" dirty="0">
+                <a:latin typeface="Arial" panose="020B0604020202020204" pitchFamily="34" charset="0"/>
+                <a:cs typeface="Arial" panose="020B0604020202020204" pitchFamily="34" charset="0"/>
+              </a:rPr>
+              <a:t>．</a:t>
+            </a:r>
+            <a:r>
+              <a:rPr lang="en-US" altLang="zh-TW" sz="3200" dirty="0">
+                <a:latin typeface="Arial" panose="020B0604020202020204" pitchFamily="34" charset="0"/>
+                <a:cs typeface="Arial" panose="020B0604020202020204" pitchFamily="34" charset="0"/>
+              </a:rPr>
+              <a:t>git merge </a:t>
+            </a:r>
+            <a:r>
+              <a:rPr lang="en-US" altLang="zh-TW" sz="3200" dirty="0" err="1">
+                <a:latin typeface="Arial" panose="020B0604020202020204" pitchFamily="34" charset="0"/>
+                <a:cs typeface="Arial" panose="020B0604020202020204" pitchFamily="34" charset="0"/>
+              </a:rPr>
+              <a:t>branch_name</a:t>
+            </a:r>
+            <a:endParaRPr lang="en-US" altLang="zh-TW" sz="3200" dirty="0">
+              <a:latin typeface="Arial" panose="020B0604020202020204" pitchFamily="34" charset="0"/>
+              <a:cs typeface="Arial" panose="020B0604020202020204" pitchFamily="34" charset="0"/>
+            </a:endParaRPr>
+          </a:p>
+          <a:p>
+            <a:pPr>
+              <a:lnSpc>
+                <a:spcPct val="150000"/>
+              </a:lnSpc>
+            </a:pPr>
+            <a:r>
+              <a:rPr lang="zh-TW" altLang="en-US" sz="3200" dirty="0">
+                <a:latin typeface="Arial" panose="020B0604020202020204" pitchFamily="34" charset="0"/>
+                <a:cs typeface="Arial" panose="020B0604020202020204" pitchFamily="34" charset="0"/>
+              </a:rPr>
+              <a:t>．</a:t>
+            </a:r>
+            <a:r>
+              <a:rPr lang="en-US" altLang="zh-TW" sz="3200" dirty="0">
+                <a:latin typeface="Arial" panose="020B0604020202020204" pitchFamily="34" charset="0"/>
+                <a:cs typeface="Arial" panose="020B0604020202020204" pitchFamily="34" charset="0"/>
+              </a:rPr>
+              <a:t>fast-forward merge (when no diverge)</a:t>
+            </a:r>
+          </a:p>
+          <a:p>
+            <a:pPr>
+              <a:lnSpc>
+                <a:spcPct val="150000"/>
+              </a:lnSpc>
+            </a:pPr>
+            <a:r>
+              <a:rPr lang="zh-TW" altLang="en-US" sz="3200" dirty="0">
+                <a:latin typeface="Arial" panose="020B0604020202020204" pitchFamily="34" charset="0"/>
+                <a:cs typeface="Arial" panose="020B0604020202020204" pitchFamily="34" charset="0"/>
+              </a:rPr>
+              <a:t>．</a:t>
+            </a:r>
+            <a:r>
+              <a:rPr lang="en-US" altLang="zh-TW" sz="3200" dirty="0">
+                <a:latin typeface="Arial" panose="020B0604020202020204" pitchFamily="34" charset="0"/>
+                <a:cs typeface="Arial" panose="020B0604020202020204" pitchFamily="34" charset="0"/>
+              </a:rPr>
+              <a:t>three-way merge (diverge but no conflict)</a:t>
+            </a:r>
+          </a:p>
+          <a:p>
+            <a:pPr>
+              <a:lnSpc>
+                <a:spcPct val="150000"/>
+              </a:lnSpc>
+            </a:pPr>
+            <a:r>
+              <a:rPr lang="zh-TW" altLang="en-US" sz="3200" dirty="0">
+                <a:latin typeface="Arial" panose="020B0604020202020204" pitchFamily="34" charset="0"/>
+                <a:cs typeface="Arial" panose="020B0604020202020204" pitchFamily="34" charset="0"/>
+              </a:rPr>
+              <a:t>．</a:t>
+            </a:r>
+            <a:r>
+              <a:rPr lang="en-US" altLang="zh-TW" sz="3200" dirty="0">
+                <a:latin typeface="Arial" panose="020B0604020202020204" pitchFamily="34" charset="0"/>
+                <a:cs typeface="Arial" panose="020B0604020202020204" pitchFamily="34" charset="0"/>
+              </a:rPr>
+              <a:t>conflict ? Fix it, add, and commit </a:t>
+            </a:r>
+          </a:p>
+        </p:txBody>
+      </p:sp>
+    </p:spTree>
+    <p:extLst>
+      <p:ext uri="{BB962C8B-B14F-4D97-AF65-F5344CB8AC3E}">
+        <p14:creationId xmlns:p14="http://schemas.microsoft.com/office/powerpoint/2010/main" val="1609292287"/>
       </p:ext>
     </p:extLst>
   </p:cSld>
@@ -7852,6 +9543,1241 @@
 </p:sld>
 </file>
 
+<file path=ppt/slides/slide30.xml><?xml version="1.0" encoding="utf-8"?>
+<p:sld xmlns:a="http://schemas.openxmlformats.org/drawingml/2006/main" xmlns:r="http://schemas.openxmlformats.org/officeDocument/2006/relationships" xmlns:p="http://schemas.openxmlformats.org/presentationml/2006/main">
+  <p:cSld>
+    <p:spTree>
+      <p:nvGrpSpPr>
+        <p:cNvPr id="1" name=""/>
+        <p:cNvGrpSpPr/>
+        <p:nvPr/>
+      </p:nvGrpSpPr>
+      <p:grpSpPr>
+        <a:xfrm>
+          <a:off x="0" y="0"/>
+          <a:ext cx="0" cy="0"/>
+          <a:chOff x="0" y="0"/>
+          <a:chExt cx="0" cy="0"/>
+        </a:xfrm>
+      </p:grpSpPr>
+      <p:pic>
+        <p:nvPicPr>
+          <p:cNvPr id="3" name="圖片 2">
+            <a:extLst>
+              <a:ext uri="{FF2B5EF4-FFF2-40B4-BE49-F238E27FC236}">
+                <a16:creationId xmlns:a16="http://schemas.microsoft.com/office/drawing/2014/main" id="{1202EBDE-7F64-43BD-86B7-6C228CCEC2D0}"/>
+              </a:ext>
+            </a:extLst>
+          </p:cNvPr>
+          <p:cNvPicPr>
+            <a:picLocks noChangeAspect="1"/>
+          </p:cNvPicPr>
+          <p:nvPr/>
+        </p:nvPicPr>
+        <p:blipFill>
+          <a:blip r:embed="rId2" cstate="print">
+            <a:extLst>
+              <a:ext uri="{28A0092B-C50C-407E-A947-70E740481C1C}">
+                <a14:useLocalDpi xmlns:a14="http://schemas.microsoft.com/office/drawing/2010/main" val="0"/>
+              </a:ext>
+            </a:extLst>
+          </a:blip>
+          <a:stretch>
+            <a:fillRect/>
+          </a:stretch>
+        </p:blipFill>
+        <p:spPr>
+          <a:xfrm>
+            <a:off x="6598915" y="0"/>
+            <a:ext cx="2545085" cy="3294895"/>
+          </a:xfrm>
+          <a:prstGeom prst="rect">
+            <a:avLst/>
+          </a:prstGeom>
+        </p:spPr>
+      </p:pic>
+      <p:pic>
+        <p:nvPicPr>
+          <p:cNvPr id="4" name="圖片 3">
+            <a:extLst>
+              <a:ext uri="{FF2B5EF4-FFF2-40B4-BE49-F238E27FC236}">
+                <a16:creationId xmlns:a16="http://schemas.microsoft.com/office/drawing/2014/main" id="{AEFF5069-0FA7-44E7-AEEE-225463C6B1AC}"/>
+              </a:ext>
+            </a:extLst>
+          </p:cNvPr>
+          <p:cNvPicPr>
+            <a:picLocks noChangeAspect="1"/>
+          </p:cNvPicPr>
+          <p:nvPr/>
+        </p:nvPicPr>
+        <p:blipFill>
+          <a:blip r:embed="rId3" cstate="print">
+            <a:extLst>
+              <a:ext uri="{28A0092B-C50C-407E-A947-70E740481C1C}">
+                <a14:useLocalDpi xmlns:a14="http://schemas.microsoft.com/office/drawing/2010/main" val="0"/>
+              </a:ext>
+            </a:extLst>
+          </a:blip>
+          <a:stretch>
+            <a:fillRect/>
+          </a:stretch>
+        </p:blipFill>
+        <p:spPr>
+          <a:xfrm>
+            <a:off x="0" y="4169659"/>
+            <a:ext cx="3934976" cy="2688341"/>
+          </a:xfrm>
+          <a:prstGeom prst="rect">
+            <a:avLst/>
+          </a:prstGeom>
+        </p:spPr>
+      </p:pic>
+      <p:cxnSp>
+        <p:nvCxnSpPr>
+          <p:cNvPr id="5" name="直線接點 4">
+            <a:extLst>
+              <a:ext uri="{FF2B5EF4-FFF2-40B4-BE49-F238E27FC236}">
+                <a16:creationId xmlns:a16="http://schemas.microsoft.com/office/drawing/2014/main" id="{D1762274-47D1-40FE-B255-A9D5DEA69D48}"/>
+              </a:ext>
+            </a:extLst>
+          </p:cNvPr>
+          <p:cNvCxnSpPr>
+            <a:cxnSpLocks/>
+          </p:cNvCxnSpPr>
+          <p:nvPr/>
+        </p:nvCxnSpPr>
+        <p:spPr>
+          <a:xfrm>
+            <a:off x="678535" y="637564"/>
+            <a:ext cx="285226" cy="503339"/>
+          </a:xfrm>
+          <a:prstGeom prst="line">
+            <a:avLst/>
+          </a:prstGeom>
+          <a:ln w="28575">
+            <a:solidFill>
+              <a:schemeClr val="bg1">
+                <a:lumMod val="50000"/>
+              </a:schemeClr>
+            </a:solidFill>
+          </a:ln>
+        </p:spPr>
+        <p:style>
+          <a:lnRef idx="1">
+            <a:schemeClr val="accent1"/>
+          </a:lnRef>
+          <a:fillRef idx="0">
+            <a:schemeClr val="accent1"/>
+          </a:fillRef>
+          <a:effectRef idx="0">
+            <a:schemeClr val="accent1"/>
+          </a:effectRef>
+          <a:fontRef idx="minor">
+            <a:schemeClr val="tx1"/>
+          </a:fontRef>
+        </p:style>
+      </p:cxnSp>
+      <p:cxnSp>
+        <p:nvCxnSpPr>
+          <p:cNvPr id="6" name="直線接點 5">
+            <a:extLst>
+              <a:ext uri="{FF2B5EF4-FFF2-40B4-BE49-F238E27FC236}">
+                <a16:creationId xmlns:a16="http://schemas.microsoft.com/office/drawing/2014/main" id="{E2569004-F964-4D54-83A1-1EDA6D9EF198}"/>
+              </a:ext>
+            </a:extLst>
+          </p:cNvPr>
+          <p:cNvCxnSpPr>
+            <a:cxnSpLocks/>
+          </p:cNvCxnSpPr>
+          <p:nvPr/>
+        </p:nvCxnSpPr>
+        <p:spPr>
+          <a:xfrm>
+            <a:off x="963761" y="1140903"/>
+            <a:ext cx="3162650" cy="0"/>
+          </a:xfrm>
+          <a:prstGeom prst="line">
+            <a:avLst/>
+          </a:prstGeom>
+          <a:ln w="28575">
+            <a:solidFill>
+              <a:schemeClr val="bg1">
+                <a:lumMod val="50000"/>
+              </a:schemeClr>
+            </a:solidFill>
+          </a:ln>
+        </p:spPr>
+        <p:style>
+          <a:lnRef idx="1">
+            <a:schemeClr val="accent1"/>
+          </a:lnRef>
+          <a:fillRef idx="0">
+            <a:schemeClr val="accent1"/>
+          </a:fillRef>
+          <a:effectRef idx="0">
+            <a:schemeClr val="accent1"/>
+          </a:effectRef>
+          <a:fontRef idx="minor">
+            <a:schemeClr val="tx1"/>
+          </a:fontRef>
+        </p:style>
+      </p:cxnSp>
+      <p:cxnSp>
+        <p:nvCxnSpPr>
+          <p:cNvPr id="7" name="直線接點 6">
+            <a:extLst>
+              <a:ext uri="{FF2B5EF4-FFF2-40B4-BE49-F238E27FC236}">
+                <a16:creationId xmlns:a16="http://schemas.microsoft.com/office/drawing/2014/main" id="{139F4661-2B2F-46A0-8E8F-96ADBA363B4C}"/>
+              </a:ext>
+            </a:extLst>
+          </p:cNvPr>
+          <p:cNvCxnSpPr>
+            <a:cxnSpLocks/>
+          </p:cNvCxnSpPr>
+          <p:nvPr/>
+        </p:nvCxnSpPr>
+        <p:spPr>
+          <a:xfrm>
+            <a:off x="4126411" y="1140904"/>
+            <a:ext cx="285226" cy="503339"/>
+          </a:xfrm>
+          <a:prstGeom prst="line">
+            <a:avLst/>
+          </a:prstGeom>
+          <a:ln w="28575">
+            <a:solidFill>
+              <a:schemeClr val="bg1">
+                <a:lumMod val="50000"/>
+              </a:schemeClr>
+            </a:solidFill>
+          </a:ln>
+        </p:spPr>
+        <p:style>
+          <a:lnRef idx="1">
+            <a:schemeClr val="accent1"/>
+          </a:lnRef>
+          <a:fillRef idx="0">
+            <a:schemeClr val="accent1"/>
+          </a:fillRef>
+          <a:effectRef idx="0">
+            <a:schemeClr val="accent1"/>
+          </a:effectRef>
+          <a:fontRef idx="minor">
+            <a:schemeClr val="tx1"/>
+          </a:fontRef>
+        </p:style>
+      </p:cxnSp>
+      <p:sp>
+        <p:nvSpPr>
+          <p:cNvPr id="8" name="文字方塊 7">
+            <a:extLst>
+              <a:ext uri="{FF2B5EF4-FFF2-40B4-BE49-F238E27FC236}">
+                <a16:creationId xmlns:a16="http://schemas.microsoft.com/office/drawing/2014/main" id="{2E3C98C0-256E-47E3-92E0-EFFAA4DD8CD0}"/>
+              </a:ext>
+            </a:extLst>
+          </p:cNvPr>
+          <p:cNvSpPr txBox="1"/>
+          <p:nvPr/>
+        </p:nvSpPr>
+        <p:spPr>
+          <a:xfrm>
+            <a:off x="963761" y="433017"/>
+            <a:ext cx="1909497" cy="707886"/>
+          </a:xfrm>
+          <a:prstGeom prst="rect">
+            <a:avLst/>
+          </a:prstGeom>
+          <a:noFill/>
+        </p:spPr>
+        <p:txBody>
+          <a:bodyPr wrap="none" rtlCol="0">
+            <a:spAutoFit/>
+          </a:bodyPr>
+          <a:lstStyle/>
+          <a:p>
+            <a:r>
+              <a:rPr lang="en-US" altLang="zh-TW" sz="4000" dirty="0">
+                <a:latin typeface="微軟正黑體" panose="020B0604030504040204" pitchFamily="34" charset="-120"/>
+                <a:ea typeface="微軟正黑體" panose="020B0604030504040204" pitchFamily="34" charset="-120"/>
+                <a:cs typeface="Times New Roman" panose="02020603050405020304" pitchFamily="18" charset="0"/>
+              </a:rPr>
+              <a:t>GitHub</a:t>
+            </a:r>
+            <a:endParaRPr lang="zh-TW" altLang="en-US" sz="4000" dirty="0">
+              <a:latin typeface="微軟正黑體" panose="020B0604030504040204" pitchFamily="34" charset="-120"/>
+              <a:ea typeface="微軟正黑體" panose="020B0604030504040204" pitchFamily="34" charset="-120"/>
+              <a:cs typeface="Times New Roman" panose="02020603050405020304" pitchFamily="18" charset="0"/>
+            </a:endParaRPr>
+          </a:p>
+        </p:txBody>
+      </p:sp>
+      <p:pic>
+        <p:nvPicPr>
+          <p:cNvPr id="10" name="圖片 9">
+            <a:hlinkClick r:id="rId4"/>
+            <a:extLst>
+              <a:ext uri="{FF2B5EF4-FFF2-40B4-BE49-F238E27FC236}">
+                <a16:creationId xmlns:a16="http://schemas.microsoft.com/office/drawing/2014/main" id="{65BE1B23-F44B-401E-B019-58749DAFAF89}"/>
+              </a:ext>
+            </a:extLst>
+          </p:cNvPr>
+          <p:cNvPicPr>
+            <a:picLocks noChangeAspect="1"/>
+          </p:cNvPicPr>
+          <p:nvPr/>
+        </p:nvPicPr>
+        <p:blipFill rotWithShape="1">
+          <a:blip r:embed="rId5">
+            <a:extLst>
+              <a:ext uri="{28A0092B-C50C-407E-A947-70E740481C1C}">
+                <a14:useLocalDpi xmlns:a14="http://schemas.microsoft.com/office/drawing/2010/main" val="0"/>
+              </a:ext>
+            </a:extLst>
+          </a:blip>
+          <a:srcRect l="19450" r="19633"/>
+          <a:stretch/>
+        </p:blipFill>
+        <p:spPr>
+          <a:xfrm>
+            <a:off x="2570337" y="2259784"/>
+            <a:ext cx="4003325" cy="3450155"/>
+          </a:xfrm>
+          <a:prstGeom prst="rect">
+            <a:avLst/>
+          </a:prstGeom>
+        </p:spPr>
+      </p:pic>
+    </p:spTree>
+    <p:extLst>
+      <p:ext uri="{BB962C8B-B14F-4D97-AF65-F5344CB8AC3E}">
+        <p14:creationId xmlns:p14="http://schemas.microsoft.com/office/powerpoint/2010/main" val="2013825449"/>
+      </p:ext>
+    </p:extLst>
+  </p:cSld>
+  <p:clrMapOvr>
+    <a:masterClrMapping/>
+  </p:clrMapOvr>
+</p:sld>
+</file>
+
+<file path=ppt/slides/slide31.xml><?xml version="1.0" encoding="utf-8"?>
+<p:sld xmlns:a="http://schemas.openxmlformats.org/drawingml/2006/main" xmlns:r="http://schemas.openxmlformats.org/officeDocument/2006/relationships" xmlns:p="http://schemas.openxmlformats.org/presentationml/2006/main">
+  <p:cSld>
+    <p:spTree>
+      <p:nvGrpSpPr>
+        <p:cNvPr id="1" name=""/>
+        <p:cNvGrpSpPr/>
+        <p:nvPr/>
+      </p:nvGrpSpPr>
+      <p:grpSpPr>
+        <a:xfrm>
+          <a:off x="0" y="0"/>
+          <a:ext cx="0" cy="0"/>
+          <a:chOff x="0" y="0"/>
+          <a:chExt cx="0" cy="0"/>
+        </a:xfrm>
+      </p:grpSpPr>
+      <p:pic>
+        <p:nvPicPr>
+          <p:cNvPr id="3" name="圖片 2">
+            <a:extLst>
+              <a:ext uri="{FF2B5EF4-FFF2-40B4-BE49-F238E27FC236}">
+                <a16:creationId xmlns:a16="http://schemas.microsoft.com/office/drawing/2014/main" id="{1202EBDE-7F64-43BD-86B7-6C228CCEC2D0}"/>
+              </a:ext>
+            </a:extLst>
+          </p:cNvPr>
+          <p:cNvPicPr>
+            <a:picLocks noChangeAspect="1"/>
+          </p:cNvPicPr>
+          <p:nvPr/>
+        </p:nvPicPr>
+        <p:blipFill>
+          <a:blip r:embed="rId2" cstate="print">
+            <a:extLst>
+              <a:ext uri="{28A0092B-C50C-407E-A947-70E740481C1C}">
+                <a14:useLocalDpi xmlns:a14="http://schemas.microsoft.com/office/drawing/2010/main" val="0"/>
+              </a:ext>
+            </a:extLst>
+          </a:blip>
+          <a:stretch>
+            <a:fillRect/>
+          </a:stretch>
+        </p:blipFill>
+        <p:spPr>
+          <a:xfrm>
+            <a:off x="6598915" y="0"/>
+            <a:ext cx="2545085" cy="3294895"/>
+          </a:xfrm>
+          <a:prstGeom prst="rect">
+            <a:avLst/>
+          </a:prstGeom>
+        </p:spPr>
+      </p:pic>
+      <p:pic>
+        <p:nvPicPr>
+          <p:cNvPr id="4" name="圖片 3">
+            <a:extLst>
+              <a:ext uri="{FF2B5EF4-FFF2-40B4-BE49-F238E27FC236}">
+                <a16:creationId xmlns:a16="http://schemas.microsoft.com/office/drawing/2014/main" id="{AEFF5069-0FA7-44E7-AEEE-225463C6B1AC}"/>
+              </a:ext>
+            </a:extLst>
+          </p:cNvPr>
+          <p:cNvPicPr>
+            <a:picLocks noChangeAspect="1"/>
+          </p:cNvPicPr>
+          <p:nvPr/>
+        </p:nvPicPr>
+        <p:blipFill>
+          <a:blip r:embed="rId3" cstate="print">
+            <a:extLst>
+              <a:ext uri="{28A0092B-C50C-407E-A947-70E740481C1C}">
+                <a14:useLocalDpi xmlns:a14="http://schemas.microsoft.com/office/drawing/2010/main" val="0"/>
+              </a:ext>
+            </a:extLst>
+          </a:blip>
+          <a:stretch>
+            <a:fillRect/>
+          </a:stretch>
+        </p:blipFill>
+        <p:spPr>
+          <a:xfrm>
+            <a:off x="0" y="4169659"/>
+            <a:ext cx="3934976" cy="2688341"/>
+          </a:xfrm>
+          <a:prstGeom prst="rect">
+            <a:avLst/>
+          </a:prstGeom>
+        </p:spPr>
+      </p:pic>
+    </p:spTree>
+    <p:extLst>
+      <p:ext uri="{BB962C8B-B14F-4D97-AF65-F5344CB8AC3E}">
+        <p14:creationId xmlns:p14="http://schemas.microsoft.com/office/powerpoint/2010/main" val="680710026"/>
+      </p:ext>
+    </p:extLst>
+  </p:cSld>
+  <p:clrMapOvr>
+    <a:masterClrMapping/>
+  </p:clrMapOvr>
+</p:sld>
+</file>
+
+<file path=ppt/slides/slide32.xml><?xml version="1.0" encoding="utf-8"?>
+<p:sld xmlns:a="http://schemas.openxmlformats.org/drawingml/2006/main" xmlns:r="http://schemas.openxmlformats.org/officeDocument/2006/relationships" xmlns:p="http://schemas.openxmlformats.org/presentationml/2006/main">
+  <p:cSld>
+    <p:spTree>
+      <p:nvGrpSpPr>
+        <p:cNvPr id="1" name=""/>
+        <p:cNvGrpSpPr/>
+        <p:nvPr/>
+      </p:nvGrpSpPr>
+      <p:grpSpPr>
+        <a:xfrm>
+          <a:off x="0" y="0"/>
+          <a:ext cx="0" cy="0"/>
+          <a:chOff x="0" y="0"/>
+          <a:chExt cx="0" cy="0"/>
+        </a:xfrm>
+      </p:grpSpPr>
+      <p:pic>
+        <p:nvPicPr>
+          <p:cNvPr id="3" name="圖片 2">
+            <a:extLst>
+              <a:ext uri="{FF2B5EF4-FFF2-40B4-BE49-F238E27FC236}">
+                <a16:creationId xmlns:a16="http://schemas.microsoft.com/office/drawing/2014/main" id="{1202EBDE-7F64-43BD-86B7-6C228CCEC2D0}"/>
+              </a:ext>
+            </a:extLst>
+          </p:cNvPr>
+          <p:cNvPicPr>
+            <a:picLocks noChangeAspect="1"/>
+          </p:cNvPicPr>
+          <p:nvPr/>
+        </p:nvPicPr>
+        <p:blipFill>
+          <a:blip r:embed="rId2" cstate="print">
+            <a:extLst>
+              <a:ext uri="{28A0092B-C50C-407E-A947-70E740481C1C}">
+                <a14:useLocalDpi xmlns:a14="http://schemas.microsoft.com/office/drawing/2010/main" val="0"/>
+              </a:ext>
+            </a:extLst>
+          </a:blip>
+          <a:stretch>
+            <a:fillRect/>
+          </a:stretch>
+        </p:blipFill>
+        <p:spPr>
+          <a:xfrm>
+            <a:off x="6598915" y="0"/>
+            <a:ext cx="2545085" cy="3294895"/>
+          </a:xfrm>
+          <a:prstGeom prst="rect">
+            <a:avLst/>
+          </a:prstGeom>
+        </p:spPr>
+      </p:pic>
+      <p:pic>
+        <p:nvPicPr>
+          <p:cNvPr id="4" name="圖片 3">
+            <a:extLst>
+              <a:ext uri="{FF2B5EF4-FFF2-40B4-BE49-F238E27FC236}">
+                <a16:creationId xmlns:a16="http://schemas.microsoft.com/office/drawing/2014/main" id="{AEFF5069-0FA7-44E7-AEEE-225463C6B1AC}"/>
+              </a:ext>
+            </a:extLst>
+          </p:cNvPr>
+          <p:cNvPicPr>
+            <a:picLocks noChangeAspect="1"/>
+          </p:cNvPicPr>
+          <p:nvPr/>
+        </p:nvPicPr>
+        <p:blipFill>
+          <a:blip r:embed="rId3" cstate="print">
+            <a:extLst>
+              <a:ext uri="{28A0092B-C50C-407E-A947-70E740481C1C}">
+                <a14:useLocalDpi xmlns:a14="http://schemas.microsoft.com/office/drawing/2010/main" val="0"/>
+              </a:ext>
+            </a:extLst>
+          </a:blip>
+          <a:stretch>
+            <a:fillRect/>
+          </a:stretch>
+        </p:blipFill>
+        <p:spPr>
+          <a:xfrm>
+            <a:off x="0" y="4169659"/>
+            <a:ext cx="3934976" cy="2688341"/>
+          </a:xfrm>
+          <a:prstGeom prst="rect">
+            <a:avLst/>
+          </a:prstGeom>
+        </p:spPr>
+      </p:pic>
+    </p:spTree>
+    <p:extLst>
+      <p:ext uri="{BB962C8B-B14F-4D97-AF65-F5344CB8AC3E}">
+        <p14:creationId xmlns:p14="http://schemas.microsoft.com/office/powerpoint/2010/main" val="3810482808"/>
+      </p:ext>
+    </p:extLst>
+  </p:cSld>
+  <p:clrMapOvr>
+    <a:masterClrMapping/>
+  </p:clrMapOvr>
+</p:sld>
+</file>
+
+<file path=ppt/slides/slide33.xml><?xml version="1.0" encoding="utf-8"?>
+<p:sld xmlns:a="http://schemas.openxmlformats.org/drawingml/2006/main" xmlns:r="http://schemas.openxmlformats.org/officeDocument/2006/relationships" xmlns:p="http://schemas.openxmlformats.org/presentationml/2006/main">
+  <p:cSld>
+    <p:spTree>
+      <p:nvGrpSpPr>
+        <p:cNvPr id="1" name=""/>
+        <p:cNvGrpSpPr/>
+        <p:nvPr/>
+      </p:nvGrpSpPr>
+      <p:grpSpPr>
+        <a:xfrm>
+          <a:off x="0" y="0"/>
+          <a:ext cx="0" cy="0"/>
+          <a:chOff x="0" y="0"/>
+          <a:chExt cx="0" cy="0"/>
+        </a:xfrm>
+      </p:grpSpPr>
+      <p:pic>
+        <p:nvPicPr>
+          <p:cNvPr id="3" name="圖片 2">
+            <a:extLst>
+              <a:ext uri="{FF2B5EF4-FFF2-40B4-BE49-F238E27FC236}">
+                <a16:creationId xmlns:a16="http://schemas.microsoft.com/office/drawing/2014/main" id="{1202EBDE-7F64-43BD-86B7-6C228CCEC2D0}"/>
+              </a:ext>
+            </a:extLst>
+          </p:cNvPr>
+          <p:cNvPicPr>
+            <a:picLocks noChangeAspect="1"/>
+          </p:cNvPicPr>
+          <p:nvPr/>
+        </p:nvPicPr>
+        <p:blipFill>
+          <a:blip r:embed="rId2" cstate="print">
+            <a:extLst>
+              <a:ext uri="{28A0092B-C50C-407E-A947-70E740481C1C}">
+                <a14:useLocalDpi xmlns:a14="http://schemas.microsoft.com/office/drawing/2010/main" val="0"/>
+              </a:ext>
+            </a:extLst>
+          </a:blip>
+          <a:stretch>
+            <a:fillRect/>
+          </a:stretch>
+        </p:blipFill>
+        <p:spPr>
+          <a:xfrm>
+            <a:off x="6598915" y="0"/>
+            <a:ext cx="2545085" cy="3294895"/>
+          </a:xfrm>
+          <a:prstGeom prst="rect">
+            <a:avLst/>
+          </a:prstGeom>
+        </p:spPr>
+      </p:pic>
+      <p:pic>
+        <p:nvPicPr>
+          <p:cNvPr id="4" name="圖片 3">
+            <a:extLst>
+              <a:ext uri="{FF2B5EF4-FFF2-40B4-BE49-F238E27FC236}">
+                <a16:creationId xmlns:a16="http://schemas.microsoft.com/office/drawing/2014/main" id="{AEFF5069-0FA7-44E7-AEEE-225463C6B1AC}"/>
+              </a:ext>
+            </a:extLst>
+          </p:cNvPr>
+          <p:cNvPicPr>
+            <a:picLocks noChangeAspect="1"/>
+          </p:cNvPicPr>
+          <p:nvPr/>
+        </p:nvPicPr>
+        <p:blipFill>
+          <a:blip r:embed="rId3" cstate="print">
+            <a:extLst>
+              <a:ext uri="{28A0092B-C50C-407E-A947-70E740481C1C}">
+                <a14:useLocalDpi xmlns:a14="http://schemas.microsoft.com/office/drawing/2010/main" val="0"/>
+              </a:ext>
+            </a:extLst>
+          </a:blip>
+          <a:stretch>
+            <a:fillRect/>
+          </a:stretch>
+        </p:blipFill>
+        <p:spPr>
+          <a:xfrm>
+            <a:off x="0" y="4169659"/>
+            <a:ext cx="3934976" cy="2688341"/>
+          </a:xfrm>
+          <a:prstGeom prst="rect">
+            <a:avLst/>
+          </a:prstGeom>
+        </p:spPr>
+      </p:pic>
+    </p:spTree>
+    <p:extLst>
+      <p:ext uri="{BB962C8B-B14F-4D97-AF65-F5344CB8AC3E}">
+        <p14:creationId xmlns:p14="http://schemas.microsoft.com/office/powerpoint/2010/main" val="4116190145"/>
+      </p:ext>
+    </p:extLst>
+  </p:cSld>
+  <p:clrMapOvr>
+    <a:masterClrMapping/>
+  </p:clrMapOvr>
+</p:sld>
+</file>
+
+<file path=ppt/slides/slide34.xml><?xml version="1.0" encoding="utf-8"?>
+<p:sld xmlns:a="http://schemas.openxmlformats.org/drawingml/2006/main" xmlns:r="http://schemas.openxmlformats.org/officeDocument/2006/relationships" xmlns:p="http://schemas.openxmlformats.org/presentationml/2006/main">
+  <p:cSld>
+    <p:spTree>
+      <p:nvGrpSpPr>
+        <p:cNvPr id="1" name=""/>
+        <p:cNvGrpSpPr/>
+        <p:nvPr/>
+      </p:nvGrpSpPr>
+      <p:grpSpPr>
+        <a:xfrm>
+          <a:off x="0" y="0"/>
+          <a:ext cx="0" cy="0"/>
+          <a:chOff x="0" y="0"/>
+          <a:chExt cx="0" cy="0"/>
+        </a:xfrm>
+      </p:grpSpPr>
+      <p:pic>
+        <p:nvPicPr>
+          <p:cNvPr id="3" name="圖片 2">
+            <a:extLst>
+              <a:ext uri="{FF2B5EF4-FFF2-40B4-BE49-F238E27FC236}">
+                <a16:creationId xmlns:a16="http://schemas.microsoft.com/office/drawing/2014/main" id="{1202EBDE-7F64-43BD-86B7-6C228CCEC2D0}"/>
+              </a:ext>
+            </a:extLst>
+          </p:cNvPr>
+          <p:cNvPicPr>
+            <a:picLocks noChangeAspect="1"/>
+          </p:cNvPicPr>
+          <p:nvPr/>
+        </p:nvPicPr>
+        <p:blipFill>
+          <a:blip r:embed="rId2" cstate="print">
+            <a:extLst>
+              <a:ext uri="{28A0092B-C50C-407E-A947-70E740481C1C}">
+                <a14:useLocalDpi xmlns:a14="http://schemas.microsoft.com/office/drawing/2010/main" val="0"/>
+              </a:ext>
+            </a:extLst>
+          </a:blip>
+          <a:stretch>
+            <a:fillRect/>
+          </a:stretch>
+        </p:blipFill>
+        <p:spPr>
+          <a:xfrm>
+            <a:off x="6598915" y="0"/>
+            <a:ext cx="2545085" cy="3294895"/>
+          </a:xfrm>
+          <a:prstGeom prst="rect">
+            <a:avLst/>
+          </a:prstGeom>
+        </p:spPr>
+      </p:pic>
+      <p:pic>
+        <p:nvPicPr>
+          <p:cNvPr id="4" name="圖片 3">
+            <a:extLst>
+              <a:ext uri="{FF2B5EF4-FFF2-40B4-BE49-F238E27FC236}">
+                <a16:creationId xmlns:a16="http://schemas.microsoft.com/office/drawing/2014/main" id="{AEFF5069-0FA7-44E7-AEEE-225463C6B1AC}"/>
+              </a:ext>
+            </a:extLst>
+          </p:cNvPr>
+          <p:cNvPicPr>
+            <a:picLocks noChangeAspect="1"/>
+          </p:cNvPicPr>
+          <p:nvPr/>
+        </p:nvPicPr>
+        <p:blipFill>
+          <a:blip r:embed="rId3" cstate="print">
+            <a:extLst>
+              <a:ext uri="{28A0092B-C50C-407E-A947-70E740481C1C}">
+                <a14:useLocalDpi xmlns:a14="http://schemas.microsoft.com/office/drawing/2010/main" val="0"/>
+              </a:ext>
+            </a:extLst>
+          </a:blip>
+          <a:stretch>
+            <a:fillRect/>
+          </a:stretch>
+        </p:blipFill>
+        <p:spPr>
+          <a:xfrm>
+            <a:off x="0" y="4169659"/>
+            <a:ext cx="3934976" cy="2688341"/>
+          </a:xfrm>
+          <a:prstGeom prst="rect">
+            <a:avLst/>
+          </a:prstGeom>
+        </p:spPr>
+      </p:pic>
+    </p:spTree>
+    <p:extLst>
+      <p:ext uri="{BB962C8B-B14F-4D97-AF65-F5344CB8AC3E}">
+        <p14:creationId xmlns:p14="http://schemas.microsoft.com/office/powerpoint/2010/main" val="753813999"/>
+      </p:ext>
+    </p:extLst>
+  </p:cSld>
+  <p:clrMapOvr>
+    <a:masterClrMapping/>
+  </p:clrMapOvr>
+</p:sld>
+</file>
+
+<file path=ppt/slides/slide35.xml><?xml version="1.0" encoding="utf-8"?>
+<p:sld xmlns:a="http://schemas.openxmlformats.org/drawingml/2006/main" xmlns:r="http://schemas.openxmlformats.org/officeDocument/2006/relationships" xmlns:p="http://schemas.openxmlformats.org/presentationml/2006/main">
+  <p:cSld>
+    <p:spTree>
+      <p:nvGrpSpPr>
+        <p:cNvPr id="1" name=""/>
+        <p:cNvGrpSpPr/>
+        <p:nvPr/>
+      </p:nvGrpSpPr>
+      <p:grpSpPr>
+        <a:xfrm>
+          <a:off x="0" y="0"/>
+          <a:ext cx="0" cy="0"/>
+          <a:chOff x="0" y="0"/>
+          <a:chExt cx="0" cy="0"/>
+        </a:xfrm>
+      </p:grpSpPr>
+      <p:pic>
+        <p:nvPicPr>
+          <p:cNvPr id="3" name="圖片 2">
+            <a:extLst>
+              <a:ext uri="{FF2B5EF4-FFF2-40B4-BE49-F238E27FC236}">
+                <a16:creationId xmlns:a16="http://schemas.microsoft.com/office/drawing/2014/main" id="{1202EBDE-7F64-43BD-86B7-6C228CCEC2D0}"/>
+              </a:ext>
+            </a:extLst>
+          </p:cNvPr>
+          <p:cNvPicPr>
+            <a:picLocks noChangeAspect="1"/>
+          </p:cNvPicPr>
+          <p:nvPr/>
+        </p:nvPicPr>
+        <p:blipFill>
+          <a:blip r:embed="rId2" cstate="print">
+            <a:extLst>
+              <a:ext uri="{28A0092B-C50C-407E-A947-70E740481C1C}">
+                <a14:useLocalDpi xmlns:a14="http://schemas.microsoft.com/office/drawing/2010/main" val="0"/>
+              </a:ext>
+            </a:extLst>
+          </a:blip>
+          <a:stretch>
+            <a:fillRect/>
+          </a:stretch>
+        </p:blipFill>
+        <p:spPr>
+          <a:xfrm>
+            <a:off x="6598915" y="0"/>
+            <a:ext cx="2545085" cy="3294895"/>
+          </a:xfrm>
+          <a:prstGeom prst="rect">
+            <a:avLst/>
+          </a:prstGeom>
+        </p:spPr>
+      </p:pic>
+      <p:pic>
+        <p:nvPicPr>
+          <p:cNvPr id="4" name="圖片 3">
+            <a:extLst>
+              <a:ext uri="{FF2B5EF4-FFF2-40B4-BE49-F238E27FC236}">
+                <a16:creationId xmlns:a16="http://schemas.microsoft.com/office/drawing/2014/main" id="{AEFF5069-0FA7-44E7-AEEE-225463C6B1AC}"/>
+              </a:ext>
+            </a:extLst>
+          </p:cNvPr>
+          <p:cNvPicPr>
+            <a:picLocks noChangeAspect="1"/>
+          </p:cNvPicPr>
+          <p:nvPr/>
+        </p:nvPicPr>
+        <p:blipFill>
+          <a:blip r:embed="rId3" cstate="print">
+            <a:extLst>
+              <a:ext uri="{28A0092B-C50C-407E-A947-70E740481C1C}">
+                <a14:useLocalDpi xmlns:a14="http://schemas.microsoft.com/office/drawing/2010/main" val="0"/>
+              </a:ext>
+            </a:extLst>
+          </a:blip>
+          <a:stretch>
+            <a:fillRect/>
+          </a:stretch>
+        </p:blipFill>
+        <p:spPr>
+          <a:xfrm>
+            <a:off x="0" y="4169659"/>
+            <a:ext cx="3934976" cy="2688341"/>
+          </a:xfrm>
+          <a:prstGeom prst="rect">
+            <a:avLst/>
+          </a:prstGeom>
+        </p:spPr>
+      </p:pic>
+    </p:spTree>
+    <p:extLst>
+      <p:ext uri="{BB962C8B-B14F-4D97-AF65-F5344CB8AC3E}">
+        <p14:creationId xmlns:p14="http://schemas.microsoft.com/office/powerpoint/2010/main" val="1430568939"/>
+      </p:ext>
+    </p:extLst>
+  </p:cSld>
+  <p:clrMapOvr>
+    <a:masterClrMapping/>
+  </p:clrMapOvr>
+</p:sld>
+</file>
+
+<file path=ppt/slides/slide36.xml><?xml version="1.0" encoding="utf-8"?>
+<p:sld xmlns:a="http://schemas.openxmlformats.org/drawingml/2006/main" xmlns:r="http://schemas.openxmlformats.org/officeDocument/2006/relationships" xmlns:p="http://schemas.openxmlformats.org/presentationml/2006/main">
+  <p:cSld>
+    <p:spTree>
+      <p:nvGrpSpPr>
+        <p:cNvPr id="1" name=""/>
+        <p:cNvGrpSpPr/>
+        <p:nvPr/>
+      </p:nvGrpSpPr>
+      <p:grpSpPr>
+        <a:xfrm>
+          <a:off x="0" y="0"/>
+          <a:ext cx="0" cy="0"/>
+          <a:chOff x="0" y="0"/>
+          <a:chExt cx="0" cy="0"/>
+        </a:xfrm>
+      </p:grpSpPr>
+      <p:pic>
+        <p:nvPicPr>
+          <p:cNvPr id="3" name="圖片 2">
+            <a:extLst>
+              <a:ext uri="{FF2B5EF4-FFF2-40B4-BE49-F238E27FC236}">
+                <a16:creationId xmlns:a16="http://schemas.microsoft.com/office/drawing/2014/main" id="{1202EBDE-7F64-43BD-86B7-6C228CCEC2D0}"/>
+              </a:ext>
+            </a:extLst>
+          </p:cNvPr>
+          <p:cNvPicPr>
+            <a:picLocks noChangeAspect="1"/>
+          </p:cNvPicPr>
+          <p:nvPr/>
+        </p:nvPicPr>
+        <p:blipFill>
+          <a:blip r:embed="rId2" cstate="print">
+            <a:extLst>
+              <a:ext uri="{28A0092B-C50C-407E-A947-70E740481C1C}">
+                <a14:useLocalDpi xmlns:a14="http://schemas.microsoft.com/office/drawing/2010/main" val="0"/>
+              </a:ext>
+            </a:extLst>
+          </a:blip>
+          <a:stretch>
+            <a:fillRect/>
+          </a:stretch>
+        </p:blipFill>
+        <p:spPr>
+          <a:xfrm>
+            <a:off x="6598915" y="0"/>
+            <a:ext cx="2545085" cy="3294895"/>
+          </a:xfrm>
+          <a:prstGeom prst="rect">
+            <a:avLst/>
+          </a:prstGeom>
+        </p:spPr>
+      </p:pic>
+      <p:pic>
+        <p:nvPicPr>
+          <p:cNvPr id="4" name="圖片 3">
+            <a:extLst>
+              <a:ext uri="{FF2B5EF4-FFF2-40B4-BE49-F238E27FC236}">
+                <a16:creationId xmlns:a16="http://schemas.microsoft.com/office/drawing/2014/main" id="{AEFF5069-0FA7-44E7-AEEE-225463C6B1AC}"/>
+              </a:ext>
+            </a:extLst>
+          </p:cNvPr>
+          <p:cNvPicPr>
+            <a:picLocks noChangeAspect="1"/>
+          </p:cNvPicPr>
+          <p:nvPr/>
+        </p:nvPicPr>
+        <p:blipFill>
+          <a:blip r:embed="rId3" cstate="print">
+            <a:extLst>
+              <a:ext uri="{28A0092B-C50C-407E-A947-70E740481C1C}">
+                <a14:useLocalDpi xmlns:a14="http://schemas.microsoft.com/office/drawing/2010/main" val="0"/>
+              </a:ext>
+            </a:extLst>
+          </a:blip>
+          <a:stretch>
+            <a:fillRect/>
+          </a:stretch>
+        </p:blipFill>
+        <p:spPr>
+          <a:xfrm>
+            <a:off x="0" y="4169659"/>
+            <a:ext cx="3934976" cy="2688341"/>
+          </a:xfrm>
+          <a:prstGeom prst="rect">
+            <a:avLst/>
+          </a:prstGeom>
+        </p:spPr>
+      </p:pic>
+    </p:spTree>
+    <p:extLst>
+      <p:ext uri="{BB962C8B-B14F-4D97-AF65-F5344CB8AC3E}">
+        <p14:creationId xmlns:p14="http://schemas.microsoft.com/office/powerpoint/2010/main" val="1615937117"/>
+      </p:ext>
+    </p:extLst>
+  </p:cSld>
+  <p:clrMapOvr>
+    <a:masterClrMapping/>
+  </p:clrMapOvr>
+</p:sld>
+</file>
+
+<file path=ppt/slides/slide37.xml><?xml version="1.0" encoding="utf-8"?>
+<p:sld xmlns:a="http://schemas.openxmlformats.org/drawingml/2006/main" xmlns:r="http://schemas.openxmlformats.org/officeDocument/2006/relationships" xmlns:p="http://schemas.openxmlformats.org/presentationml/2006/main">
+  <p:cSld>
+    <p:spTree>
+      <p:nvGrpSpPr>
+        <p:cNvPr id="1" name=""/>
+        <p:cNvGrpSpPr/>
+        <p:nvPr/>
+      </p:nvGrpSpPr>
+      <p:grpSpPr>
+        <a:xfrm>
+          <a:off x="0" y="0"/>
+          <a:ext cx="0" cy="0"/>
+          <a:chOff x="0" y="0"/>
+          <a:chExt cx="0" cy="0"/>
+        </a:xfrm>
+      </p:grpSpPr>
+      <p:pic>
+        <p:nvPicPr>
+          <p:cNvPr id="3" name="圖片 2">
+            <a:extLst>
+              <a:ext uri="{FF2B5EF4-FFF2-40B4-BE49-F238E27FC236}">
+                <a16:creationId xmlns:a16="http://schemas.microsoft.com/office/drawing/2014/main" id="{1202EBDE-7F64-43BD-86B7-6C228CCEC2D0}"/>
+              </a:ext>
+            </a:extLst>
+          </p:cNvPr>
+          <p:cNvPicPr>
+            <a:picLocks noChangeAspect="1"/>
+          </p:cNvPicPr>
+          <p:nvPr/>
+        </p:nvPicPr>
+        <p:blipFill>
+          <a:blip r:embed="rId2" cstate="print">
+            <a:extLst>
+              <a:ext uri="{28A0092B-C50C-407E-A947-70E740481C1C}">
+                <a14:useLocalDpi xmlns:a14="http://schemas.microsoft.com/office/drawing/2010/main" val="0"/>
+              </a:ext>
+            </a:extLst>
+          </a:blip>
+          <a:stretch>
+            <a:fillRect/>
+          </a:stretch>
+        </p:blipFill>
+        <p:spPr>
+          <a:xfrm>
+            <a:off x="6598915" y="0"/>
+            <a:ext cx="2545085" cy="3294895"/>
+          </a:xfrm>
+          <a:prstGeom prst="rect">
+            <a:avLst/>
+          </a:prstGeom>
+        </p:spPr>
+      </p:pic>
+      <p:pic>
+        <p:nvPicPr>
+          <p:cNvPr id="4" name="圖片 3">
+            <a:extLst>
+              <a:ext uri="{FF2B5EF4-FFF2-40B4-BE49-F238E27FC236}">
+                <a16:creationId xmlns:a16="http://schemas.microsoft.com/office/drawing/2014/main" id="{AEFF5069-0FA7-44E7-AEEE-225463C6B1AC}"/>
+              </a:ext>
+            </a:extLst>
+          </p:cNvPr>
+          <p:cNvPicPr>
+            <a:picLocks noChangeAspect="1"/>
+          </p:cNvPicPr>
+          <p:nvPr/>
+        </p:nvPicPr>
+        <p:blipFill>
+          <a:blip r:embed="rId3" cstate="print">
+            <a:extLst>
+              <a:ext uri="{28A0092B-C50C-407E-A947-70E740481C1C}">
+                <a14:useLocalDpi xmlns:a14="http://schemas.microsoft.com/office/drawing/2010/main" val="0"/>
+              </a:ext>
+            </a:extLst>
+          </a:blip>
+          <a:stretch>
+            <a:fillRect/>
+          </a:stretch>
+        </p:blipFill>
+        <p:spPr>
+          <a:xfrm>
+            <a:off x="0" y="4169659"/>
+            <a:ext cx="3934976" cy="2688341"/>
+          </a:xfrm>
+          <a:prstGeom prst="rect">
+            <a:avLst/>
+          </a:prstGeom>
+        </p:spPr>
+      </p:pic>
+    </p:spTree>
+    <p:extLst>
+      <p:ext uri="{BB962C8B-B14F-4D97-AF65-F5344CB8AC3E}">
+        <p14:creationId xmlns:p14="http://schemas.microsoft.com/office/powerpoint/2010/main" val="1509265716"/>
+      </p:ext>
+    </p:extLst>
+  </p:cSld>
+  <p:clrMapOvr>
+    <a:masterClrMapping/>
+  </p:clrMapOvr>
+</p:sld>
+</file>
+
+<file path=ppt/slides/slide38.xml><?xml version="1.0" encoding="utf-8"?>
+<p:sld xmlns:a="http://schemas.openxmlformats.org/drawingml/2006/main" xmlns:r="http://schemas.openxmlformats.org/officeDocument/2006/relationships" xmlns:p="http://schemas.openxmlformats.org/presentationml/2006/main">
+  <p:cSld>
+    <p:spTree>
+      <p:nvGrpSpPr>
+        <p:cNvPr id="1" name=""/>
+        <p:cNvGrpSpPr/>
+        <p:nvPr/>
+      </p:nvGrpSpPr>
+      <p:grpSpPr>
+        <a:xfrm>
+          <a:off x="0" y="0"/>
+          <a:ext cx="0" cy="0"/>
+          <a:chOff x="0" y="0"/>
+          <a:chExt cx="0" cy="0"/>
+        </a:xfrm>
+      </p:grpSpPr>
+      <p:pic>
+        <p:nvPicPr>
+          <p:cNvPr id="3" name="圖片 2">
+            <a:extLst>
+              <a:ext uri="{FF2B5EF4-FFF2-40B4-BE49-F238E27FC236}">
+                <a16:creationId xmlns:a16="http://schemas.microsoft.com/office/drawing/2014/main" id="{1202EBDE-7F64-43BD-86B7-6C228CCEC2D0}"/>
+              </a:ext>
+            </a:extLst>
+          </p:cNvPr>
+          <p:cNvPicPr>
+            <a:picLocks noChangeAspect="1"/>
+          </p:cNvPicPr>
+          <p:nvPr/>
+        </p:nvPicPr>
+        <p:blipFill>
+          <a:blip r:embed="rId2" cstate="print">
+            <a:extLst>
+              <a:ext uri="{28A0092B-C50C-407E-A947-70E740481C1C}">
+                <a14:useLocalDpi xmlns:a14="http://schemas.microsoft.com/office/drawing/2010/main" val="0"/>
+              </a:ext>
+            </a:extLst>
+          </a:blip>
+          <a:stretch>
+            <a:fillRect/>
+          </a:stretch>
+        </p:blipFill>
+        <p:spPr>
+          <a:xfrm>
+            <a:off x="6598915" y="0"/>
+            <a:ext cx="2545085" cy="3294895"/>
+          </a:xfrm>
+          <a:prstGeom prst="rect">
+            <a:avLst/>
+          </a:prstGeom>
+        </p:spPr>
+      </p:pic>
+      <p:pic>
+        <p:nvPicPr>
+          <p:cNvPr id="4" name="圖片 3">
+            <a:extLst>
+              <a:ext uri="{FF2B5EF4-FFF2-40B4-BE49-F238E27FC236}">
+                <a16:creationId xmlns:a16="http://schemas.microsoft.com/office/drawing/2014/main" id="{AEFF5069-0FA7-44E7-AEEE-225463C6B1AC}"/>
+              </a:ext>
+            </a:extLst>
+          </p:cNvPr>
+          <p:cNvPicPr>
+            <a:picLocks noChangeAspect="1"/>
+          </p:cNvPicPr>
+          <p:nvPr/>
+        </p:nvPicPr>
+        <p:blipFill>
+          <a:blip r:embed="rId3" cstate="print">
+            <a:extLst>
+              <a:ext uri="{28A0092B-C50C-407E-A947-70E740481C1C}">
+                <a14:useLocalDpi xmlns:a14="http://schemas.microsoft.com/office/drawing/2010/main" val="0"/>
+              </a:ext>
+            </a:extLst>
+          </a:blip>
+          <a:stretch>
+            <a:fillRect/>
+          </a:stretch>
+        </p:blipFill>
+        <p:spPr>
+          <a:xfrm>
+            <a:off x="0" y="4169659"/>
+            <a:ext cx="3934976" cy="2688341"/>
+          </a:xfrm>
+          <a:prstGeom prst="rect">
+            <a:avLst/>
+          </a:prstGeom>
+        </p:spPr>
+      </p:pic>
+    </p:spTree>
+    <p:extLst>
+      <p:ext uri="{BB962C8B-B14F-4D97-AF65-F5344CB8AC3E}">
+        <p14:creationId xmlns:p14="http://schemas.microsoft.com/office/powerpoint/2010/main" val="2624269977"/>
+      </p:ext>
+    </p:extLst>
+  </p:cSld>
+  <p:clrMapOvr>
+    <a:masterClrMapping/>
+  </p:clrMapOvr>
+</p:sld>
+</file>
+
+<file path=ppt/slides/slide39.xml><?xml version="1.0" encoding="utf-8"?>
+<p:sld xmlns:a="http://schemas.openxmlformats.org/drawingml/2006/main" xmlns:r="http://schemas.openxmlformats.org/officeDocument/2006/relationships" xmlns:p="http://schemas.openxmlformats.org/presentationml/2006/main">
+  <p:cSld>
+    <p:spTree>
+      <p:nvGrpSpPr>
+        <p:cNvPr id="1" name=""/>
+        <p:cNvGrpSpPr/>
+        <p:nvPr/>
+      </p:nvGrpSpPr>
+      <p:grpSpPr>
+        <a:xfrm>
+          <a:off x="0" y="0"/>
+          <a:ext cx="0" cy="0"/>
+          <a:chOff x="0" y="0"/>
+          <a:chExt cx="0" cy="0"/>
+        </a:xfrm>
+      </p:grpSpPr>
+      <p:pic>
+        <p:nvPicPr>
+          <p:cNvPr id="3" name="圖片 2">
+            <a:extLst>
+              <a:ext uri="{FF2B5EF4-FFF2-40B4-BE49-F238E27FC236}">
+                <a16:creationId xmlns:a16="http://schemas.microsoft.com/office/drawing/2014/main" id="{1202EBDE-7F64-43BD-86B7-6C228CCEC2D0}"/>
+              </a:ext>
+            </a:extLst>
+          </p:cNvPr>
+          <p:cNvPicPr>
+            <a:picLocks noChangeAspect="1"/>
+          </p:cNvPicPr>
+          <p:nvPr/>
+        </p:nvPicPr>
+        <p:blipFill>
+          <a:blip r:embed="rId2" cstate="print">
+            <a:extLst>
+              <a:ext uri="{28A0092B-C50C-407E-A947-70E740481C1C}">
+                <a14:useLocalDpi xmlns:a14="http://schemas.microsoft.com/office/drawing/2010/main" val="0"/>
+              </a:ext>
+            </a:extLst>
+          </a:blip>
+          <a:stretch>
+            <a:fillRect/>
+          </a:stretch>
+        </p:blipFill>
+        <p:spPr>
+          <a:xfrm>
+            <a:off x="6598915" y="0"/>
+            <a:ext cx="2545085" cy="3294895"/>
+          </a:xfrm>
+          <a:prstGeom prst="rect">
+            <a:avLst/>
+          </a:prstGeom>
+        </p:spPr>
+      </p:pic>
+      <p:pic>
+        <p:nvPicPr>
+          <p:cNvPr id="4" name="圖片 3">
+            <a:extLst>
+              <a:ext uri="{FF2B5EF4-FFF2-40B4-BE49-F238E27FC236}">
+                <a16:creationId xmlns:a16="http://schemas.microsoft.com/office/drawing/2014/main" id="{AEFF5069-0FA7-44E7-AEEE-225463C6B1AC}"/>
+              </a:ext>
+            </a:extLst>
+          </p:cNvPr>
+          <p:cNvPicPr>
+            <a:picLocks noChangeAspect="1"/>
+          </p:cNvPicPr>
+          <p:nvPr/>
+        </p:nvPicPr>
+        <p:blipFill>
+          <a:blip r:embed="rId3" cstate="print">
+            <a:extLst>
+              <a:ext uri="{28A0092B-C50C-407E-A947-70E740481C1C}">
+                <a14:useLocalDpi xmlns:a14="http://schemas.microsoft.com/office/drawing/2010/main" val="0"/>
+              </a:ext>
+            </a:extLst>
+          </a:blip>
+          <a:stretch>
+            <a:fillRect/>
+          </a:stretch>
+        </p:blipFill>
+        <p:spPr>
+          <a:xfrm>
+            <a:off x="0" y="4169659"/>
+            <a:ext cx="3934976" cy="2688341"/>
+          </a:xfrm>
+          <a:prstGeom prst="rect">
+            <a:avLst/>
+          </a:prstGeom>
+        </p:spPr>
+      </p:pic>
+    </p:spTree>
+    <p:extLst>
+      <p:ext uri="{BB962C8B-B14F-4D97-AF65-F5344CB8AC3E}">
+        <p14:creationId xmlns:p14="http://schemas.microsoft.com/office/powerpoint/2010/main" val="3887989850"/>
+      </p:ext>
+    </p:extLst>
+  </p:cSld>
+  <p:clrMapOvr>
+    <a:masterClrMapping/>
+  </p:clrMapOvr>
+</p:sld>
+</file>
+
 <file path=ppt/slides/slide4.xml><?xml version="1.0" encoding="utf-8"?>
 <p:sld xmlns:a="http://schemas.openxmlformats.org/drawingml/2006/main" xmlns:r="http://schemas.openxmlformats.org/officeDocument/2006/relationships" xmlns:p="http://schemas.openxmlformats.org/presentationml/2006/main">
   <p:cSld>
@@ -8034,6 +10960,312 @@
     <p:extLst>
       <p:ext uri="{BB962C8B-B14F-4D97-AF65-F5344CB8AC3E}">
         <p14:creationId xmlns:p14="http://schemas.microsoft.com/office/powerpoint/2010/main" val="4236992931"/>
+      </p:ext>
+    </p:extLst>
+  </p:cSld>
+  <p:clrMapOvr>
+    <a:masterClrMapping/>
+  </p:clrMapOvr>
+</p:sld>
+</file>
+
+<file path=ppt/slides/slide40.xml><?xml version="1.0" encoding="utf-8"?>
+<p:sld xmlns:a="http://schemas.openxmlformats.org/drawingml/2006/main" xmlns:r="http://schemas.openxmlformats.org/officeDocument/2006/relationships" xmlns:p="http://schemas.openxmlformats.org/presentationml/2006/main">
+  <p:cSld>
+    <p:spTree>
+      <p:nvGrpSpPr>
+        <p:cNvPr id="1" name=""/>
+        <p:cNvGrpSpPr/>
+        <p:nvPr/>
+      </p:nvGrpSpPr>
+      <p:grpSpPr>
+        <a:xfrm>
+          <a:off x="0" y="0"/>
+          <a:ext cx="0" cy="0"/>
+          <a:chOff x="0" y="0"/>
+          <a:chExt cx="0" cy="0"/>
+        </a:xfrm>
+      </p:grpSpPr>
+      <p:pic>
+        <p:nvPicPr>
+          <p:cNvPr id="3" name="圖片 2">
+            <a:extLst>
+              <a:ext uri="{FF2B5EF4-FFF2-40B4-BE49-F238E27FC236}">
+                <a16:creationId xmlns:a16="http://schemas.microsoft.com/office/drawing/2014/main" id="{1202EBDE-7F64-43BD-86B7-6C228CCEC2D0}"/>
+              </a:ext>
+            </a:extLst>
+          </p:cNvPr>
+          <p:cNvPicPr>
+            <a:picLocks noChangeAspect="1"/>
+          </p:cNvPicPr>
+          <p:nvPr/>
+        </p:nvPicPr>
+        <p:blipFill>
+          <a:blip r:embed="rId2" cstate="print">
+            <a:extLst>
+              <a:ext uri="{28A0092B-C50C-407E-A947-70E740481C1C}">
+                <a14:useLocalDpi xmlns:a14="http://schemas.microsoft.com/office/drawing/2010/main" val="0"/>
+              </a:ext>
+            </a:extLst>
+          </a:blip>
+          <a:stretch>
+            <a:fillRect/>
+          </a:stretch>
+        </p:blipFill>
+        <p:spPr>
+          <a:xfrm>
+            <a:off x="6598915" y="0"/>
+            <a:ext cx="2545085" cy="3294895"/>
+          </a:xfrm>
+          <a:prstGeom prst="rect">
+            <a:avLst/>
+          </a:prstGeom>
+        </p:spPr>
+      </p:pic>
+      <p:pic>
+        <p:nvPicPr>
+          <p:cNvPr id="4" name="圖片 3">
+            <a:extLst>
+              <a:ext uri="{FF2B5EF4-FFF2-40B4-BE49-F238E27FC236}">
+                <a16:creationId xmlns:a16="http://schemas.microsoft.com/office/drawing/2014/main" id="{AEFF5069-0FA7-44E7-AEEE-225463C6B1AC}"/>
+              </a:ext>
+            </a:extLst>
+          </p:cNvPr>
+          <p:cNvPicPr>
+            <a:picLocks noChangeAspect="1"/>
+          </p:cNvPicPr>
+          <p:nvPr/>
+        </p:nvPicPr>
+        <p:blipFill>
+          <a:blip r:embed="rId3" cstate="print">
+            <a:extLst>
+              <a:ext uri="{28A0092B-C50C-407E-A947-70E740481C1C}">
+                <a14:useLocalDpi xmlns:a14="http://schemas.microsoft.com/office/drawing/2010/main" val="0"/>
+              </a:ext>
+            </a:extLst>
+          </a:blip>
+          <a:stretch>
+            <a:fillRect/>
+          </a:stretch>
+        </p:blipFill>
+        <p:spPr>
+          <a:xfrm>
+            <a:off x="0" y="4169659"/>
+            <a:ext cx="3934976" cy="2688341"/>
+          </a:xfrm>
+          <a:prstGeom prst="rect">
+            <a:avLst/>
+          </a:prstGeom>
+        </p:spPr>
+      </p:pic>
+    </p:spTree>
+    <p:extLst>
+      <p:ext uri="{BB962C8B-B14F-4D97-AF65-F5344CB8AC3E}">
+        <p14:creationId xmlns:p14="http://schemas.microsoft.com/office/powerpoint/2010/main" val="124486230"/>
+      </p:ext>
+    </p:extLst>
+  </p:cSld>
+  <p:clrMapOvr>
+    <a:masterClrMapping/>
+  </p:clrMapOvr>
+</p:sld>
+</file>
+
+<file path=ppt/slides/slide41.xml><?xml version="1.0" encoding="utf-8"?>
+<p:sld xmlns:a="http://schemas.openxmlformats.org/drawingml/2006/main" xmlns:r="http://schemas.openxmlformats.org/officeDocument/2006/relationships" xmlns:p="http://schemas.openxmlformats.org/presentationml/2006/main">
+  <p:cSld>
+    <p:spTree>
+      <p:nvGrpSpPr>
+        <p:cNvPr id="1" name=""/>
+        <p:cNvGrpSpPr/>
+        <p:nvPr/>
+      </p:nvGrpSpPr>
+      <p:grpSpPr>
+        <a:xfrm>
+          <a:off x="0" y="0"/>
+          <a:ext cx="0" cy="0"/>
+          <a:chOff x="0" y="0"/>
+          <a:chExt cx="0" cy="0"/>
+        </a:xfrm>
+      </p:grpSpPr>
+      <p:pic>
+        <p:nvPicPr>
+          <p:cNvPr id="3" name="圖片 2">
+            <a:extLst>
+              <a:ext uri="{FF2B5EF4-FFF2-40B4-BE49-F238E27FC236}">
+                <a16:creationId xmlns:a16="http://schemas.microsoft.com/office/drawing/2014/main" id="{1202EBDE-7F64-43BD-86B7-6C228CCEC2D0}"/>
+              </a:ext>
+            </a:extLst>
+          </p:cNvPr>
+          <p:cNvPicPr>
+            <a:picLocks noChangeAspect="1"/>
+          </p:cNvPicPr>
+          <p:nvPr/>
+        </p:nvPicPr>
+        <p:blipFill>
+          <a:blip r:embed="rId2" cstate="print">
+            <a:extLst>
+              <a:ext uri="{28A0092B-C50C-407E-A947-70E740481C1C}">
+                <a14:useLocalDpi xmlns:a14="http://schemas.microsoft.com/office/drawing/2010/main" val="0"/>
+              </a:ext>
+            </a:extLst>
+          </a:blip>
+          <a:stretch>
+            <a:fillRect/>
+          </a:stretch>
+        </p:blipFill>
+        <p:spPr>
+          <a:xfrm>
+            <a:off x="6598915" y="0"/>
+            <a:ext cx="2545085" cy="3294895"/>
+          </a:xfrm>
+          <a:prstGeom prst="rect">
+            <a:avLst/>
+          </a:prstGeom>
+        </p:spPr>
+      </p:pic>
+      <p:pic>
+        <p:nvPicPr>
+          <p:cNvPr id="4" name="圖片 3">
+            <a:extLst>
+              <a:ext uri="{FF2B5EF4-FFF2-40B4-BE49-F238E27FC236}">
+                <a16:creationId xmlns:a16="http://schemas.microsoft.com/office/drawing/2014/main" id="{AEFF5069-0FA7-44E7-AEEE-225463C6B1AC}"/>
+              </a:ext>
+            </a:extLst>
+          </p:cNvPr>
+          <p:cNvPicPr>
+            <a:picLocks noChangeAspect="1"/>
+          </p:cNvPicPr>
+          <p:nvPr/>
+        </p:nvPicPr>
+        <p:blipFill>
+          <a:blip r:embed="rId3" cstate="print">
+            <a:extLst>
+              <a:ext uri="{28A0092B-C50C-407E-A947-70E740481C1C}">
+                <a14:useLocalDpi xmlns:a14="http://schemas.microsoft.com/office/drawing/2010/main" val="0"/>
+              </a:ext>
+            </a:extLst>
+          </a:blip>
+          <a:stretch>
+            <a:fillRect/>
+          </a:stretch>
+        </p:blipFill>
+        <p:spPr>
+          <a:xfrm>
+            <a:off x="0" y="4169659"/>
+            <a:ext cx="3934976" cy="2688341"/>
+          </a:xfrm>
+          <a:prstGeom prst="rect">
+            <a:avLst/>
+          </a:prstGeom>
+        </p:spPr>
+      </p:pic>
+    </p:spTree>
+    <p:extLst>
+      <p:ext uri="{BB962C8B-B14F-4D97-AF65-F5344CB8AC3E}">
+        <p14:creationId xmlns:p14="http://schemas.microsoft.com/office/powerpoint/2010/main" val="76552849"/>
+      </p:ext>
+    </p:extLst>
+  </p:cSld>
+  <p:clrMapOvr>
+    <a:masterClrMapping/>
+  </p:clrMapOvr>
+</p:sld>
+</file>
+
+<file path=ppt/slides/slide42.xml><?xml version="1.0" encoding="utf-8"?>
+<p:sld xmlns:a="http://schemas.openxmlformats.org/drawingml/2006/main" xmlns:r="http://schemas.openxmlformats.org/officeDocument/2006/relationships" xmlns:p="http://schemas.openxmlformats.org/presentationml/2006/main">
+  <p:cSld>
+    <p:spTree>
+      <p:nvGrpSpPr>
+        <p:cNvPr id="1" name=""/>
+        <p:cNvGrpSpPr/>
+        <p:nvPr/>
+      </p:nvGrpSpPr>
+      <p:grpSpPr>
+        <a:xfrm>
+          <a:off x="0" y="0"/>
+          <a:ext cx="0" cy="0"/>
+          <a:chOff x="0" y="0"/>
+          <a:chExt cx="0" cy="0"/>
+        </a:xfrm>
+      </p:grpSpPr>
+      <p:pic>
+        <p:nvPicPr>
+          <p:cNvPr id="3" name="圖片 2">
+            <a:extLst>
+              <a:ext uri="{FF2B5EF4-FFF2-40B4-BE49-F238E27FC236}">
+                <a16:creationId xmlns:a16="http://schemas.microsoft.com/office/drawing/2014/main" id="{1202EBDE-7F64-43BD-86B7-6C228CCEC2D0}"/>
+              </a:ext>
+            </a:extLst>
+          </p:cNvPr>
+          <p:cNvPicPr>
+            <a:picLocks noChangeAspect="1"/>
+          </p:cNvPicPr>
+          <p:nvPr/>
+        </p:nvPicPr>
+        <p:blipFill>
+          <a:blip r:embed="rId2" cstate="print">
+            <a:extLst>
+              <a:ext uri="{28A0092B-C50C-407E-A947-70E740481C1C}">
+                <a14:useLocalDpi xmlns:a14="http://schemas.microsoft.com/office/drawing/2010/main" val="0"/>
+              </a:ext>
+            </a:extLst>
+          </a:blip>
+          <a:stretch>
+            <a:fillRect/>
+          </a:stretch>
+        </p:blipFill>
+        <p:spPr>
+          <a:xfrm>
+            <a:off x="6598915" y="0"/>
+            <a:ext cx="2545085" cy="3294895"/>
+          </a:xfrm>
+          <a:prstGeom prst="rect">
+            <a:avLst/>
+          </a:prstGeom>
+        </p:spPr>
+      </p:pic>
+      <p:pic>
+        <p:nvPicPr>
+          <p:cNvPr id="4" name="圖片 3">
+            <a:extLst>
+              <a:ext uri="{FF2B5EF4-FFF2-40B4-BE49-F238E27FC236}">
+                <a16:creationId xmlns:a16="http://schemas.microsoft.com/office/drawing/2014/main" id="{AEFF5069-0FA7-44E7-AEEE-225463C6B1AC}"/>
+              </a:ext>
+            </a:extLst>
+          </p:cNvPr>
+          <p:cNvPicPr>
+            <a:picLocks noChangeAspect="1"/>
+          </p:cNvPicPr>
+          <p:nvPr/>
+        </p:nvPicPr>
+        <p:blipFill>
+          <a:blip r:embed="rId3" cstate="print">
+            <a:extLst>
+              <a:ext uri="{28A0092B-C50C-407E-A947-70E740481C1C}">
+                <a14:useLocalDpi xmlns:a14="http://schemas.microsoft.com/office/drawing/2010/main" val="0"/>
+              </a:ext>
+            </a:extLst>
+          </a:blip>
+          <a:stretch>
+            <a:fillRect/>
+          </a:stretch>
+        </p:blipFill>
+        <p:spPr>
+          <a:xfrm>
+            <a:off x="0" y="4169659"/>
+            <a:ext cx="3934976" cy="2688341"/>
+          </a:xfrm>
+          <a:prstGeom prst="rect">
+            <a:avLst/>
+          </a:prstGeom>
+        </p:spPr>
+      </p:pic>
+    </p:spTree>
+    <p:extLst>
+      <p:ext uri="{BB962C8B-B14F-4D97-AF65-F5344CB8AC3E}">
+        <p14:creationId xmlns:p14="http://schemas.microsoft.com/office/powerpoint/2010/main" val="2818705360"/>
       </p:ext>
     </p:extLst>
   </p:cSld>
@@ -9028,7 +12260,7 @@
         <p:spPr>
           <a:xfrm>
             <a:off x="584853" y="463989"/>
-            <a:ext cx="3624710" cy="584775"/>
+            <a:ext cx="4057521" cy="646331"/>
           </a:xfrm>
           <a:prstGeom prst="rect">
             <a:avLst/>
@@ -9042,7 +12274,7 @@
           <a:lstStyle/>
           <a:p>
             <a:r>
-              <a:rPr lang="en-US" altLang="zh-TW" sz="3200" dirty="0">
+              <a:rPr lang="en-US" altLang="zh-TW" sz="3600" dirty="0">
                 <a:latin typeface="Arial" panose="020B0604020202020204" pitchFamily="34" charset="0"/>
                 <a:cs typeface="Arial" panose="020B0604020202020204" pitchFamily="34" charset="0"/>
               </a:rPr>
@@ -9079,7 +12311,7 @@
         </p:blipFill>
         <p:spPr>
           <a:xfrm>
-            <a:off x="3475543" y="3294895"/>
+            <a:off x="3511993" y="3550763"/>
             <a:ext cx="5215449" cy="2924985"/>
           </a:xfrm>
           <a:prstGeom prst="rect">
@@ -9115,7 +12347,7 @@
         </p:blipFill>
         <p:spPr>
           <a:xfrm>
-            <a:off x="707795" y="1340977"/>
+            <a:off x="691017" y="1513223"/>
             <a:ext cx="5063829" cy="2828682"/>
           </a:xfrm>
           <a:prstGeom prst="rect">

</xml_diff>

<commit_message>
Add revert and checkout stuff in PPT
</commit_message>
<xml_diff>
--- a/TA_Class_III.pptx
+++ b/TA_Class_III.pptx
@@ -28,25 +28,26 @@
     <p:sldId id="300" r:id="rId22"/>
     <p:sldId id="314" r:id="rId23"/>
     <p:sldId id="315" r:id="rId24"/>
-    <p:sldId id="316" r:id="rId25"/>
-    <p:sldId id="317" r:id="rId26"/>
-    <p:sldId id="318" r:id="rId27"/>
-    <p:sldId id="319" r:id="rId28"/>
-    <p:sldId id="320" r:id="rId29"/>
-    <p:sldId id="321" r:id="rId30"/>
-    <p:sldId id="322" r:id="rId31"/>
-    <p:sldId id="323" r:id="rId32"/>
-    <p:sldId id="324" r:id="rId33"/>
-    <p:sldId id="325" r:id="rId34"/>
-    <p:sldId id="326" r:id="rId35"/>
-    <p:sldId id="327" r:id="rId36"/>
-    <p:sldId id="328" r:id="rId37"/>
-    <p:sldId id="329" r:id="rId38"/>
-    <p:sldId id="330" r:id="rId39"/>
-    <p:sldId id="331" r:id="rId40"/>
-    <p:sldId id="332" r:id="rId41"/>
-    <p:sldId id="333" r:id="rId42"/>
-    <p:sldId id="334" r:id="rId43"/>
+    <p:sldId id="335" r:id="rId25"/>
+    <p:sldId id="316" r:id="rId26"/>
+    <p:sldId id="317" r:id="rId27"/>
+    <p:sldId id="318" r:id="rId28"/>
+    <p:sldId id="319" r:id="rId29"/>
+    <p:sldId id="320" r:id="rId30"/>
+    <p:sldId id="321" r:id="rId31"/>
+    <p:sldId id="322" r:id="rId32"/>
+    <p:sldId id="323" r:id="rId33"/>
+    <p:sldId id="324" r:id="rId34"/>
+    <p:sldId id="325" r:id="rId35"/>
+    <p:sldId id="326" r:id="rId36"/>
+    <p:sldId id="327" r:id="rId37"/>
+    <p:sldId id="328" r:id="rId38"/>
+    <p:sldId id="329" r:id="rId39"/>
+    <p:sldId id="330" r:id="rId40"/>
+    <p:sldId id="331" r:id="rId41"/>
+    <p:sldId id="332" r:id="rId42"/>
+    <p:sldId id="333" r:id="rId43"/>
+    <p:sldId id="334" r:id="rId44"/>
   </p:sldIdLst>
   <p:sldSz cx="9144000" cy="6858000" type="screen4x3"/>
   <p:notesSz cx="6858000" cy="9144000"/>
@@ -296,7 +297,7 @@
           <a:p>
             <a:fld id="{E993BEFC-976D-4ED6-9D0A-EDCFF8846F99}" type="datetimeFigureOut">
               <a:rPr lang="zh-TW" altLang="en-US" smtClean="0"/>
-              <a:t>2020/9/26</a:t>
+              <a:t>2020/9/27</a:t>
             </a:fld>
             <a:endParaRPr lang="zh-TW" altLang="en-US"/>
           </a:p>
@@ -466,7 +467,7 @@
           <a:p>
             <a:fld id="{E993BEFC-976D-4ED6-9D0A-EDCFF8846F99}" type="datetimeFigureOut">
               <a:rPr lang="zh-TW" altLang="en-US" smtClean="0"/>
-              <a:t>2020/9/26</a:t>
+              <a:t>2020/9/27</a:t>
             </a:fld>
             <a:endParaRPr lang="zh-TW" altLang="en-US"/>
           </a:p>
@@ -646,7 +647,7 @@
           <a:p>
             <a:fld id="{E993BEFC-976D-4ED6-9D0A-EDCFF8846F99}" type="datetimeFigureOut">
               <a:rPr lang="zh-TW" altLang="en-US" smtClean="0"/>
-              <a:t>2020/9/26</a:t>
+              <a:t>2020/9/27</a:t>
             </a:fld>
             <a:endParaRPr lang="zh-TW" altLang="en-US"/>
           </a:p>
@@ -816,7 +817,7 @@
           <a:p>
             <a:fld id="{E993BEFC-976D-4ED6-9D0A-EDCFF8846F99}" type="datetimeFigureOut">
               <a:rPr lang="zh-TW" altLang="en-US" smtClean="0"/>
-              <a:t>2020/9/26</a:t>
+              <a:t>2020/9/27</a:t>
             </a:fld>
             <a:endParaRPr lang="zh-TW" altLang="en-US"/>
           </a:p>
@@ -1060,7 +1061,7 @@
           <a:p>
             <a:fld id="{E993BEFC-976D-4ED6-9D0A-EDCFF8846F99}" type="datetimeFigureOut">
               <a:rPr lang="zh-TW" altLang="en-US" smtClean="0"/>
-              <a:t>2020/9/26</a:t>
+              <a:t>2020/9/27</a:t>
             </a:fld>
             <a:endParaRPr lang="zh-TW" altLang="en-US"/>
           </a:p>
@@ -1292,7 +1293,7 @@
           <a:p>
             <a:fld id="{E993BEFC-976D-4ED6-9D0A-EDCFF8846F99}" type="datetimeFigureOut">
               <a:rPr lang="zh-TW" altLang="en-US" smtClean="0"/>
-              <a:t>2020/9/26</a:t>
+              <a:t>2020/9/27</a:t>
             </a:fld>
             <a:endParaRPr lang="zh-TW" altLang="en-US"/>
           </a:p>
@@ -1659,7 +1660,7 @@
           <a:p>
             <a:fld id="{E993BEFC-976D-4ED6-9D0A-EDCFF8846F99}" type="datetimeFigureOut">
               <a:rPr lang="zh-TW" altLang="en-US" smtClean="0"/>
-              <a:t>2020/9/26</a:t>
+              <a:t>2020/9/27</a:t>
             </a:fld>
             <a:endParaRPr lang="zh-TW" altLang="en-US"/>
           </a:p>
@@ -1777,7 +1778,7 @@
           <a:p>
             <a:fld id="{E993BEFC-976D-4ED6-9D0A-EDCFF8846F99}" type="datetimeFigureOut">
               <a:rPr lang="zh-TW" altLang="en-US" smtClean="0"/>
-              <a:t>2020/9/26</a:t>
+              <a:t>2020/9/27</a:t>
             </a:fld>
             <a:endParaRPr lang="zh-TW" altLang="en-US"/>
           </a:p>
@@ -1872,7 +1873,7 @@
           <a:p>
             <a:fld id="{E993BEFC-976D-4ED6-9D0A-EDCFF8846F99}" type="datetimeFigureOut">
               <a:rPr lang="zh-TW" altLang="en-US" smtClean="0"/>
-              <a:t>2020/9/26</a:t>
+              <a:t>2020/9/27</a:t>
             </a:fld>
             <a:endParaRPr lang="zh-TW" altLang="en-US"/>
           </a:p>
@@ -2149,7 +2150,7 @@
           <a:p>
             <a:fld id="{E993BEFC-976D-4ED6-9D0A-EDCFF8846F99}" type="datetimeFigureOut">
               <a:rPr lang="zh-TW" altLang="en-US" smtClean="0"/>
-              <a:t>2020/9/26</a:t>
+              <a:t>2020/9/27</a:t>
             </a:fld>
             <a:endParaRPr lang="zh-TW" altLang="en-US"/>
           </a:p>
@@ -2406,7 +2407,7 @@
           <a:p>
             <a:fld id="{E993BEFC-976D-4ED6-9D0A-EDCFF8846F99}" type="datetimeFigureOut">
               <a:rPr lang="zh-TW" altLang="en-US" smtClean="0"/>
-              <a:t>2020/9/26</a:t>
+              <a:t>2020/9/27</a:t>
             </a:fld>
             <a:endParaRPr lang="zh-TW" altLang="en-US"/>
           </a:p>
@@ -2619,7 +2620,7 @@
           <a:p>
             <a:fld id="{E993BEFC-976D-4ED6-9D0A-EDCFF8846F99}" type="datetimeFigureOut">
               <a:rPr lang="zh-TW" altLang="en-US" smtClean="0"/>
-              <a:t>2020/9/26</a:t>
+              <a:t>2020/9/27</a:t>
             </a:fld>
             <a:endParaRPr lang="zh-TW" altLang="en-US"/>
           </a:p>
@@ -7197,7 +7198,7 @@
           <p:cNvPr id="5" name="文字方塊 4">
             <a:extLst>
               <a:ext uri="{FF2B5EF4-FFF2-40B4-BE49-F238E27FC236}">
-                <a16:creationId xmlns:a16="http://schemas.microsoft.com/office/drawing/2014/main" id="{81F06AE7-3921-42C6-B2D9-A2ADE7774792}"/>
+                <a16:creationId xmlns:a16="http://schemas.microsoft.com/office/drawing/2014/main" id="{CBF62395-EAE0-4B18-B853-10403B7060CB}"/>
               </a:ext>
             </a:extLst>
           </p:cNvPr>
@@ -7206,8 +7207,8 @@
         </p:nvSpPr>
         <p:spPr>
           <a:xfrm>
-            <a:off x="612397" y="646429"/>
-            <a:ext cx="1595309" cy="646331"/>
+            <a:off x="745641" y="722656"/>
+            <a:ext cx="6378669" cy="3698192"/>
           </a:xfrm>
           <a:prstGeom prst="rect">
             <a:avLst/>
@@ -7220,22 +7221,143 @@
           </a:bodyPr>
           <a:lstStyle/>
           <a:p>
-            <a:r>
-              <a:rPr lang="en-US" altLang="zh-TW" sz="3600" dirty="0">
+            <a:pPr>
+              <a:lnSpc>
+                <a:spcPct val="150000"/>
+              </a:lnSpc>
+            </a:pPr>
+            <a:r>
+              <a:rPr lang="zh-TW" altLang="en-US" sz="3200" dirty="0">
                 <a:latin typeface="Arial" panose="020B0604020202020204" pitchFamily="34" charset="0"/>
                 <a:cs typeface="Arial" panose="020B0604020202020204" pitchFamily="34" charset="0"/>
               </a:rPr>
-              <a:t>branch</a:t>
+              <a:t>．</a:t>
+            </a:r>
+            <a:r>
+              <a:rPr lang="en-US" altLang="zh-TW" sz="3200" dirty="0">
+                <a:latin typeface="Arial" panose="020B0604020202020204" pitchFamily="34" charset="0"/>
+                <a:cs typeface="Arial" panose="020B0604020202020204" pitchFamily="34" charset="0"/>
+              </a:rPr>
+              <a:t>git checkout &lt;sha1&gt; </a:t>
+            </a:r>
+          </a:p>
+          <a:p>
+            <a:pPr>
+              <a:lnSpc>
+                <a:spcPct val="150000"/>
+              </a:lnSpc>
+            </a:pPr>
+            <a:r>
+              <a:rPr lang="zh-TW" altLang="en-US" sz="3200" dirty="0">
+                <a:latin typeface="Arial" panose="020B0604020202020204" pitchFamily="34" charset="0"/>
+                <a:cs typeface="Arial" panose="020B0604020202020204" pitchFamily="34" charset="0"/>
+              </a:rPr>
+              <a:t>　</a:t>
+            </a:r>
+            <a:r>
+              <a:rPr lang="en-US" altLang="zh-TW" sz="3200" dirty="0">
+                <a:latin typeface="Arial" panose="020B0604020202020204" pitchFamily="34" charset="0"/>
+                <a:cs typeface="Arial" panose="020B0604020202020204" pitchFamily="34" charset="0"/>
+              </a:rPr>
+              <a:t>to check out a particular commit</a:t>
+            </a:r>
+          </a:p>
+          <a:p>
+            <a:pPr>
+              <a:lnSpc>
+                <a:spcPct val="150000"/>
+              </a:lnSpc>
+            </a:pPr>
+            <a:endParaRPr lang="en-US" altLang="zh-TW" sz="3200" dirty="0">
+              <a:latin typeface="Arial" panose="020B0604020202020204" pitchFamily="34" charset="0"/>
+              <a:cs typeface="Arial" panose="020B0604020202020204" pitchFamily="34" charset="0"/>
+            </a:endParaRPr>
+          </a:p>
+          <a:p>
+            <a:pPr>
+              <a:lnSpc>
+                <a:spcPct val="150000"/>
+              </a:lnSpc>
+            </a:pPr>
+            <a:r>
+              <a:rPr lang="zh-TW" altLang="en-US" sz="3200" dirty="0">
+                <a:latin typeface="Arial" panose="020B0604020202020204" pitchFamily="34" charset="0"/>
+                <a:cs typeface="Arial" panose="020B0604020202020204" pitchFamily="34" charset="0"/>
+              </a:rPr>
+              <a:t>．</a:t>
+            </a:r>
+            <a:r>
+              <a:rPr lang="en-US" altLang="zh-TW" sz="3200" dirty="0">
+                <a:latin typeface="Arial" panose="020B0604020202020204" pitchFamily="34" charset="0"/>
+                <a:cs typeface="Arial" panose="020B0604020202020204" pitchFamily="34" charset="0"/>
+              </a:rPr>
+              <a:t>git revert &lt;sha1&gt; </a:t>
+            </a:r>
+          </a:p>
+          <a:p>
+            <a:pPr>
+              <a:lnSpc>
+                <a:spcPct val="150000"/>
+              </a:lnSpc>
+            </a:pPr>
+            <a:r>
+              <a:rPr lang="zh-TW" altLang="en-US" sz="3200" dirty="0">
+                <a:latin typeface="Arial" panose="020B0604020202020204" pitchFamily="34" charset="0"/>
+                <a:cs typeface="Arial" panose="020B0604020202020204" pitchFamily="34" charset="0"/>
+              </a:rPr>
+              <a:t>　</a:t>
+            </a:r>
+            <a:r>
+              <a:rPr lang="en-US" altLang="zh-TW" sz="3200" dirty="0">
+                <a:latin typeface="Arial" panose="020B0604020202020204" pitchFamily="34" charset="0"/>
+                <a:cs typeface="Arial" panose="020B0604020202020204" pitchFamily="34" charset="0"/>
+              </a:rPr>
+              <a:t>to revert a particular commit</a:t>
             </a:r>
           </a:p>
         </p:txBody>
       </p:sp>
+      <p:pic>
+        <p:nvPicPr>
+          <p:cNvPr id="6" name="圖片 5" descr="一張含有 文字 的圖片&#10;&#10;自動產生的描述">
+            <a:extLst>
+              <a:ext uri="{FF2B5EF4-FFF2-40B4-BE49-F238E27FC236}">
+                <a16:creationId xmlns:a16="http://schemas.microsoft.com/office/drawing/2014/main" id="{B8A1334F-D335-4789-AB67-6F264235D2B8}"/>
+              </a:ext>
+            </a:extLst>
+          </p:cNvPr>
+          <p:cNvPicPr>
+            <a:picLocks noChangeAspect="1"/>
+          </p:cNvPicPr>
+          <p:nvPr/>
+        </p:nvPicPr>
+        <p:blipFill rotWithShape="1">
+          <a:blip r:embed="rId4">
+            <a:extLst>
+              <a:ext uri="{28A0092B-C50C-407E-A947-70E740481C1C}">
+                <a14:useLocalDpi xmlns:a14="http://schemas.microsoft.com/office/drawing/2010/main" val="0"/>
+              </a:ext>
+            </a:extLst>
+          </a:blip>
+          <a:srcRect t="38157" r="27885" b="37080"/>
+          <a:stretch/>
+        </p:blipFill>
+        <p:spPr>
+          <a:xfrm>
+            <a:off x="4176398" y="5077410"/>
+            <a:ext cx="4053202" cy="872837"/>
+          </a:xfrm>
+          <a:prstGeom prst="rect">
+            <a:avLst/>
+          </a:prstGeom>
+        </p:spPr>
+      </p:pic>
       <p:sp>
         <p:nvSpPr>
-          <p:cNvPr id="6" name="矩形 5">
-            <a:extLst>
-              <a:ext uri="{FF2B5EF4-FFF2-40B4-BE49-F238E27FC236}">
-                <a16:creationId xmlns:a16="http://schemas.microsoft.com/office/drawing/2014/main" id="{DFC472AC-C814-4264-B516-AEF54EEC4967}"/>
+          <p:cNvPr id="2" name="矩形 1">
+            <a:extLst>
+              <a:ext uri="{FF2B5EF4-FFF2-40B4-BE49-F238E27FC236}">
+                <a16:creationId xmlns:a16="http://schemas.microsoft.com/office/drawing/2014/main" id="{B78F6BC9-3D83-42A1-A93E-ECB2139B9469}"/>
               </a:ext>
             </a:extLst>
           </p:cNvPr>
@@ -7244,31 +7366,33 @@
         </p:nvSpPr>
         <p:spPr>
           <a:xfrm>
-            <a:off x="889233" y="1734084"/>
-            <a:ext cx="7365534" cy="2575420"/>
-          </a:xfrm>
-          <a:prstGeom prst="rect">
-            <a:avLst/>
-          </a:prstGeom>
-          <a:solidFill>
-            <a:schemeClr val="accent3">
-              <a:lumMod val="20000"/>
-              <a:lumOff val="80000"/>
-            </a:schemeClr>
-          </a:solidFill>
+            <a:off x="4655127" y="5077410"/>
+            <a:ext cx="2795155" cy="336254"/>
+          </a:xfrm>
+          <a:prstGeom prst="rect">
+            <a:avLst/>
+          </a:prstGeom>
+          <a:noFill/>
+          <a:ln w="38100">
+            <a:solidFill>
+              <a:srgbClr val="FF0000"/>
+            </a:solidFill>
+          </a:ln>
         </p:spPr>
         <p:style>
           <a:lnRef idx="2">
-            <a:schemeClr val="dk1"/>
+            <a:schemeClr val="accent1">
+              <a:shade val="50000"/>
+            </a:schemeClr>
           </a:lnRef>
           <a:fillRef idx="1">
-            <a:schemeClr val="lt1"/>
+            <a:schemeClr val="accent1"/>
           </a:fillRef>
           <a:effectRef idx="0">
-            <a:schemeClr val="dk1"/>
+            <a:schemeClr val="accent1"/>
           </a:effectRef>
           <a:fontRef idx="minor">
-            <a:schemeClr val="dk1"/>
+            <a:schemeClr val="lt1"/>
           </a:fontRef>
         </p:style>
         <p:txBody>
@@ -7282,47 +7406,53 @@
       </p:sp>
       <p:sp>
         <p:nvSpPr>
-          <p:cNvPr id="7" name="文字方塊 6">
-            <a:extLst>
-              <a:ext uri="{FF2B5EF4-FFF2-40B4-BE49-F238E27FC236}">
-                <a16:creationId xmlns:a16="http://schemas.microsoft.com/office/drawing/2014/main" id="{1EBF860A-F73D-4938-89CB-809C81B30BE8}"/>
-              </a:ext>
-            </a:extLst>
-          </p:cNvPr>
-          <p:cNvSpPr txBox="1"/>
+          <p:cNvPr id="7" name="矩形 6">
+            <a:extLst>
+              <a:ext uri="{FF2B5EF4-FFF2-40B4-BE49-F238E27FC236}">
+                <a16:creationId xmlns:a16="http://schemas.microsoft.com/office/drawing/2014/main" id="{6932937B-C1F4-4C7F-82AF-15C29B7F8BED}"/>
+              </a:ext>
+            </a:extLst>
+          </p:cNvPr>
+          <p:cNvSpPr/>
           <p:nvPr/>
         </p:nvSpPr>
         <p:spPr>
           <a:xfrm>
-            <a:off x="1241332" y="2236964"/>
-            <a:ext cx="6661336" cy="1569660"/>
-          </a:xfrm>
-          <a:prstGeom prst="rect">
-            <a:avLst/>
-          </a:prstGeom>
-          <a:noFill/>
+            <a:off x="6202999" y="4574854"/>
+            <a:ext cx="1018227" cy="369332"/>
+          </a:xfrm>
+          <a:prstGeom prst="rect">
+            <a:avLst/>
+          </a:prstGeom>
         </p:spPr>
         <p:txBody>
-          <a:bodyPr wrap="square" rtlCol="0">
+          <a:bodyPr wrap="none">
             <a:spAutoFit/>
           </a:bodyPr>
           <a:lstStyle/>
           <a:p>
-            <a:pPr algn="just"/>
-            <a:r>
-              <a:rPr lang="en-US" altLang="zh-TW" sz="3200" dirty="0">
+            <a:r>
+              <a:rPr lang="en-US" altLang="zh-TW" dirty="0">
+                <a:solidFill>
+                  <a:srgbClr val="FF0000"/>
+                </a:solidFill>
                 <a:latin typeface="Arial" panose="020B0604020202020204" pitchFamily="34" charset="0"/>
                 <a:cs typeface="Arial" panose="020B0604020202020204" pitchFamily="34" charset="0"/>
               </a:rPr>
-              <a:t>The default branch git create for you when a new git repo is initialized is called “master”.</a:t>
-            </a:r>
+              <a:t>&lt;sha1&gt; </a:t>
+            </a:r>
+            <a:endParaRPr lang="zh-TW" altLang="en-US" dirty="0">
+              <a:solidFill>
+                <a:srgbClr val="FF0000"/>
+              </a:solidFill>
+            </a:endParaRPr>
           </a:p>
         </p:txBody>
       </p:sp>
     </p:spTree>
     <p:extLst>
       <p:ext uri="{BB962C8B-B14F-4D97-AF65-F5344CB8AC3E}">
-        <p14:creationId xmlns:p14="http://schemas.microsoft.com/office/powerpoint/2010/main" val="1557077587"/>
+        <p14:creationId xmlns:p14="http://schemas.microsoft.com/office/powerpoint/2010/main" val="2995653458"/>
       </p:ext>
     </p:extLst>
   </p:cSld>
@@ -7423,10 +7553,48 @@
       </p:pic>
       <p:sp>
         <p:nvSpPr>
-          <p:cNvPr id="5" name="矩形 4">
-            <a:extLst>
-              <a:ext uri="{FF2B5EF4-FFF2-40B4-BE49-F238E27FC236}">
-                <a16:creationId xmlns:a16="http://schemas.microsoft.com/office/drawing/2014/main" id="{350A71E6-8087-47AB-83A3-4704D41A90E2}"/>
+          <p:cNvPr id="5" name="文字方塊 4">
+            <a:extLst>
+              <a:ext uri="{FF2B5EF4-FFF2-40B4-BE49-F238E27FC236}">
+                <a16:creationId xmlns:a16="http://schemas.microsoft.com/office/drawing/2014/main" id="{81F06AE7-3921-42C6-B2D9-A2ADE7774792}"/>
+              </a:ext>
+            </a:extLst>
+          </p:cNvPr>
+          <p:cNvSpPr txBox="1"/>
+          <p:nvPr/>
+        </p:nvSpPr>
+        <p:spPr>
+          <a:xfrm>
+            <a:off x="612397" y="646429"/>
+            <a:ext cx="1595309" cy="646331"/>
+          </a:xfrm>
+          <a:prstGeom prst="rect">
+            <a:avLst/>
+          </a:prstGeom>
+          <a:noFill/>
+        </p:spPr>
+        <p:txBody>
+          <a:bodyPr wrap="none" rtlCol="0">
+            <a:spAutoFit/>
+          </a:bodyPr>
+          <a:lstStyle/>
+          <a:p>
+            <a:r>
+              <a:rPr lang="en-US" altLang="zh-TW" sz="3600" dirty="0">
+                <a:latin typeface="Arial" panose="020B0604020202020204" pitchFamily="34" charset="0"/>
+                <a:cs typeface="Arial" panose="020B0604020202020204" pitchFamily="34" charset="0"/>
+              </a:rPr>
+              <a:t>branch</a:t>
+            </a:r>
+          </a:p>
+        </p:txBody>
+      </p:sp>
+      <p:sp>
+        <p:nvSpPr>
+          <p:cNvPr id="6" name="矩形 5">
+            <a:extLst>
+              <a:ext uri="{FF2B5EF4-FFF2-40B4-BE49-F238E27FC236}">
+                <a16:creationId xmlns:a16="http://schemas.microsoft.com/office/drawing/2014/main" id="{DFC472AC-C814-4264-B516-AEF54EEC4967}"/>
               </a:ext>
             </a:extLst>
           </p:cNvPr>
@@ -7473,10 +7641,10 @@
       </p:sp>
       <p:sp>
         <p:nvSpPr>
-          <p:cNvPr id="6" name="文字方塊 5">
-            <a:extLst>
-              <a:ext uri="{FF2B5EF4-FFF2-40B4-BE49-F238E27FC236}">
-                <a16:creationId xmlns:a16="http://schemas.microsoft.com/office/drawing/2014/main" id="{66E182E2-8101-480C-AC1D-3278E5B34E3E}"/>
+          <p:cNvPr id="7" name="文字方塊 6">
+            <a:extLst>
+              <a:ext uri="{FF2B5EF4-FFF2-40B4-BE49-F238E27FC236}">
+                <a16:creationId xmlns:a16="http://schemas.microsoft.com/office/drawing/2014/main" id="{1EBF860A-F73D-4938-89CB-809C81B30BE8}"/>
               </a:ext>
             </a:extLst>
           </p:cNvPr>
@@ -7505,7 +7673,7 @@
                 <a:latin typeface="Arial" panose="020B0604020202020204" pitchFamily="34" charset="0"/>
                 <a:cs typeface="Arial" panose="020B0604020202020204" pitchFamily="34" charset="0"/>
               </a:rPr>
-              <a:t>Branches enable changes to be worked on without disruption the most current working state,</a:t>
+              <a:t>The default branch git create for you when a new git repo is initialized is called “master”.</a:t>
             </a:r>
           </a:p>
         </p:txBody>
@@ -7513,7 +7681,7 @@
     </p:spTree>
     <p:extLst>
       <p:ext uri="{BB962C8B-B14F-4D97-AF65-F5344CB8AC3E}">
-        <p14:creationId xmlns:p14="http://schemas.microsoft.com/office/powerpoint/2010/main" val="3514847679"/>
+        <p14:creationId xmlns:p14="http://schemas.microsoft.com/office/powerpoint/2010/main" val="1557077587"/>
       </p:ext>
     </p:extLst>
   </p:cSld>
@@ -7612,48 +7780,12 @@
           </a:prstGeom>
         </p:spPr>
       </p:pic>
-      <p:pic>
-        <p:nvPicPr>
-          <p:cNvPr id="5" name="圖片 4">
-            <a:extLst>
-              <a:ext uri="{FF2B5EF4-FFF2-40B4-BE49-F238E27FC236}">
-                <a16:creationId xmlns:a16="http://schemas.microsoft.com/office/drawing/2014/main" id="{AF3458E4-59B0-4B08-A818-697C2ED81E6C}"/>
-              </a:ext>
-            </a:extLst>
-          </p:cNvPr>
-          <p:cNvPicPr>
-            <a:picLocks noChangeAspect="1"/>
-          </p:cNvPicPr>
-          <p:nvPr/>
-        </p:nvPicPr>
-        <p:blipFill>
-          <a:blip r:embed="rId4">
-            <a:extLst>
-              <a:ext uri="{28A0092B-C50C-407E-A947-70E740481C1C}">
-                <a14:useLocalDpi xmlns:a14="http://schemas.microsoft.com/office/drawing/2010/main" val="0"/>
-              </a:ext>
-            </a:extLst>
-          </a:blip>
-          <a:stretch>
-            <a:fillRect/>
-          </a:stretch>
-        </p:blipFill>
-        <p:spPr>
-          <a:xfrm>
-            <a:off x="1547744" y="3873945"/>
-            <a:ext cx="6048511" cy="518444"/>
-          </a:xfrm>
-          <a:prstGeom prst="rect">
-            <a:avLst/>
-          </a:prstGeom>
-        </p:spPr>
-      </p:pic>
       <p:sp>
         <p:nvSpPr>
-          <p:cNvPr id="6" name="矩形 5">
-            <a:extLst>
-              <a:ext uri="{FF2B5EF4-FFF2-40B4-BE49-F238E27FC236}">
-                <a16:creationId xmlns:a16="http://schemas.microsoft.com/office/drawing/2014/main" id="{6478E4DF-B4DB-4C34-A11D-5DE72C3BF409}"/>
+          <p:cNvPr id="5" name="矩形 4">
+            <a:extLst>
+              <a:ext uri="{FF2B5EF4-FFF2-40B4-BE49-F238E27FC236}">
+                <a16:creationId xmlns:a16="http://schemas.microsoft.com/office/drawing/2014/main" id="{350A71E6-8087-47AB-83A3-4704D41A90E2}"/>
               </a:ext>
             </a:extLst>
           </p:cNvPr>
@@ -7662,8 +7794,8 @@
         </p:nvSpPr>
         <p:spPr>
           <a:xfrm>
-            <a:off x="1547744" y="1747232"/>
-            <a:ext cx="6048511" cy="1224792"/>
+            <a:off x="889233" y="1734084"/>
+            <a:ext cx="7365534" cy="2575420"/>
           </a:xfrm>
           <a:prstGeom prst="rect">
             <a:avLst/>
@@ -7674,26 +7806,19 @@
               <a:lumOff val="80000"/>
             </a:schemeClr>
           </a:solidFill>
-          <a:ln w="38100">
-            <a:solidFill>
-              <a:schemeClr val="tx1"/>
-            </a:solidFill>
-          </a:ln>
         </p:spPr>
         <p:style>
           <a:lnRef idx="2">
-            <a:schemeClr val="accent1">
-              <a:shade val="50000"/>
-            </a:schemeClr>
+            <a:schemeClr val="dk1"/>
           </a:lnRef>
           <a:fillRef idx="1">
-            <a:schemeClr val="accent1"/>
+            <a:schemeClr val="lt1"/>
           </a:fillRef>
           <a:effectRef idx="0">
-            <a:schemeClr val="accent1"/>
+            <a:schemeClr val="dk1"/>
           </a:effectRef>
           <a:fontRef idx="minor">
-            <a:schemeClr val="lt1"/>
+            <a:schemeClr val="dk1"/>
           </a:fontRef>
         </p:style>
         <p:txBody>
@@ -7707,10 +7832,10 @@
       </p:sp>
       <p:sp>
         <p:nvSpPr>
-          <p:cNvPr id="7" name="文字方塊 6">
-            <a:extLst>
-              <a:ext uri="{FF2B5EF4-FFF2-40B4-BE49-F238E27FC236}">
-                <a16:creationId xmlns:a16="http://schemas.microsoft.com/office/drawing/2014/main" id="{63B6A64A-1E37-4FBC-B723-7EFCF0CF2F9F}"/>
+          <p:cNvPr id="6" name="文字方塊 5">
+            <a:extLst>
+              <a:ext uri="{FF2B5EF4-FFF2-40B4-BE49-F238E27FC236}">
+                <a16:creationId xmlns:a16="http://schemas.microsoft.com/office/drawing/2014/main" id="{66E182E2-8101-480C-AC1D-3278E5B34E3E}"/>
               </a:ext>
             </a:extLst>
           </p:cNvPr>
@@ -7719,8 +7844,8 @@
         </p:nvSpPr>
         <p:spPr>
           <a:xfrm>
-            <a:off x="1967488" y="2067240"/>
-            <a:ext cx="5079859" cy="584775"/>
+            <a:off x="1241332" y="2236964"/>
+            <a:ext cx="6661336" cy="1569660"/>
           </a:xfrm>
           <a:prstGeom prst="rect">
             <a:avLst/>
@@ -7733,38 +7858,21 @@
           </a:bodyPr>
           <a:lstStyle/>
           <a:p>
-            <a:r>
-              <a:rPr lang="zh-TW" altLang="en-US" sz="3200" dirty="0">
-                <a:latin typeface="Arial" panose="020B0604020202020204" pitchFamily="34" charset="0"/>
-                <a:cs typeface="Arial" panose="020B0604020202020204" pitchFamily="34" charset="0"/>
-              </a:rPr>
-              <a:t>．</a:t>
-            </a:r>
+            <a:pPr algn="just"/>
             <a:r>
               <a:rPr lang="en-US" altLang="zh-TW" sz="3200" dirty="0">
                 <a:latin typeface="Arial" panose="020B0604020202020204" pitchFamily="34" charset="0"/>
                 <a:cs typeface="Arial" panose="020B0604020202020204" pitchFamily="34" charset="0"/>
               </a:rPr>
-              <a:t>git branch </a:t>
-            </a:r>
-            <a:r>
-              <a:rPr lang="en-US" altLang="zh-TW" sz="3200" dirty="0" err="1">
-                <a:latin typeface="Arial" panose="020B0604020202020204" pitchFamily="34" charset="0"/>
-                <a:cs typeface="Arial" panose="020B0604020202020204" pitchFamily="34" charset="0"/>
-              </a:rPr>
-              <a:t>branch_name</a:t>
-            </a:r>
-            <a:endParaRPr lang="en-US" altLang="zh-TW" sz="3200" dirty="0">
-              <a:latin typeface="Arial" panose="020B0604020202020204" pitchFamily="34" charset="0"/>
-              <a:cs typeface="Arial" panose="020B0604020202020204" pitchFamily="34" charset="0"/>
-            </a:endParaRPr>
+              <a:t>Branches enable changes to be worked on without disruption the most current working state,</a:t>
+            </a:r>
           </a:p>
         </p:txBody>
       </p:sp>
     </p:spTree>
     <p:extLst>
       <p:ext uri="{BB962C8B-B14F-4D97-AF65-F5344CB8AC3E}">
-        <p14:creationId xmlns:p14="http://schemas.microsoft.com/office/powerpoint/2010/main" val="496548563"/>
+        <p14:creationId xmlns:p14="http://schemas.microsoft.com/office/powerpoint/2010/main" val="3514847679"/>
       </p:ext>
     </p:extLst>
   </p:cSld>
@@ -7863,12 +7971,48 @@
           </a:prstGeom>
         </p:spPr>
       </p:pic>
+      <p:pic>
+        <p:nvPicPr>
+          <p:cNvPr id="5" name="圖片 4">
+            <a:extLst>
+              <a:ext uri="{FF2B5EF4-FFF2-40B4-BE49-F238E27FC236}">
+                <a16:creationId xmlns:a16="http://schemas.microsoft.com/office/drawing/2014/main" id="{AF3458E4-59B0-4B08-A818-697C2ED81E6C}"/>
+              </a:ext>
+            </a:extLst>
+          </p:cNvPr>
+          <p:cNvPicPr>
+            <a:picLocks noChangeAspect="1"/>
+          </p:cNvPicPr>
+          <p:nvPr/>
+        </p:nvPicPr>
+        <p:blipFill>
+          <a:blip r:embed="rId4">
+            <a:extLst>
+              <a:ext uri="{28A0092B-C50C-407E-A947-70E740481C1C}">
+                <a14:useLocalDpi xmlns:a14="http://schemas.microsoft.com/office/drawing/2010/main" val="0"/>
+              </a:ext>
+            </a:extLst>
+          </a:blip>
+          <a:stretch>
+            <a:fillRect/>
+          </a:stretch>
+        </p:blipFill>
+        <p:spPr>
+          <a:xfrm>
+            <a:off x="1547744" y="3873945"/>
+            <a:ext cx="6048511" cy="518444"/>
+          </a:xfrm>
+          <a:prstGeom prst="rect">
+            <a:avLst/>
+          </a:prstGeom>
+        </p:spPr>
+      </p:pic>
       <p:sp>
         <p:nvSpPr>
           <p:cNvPr id="6" name="矩形 5">
             <a:extLst>
               <a:ext uri="{FF2B5EF4-FFF2-40B4-BE49-F238E27FC236}">
-                <a16:creationId xmlns:a16="http://schemas.microsoft.com/office/drawing/2014/main" id="{27BA8308-0E71-42BC-9714-02D5FFF2E137}"/>
+                <a16:creationId xmlns:a16="http://schemas.microsoft.com/office/drawing/2014/main" id="{6478E4DF-B4DB-4C34-A11D-5DE72C3BF409}"/>
               </a:ext>
             </a:extLst>
           </p:cNvPr>
@@ -7877,8 +8021,8 @@
         </p:nvSpPr>
         <p:spPr>
           <a:xfrm>
-            <a:off x="2545086" y="1253290"/>
-            <a:ext cx="3485650" cy="1224792"/>
+            <a:off x="1547744" y="1747232"/>
+            <a:ext cx="6048511" cy="1224792"/>
           </a:xfrm>
           <a:prstGeom prst="rect">
             <a:avLst/>
@@ -7925,7 +8069,7 @@
           <p:cNvPr id="7" name="文字方塊 6">
             <a:extLst>
               <a:ext uri="{FF2B5EF4-FFF2-40B4-BE49-F238E27FC236}">
-                <a16:creationId xmlns:a16="http://schemas.microsoft.com/office/drawing/2014/main" id="{1732E131-8FBC-482E-9A54-9B01F26C3535}"/>
+                <a16:creationId xmlns:a16="http://schemas.microsoft.com/office/drawing/2014/main" id="{63B6A64A-1E37-4FBC-B723-7EFCF0CF2F9F}"/>
               </a:ext>
             </a:extLst>
           </p:cNvPr>
@@ -7934,8 +8078,8 @@
         </p:nvSpPr>
         <p:spPr>
           <a:xfrm>
-            <a:off x="2862599" y="1566723"/>
-            <a:ext cx="2706742" cy="584775"/>
+            <a:off x="1967488" y="2067240"/>
+            <a:ext cx="5079859" cy="584775"/>
           </a:xfrm>
           <a:prstGeom prst="rect">
             <a:avLst/>
@@ -7960,51 +8104,26 @@
                 <a:latin typeface="Arial" panose="020B0604020202020204" pitchFamily="34" charset="0"/>
                 <a:cs typeface="Arial" panose="020B0604020202020204" pitchFamily="34" charset="0"/>
               </a:rPr>
-              <a:t>git branch</a:t>
-            </a:r>
+              <a:t>git branch </a:t>
+            </a:r>
+            <a:r>
+              <a:rPr lang="en-US" altLang="zh-TW" sz="3200" dirty="0" err="1">
+                <a:latin typeface="Arial" panose="020B0604020202020204" pitchFamily="34" charset="0"/>
+                <a:cs typeface="Arial" panose="020B0604020202020204" pitchFamily="34" charset="0"/>
+              </a:rPr>
+              <a:t>branch_name</a:t>
+            </a:r>
+            <a:endParaRPr lang="en-US" altLang="zh-TW" sz="3200" dirty="0">
+              <a:latin typeface="Arial" panose="020B0604020202020204" pitchFamily="34" charset="0"/>
+              <a:cs typeface="Arial" panose="020B0604020202020204" pitchFamily="34" charset="0"/>
+            </a:endParaRPr>
           </a:p>
         </p:txBody>
       </p:sp>
-      <p:pic>
-        <p:nvPicPr>
-          <p:cNvPr id="8" name="圖片 7" descr="一張含有 文字 的圖片&#10;&#10;自動產生的描述">
-            <a:extLst>
-              <a:ext uri="{FF2B5EF4-FFF2-40B4-BE49-F238E27FC236}">
-                <a16:creationId xmlns:a16="http://schemas.microsoft.com/office/drawing/2014/main" id="{E3291D27-DD2B-4404-961E-C5BDE4896889}"/>
-              </a:ext>
-            </a:extLst>
-          </p:cNvPr>
-          <p:cNvPicPr>
-            <a:picLocks noChangeAspect="1"/>
-          </p:cNvPicPr>
-          <p:nvPr/>
-        </p:nvPicPr>
-        <p:blipFill>
-          <a:blip r:embed="rId4">
-            <a:extLst>
-              <a:ext uri="{28A0092B-C50C-407E-A947-70E740481C1C}">
-                <a14:useLocalDpi xmlns:a14="http://schemas.microsoft.com/office/drawing/2010/main" val="0"/>
-              </a:ext>
-            </a:extLst>
-          </a:blip>
-          <a:stretch>
-            <a:fillRect/>
-          </a:stretch>
-        </p:blipFill>
-        <p:spPr>
-          <a:xfrm>
-            <a:off x="1298795" y="3294895"/>
-            <a:ext cx="6546409" cy="2309815"/>
-          </a:xfrm>
-          <a:prstGeom prst="rect">
-            <a:avLst/>
-          </a:prstGeom>
-        </p:spPr>
-      </p:pic>
     </p:spTree>
     <p:extLst>
       <p:ext uri="{BB962C8B-B14F-4D97-AF65-F5344CB8AC3E}">
-        <p14:creationId xmlns:p14="http://schemas.microsoft.com/office/powerpoint/2010/main" val="1659399492"/>
+        <p14:creationId xmlns:p14="http://schemas.microsoft.com/office/powerpoint/2010/main" val="496548563"/>
       </p:ext>
     </p:extLst>
   </p:cSld>
@@ -8105,217 +8224,67 @@
       </p:pic>
       <p:sp>
         <p:nvSpPr>
-          <p:cNvPr id="5" name="文字方塊 4">
-            <a:extLst>
-              <a:ext uri="{FF2B5EF4-FFF2-40B4-BE49-F238E27FC236}">
-                <a16:creationId xmlns:a16="http://schemas.microsoft.com/office/drawing/2014/main" id="{48465F4D-92C8-4218-A958-29D62F6B1A97}"/>
-              </a:ext>
-            </a:extLst>
-          </p:cNvPr>
-          <p:cNvSpPr txBox="1"/>
+          <p:cNvPr id="6" name="矩形 5">
+            <a:extLst>
+              <a:ext uri="{FF2B5EF4-FFF2-40B4-BE49-F238E27FC236}">
+                <a16:creationId xmlns:a16="http://schemas.microsoft.com/office/drawing/2014/main" id="{27BA8308-0E71-42BC-9714-02D5FFF2E137}"/>
+              </a:ext>
+            </a:extLst>
+          </p:cNvPr>
+          <p:cNvSpPr/>
           <p:nvPr/>
         </p:nvSpPr>
         <p:spPr>
           <a:xfrm>
-            <a:off x="386372" y="324441"/>
-            <a:ext cx="2004491" cy="523220"/>
-          </a:xfrm>
-          <a:prstGeom prst="rect">
-            <a:avLst/>
-          </a:prstGeom>
-          <a:noFill/>
-        </p:spPr>
-        <p:txBody>
-          <a:bodyPr wrap="square" rtlCol="0">
-            <a:spAutoFit/>
-          </a:bodyPr>
-          <a:lstStyle/>
-          <a:p>
-            <a:r>
-              <a:rPr lang="zh-TW" altLang="en-US" sz="2800" dirty="0">
-                <a:latin typeface="Arial" panose="020B0604020202020204" pitchFamily="34" charset="0"/>
-                <a:cs typeface="Arial" panose="020B0604020202020204" pitchFamily="34" charset="0"/>
-              </a:rPr>
-              <a:t> ＊</a:t>
-            </a:r>
-            <a:r>
-              <a:rPr lang="en-US" altLang="zh-TW" sz="2800" dirty="0">
-                <a:latin typeface="Arial" panose="020B0604020202020204" pitchFamily="34" charset="0"/>
-                <a:cs typeface="Arial" panose="020B0604020202020204" pitchFamily="34" charset="0"/>
-              </a:rPr>
-              <a:t>master</a:t>
-            </a:r>
-          </a:p>
-        </p:txBody>
-      </p:sp>
-      <p:sp>
-        <p:nvSpPr>
-          <p:cNvPr id="6" name="文字方塊 5">
-            <a:extLst>
-              <a:ext uri="{FF2B5EF4-FFF2-40B4-BE49-F238E27FC236}">
-                <a16:creationId xmlns:a16="http://schemas.microsoft.com/office/drawing/2014/main" id="{8481A8F0-C2E1-4577-AC58-35B8EFAE7EBC}"/>
-              </a:ext>
-            </a:extLst>
-          </p:cNvPr>
-          <p:cNvSpPr txBox="1"/>
-          <p:nvPr/>
-        </p:nvSpPr>
-        <p:spPr>
-          <a:xfrm>
-            <a:off x="349046" y="1058886"/>
-            <a:ext cx="2110327" cy="523220"/>
-          </a:xfrm>
-          <a:prstGeom prst="rect">
-            <a:avLst/>
-          </a:prstGeom>
-        </p:spPr>
-        <p:style>
-          <a:lnRef idx="2">
-            <a:schemeClr val="dk1"/>
-          </a:lnRef>
-          <a:fillRef idx="1">
-            <a:schemeClr val="lt1"/>
-          </a:fillRef>
-          <a:effectRef idx="0">
-            <a:schemeClr val="dk1"/>
-          </a:effectRef>
-          <a:fontRef idx="minor">
-            <a:schemeClr val="dk1"/>
-          </a:fontRef>
-        </p:style>
-        <p:txBody>
-          <a:bodyPr wrap="square" rtlCol="0">
-            <a:spAutoFit/>
-          </a:bodyPr>
-          <a:lstStyle/>
-          <a:p>
-            <a:r>
-              <a:rPr lang="zh-TW" altLang="en-US" sz="2800" dirty="0">
-                <a:latin typeface="Arial" panose="020B0604020202020204" pitchFamily="34" charset="0"/>
-                <a:cs typeface="Arial" panose="020B0604020202020204" pitchFamily="34" charset="0"/>
-              </a:rPr>
-              <a:t>。</a:t>
-            </a:r>
-            <a:r>
-              <a:rPr lang="en-US" altLang="zh-TW" sz="2800" dirty="0">
-                <a:latin typeface="Arial" panose="020B0604020202020204" pitchFamily="34" charset="0"/>
-                <a:cs typeface="Arial" panose="020B0604020202020204" pitchFamily="34" charset="0"/>
-              </a:rPr>
-              <a:t>main file</a:t>
-            </a:r>
-          </a:p>
-        </p:txBody>
-      </p:sp>
-      <p:sp>
-        <p:nvSpPr>
-          <p:cNvPr id="7" name="文字方塊 6">
-            <a:extLst>
-              <a:ext uri="{FF2B5EF4-FFF2-40B4-BE49-F238E27FC236}">
-                <a16:creationId xmlns:a16="http://schemas.microsoft.com/office/drawing/2014/main" id="{FC0A0403-E86E-4D4B-A9EC-7255B9A71DC6}"/>
-              </a:ext>
-            </a:extLst>
-          </p:cNvPr>
-          <p:cNvSpPr txBox="1"/>
-          <p:nvPr/>
-        </p:nvSpPr>
-        <p:spPr>
-          <a:xfrm>
-            <a:off x="1669409" y="2314568"/>
-            <a:ext cx="2110327" cy="523220"/>
-          </a:xfrm>
-          <a:prstGeom prst="rect">
-            <a:avLst/>
-          </a:prstGeom>
-        </p:spPr>
-        <p:style>
-          <a:lnRef idx="2">
-            <a:schemeClr val="dk1"/>
-          </a:lnRef>
-          <a:fillRef idx="1">
-            <a:schemeClr val="lt1"/>
-          </a:fillRef>
-          <a:effectRef idx="0">
-            <a:schemeClr val="dk1"/>
-          </a:effectRef>
-          <a:fontRef idx="minor">
-            <a:schemeClr val="dk1"/>
-          </a:fontRef>
-        </p:style>
-        <p:txBody>
-          <a:bodyPr wrap="square" rtlCol="0">
-            <a:spAutoFit/>
-          </a:bodyPr>
-          <a:lstStyle/>
-          <a:p>
-            <a:r>
-              <a:rPr lang="zh-TW" altLang="en-US" sz="2800" dirty="0">
-                <a:latin typeface="Arial" panose="020B0604020202020204" pitchFamily="34" charset="0"/>
-                <a:cs typeface="Arial" panose="020B0604020202020204" pitchFamily="34" charset="0"/>
-              </a:rPr>
-              <a:t>。</a:t>
-            </a:r>
-            <a:r>
-              <a:rPr lang="en-US" altLang="zh-TW" sz="2800" dirty="0">
-                <a:latin typeface="Arial" panose="020B0604020202020204" pitchFamily="34" charset="0"/>
-                <a:cs typeface="Arial" panose="020B0604020202020204" pitchFamily="34" charset="0"/>
-              </a:rPr>
-              <a:t>main file</a:t>
-            </a:r>
-          </a:p>
-        </p:txBody>
-      </p:sp>
-      <p:cxnSp>
-        <p:nvCxnSpPr>
-          <p:cNvPr id="8" name="接點: 肘形 7">
-            <a:extLst>
-              <a:ext uri="{FF2B5EF4-FFF2-40B4-BE49-F238E27FC236}">
-                <a16:creationId xmlns:a16="http://schemas.microsoft.com/office/drawing/2014/main" id="{7EADF4EE-F288-43EB-A2A7-D9F30DA40375}"/>
-              </a:ext>
-            </a:extLst>
-          </p:cNvPr>
-          <p:cNvCxnSpPr>
-            <a:cxnSpLocks/>
-            <a:stCxn id="6" idx="3"/>
-            <a:endCxn id="7" idx="0"/>
-          </p:cNvCxnSpPr>
-          <p:nvPr/>
-        </p:nvCxnSpPr>
-        <p:spPr>
-          <a:xfrm>
-            <a:off x="2459373" y="1320496"/>
-            <a:ext cx="265200" cy="994072"/>
-          </a:xfrm>
-          <a:prstGeom prst="bentConnector2">
-            <a:avLst/>
-          </a:prstGeom>
+            <a:off x="2545086" y="1253290"/>
+            <a:ext cx="3485650" cy="1224792"/>
+          </a:xfrm>
+          <a:prstGeom prst="rect">
+            <a:avLst/>
+          </a:prstGeom>
+          <a:solidFill>
+            <a:schemeClr val="accent3">
+              <a:lumMod val="20000"/>
+              <a:lumOff val="80000"/>
+            </a:schemeClr>
+          </a:solidFill>
           <a:ln w="38100">
             <a:solidFill>
               <a:schemeClr val="tx1"/>
             </a:solidFill>
-            <a:tailEnd type="triangle"/>
           </a:ln>
         </p:spPr>
         <p:style>
-          <a:lnRef idx="1">
-            <a:schemeClr val="accent1"/>
+          <a:lnRef idx="2">
+            <a:schemeClr val="accent1">
+              <a:shade val="50000"/>
+            </a:schemeClr>
           </a:lnRef>
-          <a:fillRef idx="0">
+          <a:fillRef idx="1">
             <a:schemeClr val="accent1"/>
           </a:fillRef>
           <a:effectRef idx="0">
             <a:schemeClr val="accent1"/>
           </a:effectRef>
           <a:fontRef idx="minor">
-            <a:schemeClr val="tx1"/>
+            <a:schemeClr val="lt1"/>
           </a:fontRef>
         </p:style>
-      </p:cxnSp>
+        <p:txBody>
+          <a:bodyPr rtlCol="0" anchor="ctr"/>
+          <a:lstStyle/>
+          <a:p>
+            <a:pPr algn="ctr"/>
+            <a:endParaRPr lang="zh-TW" altLang="en-US"/>
+          </a:p>
+        </p:txBody>
+      </p:sp>
       <p:sp>
         <p:nvSpPr>
-          <p:cNvPr id="10" name="文字方塊 9">
-            <a:extLst>
-              <a:ext uri="{FF2B5EF4-FFF2-40B4-BE49-F238E27FC236}">
-                <a16:creationId xmlns:a16="http://schemas.microsoft.com/office/drawing/2014/main" id="{ECA7307C-CF29-4344-871F-39CBDF1B0055}"/>
+          <p:cNvPr id="7" name="文字方塊 6">
+            <a:extLst>
+              <a:ext uri="{FF2B5EF4-FFF2-40B4-BE49-F238E27FC236}">
+                <a16:creationId xmlns:a16="http://schemas.microsoft.com/office/drawing/2014/main" id="{1732E131-8FBC-482E-9A54-9B01F26C3535}"/>
               </a:ext>
             </a:extLst>
           </p:cNvPr>
@@ -8324,8 +8293,8 @@
         </p:nvSpPr>
         <p:spPr>
           <a:xfrm>
-            <a:off x="2915344" y="1417422"/>
-            <a:ext cx="3451167" cy="400110"/>
+            <a:off x="2862599" y="1566723"/>
+            <a:ext cx="2706742" cy="584775"/>
           </a:xfrm>
           <a:prstGeom prst="rect">
             <a:avLst/>
@@ -8339,567 +8308,62 @@
           <a:lstStyle/>
           <a:p>
             <a:r>
-              <a:rPr lang="en-US" altLang="zh-TW" sz="2000" dirty="0">
-                <a:latin typeface="Arial" panose="020B0604020202020204" pitchFamily="34" charset="0"/>
-                <a:cs typeface="Arial" panose="020B0604020202020204" pitchFamily="34" charset="0"/>
-              </a:rPr>
-              <a:t>git checkout –b </a:t>
-            </a:r>
-            <a:r>
-              <a:rPr lang="en-US" altLang="zh-TW" sz="2000" dirty="0" err="1">
-                <a:latin typeface="Arial" panose="020B0604020202020204" pitchFamily="34" charset="0"/>
-                <a:cs typeface="Arial" panose="020B0604020202020204" pitchFamily="34" charset="0"/>
-              </a:rPr>
-              <a:t>new_branch</a:t>
-            </a:r>
-            <a:endParaRPr lang="en-US" altLang="zh-TW" sz="2000" dirty="0">
-              <a:latin typeface="Arial" panose="020B0604020202020204" pitchFamily="34" charset="0"/>
-              <a:cs typeface="Arial" panose="020B0604020202020204" pitchFamily="34" charset="0"/>
-            </a:endParaRPr>
-          </a:p>
-        </p:txBody>
-      </p:sp>
-      <p:sp>
-        <p:nvSpPr>
-          <p:cNvPr id="16" name="文字方塊 15">
-            <a:extLst>
-              <a:ext uri="{FF2B5EF4-FFF2-40B4-BE49-F238E27FC236}">
-                <a16:creationId xmlns:a16="http://schemas.microsoft.com/office/drawing/2014/main" id="{5363C442-B1E3-43CD-B532-2E2556292ED2}"/>
-              </a:ext>
-            </a:extLst>
-          </p:cNvPr>
-          <p:cNvSpPr txBox="1"/>
-          <p:nvPr/>
-        </p:nvSpPr>
-        <p:spPr>
-          <a:xfrm>
-            <a:off x="6114410" y="2105740"/>
-            <a:ext cx="2110328" cy="954107"/>
-          </a:xfrm>
-          <a:prstGeom prst="rect">
-            <a:avLst/>
-          </a:prstGeom>
-        </p:spPr>
-        <p:style>
-          <a:lnRef idx="2">
-            <a:schemeClr val="dk1"/>
-          </a:lnRef>
-          <a:fillRef idx="1">
-            <a:schemeClr val="lt1"/>
-          </a:fillRef>
-          <a:effectRef idx="0">
-            <a:schemeClr val="dk1"/>
-          </a:effectRef>
-          <a:fontRef idx="minor">
-            <a:schemeClr val="dk1"/>
-          </a:fontRef>
-        </p:style>
-        <p:txBody>
-          <a:bodyPr wrap="square" rtlCol="0">
-            <a:spAutoFit/>
-          </a:bodyPr>
-          <a:lstStyle/>
-          <a:p>
-            <a:r>
-              <a:rPr lang="zh-TW" altLang="en-US" sz="2800" dirty="0">
-                <a:latin typeface="Arial" panose="020B0604020202020204" pitchFamily="34" charset="0"/>
-                <a:cs typeface="Arial" panose="020B0604020202020204" pitchFamily="34" charset="0"/>
-              </a:rPr>
-              <a:t>。</a:t>
-            </a:r>
-            <a:r>
-              <a:rPr lang="en-US" altLang="zh-TW" sz="2800" dirty="0">
-                <a:latin typeface="Arial" panose="020B0604020202020204" pitchFamily="34" charset="0"/>
-                <a:cs typeface="Arial" panose="020B0604020202020204" pitchFamily="34" charset="0"/>
-              </a:rPr>
-              <a:t>main file</a:t>
-            </a:r>
-          </a:p>
-          <a:p>
-            <a:r>
-              <a:rPr lang="zh-TW" altLang="en-US" sz="2800" dirty="0">
+              <a:rPr lang="zh-TW" altLang="en-US" sz="3200" dirty="0">
                 <a:latin typeface="Arial" panose="020B0604020202020204" pitchFamily="34" charset="0"/>
                 <a:cs typeface="Arial" panose="020B0604020202020204" pitchFamily="34" charset="0"/>
               </a:rPr>
               <a:t>．</a:t>
             </a:r>
             <a:r>
-              <a:rPr lang="en-US" altLang="zh-TW" sz="2800" dirty="0">
+              <a:rPr lang="en-US" altLang="zh-TW" sz="3200" dirty="0">
                 <a:latin typeface="Arial" panose="020B0604020202020204" pitchFamily="34" charset="0"/>
                 <a:cs typeface="Arial" panose="020B0604020202020204" pitchFamily="34" charset="0"/>
               </a:rPr>
-              <a:t>new file</a:t>
+              <a:t>git branch</a:t>
             </a:r>
           </a:p>
         </p:txBody>
       </p:sp>
-      <p:cxnSp>
-        <p:nvCxnSpPr>
-          <p:cNvPr id="18" name="直線單箭頭接點 17">
-            <a:extLst>
-              <a:ext uri="{FF2B5EF4-FFF2-40B4-BE49-F238E27FC236}">
-                <a16:creationId xmlns:a16="http://schemas.microsoft.com/office/drawing/2014/main" id="{D33E09B5-2ABD-4400-824C-B26610015F89}"/>
-              </a:ext>
-            </a:extLst>
-          </p:cNvPr>
-          <p:cNvCxnSpPr>
-            <a:cxnSpLocks/>
-            <a:stCxn id="7" idx="3"/>
-            <a:endCxn id="16" idx="1"/>
-          </p:cNvCxnSpPr>
-          <p:nvPr/>
-        </p:nvCxnSpPr>
-        <p:spPr>
-          <a:xfrm>
-            <a:off x="3779736" y="2576178"/>
-            <a:ext cx="2334674" cy="6616"/>
-          </a:xfrm>
-          <a:prstGeom prst="straightConnector1">
-            <a:avLst/>
-          </a:prstGeom>
-          <a:ln w="38100">
-            <a:solidFill>
-              <a:schemeClr val="tx1"/>
-            </a:solidFill>
-            <a:tailEnd type="triangle"/>
-          </a:ln>
-        </p:spPr>
-        <p:style>
-          <a:lnRef idx="1">
-            <a:schemeClr val="accent1"/>
-          </a:lnRef>
-          <a:fillRef idx="0">
-            <a:schemeClr val="accent1"/>
-          </a:fillRef>
-          <a:effectRef idx="0">
-            <a:schemeClr val="accent1"/>
-          </a:effectRef>
-          <a:fontRef idx="minor">
-            <a:schemeClr val="tx1"/>
-          </a:fontRef>
-        </p:style>
-      </p:cxnSp>
-      <p:sp>
-        <p:nvSpPr>
-          <p:cNvPr id="22" name="文字方塊 21">
-            <a:extLst>
-              <a:ext uri="{FF2B5EF4-FFF2-40B4-BE49-F238E27FC236}">
-                <a16:creationId xmlns:a16="http://schemas.microsoft.com/office/drawing/2014/main" id="{79DDA0F3-83F4-4BB3-BBBA-2509FAA4F2A3}"/>
-              </a:ext>
-            </a:extLst>
-          </p:cNvPr>
-          <p:cNvSpPr txBox="1"/>
-          <p:nvPr/>
-        </p:nvSpPr>
-        <p:spPr>
-          <a:xfrm>
-            <a:off x="4376428" y="2114513"/>
-            <a:ext cx="933805" cy="400110"/>
-          </a:xfrm>
-          <a:prstGeom prst="rect">
-            <a:avLst/>
-          </a:prstGeom>
-          <a:noFill/>
-        </p:spPr>
-        <p:txBody>
-          <a:bodyPr wrap="square" rtlCol="0">
-            <a:spAutoFit/>
-          </a:bodyPr>
-          <a:lstStyle/>
-          <a:p>
-            <a:r>
-              <a:rPr lang="en-US" altLang="zh-TW" sz="2000" dirty="0">
-                <a:latin typeface="Arial" panose="020B0604020202020204" pitchFamily="34" charset="0"/>
-                <a:cs typeface="Arial" panose="020B0604020202020204" pitchFamily="34" charset="0"/>
-              </a:rPr>
-              <a:t>modify</a:t>
-            </a:r>
-          </a:p>
-        </p:txBody>
-      </p:sp>
-      <p:sp>
-        <p:nvSpPr>
-          <p:cNvPr id="23" name="文字方塊 22">
-            <a:extLst>
-              <a:ext uri="{FF2B5EF4-FFF2-40B4-BE49-F238E27FC236}">
-                <a16:creationId xmlns:a16="http://schemas.microsoft.com/office/drawing/2014/main" id="{1F468E26-20E0-441C-9F7E-9891B9ACA69B}"/>
-              </a:ext>
-            </a:extLst>
-          </p:cNvPr>
-          <p:cNvSpPr txBox="1"/>
-          <p:nvPr/>
-        </p:nvSpPr>
-        <p:spPr>
-          <a:xfrm>
-            <a:off x="1669408" y="3646439"/>
-            <a:ext cx="2110328" cy="954107"/>
-          </a:xfrm>
-          <a:prstGeom prst="rect">
-            <a:avLst/>
-          </a:prstGeom>
-        </p:spPr>
-        <p:style>
-          <a:lnRef idx="2">
-            <a:schemeClr val="dk1"/>
-          </a:lnRef>
-          <a:fillRef idx="1">
-            <a:schemeClr val="lt1"/>
-          </a:fillRef>
-          <a:effectRef idx="0">
-            <a:schemeClr val="dk1"/>
-          </a:effectRef>
-          <a:fontRef idx="minor">
-            <a:schemeClr val="dk1"/>
-          </a:fontRef>
-        </p:style>
-        <p:txBody>
-          <a:bodyPr wrap="square" rtlCol="0">
-            <a:spAutoFit/>
-          </a:bodyPr>
-          <a:lstStyle/>
-          <a:p>
-            <a:r>
-              <a:rPr lang="zh-TW" altLang="en-US" sz="2800" dirty="0">
-                <a:latin typeface="Arial" panose="020B0604020202020204" pitchFamily="34" charset="0"/>
-                <a:cs typeface="Arial" panose="020B0604020202020204" pitchFamily="34" charset="0"/>
-              </a:rPr>
-              <a:t>。</a:t>
-            </a:r>
-            <a:r>
-              <a:rPr lang="en-US" altLang="zh-TW" sz="2800" dirty="0">
-                <a:latin typeface="Arial" panose="020B0604020202020204" pitchFamily="34" charset="0"/>
-                <a:cs typeface="Arial" panose="020B0604020202020204" pitchFamily="34" charset="0"/>
-              </a:rPr>
-              <a:t>main file</a:t>
-            </a:r>
-          </a:p>
-          <a:p>
-            <a:r>
-              <a:rPr lang="zh-TW" altLang="en-US" sz="2800" dirty="0">
-                <a:latin typeface="Arial" panose="020B0604020202020204" pitchFamily="34" charset="0"/>
-                <a:cs typeface="Arial" panose="020B0604020202020204" pitchFamily="34" charset="0"/>
-              </a:rPr>
-              <a:t>．</a:t>
-            </a:r>
-            <a:r>
-              <a:rPr lang="en-US" altLang="zh-TW" sz="2800" dirty="0">
-                <a:latin typeface="Arial" panose="020B0604020202020204" pitchFamily="34" charset="0"/>
-                <a:cs typeface="Arial" panose="020B0604020202020204" pitchFamily="34" charset="0"/>
-              </a:rPr>
-              <a:t>new file</a:t>
-            </a:r>
-          </a:p>
-        </p:txBody>
-      </p:sp>
-      <p:cxnSp>
-        <p:nvCxnSpPr>
-          <p:cNvPr id="24" name="直線單箭頭接點 23">
-            <a:extLst>
-              <a:ext uri="{FF2B5EF4-FFF2-40B4-BE49-F238E27FC236}">
-                <a16:creationId xmlns:a16="http://schemas.microsoft.com/office/drawing/2014/main" id="{AC2572B1-8983-4F84-8AB1-414999449184}"/>
-              </a:ext>
-            </a:extLst>
-          </p:cNvPr>
-          <p:cNvCxnSpPr>
-            <a:cxnSpLocks/>
-            <a:stCxn id="7" idx="2"/>
-            <a:endCxn id="23" idx="0"/>
-          </p:cNvCxnSpPr>
-          <p:nvPr/>
-        </p:nvCxnSpPr>
-        <p:spPr>
-          <a:xfrm flipH="1">
-            <a:off x="2724572" y="2837788"/>
-            <a:ext cx="1" cy="808651"/>
-          </a:xfrm>
-          <a:prstGeom prst="straightConnector1">
-            <a:avLst/>
-          </a:prstGeom>
-          <a:ln w="38100">
-            <a:solidFill>
-              <a:schemeClr val="tx1"/>
-            </a:solidFill>
-            <a:tailEnd type="triangle"/>
-          </a:ln>
-        </p:spPr>
-        <p:style>
-          <a:lnRef idx="1">
-            <a:schemeClr val="accent1"/>
-          </a:lnRef>
-          <a:fillRef idx="0">
-            <a:schemeClr val="accent1"/>
-          </a:fillRef>
-          <a:effectRef idx="0">
-            <a:schemeClr val="accent1"/>
-          </a:effectRef>
-          <a:fontRef idx="minor">
-            <a:schemeClr val="tx1"/>
-          </a:fontRef>
-        </p:style>
-      </p:cxnSp>
-      <p:cxnSp>
-        <p:nvCxnSpPr>
-          <p:cNvPr id="27" name="接點: 肘形 26">
-            <a:extLst>
-              <a:ext uri="{FF2B5EF4-FFF2-40B4-BE49-F238E27FC236}">
-                <a16:creationId xmlns:a16="http://schemas.microsoft.com/office/drawing/2014/main" id="{2E528F29-0DD3-4E23-9397-6B2F6F355E7B}"/>
-              </a:ext>
-            </a:extLst>
-          </p:cNvPr>
-          <p:cNvCxnSpPr>
-            <a:cxnSpLocks/>
-            <a:stCxn id="16" idx="2"/>
-            <a:endCxn id="23" idx="3"/>
-          </p:cNvCxnSpPr>
-          <p:nvPr/>
-        </p:nvCxnSpPr>
-        <p:spPr>
-          <a:xfrm rot="5400000">
-            <a:off x="4942832" y="1896751"/>
-            <a:ext cx="1063646" cy="3389838"/>
-          </a:xfrm>
-          <a:prstGeom prst="bentConnector2">
-            <a:avLst/>
-          </a:prstGeom>
-          <a:ln w="38100">
-            <a:solidFill>
-              <a:schemeClr val="tx1"/>
-            </a:solidFill>
-            <a:tailEnd type="triangle"/>
-          </a:ln>
-        </p:spPr>
-        <p:style>
-          <a:lnRef idx="1">
-            <a:schemeClr val="accent1"/>
-          </a:lnRef>
-          <a:fillRef idx="0">
-            <a:schemeClr val="accent1"/>
-          </a:fillRef>
-          <a:effectRef idx="0">
-            <a:schemeClr val="accent1"/>
-          </a:effectRef>
-          <a:fontRef idx="minor">
-            <a:schemeClr val="tx1"/>
-          </a:fontRef>
-        </p:style>
-      </p:cxnSp>
-      <p:sp>
-        <p:nvSpPr>
-          <p:cNvPr id="30" name="文字方塊 29">
-            <a:extLst>
-              <a:ext uri="{FF2B5EF4-FFF2-40B4-BE49-F238E27FC236}">
-                <a16:creationId xmlns:a16="http://schemas.microsoft.com/office/drawing/2014/main" id="{FEBF6538-9CDD-4F5A-BCB3-757B8725C0BA}"/>
-              </a:ext>
-            </a:extLst>
-          </p:cNvPr>
-          <p:cNvSpPr txBox="1"/>
-          <p:nvPr/>
-        </p:nvSpPr>
-        <p:spPr>
-          <a:xfrm>
-            <a:off x="4652057" y="3686176"/>
-            <a:ext cx="1714454" cy="400110"/>
-          </a:xfrm>
-          <a:prstGeom prst="rect">
-            <a:avLst/>
-          </a:prstGeom>
-          <a:noFill/>
-        </p:spPr>
-        <p:txBody>
-          <a:bodyPr wrap="square" rtlCol="0">
-            <a:spAutoFit/>
-          </a:bodyPr>
-          <a:lstStyle/>
-          <a:p>
-            <a:r>
-              <a:rPr lang="en-US" altLang="zh-TW" sz="2000" dirty="0">
-                <a:latin typeface="Arial" panose="020B0604020202020204" pitchFamily="34" charset="0"/>
-                <a:cs typeface="Arial" panose="020B0604020202020204" pitchFamily="34" charset="0"/>
-              </a:rPr>
-              <a:t>add, commit</a:t>
-            </a:r>
-          </a:p>
-        </p:txBody>
-      </p:sp>
-      <p:cxnSp>
-        <p:nvCxnSpPr>
-          <p:cNvPr id="33" name="直線單箭頭接點 32">
-            <a:extLst>
-              <a:ext uri="{FF2B5EF4-FFF2-40B4-BE49-F238E27FC236}">
-                <a16:creationId xmlns:a16="http://schemas.microsoft.com/office/drawing/2014/main" id="{A76451C5-833B-4D40-98B0-22044EE7228D}"/>
-              </a:ext>
-            </a:extLst>
-          </p:cNvPr>
-          <p:cNvCxnSpPr>
-            <a:cxnSpLocks/>
-            <a:stCxn id="6" idx="2"/>
-            <a:endCxn id="36" idx="0"/>
-          </p:cNvCxnSpPr>
-          <p:nvPr/>
-        </p:nvCxnSpPr>
-        <p:spPr>
-          <a:xfrm flipH="1">
-            <a:off x="1404209" y="1582106"/>
-            <a:ext cx="1" cy="3643180"/>
-          </a:xfrm>
-          <a:prstGeom prst="straightConnector1">
-            <a:avLst/>
-          </a:prstGeom>
-          <a:ln w="38100">
-            <a:solidFill>
-              <a:schemeClr val="tx1"/>
-            </a:solidFill>
-            <a:tailEnd type="triangle"/>
-          </a:ln>
-        </p:spPr>
-        <p:style>
-          <a:lnRef idx="1">
-            <a:schemeClr val="accent1"/>
-          </a:lnRef>
-          <a:fillRef idx="0">
-            <a:schemeClr val="accent1"/>
-          </a:fillRef>
-          <a:effectRef idx="0">
-            <a:schemeClr val="accent1"/>
-          </a:effectRef>
-          <a:fontRef idx="minor">
-            <a:schemeClr val="tx1"/>
-          </a:fontRef>
-        </p:style>
-      </p:cxnSp>
-      <p:sp>
-        <p:nvSpPr>
-          <p:cNvPr id="36" name="文字方塊 35">
-            <a:extLst>
-              <a:ext uri="{FF2B5EF4-FFF2-40B4-BE49-F238E27FC236}">
-                <a16:creationId xmlns:a16="http://schemas.microsoft.com/office/drawing/2014/main" id="{518804E3-8FC2-4488-87D4-F4A9F33849D8}"/>
-              </a:ext>
-            </a:extLst>
-          </p:cNvPr>
-          <p:cNvSpPr txBox="1"/>
-          <p:nvPr/>
-        </p:nvSpPr>
-        <p:spPr>
-          <a:xfrm>
-            <a:off x="937306" y="5225286"/>
-            <a:ext cx="933805" cy="400110"/>
-          </a:xfrm>
-          <a:prstGeom prst="rect">
-            <a:avLst/>
-          </a:prstGeom>
-          <a:noFill/>
-        </p:spPr>
-        <p:txBody>
-          <a:bodyPr wrap="square" rtlCol="0">
-            <a:spAutoFit/>
-          </a:bodyPr>
-          <a:lstStyle/>
-          <a:p>
-            <a:r>
-              <a:rPr lang="en-US" altLang="zh-TW" sz="2000" dirty="0">
-                <a:latin typeface="Arial" panose="020B0604020202020204" pitchFamily="34" charset="0"/>
-                <a:cs typeface="Arial" panose="020B0604020202020204" pitchFamily="34" charset="0"/>
-              </a:rPr>
-              <a:t>merge</a:t>
-            </a:r>
-          </a:p>
-        </p:txBody>
-      </p:sp>
-      <p:cxnSp>
-        <p:nvCxnSpPr>
-          <p:cNvPr id="40" name="接點: 肘形 39">
-            <a:extLst>
-              <a:ext uri="{FF2B5EF4-FFF2-40B4-BE49-F238E27FC236}">
-                <a16:creationId xmlns:a16="http://schemas.microsoft.com/office/drawing/2014/main" id="{FEB8B8ED-CAB0-4C11-9628-33C7EB66C3FA}"/>
-              </a:ext>
-            </a:extLst>
-          </p:cNvPr>
-          <p:cNvCxnSpPr>
-            <a:cxnSpLocks/>
-            <a:stCxn id="23" idx="2"/>
-            <a:endCxn id="36" idx="3"/>
-          </p:cNvCxnSpPr>
-          <p:nvPr/>
-        </p:nvCxnSpPr>
-        <p:spPr>
-          <a:xfrm rot="5400000">
-            <a:off x="1885445" y="4586213"/>
-            <a:ext cx="824795" cy="853461"/>
-          </a:xfrm>
-          <a:prstGeom prst="bentConnector2">
-            <a:avLst/>
-          </a:prstGeom>
-          <a:ln w="38100">
-            <a:solidFill>
-              <a:schemeClr val="tx1"/>
-            </a:solidFill>
-            <a:tailEnd type="triangle"/>
-          </a:ln>
-        </p:spPr>
-        <p:style>
-          <a:lnRef idx="1">
-            <a:schemeClr val="accent1"/>
-          </a:lnRef>
-          <a:fillRef idx="0">
-            <a:schemeClr val="accent1"/>
-          </a:fillRef>
-          <a:effectRef idx="0">
-            <a:schemeClr val="accent1"/>
-          </a:effectRef>
-          <a:fontRef idx="minor">
-            <a:schemeClr val="tx1"/>
-          </a:fontRef>
-        </p:style>
-      </p:cxnSp>
-      <p:cxnSp>
-        <p:nvCxnSpPr>
-          <p:cNvPr id="43" name="直線單箭頭接點 42">
-            <a:extLst>
-              <a:ext uri="{FF2B5EF4-FFF2-40B4-BE49-F238E27FC236}">
-                <a16:creationId xmlns:a16="http://schemas.microsoft.com/office/drawing/2014/main" id="{4CBCE9BE-B1B4-49CC-AA1D-6C0C71B98ADB}"/>
-              </a:ext>
-            </a:extLst>
-          </p:cNvPr>
-          <p:cNvCxnSpPr>
-            <a:cxnSpLocks/>
-            <a:stCxn id="36" idx="2"/>
-          </p:cNvCxnSpPr>
-          <p:nvPr/>
-        </p:nvCxnSpPr>
-        <p:spPr>
-          <a:xfrm>
-            <a:off x="1404209" y="5625396"/>
-            <a:ext cx="0" cy="473400"/>
-          </a:xfrm>
-          <a:prstGeom prst="straightConnector1">
-            <a:avLst/>
-          </a:prstGeom>
-          <a:ln w="38100">
-            <a:solidFill>
-              <a:schemeClr val="tx1"/>
-            </a:solidFill>
-            <a:tailEnd type="triangle"/>
-          </a:ln>
-        </p:spPr>
-        <p:style>
-          <a:lnRef idx="1">
-            <a:schemeClr val="accent1"/>
-          </a:lnRef>
-          <a:fillRef idx="0">
-            <a:schemeClr val="accent1"/>
-          </a:fillRef>
-          <a:effectRef idx="0">
-            <a:schemeClr val="accent1"/>
-          </a:effectRef>
-          <a:fontRef idx="minor">
-            <a:schemeClr val="tx1"/>
-          </a:fontRef>
-        </p:style>
-      </p:cxnSp>
+      <p:pic>
+        <p:nvPicPr>
+          <p:cNvPr id="8" name="圖片 7" descr="一張含有 文字 的圖片&#10;&#10;自動產生的描述">
+            <a:extLst>
+              <a:ext uri="{FF2B5EF4-FFF2-40B4-BE49-F238E27FC236}">
+                <a16:creationId xmlns:a16="http://schemas.microsoft.com/office/drawing/2014/main" id="{E3291D27-DD2B-4404-961E-C5BDE4896889}"/>
+              </a:ext>
+            </a:extLst>
+          </p:cNvPr>
+          <p:cNvPicPr>
+            <a:picLocks noChangeAspect="1"/>
+          </p:cNvPicPr>
+          <p:nvPr/>
+        </p:nvPicPr>
+        <p:blipFill>
+          <a:blip r:embed="rId4">
+            <a:extLst>
+              <a:ext uri="{28A0092B-C50C-407E-A947-70E740481C1C}">
+                <a14:useLocalDpi xmlns:a14="http://schemas.microsoft.com/office/drawing/2010/main" val="0"/>
+              </a:ext>
+            </a:extLst>
+          </a:blip>
+          <a:stretch>
+            <a:fillRect/>
+          </a:stretch>
+        </p:blipFill>
+        <p:spPr>
+          <a:xfrm>
+            <a:off x="1298795" y="3294895"/>
+            <a:ext cx="6546409" cy="2309815"/>
+          </a:xfrm>
+          <a:prstGeom prst="rect">
+            <a:avLst/>
+          </a:prstGeom>
+        </p:spPr>
+      </p:pic>
     </p:spTree>
     <p:extLst>
       <p:ext uri="{BB962C8B-B14F-4D97-AF65-F5344CB8AC3E}">
-        <p14:creationId xmlns:p14="http://schemas.microsoft.com/office/powerpoint/2010/main" val="3095387095"/>
+        <p14:creationId xmlns:p14="http://schemas.microsoft.com/office/powerpoint/2010/main" val="1659399492"/>
       </p:ext>
     </p:extLst>
   </p:cSld>
@@ -9003,7 +8467,7 @@
           <p:cNvPr id="5" name="文字方塊 4">
             <a:extLst>
               <a:ext uri="{FF2B5EF4-FFF2-40B4-BE49-F238E27FC236}">
-                <a16:creationId xmlns:a16="http://schemas.microsoft.com/office/drawing/2014/main" id="{C16ED53E-9866-436B-893D-42D9B6177B63}"/>
+                <a16:creationId xmlns:a16="http://schemas.microsoft.com/office/drawing/2014/main" id="{48465F4D-92C8-4218-A958-29D62F6B1A97}"/>
               </a:ext>
             </a:extLst>
           </p:cNvPr>
@@ -9012,8 +8476,8 @@
         </p:nvSpPr>
         <p:spPr>
           <a:xfrm>
-            <a:off x="661169" y="767632"/>
-            <a:ext cx="8039380" cy="4433073"/>
+            <a:off x="386372" y="324441"/>
+            <a:ext cx="2004491" cy="523220"/>
           </a:xfrm>
           <a:prstGeom prst="rect">
             <a:avLst/>
@@ -9021,164 +8485,780 @@
           <a:noFill/>
         </p:spPr>
         <p:txBody>
-          <a:bodyPr wrap="none" rtlCol="0">
+          <a:bodyPr wrap="square" rtlCol="0">
             <a:spAutoFit/>
           </a:bodyPr>
           <a:lstStyle/>
           <a:p>
-            <a:pPr>
-              <a:lnSpc>
-                <a:spcPct val="150000"/>
-              </a:lnSpc>
-            </a:pPr>
-            <a:r>
-              <a:rPr lang="zh-TW" altLang="en-US" sz="3200" dirty="0">
+            <a:r>
+              <a:rPr lang="zh-TW" altLang="en-US" sz="2800" dirty="0">
+                <a:latin typeface="Arial" panose="020B0604020202020204" pitchFamily="34" charset="0"/>
+                <a:cs typeface="Arial" panose="020B0604020202020204" pitchFamily="34" charset="0"/>
+              </a:rPr>
+              <a:t> ＊</a:t>
+            </a:r>
+            <a:r>
+              <a:rPr lang="en-US" altLang="zh-TW" sz="2800" dirty="0">
+                <a:latin typeface="Arial" panose="020B0604020202020204" pitchFamily="34" charset="0"/>
+                <a:cs typeface="Arial" panose="020B0604020202020204" pitchFamily="34" charset="0"/>
+              </a:rPr>
+              <a:t>master</a:t>
+            </a:r>
+          </a:p>
+        </p:txBody>
+      </p:sp>
+      <p:sp>
+        <p:nvSpPr>
+          <p:cNvPr id="6" name="文字方塊 5">
+            <a:extLst>
+              <a:ext uri="{FF2B5EF4-FFF2-40B4-BE49-F238E27FC236}">
+                <a16:creationId xmlns:a16="http://schemas.microsoft.com/office/drawing/2014/main" id="{8481A8F0-C2E1-4577-AC58-35B8EFAE7EBC}"/>
+              </a:ext>
+            </a:extLst>
+          </p:cNvPr>
+          <p:cNvSpPr txBox="1"/>
+          <p:nvPr/>
+        </p:nvSpPr>
+        <p:spPr>
+          <a:xfrm>
+            <a:off x="349046" y="1058886"/>
+            <a:ext cx="2110327" cy="523220"/>
+          </a:xfrm>
+          <a:prstGeom prst="rect">
+            <a:avLst/>
+          </a:prstGeom>
+        </p:spPr>
+        <p:style>
+          <a:lnRef idx="2">
+            <a:schemeClr val="dk1"/>
+          </a:lnRef>
+          <a:fillRef idx="1">
+            <a:schemeClr val="lt1"/>
+          </a:fillRef>
+          <a:effectRef idx="0">
+            <a:schemeClr val="dk1"/>
+          </a:effectRef>
+          <a:fontRef idx="minor">
+            <a:schemeClr val="dk1"/>
+          </a:fontRef>
+        </p:style>
+        <p:txBody>
+          <a:bodyPr wrap="square" rtlCol="0">
+            <a:spAutoFit/>
+          </a:bodyPr>
+          <a:lstStyle/>
+          <a:p>
+            <a:r>
+              <a:rPr lang="zh-TW" altLang="en-US" sz="2800" dirty="0">
+                <a:latin typeface="Arial" panose="020B0604020202020204" pitchFamily="34" charset="0"/>
+                <a:cs typeface="Arial" panose="020B0604020202020204" pitchFamily="34" charset="0"/>
+              </a:rPr>
+              <a:t>。</a:t>
+            </a:r>
+            <a:r>
+              <a:rPr lang="en-US" altLang="zh-TW" sz="2800" dirty="0">
+                <a:latin typeface="Arial" panose="020B0604020202020204" pitchFamily="34" charset="0"/>
+                <a:cs typeface="Arial" panose="020B0604020202020204" pitchFamily="34" charset="0"/>
+              </a:rPr>
+              <a:t>main file</a:t>
+            </a:r>
+          </a:p>
+        </p:txBody>
+      </p:sp>
+      <p:sp>
+        <p:nvSpPr>
+          <p:cNvPr id="7" name="文字方塊 6">
+            <a:extLst>
+              <a:ext uri="{FF2B5EF4-FFF2-40B4-BE49-F238E27FC236}">
+                <a16:creationId xmlns:a16="http://schemas.microsoft.com/office/drawing/2014/main" id="{FC0A0403-E86E-4D4B-A9EC-7255B9A71DC6}"/>
+              </a:ext>
+            </a:extLst>
+          </p:cNvPr>
+          <p:cNvSpPr txBox="1"/>
+          <p:nvPr/>
+        </p:nvSpPr>
+        <p:spPr>
+          <a:xfrm>
+            <a:off x="1669409" y="2314568"/>
+            <a:ext cx="2110327" cy="523220"/>
+          </a:xfrm>
+          <a:prstGeom prst="rect">
+            <a:avLst/>
+          </a:prstGeom>
+        </p:spPr>
+        <p:style>
+          <a:lnRef idx="2">
+            <a:schemeClr val="dk1"/>
+          </a:lnRef>
+          <a:fillRef idx="1">
+            <a:schemeClr val="lt1"/>
+          </a:fillRef>
+          <a:effectRef idx="0">
+            <a:schemeClr val="dk1"/>
+          </a:effectRef>
+          <a:fontRef idx="minor">
+            <a:schemeClr val="dk1"/>
+          </a:fontRef>
+        </p:style>
+        <p:txBody>
+          <a:bodyPr wrap="square" rtlCol="0">
+            <a:spAutoFit/>
+          </a:bodyPr>
+          <a:lstStyle/>
+          <a:p>
+            <a:r>
+              <a:rPr lang="zh-TW" altLang="en-US" sz="2800" dirty="0">
+                <a:latin typeface="Arial" panose="020B0604020202020204" pitchFamily="34" charset="0"/>
+                <a:cs typeface="Arial" panose="020B0604020202020204" pitchFamily="34" charset="0"/>
+              </a:rPr>
+              <a:t>。</a:t>
+            </a:r>
+            <a:r>
+              <a:rPr lang="en-US" altLang="zh-TW" sz="2800" dirty="0">
+                <a:latin typeface="Arial" panose="020B0604020202020204" pitchFamily="34" charset="0"/>
+                <a:cs typeface="Arial" panose="020B0604020202020204" pitchFamily="34" charset="0"/>
+              </a:rPr>
+              <a:t>main file</a:t>
+            </a:r>
+          </a:p>
+        </p:txBody>
+      </p:sp>
+      <p:cxnSp>
+        <p:nvCxnSpPr>
+          <p:cNvPr id="8" name="接點: 肘形 7">
+            <a:extLst>
+              <a:ext uri="{FF2B5EF4-FFF2-40B4-BE49-F238E27FC236}">
+                <a16:creationId xmlns:a16="http://schemas.microsoft.com/office/drawing/2014/main" id="{7EADF4EE-F288-43EB-A2A7-D9F30DA40375}"/>
+              </a:ext>
+            </a:extLst>
+          </p:cNvPr>
+          <p:cNvCxnSpPr>
+            <a:cxnSpLocks/>
+            <a:stCxn id="6" idx="3"/>
+            <a:endCxn id="7" idx="0"/>
+          </p:cNvCxnSpPr>
+          <p:nvPr/>
+        </p:nvCxnSpPr>
+        <p:spPr>
+          <a:xfrm>
+            <a:off x="2459373" y="1320496"/>
+            <a:ext cx="265200" cy="994072"/>
+          </a:xfrm>
+          <a:prstGeom prst="bentConnector2">
+            <a:avLst/>
+          </a:prstGeom>
+          <a:ln w="38100">
+            <a:solidFill>
+              <a:schemeClr val="tx1"/>
+            </a:solidFill>
+            <a:tailEnd type="triangle"/>
+          </a:ln>
+        </p:spPr>
+        <p:style>
+          <a:lnRef idx="1">
+            <a:schemeClr val="accent1"/>
+          </a:lnRef>
+          <a:fillRef idx="0">
+            <a:schemeClr val="accent1"/>
+          </a:fillRef>
+          <a:effectRef idx="0">
+            <a:schemeClr val="accent1"/>
+          </a:effectRef>
+          <a:fontRef idx="minor">
+            <a:schemeClr val="tx1"/>
+          </a:fontRef>
+        </p:style>
+      </p:cxnSp>
+      <p:sp>
+        <p:nvSpPr>
+          <p:cNvPr id="10" name="文字方塊 9">
+            <a:extLst>
+              <a:ext uri="{FF2B5EF4-FFF2-40B4-BE49-F238E27FC236}">
+                <a16:creationId xmlns:a16="http://schemas.microsoft.com/office/drawing/2014/main" id="{ECA7307C-CF29-4344-871F-39CBDF1B0055}"/>
+              </a:ext>
+            </a:extLst>
+          </p:cNvPr>
+          <p:cNvSpPr txBox="1"/>
+          <p:nvPr/>
+        </p:nvSpPr>
+        <p:spPr>
+          <a:xfrm>
+            <a:off x="2915344" y="1417422"/>
+            <a:ext cx="3451167" cy="400110"/>
+          </a:xfrm>
+          <a:prstGeom prst="rect">
+            <a:avLst/>
+          </a:prstGeom>
+          <a:noFill/>
+        </p:spPr>
+        <p:txBody>
+          <a:bodyPr wrap="square" rtlCol="0">
+            <a:spAutoFit/>
+          </a:bodyPr>
+          <a:lstStyle/>
+          <a:p>
+            <a:r>
+              <a:rPr lang="en-US" altLang="zh-TW" sz="2000" dirty="0">
+                <a:latin typeface="Arial" panose="020B0604020202020204" pitchFamily="34" charset="0"/>
+                <a:cs typeface="Arial" panose="020B0604020202020204" pitchFamily="34" charset="0"/>
+              </a:rPr>
+              <a:t>git checkout –b </a:t>
+            </a:r>
+            <a:r>
+              <a:rPr lang="en-US" altLang="zh-TW" sz="2000" dirty="0" err="1">
+                <a:latin typeface="Arial" panose="020B0604020202020204" pitchFamily="34" charset="0"/>
+                <a:cs typeface="Arial" panose="020B0604020202020204" pitchFamily="34" charset="0"/>
+              </a:rPr>
+              <a:t>new_branch</a:t>
+            </a:r>
+            <a:endParaRPr lang="en-US" altLang="zh-TW" sz="2000" dirty="0">
+              <a:latin typeface="Arial" panose="020B0604020202020204" pitchFamily="34" charset="0"/>
+              <a:cs typeface="Arial" panose="020B0604020202020204" pitchFamily="34" charset="0"/>
+            </a:endParaRPr>
+          </a:p>
+        </p:txBody>
+      </p:sp>
+      <p:sp>
+        <p:nvSpPr>
+          <p:cNvPr id="16" name="文字方塊 15">
+            <a:extLst>
+              <a:ext uri="{FF2B5EF4-FFF2-40B4-BE49-F238E27FC236}">
+                <a16:creationId xmlns:a16="http://schemas.microsoft.com/office/drawing/2014/main" id="{5363C442-B1E3-43CD-B532-2E2556292ED2}"/>
+              </a:ext>
+            </a:extLst>
+          </p:cNvPr>
+          <p:cNvSpPr txBox="1"/>
+          <p:nvPr/>
+        </p:nvSpPr>
+        <p:spPr>
+          <a:xfrm>
+            <a:off x="6114410" y="2105740"/>
+            <a:ext cx="2110328" cy="954107"/>
+          </a:xfrm>
+          <a:prstGeom prst="rect">
+            <a:avLst/>
+          </a:prstGeom>
+        </p:spPr>
+        <p:style>
+          <a:lnRef idx="2">
+            <a:schemeClr val="dk1"/>
+          </a:lnRef>
+          <a:fillRef idx="1">
+            <a:schemeClr val="lt1"/>
+          </a:fillRef>
+          <a:effectRef idx="0">
+            <a:schemeClr val="dk1"/>
+          </a:effectRef>
+          <a:fontRef idx="minor">
+            <a:schemeClr val="dk1"/>
+          </a:fontRef>
+        </p:style>
+        <p:txBody>
+          <a:bodyPr wrap="square" rtlCol="0">
+            <a:spAutoFit/>
+          </a:bodyPr>
+          <a:lstStyle/>
+          <a:p>
+            <a:r>
+              <a:rPr lang="zh-TW" altLang="en-US" sz="2800" dirty="0">
+                <a:latin typeface="Arial" panose="020B0604020202020204" pitchFamily="34" charset="0"/>
+                <a:cs typeface="Arial" panose="020B0604020202020204" pitchFamily="34" charset="0"/>
+              </a:rPr>
+              <a:t>。</a:t>
+            </a:r>
+            <a:r>
+              <a:rPr lang="en-US" altLang="zh-TW" sz="2800" dirty="0">
+                <a:latin typeface="Arial" panose="020B0604020202020204" pitchFamily="34" charset="0"/>
+                <a:cs typeface="Arial" panose="020B0604020202020204" pitchFamily="34" charset="0"/>
+              </a:rPr>
+              <a:t>main file</a:t>
+            </a:r>
+          </a:p>
+          <a:p>
+            <a:r>
+              <a:rPr lang="zh-TW" altLang="en-US" sz="2800" dirty="0">
                 <a:latin typeface="Arial" panose="020B0604020202020204" pitchFamily="34" charset="0"/>
                 <a:cs typeface="Arial" panose="020B0604020202020204" pitchFamily="34" charset="0"/>
               </a:rPr>
               <a:t>．</a:t>
             </a:r>
             <a:r>
-              <a:rPr lang="en-US" altLang="zh-TW" sz="3200" dirty="0">
+              <a:rPr lang="en-US" altLang="zh-TW" sz="2800" dirty="0">
                 <a:latin typeface="Arial" panose="020B0604020202020204" pitchFamily="34" charset="0"/>
                 <a:cs typeface="Arial" panose="020B0604020202020204" pitchFamily="34" charset="0"/>
               </a:rPr>
-              <a:t>history of diff. branches are diff.</a:t>
-            </a:r>
-          </a:p>
-          <a:p>
-            <a:pPr>
-              <a:lnSpc>
-                <a:spcPct val="150000"/>
-              </a:lnSpc>
-            </a:pPr>
-            <a:r>
-              <a:rPr lang="zh-TW" altLang="en-US" sz="3200" dirty="0">
+              <a:t>new file</a:t>
+            </a:r>
+          </a:p>
+        </p:txBody>
+      </p:sp>
+      <p:cxnSp>
+        <p:nvCxnSpPr>
+          <p:cNvPr id="18" name="直線單箭頭接點 17">
+            <a:extLst>
+              <a:ext uri="{FF2B5EF4-FFF2-40B4-BE49-F238E27FC236}">
+                <a16:creationId xmlns:a16="http://schemas.microsoft.com/office/drawing/2014/main" id="{D33E09B5-2ABD-4400-824C-B26610015F89}"/>
+              </a:ext>
+            </a:extLst>
+          </p:cNvPr>
+          <p:cNvCxnSpPr>
+            <a:cxnSpLocks/>
+            <a:stCxn id="7" idx="3"/>
+            <a:endCxn id="16" idx="1"/>
+          </p:cNvCxnSpPr>
+          <p:nvPr/>
+        </p:nvCxnSpPr>
+        <p:spPr>
+          <a:xfrm>
+            <a:off x="3779736" y="2576178"/>
+            <a:ext cx="2334674" cy="6616"/>
+          </a:xfrm>
+          <a:prstGeom prst="straightConnector1">
+            <a:avLst/>
+          </a:prstGeom>
+          <a:ln w="38100">
+            <a:solidFill>
+              <a:schemeClr val="tx1"/>
+            </a:solidFill>
+            <a:tailEnd type="triangle"/>
+          </a:ln>
+        </p:spPr>
+        <p:style>
+          <a:lnRef idx="1">
+            <a:schemeClr val="accent1"/>
+          </a:lnRef>
+          <a:fillRef idx="0">
+            <a:schemeClr val="accent1"/>
+          </a:fillRef>
+          <a:effectRef idx="0">
+            <a:schemeClr val="accent1"/>
+          </a:effectRef>
+          <a:fontRef idx="minor">
+            <a:schemeClr val="tx1"/>
+          </a:fontRef>
+        </p:style>
+      </p:cxnSp>
+      <p:sp>
+        <p:nvSpPr>
+          <p:cNvPr id="22" name="文字方塊 21">
+            <a:extLst>
+              <a:ext uri="{FF2B5EF4-FFF2-40B4-BE49-F238E27FC236}">
+                <a16:creationId xmlns:a16="http://schemas.microsoft.com/office/drawing/2014/main" id="{79DDA0F3-83F4-4BB3-BBBA-2509FAA4F2A3}"/>
+              </a:ext>
+            </a:extLst>
+          </p:cNvPr>
+          <p:cNvSpPr txBox="1"/>
+          <p:nvPr/>
+        </p:nvSpPr>
+        <p:spPr>
+          <a:xfrm>
+            <a:off x="4376428" y="2114513"/>
+            <a:ext cx="933805" cy="400110"/>
+          </a:xfrm>
+          <a:prstGeom prst="rect">
+            <a:avLst/>
+          </a:prstGeom>
+          <a:noFill/>
+        </p:spPr>
+        <p:txBody>
+          <a:bodyPr wrap="square" rtlCol="0">
+            <a:spAutoFit/>
+          </a:bodyPr>
+          <a:lstStyle/>
+          <a:p>
+            <a:r>
+              <a:rPr lang="en-US" altLang="zh-TW" sz="2000" dirty="0">
+                <a:latin typeface="Arial" panose="020B0604020202020204" pitchFamily="34" charset="0"/>
+                <a:cs typeface="Arial" panose="020B0604020202020204" pitchFamily="34" charset="0"/>
+              </a:rPr>
+              <a:t>modify</a:t>
+            </a:r>
+          </a:p>
+        </p:txBody>
+      </p:sp>
+      <p:sp>
+        <p:nvSpPr>
+          <p:cNvPr id="23" name="文字方塊 22">
+            <a:extLst>
+              <a:ext uri="{FF2B5EF4-FFF2-40B4-BE49-F238E27FC236}">
+                <a16:creationId xmlns:a16="http://schemas.microsoft.com/office/drawing/2014/main" id="{1F468E26-20E0-441C-9F7E-9891B9ACA69B}"/>
+              </a:ext>
+            </a:extLst>
+          </p:cNvPr>
+          <p:cNvSpPr txBox="1"/>
+          <p:nvPr/>
+        </p:nvSpPr>
+        <p:spPr>
+          <a:xfrm>
+            <a:off x="1669408" y="3646439"/>
+            <a:ext cx="2110328" cy="954107"/>
+          </a:xfrm>
+          <a:prstGeom prst="rect">
+            <a:avLst/>
+          </a:prstGeom>
+        </p:spPr>
+        <p:style>
+          <a:lnRef idx="2">
+            <a:schemeClr val="dk1"/>
+          </a:lnRef>
+          <a:fillRef idx="1">
+            <a:schemeClr val="lt1"/>
+          </a:fillRef>
+          <a:effectRef idx="0">
+            <a:schemeClr val="dk1"/>
+          </a:effectRef>
+          <a:fontRef idx="minor">
+            <a:schemeClr val="dk1"/>
+          </a:fontRef>
+        </p:style>
+        <p:txBody>
+          <a:bodyPr wrap="square" rtlCol="0">
+            <a:spAutoFit/>
+          </a:bodyPr>
+          <a:lstStyle/>
+          <a:p>
+            <a:r>
+              <a:rPr lang="zh-TW" altLang="en-US" sz="2800" dirty="0">
+                <a:latin typeface="Arial" panose="020B0604020202020204" pitchFamily="34" charset="0"/>
+                <a:cs typeface="Arial" panose="020B0604020202020204" pitchFamily="34" charset="0"/>
+              </a:rPr>
+              <a:t>。</a:t>
+            </a:r>
+            <a:r>
+              <a:rPr lang="en-US" altLang="zh-TW" sz="2800" dirty="0">
+                <a:latin typeface="Arial" panose="020B0604020202020204" pitchFamily="34" charset="0"/>
+                <a:cs typeface="Arial" panose="020B0604020202020204" pitchFamily="34" charset="0"/>
+              </a:rPr>
+              <a:t>main file</a:t>
+            </a:r>
+          </a:p>
+          <a:p>
+            <a:r>
+              <a:rPr lang="zh-TW" altLang="en-US" sz="2800" dirty="0">
                 <a:latin typeface="Arial" panose="020B0604020202020204" pitchFamily="34" charset="0"/>
                 <a:cs typeface="Arial" panose="020B0604020202020204" pitchFamily="34" charset="0"/>
               </a:rPr>
               <a:t>．</a:t>
             </a:r>
             <a:r>
-              <a:rPr lang="en-US" altLang="zh-TW" sz="3200" dirty="0">
+              <a:rPr lang="en-US" altLang="zh-TW" sz="2800" dirty="0">
                 <a:latin typeface="Arial" panose="020B0604020202020204" pitchFamily="34" charset="0"/>
                 <a:cs typeface="Arial" panose="020B0604020202020204" pitchFamily="34" charset="0"/>
               </a:rPr>
-              <a:t>git branch –d </a:t>
-            </a:r>
-            <a:r>
-              <a:rPr lang="en-US" altLang="zh-TW" sz="3200" dirty="0" err="1">
+              <a:t>new file</a:t>
+            </a:r>
+          </a:p>
+        </p:txBody>
+      </p:sp>
+      <p:cxnSp>
+        <p:nvCxnSpPr>
+          <p:cNvPr id="24" name="直線單箭頭接點 23">
+            <a:extLst>
+              <a:ext uri="{FF2B5EF4-FFF2-40B4-BE49-F238E27FC236}">
+                <a16:creationId xmlns:a16="http://schemas.microsoft.com/office/drawing/2014/main" id="{AC2572B1-8983-4F84-8AB1-414999449184}"/>
+              </a:ext>
+            </a:extLst>
+          </p:cNvPr>
+          <p:cNvCxnSpPr>
+            <a:cxnSpLocks/>
+            <a:stCxn id="7" idx="2"/>
+            <a:endCxn id="23" idx="0"/>
+          </p:cNvCxnSpPr>
+          <p:nvPr/>
+        </p:nvCxnSpPr>
+        <p:spPr>
+          <a:xfrm flipH="1">
+            <a:off x="2724572" y="2837788"/>
+            <a:ext cx="1" cy="808651"/>
+          </a:xfrm>
+          <a:prstGeom prst="straightConnector1">
+            <a:avLst/>
+          </a:prstGeom>
+          <a:ln w="38100">
+            <a:solidFill>
+              <a:schemeClr val="tx1"/>
+            </a:solidFill>
+            <a:tailEnd type="triangle"/>
+          </a:ln>
+        </p:spPr>
+        <p:style>
+          <a:lnRef idx="1">
+            <a:schemeClr val="accent1"/>
+          </a:lnRef>
+          <a:fillRef idx="0">
+            <a:schemeClr val="accent1"/>
+          </a:fillRef>
+          <a:effectRef idx="0">
+            <a:schemeClr val="accent1"/>
+          </a:effectRef>
+          <a:fontRef idx="minor">
+            <a:schemeClr val="tx1"/>
+          </a:fontRef>
+        </p:style>
+      </p:cxnSp>
+      <p:cxnSp>
+        <p:nvCxnSpPr>
+          <p:cNvPr id="27" name="接點: 肘形 26">
+            <a:extLst>
+              <a:ext uri="{FF2B5EF4-FFF2-40B4-BE49-F238E27FC236}">
+                <a16:creationId xmlns:a16="http://schemas.microsoft.com/office/drawing/2014/main" id="{2E528F29-0DD3-4E23-9397-6B2F6F355E7B}"/>
+              </a:ext>
+            </a:extLst>
+          </p:cNvPr>
+          <p:cNvCxnSpPr>
+            <a:cxnSpLocks/>
+            <a:stCxn id="16" idx="2"/>
+            <a:endCxn id="23" idx="3"/>
+          </p:cNvCxnSpPr>
+          <p:nvPr/>
+        </p:nvCxnSpPr>
+        <p:spPr>
+          <a:xfrm rot="5400000">
+            <a:off x="4942832" y="1896751"/>
+            <a:ext cx="1063646" cy="3389838"/>
+          </a:xfrm>
+          <a:prstGeom prst="bentConnector2">
+            <a:avLst/>
+          </a:prstGeom>
+          <a:ln w="38100">
+            <a:solidFill>
+              <a:schemeClr val="tx1"/>
+            </a:solidFill>
+            <a:tailEnd type="triangle"/>
+          </a:ln>
+        </p:spPr>
+        <p:style>
+          <a:lnRef idx="1">
+            <a:schemeClr val="accent1"/>
+          </a:lnRef>
+          <a:fillRef idx="0">
+            <a:schemeClr val="accent1"/>
+          </a:fillRef>
+          <a:effectRef idx="0">
+            <a:schemeClr val="accent1"/>
+          </a:effectRef>
+          <a:fontRef idx="minor">
+            <a:schemeClr val="tx1"/>
+          </a:fontRef>
+        </p:style>
+      </p:cxnSp>
+      <p:sp>
+        <p:nvSpPr>
+          <p:cNvPr id="30" name="文字方塊 29">
+            <a:extLst>
+              <a:ext uri="{FF2B5EF4-FFF2-40B4-BE49-F238E27FC236}">
+                <a16:creationId xmlns:a16="http://schemas.microsoft.com/office/drawing/2014/main" id="{FEBF6538-9CDD-4F5A-BCB3-757B8725C0BA}"/>
+              </a:ext>
+            </a:extLst>
+          </p:cNvPr>
+          <p:cNvSpPr txBox="1"/>
+          <p:nvPr/>
+        </p:nvSpPr>
+        <p:spPr>
+          <a:xfrm>
+            <a:off x="4652057" y="3686176"/>
+            <a:ext cx="1714454" cy="400110"/>
+          </a:xfrm>
+          <a:prstGeom prst="rect">
+            <a:avLst/>
+          </a:prstGeom>
+          <a:noFill/>
+        </p:spPr>
+        <p:txBody>
+          <a:bodyPr wrap="square" rtlCol="0">
+            <a:spAutoFit/>
+          </a:bodyPr>
+          <a:lstStyle/>
+          <a:p>
+            <a:r>
+              <a:rPr lang="en-US" altLang="zh-TW" sz="2000" dirty="0">
                 <a:latin typeface="Arial" panose="020B0604020202020204" pitchFamily="34" charset="0"/>
                 <a:cs typeface="Arial" panose="020B0604020202020204" pitchFamily="34" charset="0"/>
               </a:rPr>
-              <a:t>branch_name</a:t>
-            </a:r>
-            <a:endParaRPr lang="en-US" altLang="zh-TW" sz="3200" dirty="0">
-              <a:latin typeface="Arial" panose="020B0604020202020204" pitchFamily="34" charset="0"/>
-              <a:cs typeface="Arial" panose="020B0604020202020204" pitchFamily="34" charset="0"/>
-            </a:endParaRPr>
-          </a:p>
-          <a:p>
-            <a:pPr>
-              <a:lnSpc>
-                <a:spcPct val="150000"/>
-              </a:lnSpc>
-            </a:pPr>
-            <a:r>
-              <a:rPr lang="zh-TW" altLang="en-US" sz="3200" dirty="0">
+              <a:t>add, commit</a:t>
+            </a:r>
+          </a:p>
+        </p:txBody>
+      </p:sp>
+      <p:cxnSp>
+        <p:nvCxnSpPr>
+          <p:cNvPr id="33" name="直線單箭頭接點 32">
+            <a:extLst>
+              <a:ext uri="{FF2B5EF4-FFF2-40B4-BE49-F238E27FC236}">
+                <a16:creationId xmlns:a16="http://schemas.microsoft.com/office/drawing/2014/main" id="{A76451C5-833B-4D40-98B0-22044EE7228D}"/>
+              </a:ext>
+            </a:extLst>
+          </p:cNvPr>
+          <p:cNvCxnSpPr>
+            <a:cxnSpLocks/>
+            <a:stCxn id="6" idx="2"/>
+            <a:endCxn id="36" idx="0"/>
+          </p:cNvCxnSpPr>
+          <p:nvPr/>
+        </p:nvCxnSpPr>
+        <p:spPr>
+          <a:xfrm flipH="1">
+            <a:off x="1404209" y="1582106"/>
+            <a:ext cx="1" cy="3643180"/>
+          </a:xfrm>
+          <a:prstGeom prst="straightConnector1">
+            <a:avLst/>
+          </a:prstGeom>
+          <a:ln w="38100">
+            <a:solidFill>
+              <a:schemeClr val="tx1"/>
+            </a:solidFill>
+            <a:tailEnd type="triangle"/>
+          </a:ln>
+        </p:spPr>
+        <p:style>
+          <a:lnRef idx="1">
+            <a:schemeClr val="accent1"/>
+          </a:lnRef>
+          <a:fillRef idx="0">
+            <a:schemeClr val="accent1"/>
+          </a:fillRef>
+          <a:effectRef idx="0">
+            <a:schemeClr val="accent1"/>
+          </a:effectRef>
+          <a:fontRef idx="minor">
+            <a:schemeClr val="tx1"/>
+          </a:fontRef>
+        </p:style>
+      </p:cxnSp>
+      <p:sp>
+        <p:nvSpPr>
+          <p:cNvPr id="36" name="文字方塊 35">
+            <a:extLst>
+              <a:ext uri="{FF2B5EF4-FFF2-40B4-BE49-F238E27FC236}">
+                <a16:creationId xmlns:a16="http://schemas.microsoft.com/office/drawing/2014/main" id="{518804E3-8FC2-4488-87D4-F4A9F33849D8}"/>
+              </a:ext>
+            </a:extLst>
+          </p:cNvPr>
+          <p:cNvSpPr txBox="1"/>
+          <p:nvPr/>
+        </p:nvSpPr>
+        <p:spPr>
+          <a:xfrm>
+            <a:off x="937306" y="5225286"/>
+            <a:ext cx="933805" cy="400110"/>
+          </a:xfrm>
+          <a:prstGeom prst="rect">
+            <a:avLst/>
+          </a:prstGeom>
+          <a:noFill/>
+        </p:spPr>
+        <p:txBody>
+          <a:bodyPr wrap="square" rtlCol="0">
+            <a:spAutoFit/>
+          </a:bodyPr>
+          <a:lstStyle/>
+          <a:p>
+            <a:r>
+              <a:rPr lang="en-US" altLang="zh-TW" sz="2000" dirty="0">
                 <a:latin typeface="Arial" panose="020B0604020202020204" pitchFamily="34" charset="0"/>
                 <a:cs typeface="Arial" panose="020B0604020202020204" pitchFamily="34" charset="0"/>
               </a:rPr>
-              <a:t>．</a:t>
-            </a:r>
-            <a:r>
-              <a:rPr lang="en-US" altLang="zh-TW" sz="3200" dirty="0">
-                <a:latin typeface="Arial" panose="020B0604020202020204" pitchFamily="34" charset="0"/>
-                <a:cs typeface="Arial" panose="020B0604020202020204" pitchFamily="34" charset="0"/>
-              </a:rPr>
-              <a:t>git merge </a:t>
-            </a:r>
-            <a:r>
-              <a:rPr lang="en-US" altLang="zh-TW" sz="3200" dirty="0" err="1">
-                <a:latin typeface="Arial" panose="020B0604020202020204" pitchFamily="34" charset="0"/>
-                <a:cs typeface="Arial" panose="020B0604020202020204" pitchFamily="34" charset="0"/>
-              </a:rPr>
-              <a:t>branch_name</a:t>
-            </a:r>
-            <a:endParaRPr lang="en-US" altLang="zh-TW" sz="3200" dirty="0">
-              <a:latin typeface="Arial" panose="020B0604020202020204" pitchFamily="34" charset="0"/>
-              <a:cs typeface="Arial" panose="020B0604020202020204" pitchFamily="34" charset="0"/>
-            </a:endParaRPr>
-          </a:p>
-          <a:p>
-            <a:pPr>
-              <a:lnSpc>
-                <a:spcPct val="150000"/>
-              </a:lnSpc>
-            </a:pPr>
-            <a:r>
-              <a:rPr lang="zh-TW" altLang="en-US" sz="3200" dirty="0">
-                <a:latin typeface="Arial" panose="020B0604020202020204" pitchFamily="34" charset="0"/>
-                <a:cs typeface="Arial" panose="020B0604020202020204" pitchFamily="34" charset="0"/>
-              </a:rPr>
-              <a:t>．</a:t>
-            </a:r>
-            <a:r>
-              <a:rPr lang="en-US" altLang="zh-TW" sz="3200" dirty="0">
-                <a:latin typeface="Arial" panose="020B0604020202020204" pitchFamily="34" charset="0"/>
-                <a:cs typeface="Arial" panose="020B0604020202020204" pitchFamily="34" charset="0"/>
-              </a:rPr>
-              <a:t>fast-forward merge (when no diverge)</a:t>
-            </a:r>
-          </a:p>
-          <a:p>
-            <a:pPr>
-              <a:lnSpc>
-                <a:spcPct val="150000"/>
-              </a:lnSpc>
-            </a:pPr>
-            <a:r>
-              <a:rPr lang="zh-TW" altLang="en-US" sz="3200" dirty="0">
-                <a:latin typeface="Arial" panose="020B0604020202020204" pitchFamily="34" charset="0"/>
-                <a:cs typeface="Arial" panose="020B0604020202020204" pitchFamily="34" charset="0"/>
-              </a:rPr>
-              <a:t>．</a:t>
-            </a:r>
-            <a:r>
-              <a:rPr lang="en-US" altLang="zh-TW" sz="3200" dirty="0">
-                <a:latin typeface="Arial" panose="020B0604020202020204" pitchFamily="34" charset="0"/>
-                <a:cs typeface="Arial" panose="020B0604020202020204" pitchFamily="34" charset="0"/>
-              </a:rPr>
-              <a:t>three-way merge (diverge but no conflict)</a:t>
-            </a:r>
-          </a:p>
-          <a:p>
-            <a:pPr>
-              <a:lnSpc>
-                <a:spcPct val="150000"/>
-              </a:lnSpc>
-            </a:pPr>
-            <a:r>
-              <a:rPr lang="zh-TW" altLang="en-US" sz="3200" dirty="0">
-                <a:latin typeface="Arial" panose="020B0604020202020204" pitchFamily="34" charset="0"/>
-                <a:cs typeface="Arial" panose="020B0604020202020204" pitchFamily="34" charset="0"/>
-              </a:rPr>
-              <a:t>．</a:t>
-            </a:r>
-            <a:r>
-              <a:rPr lang="en-US" altLang="zh-TW" sz="3200" dirty="0">
-                <a:latin typeface="Arial" panose="020B0604020202020204" pitchFamily="34" charset="0"/>
-                <a:cs typeface="Arial" panose="020B0604020202020204" pitchFamily="34" charset="0"/>
-              </a:rPr>
-              <a:t>conflict ? Fix it, add, and commit </a:t>
+              <a:t>merge</a:t>
             </a:r>
           </a:p>
         </p:txBody>
       </p:sp>
+      <p:cxnSp>
+        <p:nvCxnSpPr>
+          <p:cNvPr id="40" name="接點: 肘形 39">
+            <a:extLst>
+              <a:ext uri="{FF2B5EF4-FFF2-40B4-BE49-F238E27FC236}">
+                <a16:creationId xmlns:a16="http://schemas.microsoft.com/office/drawing/2014/main" id="{FEB8B8ED-CAB0-4C11-9628-33C7EB66C3FA}"/>
+              </a:ext>
+            </a:extLst>
+          </p:cNvPr>
+          <p:cNvCxnSpPr>
+            <a:cxnSpLocks/>
+            <a:stCxn id="23" idx="2"/>
+            <a:endCxn id="36" idx="3"/>
+          </p:cNvCxnSpPr>
+          <p:nvPr/>
+        </p:nvCxnSpPr>
+        <p:spPr>
+          <a:xfrm rot="5400000">
+            <a:off x="1885445" y="4586213"/>
+            <a:ext cx="824795" cy="853461"/>
+          </a:xfrm>
+          <a:prstGeom prst="bentConnector2">
+            <a:avLst/>
+          </a:prstGeom>
+          <a:ln w="38100">
+            <a:solidFill>
+              <a:schemeClr val="tx1"/>
+            </a:solidFill>
+            <a:tailEnd type="triangle"/>
+          </a:ln>
+        </p:spPr>
+        <p:style>
+          <a:lnRef idx="1">
+            <a:schemeClr val="accent1"/>
+          </a:lnRef>
+          <a:fillRef idx="0">
+            <a:schemeClr val="accent1"/>
+          </a:fillRef>
+          <a:effectRef idx="0">
+            <a:schemeClr val="accent1"/>
+          </a:effectRef>
+          <a:fontRef idx="minor">
+            <a:schemeClr val="tx1"/>
+          </a:fontRef>
+        </p:style>
+      </p:cxnSp>
+      <p:cxnSp>
+        <p:nvCxnSpPr>
+          <p:cNvPr id="43" name="直線單箭頭接點 42">
+            <a:extLst>
+              <a:ext uri="{FF2B5EF4-FFF2-40B4-BE49-F238E27FC236}">
+                <a16:creationId xmlns:a16="http://schemas.microsoft.com/office/drawing/2014/main" id="{4CBCE9BE-B1B4-49CC-AA1D-6C0C71B98ADB}"/>
+              </a:ext>
+            </a:extLst>
+          </p:cNvPr>
+          <p:cNvCxnSpPr>
+            <a:cxnSpLocks/>
+            <a:stCxn id="36" idx="2"/>
+          </p:cNvCxnSpPr>
+          <p:nvPr/>
+        </p:nvCxnSpPr>
+        <p:spPr>
+          <a:xfrm>
+            <a:off x="1404209" y="5625396"/>
+            <a:ext cx="0" cy="473400"/>
+          </a:xfrm>
+          <a:prstGeom prst="straightConnector1">
+            <a:avLst/>
+          </a:prstGeom>
+          <a:ln w="38100">
+            <a:solidFill>
+              <a:schemeClr val="tx1"/>
+            </a:solidFill>
+            <a:tailEnd type="triangle"/>
+          </a:ln>
+        </p:spPr>
+        <p:style>
+          <a:lnRef idx="1">
+            <a:schemeClr val="accent1"/>
+          </a:lnRef>
+          <a:fillRef idx="0">
+            <a:schemeClr val="accent1"/>
+          </a:fillRef>
+          <a:effectRef idx="0">
+            <a:schemeClr val="accent1"/>
+          </a:effectRef>
+          <a:fontRef idx="minor">
+            <a:schemeClr val="tx1"/>
+          </a:fontRef>
+        </p:style>
+      </p:cxnSp>
     </p:spTree>
     <p:extLst>
       <p:ext uri="{BB962C8B-B14F-4D97-AF65-F5344CB8AC3E}">
-        <p14:creationId xmlns:p14="http://schemas.microsoft.com/office/powerpoint/2010/main" val="1609292287"/>
+        <p14:creationId xmlns:p14="http://schemas.microsoft.com/office/powerpoint/2010/main" val="3095387095"/>
       </p:ext>
     </p:extLst>
   </p:cSld>
@@ -9632,147 +9712,12 @@
           </a:prstGeom>
         </p:spPr>
       </p:pic>
-      <p:cxnSp>
-        <p:nvCxnSpPr>
-          <p:cNvPr id="5" name="直線接點 4">
-            <a:extLst>
-              <a:ext uri="{FF2B5EF4-FFF2-40B4-BE49-F238E27FC236}">
-                <a16:creationId xmlns:a16="http://schemas.microsoft.com/office/drawing/2014/main" id="{D1762274-47D1-40FE-B255-A9D5DEA69D48}"/>
-              </a:ext>
-            </a:extLst>
-          </p:cNvPr>
-          <p:cNvCxnSpPr>
-            <a:cxnSpLocks/>
-          </p:cNvCxnSpPr>
-          <p:nvPr/>
-        </p:nvCxnSpPr>
-        <p:spPr>
-          <a:xfrm>
-            <a:off x="678535" y="637564"/>
-            <a:ext cx="285226" cy="503339"/>
-          </a:xfrm>
-          <a:prstGeom prst="line">
-            <a:avLst/>
-          </a:prstGeom>
-          <a:ln w="28575">
-            <a:solidFill>
-              <a:schemeClr val="bg1">
-                <a:lumMod val="50000"/>
-              </a:schemeClr>
-            </a:solidFill>
-          </a:ln>
-        </p:spPr>
-        <p:style>
-          <a:lnRef idx="1">
-            <a:schemeClr val="accent1"/>
-          </a:lnRef>
-          <a:fillRef idx="0">
-            <a:schemeClr val="accent1"/>
-          </a:fillRef>
-          <a:effectRef idx="0">
-            <a:schemeClr val="accent1"/>
-          </a:effectRef>
-          <a:fontRef idx="minor">
-            <a:schemeClr val="tx1"/>
-          </a:fontRef>
-        </p:style>
-      </p:cxnSp>
-      <p:cxnSp>
-        <p:nvCxnSpPr>
-          <p:cNvPr id="6" name="直線接點 5">
-            <a:extLst>
-              <a:ext uri="{FF2B5EF4-FFF2-40B4-BE49-F238E27FC236}">
-                <a16:creationId xmlns:a16="http://schemas.microsoft.com/office/drawing/2014/main" id="{E2569004-F964-4D54-83A1-1EDA6D9EF198}"/>
-              </a:ext>
-            </a:extLst>
-          </p:cNvPr>
-          <p:cNvCxnSpPr>
-            <a:cxnSpLocks/>
-          </p:cNvCxnSpPr>
-          <p:nvPr/>
-        </p:nvCxnSpPr>
-        <p:spPr>
-          <a:xfrm>
-            <a:off x="963761" y="1140903"/>
-            <a:ext cx="3162650" cy="0"/>
-          </a:xfrm>
-          <a:prstGeom prst="line">
-            <a:avLst/>
-          </a:prstGeom>
-          <a:ln w="28575">
-            <a:solidFill>
-              <a:schemeClr val="bg1">
-                <a:lumMod val="50000"/>
-              </a:schemeClr>
-            </a:solidFill>
-          </a:ln>
-        </p:spPr>
-        <p:style>
-          <a:lnRef idx="1">
-            <a:schemeClr val="accent1"/>
-          </a:lnRef>
-          <a:fillRef idx="0">
-            <a:schemeClr val="accent1"/>
-          </a:fillRef>
-          <a:effectRef idx="0">
-            <a:schemeClr val="accent1"/>
-          </a:effectRef>
-          <a:fontRef idx="minor">
-            <a:schemeClr val="tx1"/>
-          </a:fontRef>
-        </p:style>
-      </p:cxnSp>
-      <p:cxnSp>
-        <p:nvCxnSpPr>
-          <p:cNvPr id="7" name="直線接點 6">
-            <a:extLst>
-              <a:ext uri="{FF2B5EF4-FFF2-40B4-BE49-F238E27FC236}">
-                <a16:creationId xmlns:a16="http://schemas.microsoft.com/office/drawing/2014/main" id="{139F4661-2B2F-46A0-8E8F-96ADBA363B4C}"/>
-              </a:ext>
-            </a:extLst>
-          </p:cNvPr>
-          <p:cNvCxnSpPr>
-            <a:cxnSpLocks/>
-          </p:cNvCxnSpPr>
-          <p:nvPr/>
-        </p:nvCxnSpPr>
-        <p:spPr>
-          <a:xfrm>
-            <a:off x="4126411" y="1140904"/>
-            <a:ext cx="285226" cy="503339"/>
-          </a:xfrm>
-          <a:prstGeom prst="line">
-            <a:avLst/>
-          </a:prstGeom>
-          <a:ln w="28575">
-            <a:solidFill>
-              <a:schemeClr val="bg1">
-                <a:lumMod val="50000"/>
-              </a:schemeClr>
-            </a:solidFill>
-          </a:ln>
-        </p:spPr>
-        <p:style>
-          <a:lnRef idx="1">
-            <a:schemeClr val="accent1"/>
-          </a:lnRef>
-          <a:fillRef idx="0">
-            <a:schemeClr val="accent1"/>
-          </a:fillRef>
-          <a:effectRef idx="0">
-            <a:schemeClr val="accent1"/>
-          </a:effectRef>
-          <a:fontRef idx="minor">
-            <a:schemeClr val="tx1"/>
-          </a:fontRef>
-        </p:style>
-      </p:cxnSp>
       <p:sp>
         <p:nvSpPr>
-          <p:cNvPr id="8" name="文字方塊 7">
-            <a:extLst>
-              <a:ext uri="{FF2B5EF4-FFF2-40B4-BE49-F238E27FC236}">
-                <a16:creationId xmlns:a16="http://schemas.microsoft.com/office/drawing/2014/main" id="{2E3C98C0-256E-47E3-92E0-EFFAA4DD8CD0}"/>
+          <p:cNvPr id="5" name="文字方塊 4">
+            <a:extLst>
+              <a:ext uri="{FF2B5EF4-FFF2-40B4-BE49-F238E27FC236}">
+                <a16:creationId xmlns:a16="http://schemas.microsoft.com/office/drawing/2014/main" id="{C16ED53E-9866-436B-893D-42D9B6177B63}"/>
               </a:ext>
             </a:extLst>
           </p:cNvPr>
@@ -9781,8 +9726,8 @@
         </p:nvSpPr>
         <p:spPr>
           <a:xfrm>
-            <a:off x="963761" y="433017"/>
-            <a:ext cx="1909497" cy="707886"/>
+            <a:off x="661169" y="767632"/>
+            <a:ext cx="8039380" cy="4433073"/>
           </a:xfrm>
           <a:prstGeom prst="rect">
             <a:avLst/>
@@ -9795,62 +9740,159 @@
           </a:bodyPr>
           <a:lstStyle/>
           <a:p>
-            <a:r>
-              <a:rPr lang="en-US" altLang="zh-TW" sz="4000" dirty="0">
-                <a:latin typeface="微軟正黑體" panose="020B0604030504040204" pitchFamily="34" charset="-120"/>
-                <a:ea typeface="微軟正黑體" panose="020B0604030504040204" pitchFamily="34" charset="-120"/>
-                <a:cs typeface="Times New Roman" panose="02020603050405020304" pitchFamily="18" charset="0"/>
+            <a:pPr>
+              <a:lnSpc>
+                <a:spcPct val="150000"/>
+              </a:lnSpc>
+            </a:pPr>
+            <a:r>
+              <a:rPr lang="zh-TW" altLang="en-US" sz="3200" dirty="0">
+                <a:latin typeface="Arial" panose="020B0604020202020204" pitchFamily="34" charset="0"/>
+                <a:cs typeface="Arial" panose="020B0604020202020204" pitchFamily="34" charset="0"/>
               </a:rPr>
-              <a:t>GitHub</a:t>
-            </a:r>
-            <a:endParaRPr lang="zh-TW" altLang="en-US" sz="4000" dirty="0">
-              <a:latin typeface="微軟正黑體" panose="020B0604030504040204" pitchFamily="34" charset="-120"/>
-              <a:ea typeface="微軟正黑體" panose="020B0604030504040204" pitchFamily="34" charset="-120"/>
-              <a:cs typeface="Times New Roman" panose="02020603050405020304" pitchFamily="18" charset="0"/>
+              <a:t>．</a:t>
+            </a:r>
+            <a:r>
+              <a:rPr lang="en-US" altLang="zh-TW" sz="3200" dirty="0">
+                <a:latin typeface="Arial" panose="020B0604020202020204" pitchFamily="34" charset="0"/>
+                <a:cs typeface="Arial" panose="020B0604020202020204" pitchFamily="34" charset="0"/>
+              </a:rPr>
+              <a:t>history of diff. branches are diff.</a:t>
+            </a:r>
+          </a:p>
+          <a:p>
+            <a:pPr>
+              <a:lnSpc>
+                <a:spcPct val="150000"/>
+              </a:lnSpc>
+            </a:pPr>
+            <a:r>
+              <a:rPr lang="zh-TW" altLang="en-US" sz="3200" dirty="0">
+                <a:latin typeface="Arial" panose="020B0604020202020204" pitchFamily="34" charset="0"/>
+                <a:cs typeface="Arial" panose="020B0604020202020204" pitchFamily="34" charset="0"/>
+              </a:rPr>
+              <a:t>．</a:t>
+            </a:r>
+            <a:r>
+              <a:rPr lang="en-US" altLang="zh-TW" sz="3200" dirty="0">
+                <a:latin typeface="Arial" panose="020B0604020202020204" pitchFamily="34" charset="0"/>
+                <a:cs typeface="Arial" panose="020B0604020202020204" pitchFamily="34" charset="0"/>
+              </a:rPr>
+              <a:t>git branch –d </a:t>
+            </a:r>
+            <a:r>
+              <a:rPr lang="en-US" altLang="zh-TW" sz="3200" dirty="0" err="1">
+                <a:latin typeface="Arial" panose="020B0604020202020204" pitchFamily="34" charset="0"/>
+                <a:cs typeface="Arial" panose="020B0604020202020204" pitchFamily="34" charset="0"/>
+              </a:rPr>
+              <a:t>branch_name</a:t>
+            </a:r>
+            <a:endParaRPr lang="en-US" altLang="zh-TW" sz="3200" dirty="0">
+              <a:latin typeface="Arial" panose="020B0604020202020204" pitchFamily="34" charset="0"/>
+              <a:cs typeface="Arial" panose="020B0604020202020204" pitchFamily="34" charset="0"/>
             </a:endParaRPr>
+          </a:p>
+          <a:p>
+            <a:pPr>
+              <a:lnSpc>
+                <a:spcPct val="150000"/>
+              </a:lnSpc>
+            </a:pPr>
+            <a:r>
+              <a:rPr lang="zh-TW" altLang="en-US" sz="3200" dirty="0">
+                <a:latin typeface="Arial" panose="020B0604020202020204" pitchFamily="34" charset="0"/>
+                <a:cs typeface="Arial" panose="020B0604020202020204" pitchFamily="34" charset="0"/>
+              </a:rPr>
+              <a:t>．</a:t>
+            </a:r>
+            <a:r>
+              <a:rPr lang="en-US" altLang="zh-TW" sz="3200" dirty="0">
+                <a:latin typeface="Arial" panose="020B0604020202020204" pitchFamily="34" charset="0"/>
+                <a:cs typeface="Arial" panose="020B0604020202020204" pitchFamily="34" charset="0"/>
+              </a:rPr>
+              <a:t>git merge </a:t>
+            </a:r>
+            <a:r>
+              <a:rPr lang="en-US" altLang="zh-TW" sz="3200" dirty="0" err="1">
+                <a:latin typeface="Arial" panose="020B0604020202020204" pitchFamily="34" charset="0"/>
+                <a:cs typeface="Arial" panose="020B0604020202020204" pitchFamily="34" charset="0"/>
+              </a:rPr>
+              <a:t>branch_name</a:t>
+            </a:r>
+            <a:endParaRPr lang="en-US" altLang="zh-TW" sz="3200" dirty="0">
+              <a:latin typeface="Arial" panose="020B0604020202020204" pitchFamily="34" charset="0"/>
+              <a:cs typeface="Arial" panose="020B0604020202020204" pitchFamily="34" charset="0"/>
+            </a:endParaRPr>
+          </a:p>
+          <a:p>
+            <a:pPr>
+              <a:lnSpc>
+                <a:spcPct val="150000"/>
+              </a:lnSpc>
+            </a:pPr>
+            <a:r>
+              <a:rPr lang="zh-TW" altLang="en-US" sz="3200" dirty="0">
+                <a:latin typeface="Arial" panose="020B0604020202020204" pitchFamily="34" charset="0"/>
+                <a:cs typeface="Arial" panose="020B0604020202020204" pitchFamily="34" charset="0"/>
+              </a:rPr>
+              <a:t>．</a:t>
+            </a:r>
+            <a:r>
+              <a:rPr lang="en-US" altLang="zh-TW" sz="3200" dirty="0">
+                <a:latin typeface="Arial" panose="020B0604020202020204" pitchFamily="34" charset="0"/>
+                <a:cs typeface="Arial" panose="020B0604020202020204" pitchFamily="34" charset="0"/>
+              </a:rPr>
+              <a:t>fast-forward merge (when no diverge)</a:t>
+            </a:r>
+          </a:p>
+          <a:p>
+            <a:pPr>
+              <a:lnSpc>
+                <a:spcPct val="150000"/>
+              </a:lnSpc>
+            </a:pPr>
+            <a:r>
+              <a:rPr lang="zh-TW" altLang="en-US" sz="3200" dirty="0">
+                <a:latin typeface="Arial" panose="020B0604020202020204" pitchFamily="34" charset="0"/>
+                <a:cs typeface="Arial" panose="020B0604020202020204" pitchFamily="34" charset="0"/>
+              </a:rPr>
+              <a:t>．</a:t>
+            </a:r>
+            <a:r>
+              <a:rPr lang="en-US" altLang="zh-TW" sz="3200" dirty="0">
+                <a:latin typeface="Arial" panose="020B0604020202020204" pitchFamily="34" charset="0"/>
+                <a:cs typeface="Arial" panose="020B0604020202020204" pitchFamily="34" charset="0"/>
+              </a:rPr>
+              <a:t>three-way merge (diverge but no conflict)</a:t>
+            </a:r>
+          </a:p>
+          <a:p>
+            <a:pPr>
+              <a:lnSpc>
+                <a:spcPct val="150000"/>
+              </a:lnSpc>
+            </a:pPr>
+            <a:r>
+              <a:rPr lang="zh-TW" altLang="en-US" sz="3200" dirty="0">
+                <a:latin typeface="Arial" panose="020B0604020202020204" pitchFamily="34" charset="0"/>
+                <a:cs typeface="Arial" panose="020B0604020202020204" pitchFamily="34" charset="0"/>
+              </a:rPr>
+              <a:t>．</a:t>
+            </a:r>
+            <a:r>
+              <a:rPr lang="en-US" altLang="zh-TW" sz="3200" dirty="0">
+                <a:latin typeface="Arial" panose="020B0604020202020204" pitchFamily="34" charset="0"/>
+                <a:cs typeface="Arial" panose="020B0604020202020204" pitchFamily="34" charset="0"/>
+              </a:rPr>
+              <a:t>conflict ? Fix it, add, and commit </a:t>
+            </a:r>
           </a:p>
         </p:txBody>
       </p:sp>
-      <p:pic>
-        <p:nvPicPr>
-          <p:cNvPr id="10" name="圖片 9">
-            <a:hlinkClick r:id="rId4"/>
-            <a:extLst>
-              <a:ext uri="{FF2B5EF4-FFF2-40B4-BE49-F238E27FC236}">
-                <a16:creationId xmlns:a16="http://schemas.microsoft.com/office/drawing/2014/main" id="{65BE1B23-F44B-401E-B019-58749DAFAF89}"/>
-              </a:ext>
-            </a:extLst>
-          </p:cNvPr>
-          <p:cNvPicPr>
-            <a:picLocks noChangeAspect="1"/>
-          </p:cNvPicPr>
-          <p:nvPr/>
-        </p:nvPicPr>
-        <p:blipFill rotWithShape="1">
-          <a:blip r:embed="rId5">
-            <a:extLst>
-              <a:ext uri="{28A0092B-C50C-407E-A947-70E740481C1C}">
-                <a14:useLocalDpi xmlns:a14="http://schemas.microsoft.com/office/drawing/2010/main" val="0"/>
-              </a:ext>
-            </a:extLst>
-          </a:blip>
-          <a:srcRect l="19450" r="19633"/>
-          <a:stretch/>
-        </p:blipFill>
-        <p:spPr>
-          <a:xfrm>
-            <a:off x="2570337" y="2259784"/>
-            <a:ext cx="4003325" cy="3450155"/>
-          </a:xfrm>
-          <a:prstGeom prst="rect">
-            <a:avLst/>
-          </a:prstGeom>
-        </p:spPr>
-      </p:pic>
     </p:spTree>
     <p:extLst>
       <p:ext uri="{BB962C8B-B14F-4D97-AF65-F5344CB8AC3E}">
-        <p14:creationId xmlns:p14="http://schemas.microsoft.com/office/powerpoint/2010/main" val="2013825449"/>
+        <p14:creationId xmlns:p14="http://schemas.microsoft.com/office/powerpoint/2010/main" val="1609292287"/>
       </p:ext>
     </p:extLst>
   </p:cSld>
@@ -9949,10 +9991,225 @@
           </a:prstGeom>
         </p:spPr>
       </p:pic>
+      <p:cxnSp>
+        <p:nvCxnSpPr>
+          <p:cNvPr id="5" name="直線接點 4">
+            <a:extLst>
+              <a:ext uri="{FF2B5EF4-FFF2-40B4-BE49-F238E27FC236}">
+                <a16:creationId xmlns:a16="http://schemas.microsoft.com/office/drawing/2014/main" id="{D1762274-47D1-40FE-B255-A9D5DEA69D48}"/>
+              </a:ext>
+            </a:extLst>
+          </p:cNvPr>
+          <p:cNvCxnSpPr>
+            <a:cxnSpLocks/>
+          </p:cNvCxnSpPr>
+          <p:nvPr/>
+        </p:nvCxnSpPr>
+        <p:spPr>
+          <a:xfrm>
+            <a:off x="678535" y="637564"/>
+            <a:ext cx="285226" cy="503339"/>
+          </a:xfrm>
+          <a:prstGeom prst="line">
+            <a:avLst/>
+          </a:prstGeom>
+          <a:ln w="28575">
+            <a:solidFill>
+              <a:schemeClr val="bg1">
+                <a:lumMod val="50000"/>
+              </a:schemeClr>
+            </a:solidFill>
+          </a:ln>
+        </p:spPr>
+        <p:style>
+          <a:lnRef idx="1">
+            <a:schemeClr val="accent1"/>
+          </a:lnRef>
+          <a:fillRef idx="0">
+            <a:schemeClr val="accent1"/>
+          </a:fillRef>
+          <a:effectRef idx="0">
+            <a:schemeClr val="accent1"/>
+          </a:effectRef>
+          <a:fontRef idx="minor">
+            <a:schemeClr val="tx1"/>
+          </a:fontRef>
+        </p:style>
+      </p:cxnSp>
+      <p:cxnSp>
+        <p:nvCxnSpPr>
+          <p:cNvPr id="6" name="直線接點 5">
+            <a:extLst>
+              <a:ext uri="{FF2B5EF4-FFF2-40B4-BE49-F238E27FC236}">
+                <a16:creationId xmlns:a16="http://schemas.microsoft.com/office/drawing/2014/main" id="{E2569004-F964-4D54-83A1-1EDA6D9EF198}"/>
+              </a:ext>
+            </a:extLst>
+          </p:cNvPr>
+          <p:cNvCxnSpPr>
+            <a:cxnSpLocks/>
+          </p:cNvCxnSpPr>
+          <p:nvPr/>
+        </p:nvCxnSpPr>
+        <p:spPr>
+          <a:xfrm>
+            <a:off x="963761" y="1140903"/>
+            <a:ext cx="3162650" cy="0"/>
+          </a:xfrm>
+          <a:prstGeom prst="line">
+            <a:avLst/>
+          </a:prstGeom>
+          <a:ln w="28575">
+            <a:solidFill>
+              <a:schemeClr val="bg1">
+                <a:lumMod val="50000"/>
+              </a:schemeClr>
+            </a:solidFill>
+          </a:ln>
+        </p:spPr>
+        <p:style>
+          <a:lnRef idx="1">
+            <a:schemeClr val="accent1"/>
+          </a:lnRef>
+          <a:fillRef idx="0">
+            <a:schemeClr val="accent1"/>
+          </a:fillRef>
+          <a:effectRef idx="0">
+            <a:schemeClr val="accent1"/>
+          </a:effectRef>
+          <a:fontRef idx="minor">
+            <a:schemeClr val="tx1"/>
+          </a:fontRef>
+        </p:style>
+      </p:cxnSp>
+      <p:cxnSp>
+        <p:nvCxnSpPr>
+          <p:cNvPr id="7" name="直線接點 6">
+            <a:extLst>
+              <a:ext uri="{FF2B5EF4-FFF2-40B4-BE49-F238E27FC236}">
+                <a16:creationId xmlns:a16="http://schemas.microsoft.com/office/drawing/2014/main" id="{139F4661-2B2F-46A0-8E8F-96ADBA363B4C}"/>
+              </a:ext>
+            </a:extLst>
+          </p:cNvPr>
+          <p:cNvCxnSpPr>
+            <a:cxnSpLocks/>
+          </p:cNvCxnSpPr>
+          <p:nvPr/>
+        </p:nvCxnSpPr>
+        <p:spPr>
+          <a:xfrm>
+            <a:off x="4126411" y="1140904"/>
+            <a:ext cx="285226" cy="503339"/>
+          </a:xfrm>
+          <a:prstGeom prst="line">
+            <a:avLst/>
+          </a:prstGeom>
+          <a:ln w="28575">
+            <a:solidFill>
+              <a:schemeClr val="bg1">
+                <a:lumMod val="50000"/>
+              </a:schemeClr>
+            </a:solidFill>
+          </a:ln>
+        </p:spPr>
+        <p:style>
+          <a:lnRef idx="1">
+            <a:schemeClr val="accent1"/>
+          </a:lnRef>
+          <a:fillRef idx="0">
+            <a:schemeClr val="accent1"/>
+          </a:fillRef>
+          <a:effectRef idx="0">
+            <a:schemeClr val="accent1"/>
+          </a:effectRef>
+          <a:fontRef idx="minor">
+            <a:schemeClr val="tx1"/>
+          </a:fontRef>
+        </p:style>
+      </p:cxnSp>
+      <p:sp>
+        <p:nvSpPr>
+          <p:cNvPr id="8" name="文字方塊 7">
+            <a:extLst>
+              <a:ext uri="{FF2B5EF4-FFF2-40B4-BE49-F238E27FC236}">
+                <a16:creationId xmlns:a16="http://schemas.microsoft.com/office/drawing/2014/main" id="{2E3C98C0-256E-47E3-92E0-EFFAA4DD8CD0}"/>
+              </a:ext>
+            </a:extLst>
+          </p:cNvPr>
+          <p:cNvSpPr txBox="1"/>
+          <p:nvPr/>
+        </p:nvSpPr>
+        <p:spPr>
+          <a:xfrm>
+            <a:off x="963761" y="433017"/>
+            <a:ext cx="1909497" cy="707886"/>
+          </a:xfrm>
+          <a:prstGeom prst="rect">
+            <a:avLst/>
+          </a:prstGeom>
+          <a:noFill/>
+        </p:spPr>
+        <p:txBody>
+          <a:bodyPr wrap="none" rtlCol="0">
+            <a:spAutoFit/>
+          </a:bodyPr>
+          <a:lstStyle/>
+          <a:p>
+            <a:r>
+              <a:rPr lang="en-US" altLang="zh-TW" sz="4000" dirty="0">
+                <a:latin typeface="微軟正黑體" panose="020B0604030504040204" pitchFamily="34" charset="-120"/>
+                <a:ea typeface="微軟正黑體" panose="020B0604030504040204" pitchFamily="34" charset="-120"/>
+                <a:cs typeface="Times New Roman" panose="02020603050405020304" pitchFamily="18" charset="0"/>
+              </a:rPr>
+              <a:t>GitHub</a:t>
+            </a:r>
+            <a:endParaRPr lang="zh-TW" altLang="en-US" sz="4000" dirty="0">
+              <a:latin typeface="微軟正黑體" panose="020B0604030504040204" pitchFamily="34" charset="-120"/>
+              <a:ea typeface="微軟正黑體" panose="020B0604030504040204" pitchFamily="34" charset="-120"/>
+              <a:cs typeface="Times New Roman" panose="02020603050405020304" pitchFamily="18" charset="0"/>
+            </a:endParaRPr>
+          </a:p>
+        </p:txBody>
+      </p:sp>
+      <p:pic>
+        <p:nvPicPr>
+          <p:cNvPr id="10" name="圖片 9">
+            <a:hlinkClick r:id="rId4"/>
+            <a:extLst>
+              <a:ext uri="{FF2B5EF4-FFF2-40B4-BE49-F238E27FC236}">
+                <a16:creationId xmlns:a16="http://schemas.microsoft.com/office/drawing/2014/main" id="{65BE1B23-F44B-401E-B019-58749DAFAF89}"/>
+              </a:ext>
+            </a:extLst>
+          </p:cNvPr>
+          <p:cNvPicPr>
+            <a:picLocks noChangeAspect="1"/>
+          </p:cNvPicPr>
+          <p:nvPr/>
+        </p:nvPicPr>
+        <p:blipFill rotWithShape="1">
+          <a:blip r:embed="rId5">
+            <a:extLst>
+              <a:ext uri="{28A0092B-C50C-407E-A947-70E740481C1C}">
+                <a14:useLocalDpi xmlns:a14="http://schemas.microsoft.com/office/drawing/2010/main" val="0"/>
+              </a:ext>
+            </a:extLst>
+          </a:blip>
+          <a:srcRect l="19450" r="19633"/>
+          <a:stretch/>
+        </p:blipFill>
+        <p:spPr>
+          <a:xfrm>
+            <a:off x="2570337" y="2259784"/>
+            <a:ext cx="4003325" cy="3450155"/>
+          </a:xfrm>
+          <a:prstGeom prst="rect">
+            <a:avLst/>
+          </a:prstGeom>
+        </p:spPr>
+      </p:pic>
     </p:spTree>
     <p:extLst>
       <p:ext uri="{BB962C8B-B14F-4D97-AF65-F5344CB8AC3E}">
-        <p14:creationId xmlns:p14="http://schemas.microsoft.com/office/powerpoint/2010/main" val="680710026"/>
+        <p14:creationId xmlns:p14="http://schemas.microsoft.com/office/powerpoint/2010/main" val="2013825449"/>
       </p:ext>
     </p:extLst>
   </p:cSld>
@@ -10054,7 +10311,7 @@
     </p:spTree>
     <p:extLst>
       <p:ext uri="{BB962C8B-B14F-4D97-AF65-F5344CB8AC3E}">
-        <p14:creationId xmlns:p14="http://schemas.microsoft.com/office/powerpoint/2010/main" val="3810482808"/>
+        <p14:creationId xmlns:p14="http://schemas.microsoft.com/office/powerpoint/2010/main" val="680710026"/>
       </p:ext>
     </p:extLst>
   </p:cSld>
@@ -10156,7 +10413,7 @@
     </p:spTree>
     <p:extLst>
       <p:ext uri="{BB962C8B-B14F-4D97-AF65-F5344CB8AC3E}">
-        <p14:creationId xmlns:p14="http://schemas.microsoft.com/office/powerpoint/2010/main" val="4116190145"/>
+        <p14:creationId xmlns:p14="http://schemas.microsoft.com/office/powerpoint/2010/main" val="3810482808"/>
       </p:ext>
     </p:extLst>
   </p:cSld>
@@ -10258,7 +10515,7 @@
     </p:spTree>
     <p:extLst>
       <p:ext uri="{BB962C8B-B14F-4D97-AF65-F5344CB8AC3E}">
-        <p14:creationId xmlns:p14="http://schemas.microsoft.com/office/powerpoint/2010/main" val="753813999"/>
+        <p14:creationId xmlns:p14="http://schemas.microsoft.com/office/powerpoint/2010/main" val="4116190145"/>
       </p:ext>
     </p:extLst>
   </p:cSld>
@@ -10360,7 +10617,7 @@
     </p:spTree>
     <p:extLst>
       <p:ext uri="{BB962C8B-B14F-4D97-AF65-F5344CB8AC3E}">
-        <p14:creationId xmlns:p14="http://schemas.microsoft.com/office/powerpoint/2010/main" val="1430568939"/>
+        <p14:creationId xmlns:p14="http://schemas.microsoft.com/office/powerpoint/2010/main" val="753813999"/>
       </p:ext>
     </p:extLst>
   </p:cSld>
@@ -10462,7 +10719,7 @@
     </p:spTree>
     <p:extLst>
       <p:ext uri="{BB962C8B-B14F-4D97-AF65-F5344CB8AC3E}">
-        <p14:creationId xmlns:p14="http://schemas.microsoft.com/office/powerpoint/2010/main" val="1615937117"/>
+        <p14:creationId xmlns:p14="http://schemas.microsoft.com/office/powerpoint/2010/main" val="1430568939"/>
       </p:ext>
     </p:extLst>
   </p:cSld>
@@ -10564,7 +10821,7 @@
     </p:spTree>
     <p:extLst>
       <p:ext uri="{BB962C8B-B14F-4D97-AF65-F5344CB8AC3E}">
-        <p14:creationId xmlns:p14="http://schemas.microsoft.com/office/powerpoint/2010/main" val="1509265716"/>
+        <p14:creationId xmlns:p14="http://schemas.microsoft.com/office/powerpoint/2010/main" val="1615937117"/>
       </p:ext>
     </p:extLst>
   </p:cSld>
@@ -10666,7 +10923,7 @@
     </p:spTree>
     <p:extLst>
       <p:ext uri="{BB962C8B-B14F-4D97-AF65-F5344CB8AC3E}">
-        <p14:creationId xmlns:p14="http://schemas.microsoft.com/office/powerpoint/2010/main" val="2624269977"/>
+        <p14:creationId xmlns:p14="http://schemas.microsoft.com/office/powerpoint/2010/main" val="1509265716"/>
       </p:ext>
     </p:extLst>
   </p:cSld>
@@ -10768,7 +11025,7 @@
     </p:spTree>
     <p:extLst>
       <p:ext uri="{BB962C8B-B14F-4D97-AF65-F5344CB8AC3E}">
-        <p14:creationId xmlns:p14="http://schemas.microsoft.com/office/powerpoint/2010/main" val="3887989850"/>
+        <p14:creationId xmlns:p14="http://schemas.microsoft.com/office/powerpoint/2010/main" val="2624269977"/>
       </p:ext>
     </p:extLst>
   </p:cSld>
@@ -11061,7 +11318,7 @@
     </p:spTree>
     <p:extLst>
       <p:ext uri="{BB962C8B-B14F-4D97-AF65-F5344CB8AC3E}">
-        <p14:creationId xmlns:p14="http://schemas.microsoft.com/office/powerpoint/2010/main" val="124486230"/>
+        <p14:creationId xmlns:p14="http://schemas.microsoft.com/office/powerpoint/2010/main" val="3887989850"/>
       </p:ext>
     </p:extLst>
   </p:cSld>
@@ -11163,6 +11420,108 @@
     </p:spTree>
     <p:extLst>
       <p:ext uri="{BB962C8B-B14F-4D97-AF65-F5344CB8AC3E}">
+        <p14:creationId xmlns:p14="http://schemas.microsoft.com/office/powerpoint/2010/main" val="124486230"/>
+      </p:ext>
+    </p:extLst>
+  </p:cSld>
+  <p:clrMapOvr>
+    <a:masterClrMapping/>
+  </p:clrMapOvr>
+</p:sld>
+</file>
+
+<file path=ppt/slides/slide42.xml><?xml version="1.0" encoding="utf-8"?>
+<p:sld xmlns:a="http://schemas.openxmlformats.org/drawingml/2006/main" xmlns:r="http://schemas.openxmlformats.org/officeDocument/2006/relationships" xmlns:p="http://schemas.openxmlformats.org/presentationml/2006/main">
+  <p:cSld>
+    <p:spTree>
+      <p:nvGrpSpPr>
+        <p:cNvPr id="1" name=""/>
+        <p:cNvGrpSpPr/>
+        <p:nvPr/>
+      </p:nvGrpSpPr>
+      <p:grpSpPr>
+        <a:xfrm>
+          <a:off x="0" y="0"/>
+          <a:ext cx="0" cy="0"/>
+          <a:chOff x="0" y="0"/>
+          <a:chExt cx="0" cy="0"/>
+        </a:xfrm>
+      </p:grpSpPr>
+      <p:pic>
+        <p:nvPicPr>
+          <p:cNvPr id="3" name="圖片 2">
+            <a:extLst>
+              <a:ext uri="{FF2B5EF4-FFF2-40B4-BE49-F238E27FC236}">
+                <a16:creationId xmlns:a16="http://schemas.microsoft.com/office/drawing/2014/main" id="{1202EBDE-7F64-43BD-86B7-6C228CCEC2D0}"/>
+              </a:ext>
+            </a:extLst>
+          </p:cNvPr>
+          <p:cNvPicPr>
+            <a:picLocks noChangeAspect="1"/>
+          </p:cNvPicPr>
+          <p:nvPr/>
+        </p:nvPicPr>
+        <p:blipFill>
+          <a:blip r:embed="rId2" cstate="print">
+            <a:extLst>
+              <a:ext uri="{28A0092B-C50C-407E-A947-70E740481C1C}">
+                <a14:useLocalDpi xmlns:a14="http://schemas.microsoft.com/office/drawing/2010/main" val="0"/>
+              </a:ext>
+            </a:extLst>
+          </a:blip>
+          <a:stretch>
+            <a:fillRect/>
+          </a:stretch>
+        </p:blipFill>
+        <p:spPr>
+          <a:xfrm>
+            <a:off x="6598915" y="0"/>
+            <a:ext cx="2545085" cy="3294895"/>
+          </a:xfrm>
+          <a:prstGeom prst="rect">
+            <a:avLst/>
+          </a:prstGeom>
+        </p:spPr>
+      </p:pic>
+      <p:pic>
+        <p:nvPicPr>
+          <p:cNvPr id="4" name="圖片 3">
+            <a:extLst>
+              <a:ext uri="{FF2B5EF4-FFF2-40B4-BE49-F238E27FC236}">
+                <a16:creationId xmlns:a16="http://schemas.microsoft.com/office/drawing/2014/main" id="{AEFF5069-0FA7-44E7-AEEE-225463C6B1AC}"/>
+              </a:ext>
+            </a:extLst>
+          </p:cNvPr>
+          <p:cNvPicPr>
+            <a:picLocks noChangeAspect="1"/>
+          </p:cNvPicPr>
+          <p:nvPr/>
+        </p:nvPicPr>
+        <p:blipFill>
+          <a:blip r:embed="rId3" cstate="print">
+            <a:extLst>
+              <a:ext uri="{28A0092B-C50C-407E-A947-70E740481C1C}">
+                <a14:useLocalDpi xmlns:a14="http://schemas.microsoft.com/office/drawing/2010/main" val="0"/>
+              </a:ext>
+            </a:extLst>
+          </a:blip>
+          <a:stretch>
+            <a:fillRect/>
+          </a:stretch>
+        </p:blipFill>
+        <p:spPr>
+          <a:xfrm>
+            <a:off x="0" y="4169659"/>
+            <a:ext cx="3934976" cy="2688341"/>
+          </a:xfrm>
+          <a:prstGeom prst="rect">
+            <a:avLst/>
+          </a:prstGeom>
+        </p:spPr>
+      </p:pic>
+    </p:spTree>
+    <p:extLst>
+      <p:ext uri="{BB962C8B-B14F-4D97-AF65-F5344CB8AC3E}">
         <p14:creationId xmlns:p14="http://schemas.microsoft.com/office/powerpoint/2010/main" val="76552849"/>
       </p:ext>
     </p:extLst>
@@ -11173,7 +11532,7 @@
 </p:sld>
 </file>
 
-<file path=ppt/slides/slide42.xml><?xml version="1.0" encoding="utf-8"?>
+<file path=ppt/slides/slide43.xml><?xml version="1.0" encoding="utf-8"?>
 <p:sld xmlns:a="http://schemas.openxmlformats.org/drawingml/2006/main" xmlns:r="http://schemas.openxmlformats.org/officeDocument/2006/relationships" xmlns:p="http://schemas.openxmlformats.org/presentationml/2006/main">
   <p:cSld>
     <p:spTree>

</xml_diff>